<commit_message>
Edit the UiComponentClassDiagram power point.
</commit_message>
<xml_diff>
--- a/docs/diagrams/UiComponentClassDiagram.pptx
+++ b/docs/diagrams/UiComponentClassDiagram.pptx
@@ -208,7 +208,7 @@
           <a:p>
             <a:fld id="{F5CC4B3F-88C1-4FFA-B1B6-F41C21DC6924}" type="datetimeFigureOut">
               <a:rPr lang="en-US" smtClean="0"/>
-              <a:t>12/15/2018</a:t>
+              <a:t>2/27/2019</a:t>
             </a:fld>
             <a:endParaRPr lang="en-US"/>
           </a:p>
@@ -654,7 +654,7 @@
           <a:p>
             <a:fld id="{78C97017-6FC3-485B-9764-EAC9E56C1D49}" type="datetimeFigureOut">
               <a:rPr lang="en-US" smtClean="0"/>
-              <a:t>12/15/2018</a:t>
+              <a:t>2/27/2019</a:t>
             </a:fld>
             <a:endParaRPr lang="en-US"/>
           </a:p>
@@ -822,7 +822,7 @@
           <a:p>
             <a:fld id="{78C97017-6FC3-485B-9764-EAC9E56C1D49}" type="datetimeFigureOut">
               <a:rPr lang="en-US" smtClean="0"/>
-              <a:t>12/15/2018</a:t>
+              <a:t>2/27/2019</a:t>
             </a:fld>
             <a:endParaRPr lang="en-US"/>
           </a:p>
@@ -1000,7 +1000,7 @@
           <a:p>
             <a:fld id="{78C97017-6FC3-485B-9764-EAC9E56C1D49}" type="datetimeFigureOut">
               <a:rPr lang="en-US" smtClean="0"/>
-              <a:t>12/15/2018</a:t>
+              <a:t>2/27/2019</a:t>
             </a:fld>
             <a:endParaRPr lang="en-US"/>
           </a:p>
@@ -1168,7 +1168,7 @@
           <a:p>
             <a:fld id="{78C97017-6FC3-485B-9764-EAC9E56C1D49}" type="datetimeFigureOut">
               <a:rPr lang="en-US" smtClean="0"/>
-              <a:t>12/15/2018</a:t>
+              <a:t>2/27/2019</a:t>
             </a:fld>
             <a:endParaRPr lang="en-US"/>
           </a:p>
@@ -1413,7 +1413,7 @@
           <a:p>
             <a:fld id="{78C97017-6FC3-485B-9764-EAC9E56C1D49}" type="datetimeFigureOut">
               <a:rPr lang="en-US" smtClean="0"/>
-              <a:t>12/15/2018</a:t>
+              <a:t>2/27/2019</a:t>
             </a:fld>
             <a:endParaRPr lang="en-US"/>
           </a:p>
@@ -1698,7 +1698,7 @@
           <a:p>
             <a:fld id="{78C97017-6FC3-485B-9764-EAC9E56C1D49}" type="datetimeFigureOut">
               <a:rPr lang="en-US" smtClean="0"/>
-              <a:t>12/15/2018</a:t>
+              <a:t>2/27/2019</a:t>
             </a:fld>
             <a:endParaRPr lang="en-US"/>
           </a:p>
@@ -2117,7 +2117,7 @@
           <a:p>
             <a:fld id="{78C97017-6FC3-485B-9764-EAC9E56C1D49}" type="datetimeFigureOut">
               <a:rPr lang="en-US" smtClean="0"/>
-              <a:t>12/15/2018</a:t>
+              <a:t>2/27/2019</a:t>
             </a:fld>
             <a:endParaRPr lang="en-US"/>
           </a:p>
@@ -2234,7 +2234,7 @@
           <a:p>
             <a:fld id="{78C97017-6FC3-485B-9764-EAC9E56C1D49}" type="datetimeFigureOut">
               <a:rPr lang="en-US" smtClean="0"/>
-              <a:t>12/15/2018</a:t>
+              <a:t>2/27/2019</a:t>
             </a:fld>
             <a:endParaRPr lang="en-US"/>
           </a:p>
@@ -2329,7 +2329,7 @@
           <a:p>
             <a:fld id="{78C97017-6FC3-485B-9764-EAC9E56C1D49}" type="datetimeFigureOut">
               <a:rPr lang="en-US" smtClean="0"/>
-              <a:t>12/15/2018</a:t>
+              <a:t>2/27/2019</a:t>
             </a:fld>
             <a:endParaRPr lang="en-US"/>
           </a:p>
@@ -2604,7 +2604,7 @@
           <a:p>
             <a:fld id="{78C97017-6FC3-485B-9764-EAC9E56C1D49}" type="datetimeFigureOut">
               <a:rPr lang="en-US" smtClean="0"/>
-              <a:t>12/15/2018</a:t>
+              <a:t>2/27/2019</a:t>
             </a:fld>
             <a:endParaRPr lang="en-US"/>
           </a:p>
@@ -2856,7 +2856,7 @@
           <a:p>
             <a:fld id="{78C97017-6FC3-485B-9764-EAC9E56C1D49}" type="datetimeFigureOut">
               <a:rPr lang="en-US" smtClean="0"/>
-              <a:t>12/15/2018</a:t>
+              <a:t>2/27/2019</a:t>
             </a:fld>
             <a:endParaRPr lang="en-US"/>
           </a:p>
@@ -3067,7 +3067,7 @@
           <a:p>
             <a:fld id="{78C97017-6FC3-485B-9764-EAC9E56C1D49}" type="datetimeFigureOut">
               <a:rPr lang="en-US" smtClean="0"/>
-              <a:t>12/15/2018</a:t>
+              <a:t>2/27/2019</a:t>
             </a:fld>
             <a:endParaRPr lang="en-US"/>
           </a:p>
@@ -3450,8 +3450,8 @@
         </p:nvSpPr>
         <p:spPr>
           <a:xfrm>
-            <a:off x="1217465" y="1447800"/>
-            <a:ext cx="4917083" cy="3962400"/>
+            <a:off x="1524000" y="685800"/>
+            <a:ext cx="5200755" cy="5105401"/>
           </a:xfrm>
           <a:prstGeom prst="roundRect">
             <a:avLst>
@@ -3512,7 +3512,7 @@
         </p:nvSpPr>
         <p:spPr>
           <a:xfrm>
-            <a:off x="2095948" y="2341220"/>
+            <a:off x="2402483" y="1579221"/>
             <a:ext cx="1093635" cy="346760"/>
           </a:xfrm>
           <a:prstGeom prst="rect">
@@ -3545,7 +3545,7 @@
           <a:p>
             <a:pPr algn="ctr"/>
             <a:r>
-              <a:rPr lang="en-US" sz="1050" b="1" dirty="0" err="1">
+              <a:rPr lang="en-US" sz="1050" b="1" dirty="0">
                 <a:solidFill>
                   <a:schemeClr val="accent3">
                     <a:lumMod val="75000"/>
@@ -3572,7 +3572,7 @@
         </p:nvSpPr>
         <p:spPr>
           <a:xfrm>
-            <a:off x="2592528" y="2971800"/>
+            <a:off x="2899063" y="2209801"/>
             <a:ext cx="1093635" cy="236841"/>
           </a:xfrm>
           <a:prstGeom prst="rect">
@@ -3605,7 +3605,7 @@
           <a:p>
             <a:pPr algn="ctr"/>
             <a:r>
-              <a:rPr lang="en-US" sz="1050" b="1" dirty="0" err="1">
+              <a:rPr lang="en-US" sz="1050" b="1" dirty="0">
                 <a:solidFill>
                   <a:schemeClr val="accent3">
                     <a:lumMod val="75000"/>
@@ -3632,7 +3632,7 @@
         </p:nvSpPr>
         <p:spPr>
           <a:xfrm>
-            <a:off x="2092842" y="1770924"/>
+            <a:off x="2399377" y="1008925"/>
             <a:ext cx="1093635" cy="346760"/>
           </a:xfrm>
           <a:prstGeom prst="rect">
@@ -3668,7 +3668,7 @@
           <a:p>
             <a:pPr algn="ctr"/>
             <a:r>
-              <a:rPr lang="en-US" sz="1050" dirty="0" err="1">
+              <a:rPr lang="en-US" sz="1050" dirty="0">
                 <a:solidFill>
                   <a:schemeClr val="bg1"/>
                 </a:solidFill>
@@ -3694,7 +3694,7 @@
         </p:nvCxnSpPr>
         <p:spPr>
           <a:xfrm rot="16200000" flipH="1">
-            <a:off x="2529445" y="2227899"/>
+            <a:off x="2835980" y="1465900"/>
             <a:ext cx="223536" cy="3106"/>
           </a:xfrm>
           <a:prstGeom prst="bentConnector3">
@@ -3734,7 +3734,7 @@
         </p:nvSpPr>
         <p:spPr>
           <a:xfrm rot="10800000" flipV="1">
-            <a:off x="5394717" y="2110477"/>
+            <a:off x="5701252" y="1348478"/>
             <a:ext cx="270504" cy="175523"/>
           </a:xfrm>
           <a:prstGeom prst="triangle">
@@ -3782,7 +3782,7 @@
         </p:nvCxnSpPr>
         <p:spPr>
           <a:xfrm flipV="1">
-            <a:off x="644735" y="2991937"/>
+            <a:off x="951270" y="2229938"/>
             <a:ext cx="684904" cy="1"/>
           </a:xfrm>
           <a:prstGeom prst="bentConnector3">
@@ -3825,8 +3825,8 @@
         </p:nvSpPr>
         <p:spPr>
           <a:xfrm rot="16200000">
-            <a:off x="5703829" y="2464877"/>
-            <a:ext cx="2362201" cy="328045"/>
+            <a:off x="6031474" y="1681767"/>
+            <a:ext cx="2319981" cy="328045"/>
           </a:xfrm>
           <a:prstGeom prst="roundRect">
             <a:avLst/>
@@ -3885,7 +3885,7 @@
         </p:nvSpPr>
         <p:spPr>
           <a:xfrm>
-            <a:off x="2592528" y="3649359"/>
+            <a:off x="2899063" y="2887360"/>
             <a:ext cx="1093635" cy="236841"/>
           </a:xfrm>
           <a:prstGeom prst="rect">
@@ -3918,7 +3918,7 @@
           <a:p>
             <a:pPr algn="ctr"/>
             <a:r>
-              <a:rPr lang="en-US" sz="1050" b="1" dirty="0" err="1">
+              <a:rPr lang="en-US" sz="1050" b="1" dirty="0">
                 <a:solidFill>
                   <a:schemeClr val="accent3">
                     <a:lumMod val="75000"/>
@@ -3945,7 +3945,7 @@
         </p:nvSpPr>
         <p:spPr>
           <a:xfrm>
-            <a:off x="2592527" y="4563759"/>
+            <a:off x="2899062" y="4999719"/>
             <a:ext cx="1093635" cy="236841"/>
           </a:xfrm>
           <a:prstGeom prst="rect">
@@ -3978,7 +3978,7 @@
           <a:p>
             <a:pPr algn="ctr"/>
             <a:r>
-              <a:rPr lang="en-US" sz="1050" b="1" dirty="0" err="1">
+              <a:rPr lang="en-US" sz="1050" b="1" dirty="0">
                 <a:solidFill>
                   <a:schemeClr val="accent3">
                     <a:lumMod val="75000"/>
@@ -4005,7 +4005,7 @@
         </p:nvSpPr>
         <p:spPr>
           <a:xfrm>
-            <a:off x="2592526" y="3991960"/>
+            <a:off x="2899061" y="3915762"/>
             <a:ext cx="1093635" cy="236841"/>
           </a:xfrm>
           <a:prstGeom prst="rect">
@@ -4038,14 +4038,14 @@
           <a:p>
             <a:pPr algn="ctr"/>
             <a:r>
-              <a:rPr lang="en-US" sz="1050" b="1" dirty="0" err="1">
+              <a:rPr lang="en-US" sz="1050" b="1" dirty="0">
                 <a:solidFill>
                   <a:schemeClr val="accent3">
                     <a:lumMod val="75000"/>
                   </a:schemeClr>
                 </a:solidFill>
               </a:rPr>
-              <a:t>PersonListPanel</a:t>
+              <a:t>ListPanel</a:t>
             </a:r>
             <a:endParaRPr lang="en-SG" sz="1050" b="1" dirty="0">
               <a:solidFill>
@@ -4059,14 +4059,14 @@
       </p:sp>
       <p:sp>
         <p:nvSpPr>
-          <p:cNvPr id="37" name="Rectangle 11"/>
+          <p:cNvPr id="38" name="Rectangle 11"/>
           <p:cNvSpPr/>
           <p:nvPr/>
         </p:nvSpPr>
         <p:spPr>
           <a:xfrm>
-            <a:off x="3839323" y="4228801"/>
-            <a:ext cx="1040906" cy="236841"/>
+            <a:off x="2899063" y="5401960"/>
+            <a:ext cx="1093635" cy="236841"/>
           </a:xfrm>
           <a:prstGeom prst="rect">
             <a:avLst/>
@@ -4098,14 +4098,14 @@
           <a:p>
             <a:pPr algn="ctr"/>
             <a:r>
-              <a:rPr lang="en-US" sz="1050" b="1" dirty="0" err="1">
+              <a:rPr lang="en-US" sz="1050" b="1" dirty="0">
                 <a:solidFill>
                   <a:schemeClr val="accent3">
                     <a:lumMod val="75000"/>
                   </a:schemeClr>
                 </a:solidFill>
               </a:rPr>
-              <a:t>PersonCard</a:t>
+              <a:t>HelpWindow</a:t>
             </a:r>
             <a:endParaRPr lang="en-SG" sz="1050" b="1" dirty="0">
               <a:solidFill>
@@ -4119,73 +4119,13 @@
       </p:sp>
       <p:sp>
         <p:nvSpPr>
-          <p:cNvPr id="38" name="Rectangle 11"/>
-          <p:cNvSpPr/>
-          <p:nvPr/>
-        </p:nvSpPr>
-        <p:spPr>
-          <a:xfrm>
-            <a:off x="2592528" y="4966000"/>
-            <a:ext cx="1093635" cy="236841"/>
-          </a:xfrm>
-          <a:prstGeom prst="rect">
-            <a:avLst/>
-          </a:prstGeom>
-          <a:ln w="19050">
-            <a:solidFill>
-              <a:schemeClr val="accent3"/>
-            </a:solidFill>
-          </a:ln>
-          <a:effectLst/>
-        </p:spPr>
-        <p:style>
-          <a:lnRef idx="1">
-            <a:schemeClr val="accent3"/>
-          </a:lnRef>
-          <a:fillRef idx="2">
-            <a:schemeClr val="accent3"/>
-          </a:fillRef>
-          <a:effectRef idx="1">
-            <a:schemeClr val="accent3"/>
-          </a:effectRef>
-          <a:fontRef idx="minor">
-            <a:schemeClr val="dk1"/>
-          </a:fontRef>
-        </p:style>
-        <p:txBody>
-          <a:bodyPr rtlCol="0" anchor="ctr"/>
-          <a:lstStyle/>
-          <a:p>
-            <a:pPr algn="ctr"/>
-            <a:r>
-              <a:rPr lang="en-US" sz="1050" b="1" dirty="0" err="1">
-                <a:solidFill>
-                  <a:schemeClr val="accent3">
-                    <a:lumMod val="75000"/>
-                  </a:schemeClr>
-                </a:solidFill>
-              </a:rPr>
-              <a:t>HelpWindow</a:t>
-            </a:r>
-            <a:endParaRPr lang="en-SG" sz="1050" b="1" dirty="0">
-              <a:solidFill>
-                <a:schemeClr val="accent3">
-                  <a:lumMod val="75000"/>
-                </a:schemeClr>
-              </a:solidFill>
-            </a:endParaRPr>
-          </a:p>
-        </p:txBody>
-      </p:sp>
-      <p:sp>
-        <p:nvSpPr>
           <p:cNvPr id="39" name="Flowchart: Decision 38"/>
           <p:cNvSpPr/>
           <p:nvPr/>
         </p:nvSpPr>
         <p:spPr>
           <a:xfrm>
-            <a:off x="2324548" y="2706452"/>
+            <a:off x="2631083" y="1944453"/>
             <a:ext cx="183156" cy="161573"/>
           </a:xfrm>
           <a:prstGeom prst="flowChartDecision">
@@ -4236,7 +4176,7 @@
         </p:nvCxnSpPr>
         <p:spPr>
           <a:xfrm rot="16200000" flipH="1">
-            <a:off x="2393229" y="2890922"/>
+            <a:off x="2699764" y="2128923"/>
             <a:ext cx="222196" cy="176402"/>
           </a:xfrm>
           <a:prstGeom prst="bentConnector2">
@@ -4274,7 +4214,7 @@
         </p:nvSpPr>
         <p:spPr>
           <a:xfrm>
-            <a:off x="2590799" y="3304308"/>
+            <a:off x="2897334" y="2542309"/>
             <a:ext cx="1095361" cy="236841"/>
           </a:xfrm>
           <a:prstGeom prst="rect">
@@ -4307,7 +4247,7 @@
           <a:p>
             <a:pPr algn="ctr"/>
             <a:r>
-              <a:rPr lang="en-US" sz="1050" b="1" dirty="0" err="1">
+              <a:rPr lang="en-US" sz="1050" b="1" dirty="0">
                 <a:solidFill>
                   <a:schemeClr val="accent3">
                     <a:lumMod val="75000"/>
@@ -4337,7 +4277,7 @@
         </p:nvCxnSpPr>
         <p:spPr>
           <a:xfrm rot="16200000" flipH="1">
-            <a:off x="2054450" y="3229701"/>
+            <a:off x="2360985" y="2467702"/>
             <a:ext cx="899755" cy="176402"/>
           </a:xfrm>
           <a:prstGeom prst="bentConnector2">
@@ -4378,8 +4318,8 @@
         </p:nvCxnSpPr>
         <p:spPr>
           <a:xfrm rot="16200000" flipH="1">
-            <a:off x="1883148" y="3401003"/>
-            <a:ext cx="1242356" cy="176400"/>
+            <a:off x="1846783" y="2981904"/>
+            <a:ext cx="1928157" cy="176400"/>
           </a:xfrm>
           <a:prstGeom prst="bentConnector2">
             <a:avLst/>
@@ -4419,8 +4359,8 @@
         </p:nvCxnSpPr>
         <p:spPr>
           <a:xfrm rot="16200000" flipH="1">
-            <a:off x="1597249" y="3686901"/>
-            <a:ext cx="1814155" cy="176401"/>
+            <a:off x="1304804" y="3523882"/>
+            <a:ext cx="3012114" cy="176401"/>
           </a:xfrm>
           <a:prstGeom prst="bentConnector2">
             <a:avLst/>
@@ -4453,14 +4393,15 @@
         <p:nvCxnSpPr>
           <p:cNvPr id="53" name="Elbow Connector 63"/>
           <p:cNvCxnSpPr>
+            <a:cxnSpLocks/>
             <a:endCxn id="38" idx="1"/>
           </p:cNvCxnSpPr>
           <p:nvPr/>
         </p:nvCxnSpPr>
         <p:spPr>
           <a:xfrm rot="16200000" flipH="1">
-            <a:off x="1184119" y="3676012"/>
-            <a:ext cx="2396440" cy="420377"/>
+            <a:off x="909661" y="3530979"/>
+            <a:ext cx="3594398" cy="384406"/>
           </a:xfrm>
           <a:prstGeom prst="bentConnector2">
             <a:avLst/>
@@ -4497,7 +4438,7 @@
         </p:nvSpPr>
         <p:spPr>
           <a:xfrm>
-            <a:off x="5143948" y="1770924"/>
+            <a:off x="5450483" y="1008925"/>
             <a:ext cx="772043" cy="346760"/>
           </a:xfrm>
           <a:prstGeom prst="rect">
@@ -4549,7 +4490,7 @@
               </a:rPr>
             </a:br>
             <a:r>
-              <a:rPr lang="en-US" sz="1050" b="1" dirty="0" err="1">
+              <a:rPr lang="en-US" sz="1050" b="1" dirty="0">
                 <a:solidFill>
                   <a:schemeClr val="accent3">
                     <a:lumMod val="75000"/>
@@ -4579,7 +4520,7 @@
         </p:nvCxnSpPr>
         <p:spPr>
           <a:xfrm flipV="1">
-            <a:off x="3686160" y="2286000"/>
+            <a:off x="3992695" y="1524001"/>
             <a:ext cx="1843809" cy="1136729"/>
           </a:xfrm>
           <a:prstGeom prst="bentConnector2">
@@ -4613,15 +4554,16 @@
         <p:nvCxnSpPr>
           <p:cNvPr id="77" name="Elbow Connector 63"/>
           <p:cNvCxnSpPr>
+            <a:cxnSpLocks/>
             <a:stCxn id="16" idx="3"/>
-            <a:endCxn id="37" idx="3"/>
+            <a:endCxn id="52" idx="3"/>
           </p:cNvCxnSpPr>
           <p:nvPr/>
         </p:nvCxnSpPr>
         <p:spPr>
           <a:xfrm rot="5400000">
-            <a:off x="4174488" y="2991741"/>
-            <a:ext cx="2061222" cy="649740"/>
+            <a:off x="4261847" y="2679880"/>
+            <a:ext cx="2730536" cy="418779"/>
           </a:xfrm>
           <a:prstGeom prst="bentConnector2">
             <a:avLst/>
@@ -4661,7 +4603,7 @@
         </p:nvCxnSpPr>
         <p:spPr>
           <a:xfrm rot="5400000">
-            <a:off x="3867176" y="2104987"/>
+            <a:off x="4173711" y="1342988"/>
             <a:ext cx="1481780" cy="1843806"/>
           </a:xfrm>
           <a:prstGeom prst="bentConnector2">
@@ -4702,7 +4644,7 @@
         </p:nvCxnSpPr>
         <p:spPr>
           <a:xfrm flipV="1">
-            <a:off x="3189583" y="2286000"/>
+            <a:off x="3496118" y="1524001"/>
             <a:ext cx="2340386" cy="228600"/>
           </a:xfrm>
           <a:prstGeom prst="bentConnector2">
@@ -4736,14 +4678,14 @@
         <p:nvCxnSpPr>
           <p:cNvPr id="91" name="Elbow Connector 63"/>
           <p:cNvCxnSpPr>
-            <a:stCxn id="16" idx="3"/>
+            <a:cxnSpLocks/>
             <a:endCxn id="35" idx="3"/>
           </p:cNvCxnSpPr>
           <p:nvPr/>
         </p:nvCxnSpPr>
         <p:spPr>
           <a:xfrm rot="5400000">
-            <a:off x="3409976" y="2562187"/>
+            <a:off x="3716511" y="2998147"/>
             <a:ext cx="2396180" cy="1843807"/>
           </a:xfrm>
           <a:prstGeom prst="bentConnector2">
@@ -4777,14 +4719,14 @@
         <p:nvCxnSpPr>
           <p:cNvPr id="94" name="Elbow Connector 63"/>
           <p:cNvCxnSpPr>
-            <a:stCxn id="16" idx="3"/>
+            <a:cxnSpLocks/>
             <a:endCxn id="38" idx="3"/>
           </p:cNvCxnSpPr>
           <p:nvPr/>
         </p:nvCxnSpPr>
         <p:spPr>
           <a:xfrm rot="5400000">
-            <a:off x="3208856" y="2763307"/>
+            <a:off x="3515391" y="3199267"/>
             <a:ext cx="2798421" cy="1843806"/>
           </a:xfrm>
           <a:prstGeom prst="bentConnector2">
@@ -4824,7 +4766,7 @@
         </p:nvCxnSpPr>
         <p:spPr>
           <a:xfrm rot="5400000" flipH="1" flipV="1">
-            <a:off x="4594921" y="-355061"/>
+            <a:off x="4901456" y="-1117060"/>
             <a:ext cx="170724" cy="4081246"/>
           </a:xfrm>
           <a:prstGeom prst="bentConnector2">
@@ -4863,8 +4805,8 @@
         </p:nvSpPr>
         <p:spPr>
           <a:xfrm rot="16200000">
-            <a:off x="6213739" y="4560376"/>
-            <a:ext cx="1371599" cy="328045"/>
+            <a:off x="5870143" y="4291246"/>
+            <a:ext cx="2671863" cy="328045"/>
           </a:xfrm>
           <a:prstGeom prst="roundRect">
             <a:avLst/>
@@ -4923,7 +4865,7 @@
         </p:nvSpPr>
         <p:spPr>
           <a:xfrm rot="16200000">
-            <a:off x="956202" y="2861202"/>
+            <a:off x="1262737" y="2099203"/>
             <a:ext cx="1093635" cy="346760"/>
           </a:xfrm>
           <a:prstGeom prst="rect">
@@ -4970,7 +4912,7 @@
           <a:p>
             <a:pPr algn="ctr"/>
             <a:r>
-              <a:rPr lang="en-US" sz="1050" dirty="0" err="1">
+              <a:rPr lang="en-US" sz="1050" dirty="0">
                 <a:solidFill>
                   <a:schemeClr val="bg1"/>
                 </a:solidFill>
@@ -4993,7 +4935,7 @@
         </p:nvSpPr>
         <p:spPr>
           <a:xfrm flipV="1">
-            <a:off x="1367767" y="2286001"/>
+            <a:off x="1674302" y="1524002"/>
             <a:ext cx="270504" cy="175523"/>
           </a:xfrm>
           <a:prstGeom prst="triangle">
@@ -5044,7 +4986,7 @@
         </p:nvCxnSpPr>
         <p:spPr>
           <a:xfrm rot="10800000" flipV="1">
-            <a:off x="1503020" y="1944303"/>
+            <a:off x="1809555" y="1182304"/>
             <a:ext cx="589823" cy="341697"/>
           </a:xfrm>
           <a:prstGeom prst="bentConnector2">
@@ -5086,7 +5028,7 @@
         </p:nvCxnSpPr>
         <p:spPr>
           <a:xfrm rot="16200000" flipH="1">
-            <a:off x="2226110" y="3058040"/>
+            <a:off x="2532645" y="2296041"/>
             <a:ext cx="554704" cy="174673"/>
           </a:xfrm>
           <a:prstGeom prst="bentConnector2">
@@ -5127,7 +5069,7 @@
         </p:nvCxnSpPr>
         <p:spPr>
           <a:xfrm rot="5400000">
-            <a:off x="4205956" y="1766207"/>
+            <a:off x="4512491" y="1004208"/>
             <a:ext cx="804221" cy="1843806"/>
           </a:xfrm>
           <a:prstGeom prst="bentConnector2">
@@ -5161,15 +5103,15 @@
         <p:nvCxnSpPr>
           <p:cNvPr id="137" name="Elbow Connector 136"/>
           <p:cNvCxnSpPr>
+            <a:cxnSpLocks/>
             <a:stCxn id="36" idx="2"/>
-            <a:endCxn id="37" idx="1"/>
           </p:cNvCxnSpPr>
           <p:nvPr/>
         </p:nvCxnSpPr>
         <p:spPr>
           <a:xfrm rot="16200000" flipH="1">
-            <a:off x="3430123" y="3938021"/>
-            <a:ext cx="118421" cy="699979"/>
+            <a:off x="3749643" y="3848839"/>
+            <a:ext cx="90996" cy="698524"/>
           </a:xfrm>
           <a:prstGeom prst="bentConnector2">
             <a:avLst/>
@@ -5209,8 +5151,8 @@
         </p:nvCxnSpPr>
         <p:spPr>
           <a:xfrm rot="5400000">
-            <a:off x="3695875" y="2276286"/>
-            <a:ext cx="1824381" cy="1843808"/>
+            <a:off x="3659509" y="1857188"/>
+            <a:ext cx="2510182" cy="1843808"/>
           </a:xfrm>
           <a:prstGeom prst="bentConnector2">
             <a:avLst/>
@@ -5247,7 +5189,7 @@
         </p:nvSpPr>
         <p:spPr>
           <a:xfrm>
-            <a:off x="5422048" y="2339335"/>
+            <a:off x="5728583" y="1577336"/>
             <a:ext cx="229325" cy="166560"/>
           </a:xfrm>
           <a:prstGeom prst="rect">
@@ -5300,7 +5242,7 @@
         </p:nvSpPr>
         <p:spPr>
           <a:xfrm>
-            <a:off x="3186477" y="2405681"/>
+            <a:off x="3493012" y="1643682"/>
             <a:ext cx="3537529" cy="45719"/>
           </a:xfrm>
           <a:custGeom>
@@ -5382,7 +5324,7 @@
         </p:nvSpPr>
         <p:spPr>
           <a:xfrm>
-            <a:off x="5431573" y="4488138"/>
+            <a:off x="5738108" y="3726139"/>
             <a:ext cx="229325" cy="160062"/>
           </a:xfrm>
           <a:prstGeom prst="rect">
@@ -5435,7 +5377,7 @@
         </p:nvSpPr>
         <p:spPr>
           <a:xfrm flipV="1">
-            <a:off x="4114799" y="4472708"/>
+            <a:off x="4421334" y="4396510"/>
             <a:ext cx="2642195" cy="101600"/>
           </a:xfrm>
           <a:custGeom>
@@ -5509,6 +5451,819 @@
           </a:p>
         </p:txBody>
       </p:sp>
+      <p:sp>
+        <p:nvSpPr>
+          <p:cNvPr id="42" name="Rectangle 11">
+            <a:extLst>
+              <a:ext uri="{FF2B5EF4-FFF2-40B4-BE49-F238E27FC236}">
+                <a16:creationId xmlns:a16="http://schemas.microsoft.com/office/drawing/2014/main" id="{93275EE9-C2B9-422D-9421-63CBC62A18E4}"/>
+              </a:ext>
+            </a:extLst>
+          </p:cNvPr>
+          <p:cNvSpPr/>
+          <p:nvPr/>
+        </p:nvSpPr>
+        <p:spPr>
+          <a:xfrm>
+            <a:off x="4145858" y="3119337"/>
+            <a:ext cx="1274954" cy="230829"/>
+          </a:xfrm>
+          <a:prstGeom prst="rect">
+            <a:avLst/>
+          </a:prstGeom>
+          <a:ln w="19050">
+            <a:solidFill>
+              <a:schemeClr val="accent3"/>
+            </a:solidFill>
+          </a:ln>
+          <a:effectLst/>
+        </p:spPr>
+        <p:style>
+          <a:lnRef idx="1">
+            <a:schemeClr val="accent3"/>
+          </a:lnRef>
+          <a:fillRef idx="2">
+            <a:schemeClr val="accent3"/>
+          </a:fillRef>
+          <a:effectRef idx="1">
+            <a:schemeClr val="accent3"/>
+          </a:effectRef>
+          <a:fontRef idx="minor">
+            <a:schemeClr val="dk1"/>
+          </a:fontRef>
+        </p:style>
+        <p:txBody>
+          <a:bodyPr rtlCol="0" anchor="ctr"/>
+          <a:lstStyle/>
+          <a:p>
+            <a:pPr algn="ctr"/>
+            <a:r>
+              <a:rPr lang="en-US" sz="1050" b="1" dirty="0">
+                <a:solidFill>
+                  <a:schemeClr val="accent3">
+                    <a:lumMod val="75000"/>
+                  </a:schemeClr>
+                </a:solidFill>
+              </a:rPr>
+              <a:t>TableCard</a:t>
+            </a:r>
+            <a:endParaRPr lang="en-SG" sz="1050" b="1" dirty="0">
+              <a:solidFill>
+                <a:schemeClr val="accent3">
+                  <a:lumMod val="75000"/>
+                </a:schemeClr>
+              </a:solidFill>
+            </a:endParaRPr>
+          </a:p>
+        </p:txBody>
+      </p:sp>
+      <p:sp>
+        <p:nvSpPr>
+          <p:cNvPr id="45" name="Freeform 117">
+            <a:extLst>
+              <a:ext uri="{FF2B5EF4-FFF2-40B4-BE49-F238E27FC236}">
+                <a16:creationId xmlns:a16="http://schemas.microsoft.com/office/drawing/2014/main" id="{07A19E23-C4A7-4A7D-9549-AE5EB1EB8940}"/>
+              </a:ext>
+            </a:extLst>
+          </p:cNvPr>
+          <p:cNvSpPr/>
+          <p:nvPr/>
+        </p:nvSpPr>
+        <p:spPr>
+          <a:xfrm flipV="1">
+            <a:off x="4421334" y="3363244"/>
+            <a:ext cx="2642195" cy="101600"/>
+          </a:xfrm>
+          <a:custGeom>
+            <a:avLst/>
+            <a:gdLst>
+              <a:gd name="connsiteX0" fmla="*/ 0 w 3048000"/>
+              <a:gd name="connsiteY0" fmla="*/ 203200 h 203200"/>
+              <a:gd name="connsiteX1" fmla="*/ 221673 w 3048000"/>
+              <a:gd name="connsiteY1" fmla="*/ 0 h 203200"/>
+              <a:gd name="connsiteX2" fmla="*/ 3048000 w 3048000"/>
+              <a:gd name="connsiteY2" fmla="*/ 0 h 203200"/>
+            </a:gdLst>
+            <a:ahLst/>
+            <a:cxnLst>
+              <a:cxn ang="0">
+                <a:pos x="connsiteX0" y="connsiteY0"/>
+              </a:cxn>
+              <a:cxn ang="0">
+                <a:pos x="connsiteX1" y="connsiteY1"/>
+              </a:cxn>
+              <a:cxn ang="0">
+                <a:pos x="connsiteX2" y="connsiteY2"/>
+              </a:cxn>
+            </a:cxnLst>
+            <a:rect l="l" t="t" r="r" b="b"/>
+            <a:pathLst>
+              <a:path w="3048000" h="203200">
+                <a:moveTo>
+                  <a:pt x="0" y="203200"/>
+                </a:moveTo>
+                <a:lnTo>
+                  <a:pt x="221673" y="0"/>
+                </a:lnTo>
+                <a:lnTo>
+                  <a:pt x="3048000" y="0"/>
+                </a:lnTo>
+              </a:path>
+            </a:pathLst>
+          </a:custGeom>
+          <a:noFill/>
+          <a:ln w="19050">
+            <a:solidFill>
+              <a:schemeClr val="accent3"/>
+            </a:solidFill>
+            <a:prstDash val="sysDot"/>
+            <a:headEnd type="none" w="med" len="med"/>
+            <a:tailEnd type="arrow" w="med" len="med"/>
+          </a:ln>
+          <a:effectLst/>
+        </p:spPr>
+        <p:style>
+          <a:lnRef idx="1">
+            <a:schemeClr val="accent2"/>
+          </a:lnRef>
+          <a:fillRef idx="2">
+            <a:schemeClr val="accent2"/>
+          </a:fillRef>
+          <a:effectRef idx="1">
+            <a:schemeClr val="accent2"/>
+          </a:effectRef>
+          <a:fontRef idx="minor">
+            <a:schemeClr val="dk1"/>
+          </a:fontRef>
+        </p:style>
+        <p:txBody>
+          <a:bodyPr rtlCol="0" anchor="ctr"/>
+          <a:lstStyle/>
+          <a:p>
+            <a:pPr algn="ctr"/>
+            <a:endParaRPr lang="en-SG"/>
+          </a:p>
+        </p:txBody>
+      </p:sp>
+      <p:sp>
+        <p:nvSpPr>
+          <p:cNvPr id="46" name="Rectangle 11">
+            <a:extLst>
+              <a:ext uri="{FF2B5EF4-FFF2-40B4-BE49-F238E27FC236}">
+                <a16:creationId xmlns:a16="http://schemas.microsoft.com/office/drawing/2014/main" id="{CF41DF3E-BFEE-446C-AD0E-7A6DA7A36889}"/>
+              </a:ext>
+            </a:extLst>
+          </p:cNvPr>
+          <p:cNvSpPr/>
+          <p:nvPr/>
+        </p:nvSpPr>
+        <p:spPr>
+          <a:xfrm>
+            <a:off x="4145857" y="3543087"/>
+            <a:ext cx="1274955" cy="230829"/>
+          </a:xfrm>
+          <a:prstGeom prst="rect">
+            <a:avLst/>
+          </a:prstGeom>
+          <a:ln w="19050">
+            <a:solidFill>
+              <a:schemeClr val="accent3"/>
+            </a:solidFill>
+          </a:ln>
+          <a:effectLst/>
+        </p:spPr>
+        <p:style>
+          <a:lnRef idx="1">
+            <a:schemeClr val="accent3"/>
+          </a:lnRef>
+          <a:fillRef idx="2">
+            <a:schemeClr val="accent3"/>
+          </a:fillRef>
+          <a:effectRef idx="1">
+            <a:schemeClr val="accent3"/>
+          </a:effectRef>
+          <a:fontRef idx="minor">
+            <a:schemeClr val="dk1"/>
+          </a:fontRef>
+        </p:style>
+        <p:txBody>
+          <a:bodyPr rtlCol="0" anchor="ctr"/>
+          <a:lstStyle/>
+          <a:p>
+            <a:pPr algn="ctr"/>
+            <a:r>
+              <a:rPr lang="en-US" sz="1050" b="1" dirty="0" err="1">
+                <a:solidFill>
+                  <a:schemeClr val="accent3">
+                    <a:lumMod val="75000"/>
+                  </a:schemeClr>
+                </a:solidFill>
+              </a:rPr>
+              <a:t>StatsCard</a:t>
+            </a:r>
+            <a:endParaRPr lang="en-SG" sz="1050" b="1" dirty="0">
+              <a:solidFill>
+                <a:schemeClr val="accent3">
+                  <a:lumMod val="75000"/>
+                </a:schemeClr>
+              </a:solidFill>
+            </a:endParaRPr>
+          </a:p>
+        </p:txBody>
+      </p:sp>
+      <p:sp>
+        <p:nvSpPr>
+          <p:cNvPr id="48" name="Freeform 117">
+            <a:extLst>
+              <a:ext uri="{FF2B5EF4-FFF2-40B4-BE49-F238E27FC236}">
+                <a16:creationId xmlns:a16="http://schemas.microsoft.com/office/drawing/2014/main" id="{A5F759FE-52CA-423A-A4E8-77CB6F4F5A5B}"/>
+              </a:ext>
+            </a:extLst>
+          </p:cNvPr>
+          <p:cNvSpPr/>
+          <p:nvPr/>
+        </p:nvSpPr>
+        <p:spPr>
+          <a:xfrm flipV="1">
+            <a:off x="4421334" y="3786994"/>
+            <a:ext cx="2642195" cy="101600"/>
+          </a:xfrm>
+          <a:custGeom>
+            <a:avLst/>
+            <a:gdLst>
+              <a:gd name="connsiteX0" fmla="*/ 0 w 3048000"/>
+              <a:gd name="connsiteY0" fmla="*/ 203200 h 203200"/>
+              <a:gd name="connsiteX1" fmla="*/ 221673 w 3048000"/>
+              <a:gd name="connsiteY1" fmla="*/ 0 h 203200"/>
+              <a:gd name="connsiteX2" fmla="*/ 3048000 w 3048000"/>
+              <a:gd name="connsiteY2" fmla="*/ 0 h 203200"/>
+            </a:gdLst>
+            <a:ahLst/>
+            <a:cxnLst>
+              <a:cxn ang="0">
+                <a:pos x="connsiteX0" y="connsiteY0"/>
+              </a:cxn>
+              <a:cxn ang="0">
+                <a:pos x="connsiteX1" y="connsiteY1"/>
+              </a:cxn>
+              <a:cxn ang="0">
+                <a:pos x="connsiteX2" y="connsiteY2"/>
+              </a:cxn>
+            </a:cxnLst>
+            <a:rect l="l" t="t" r="r" b="b"/>
+            <a:pathLst>
+              <a:path w="3048000" h="203200">
+                <a:moveTo>
+                  <a:pt x="0" y="203200"/>
+                </a:moveTo>
+                <a:lnTo>
+                  <a:pt x="221673" y="0"/>
+                </a:lnTo>
+                <a:lnTo>
+                  <a:pt x="3048000" y="0"/>
+                </a:lnTo>
+              </a:path>
+            </a:pathLst>
+          </a:custGeom>
+          <a:noFill/>
+          <a:ln w="19050">
+            <a:solidFill>
+              <a:schemeClr val="accent3"/>
+            </a:solidFill>
+            <a:prstDash val="sysDot"/>
+            <a:headEnd type="none" w="med" len="med"/>
+            <a:tailEnd type="arrow" w="med" len="med"/>
+          </a:ln>
+          <a:effectLst/>
+        </p:spPr>
+        <p:style>
+          <a:lnRef idx="1">
+            <a:schemeClr val="accent2"/>
+          </a:lnRef>
+          <a:fillRef idx="2">
+            <a:schemeClr val="accent2"/>
+          </a:fillRef>
+          <a:effectRef idx="1">
+            <a:schemeClr val="accent2"/>
+          </a:effectRef>
+          <a:fontRef idx="minor">
+            <a:schemeClr val="dk1"/>
+          </a:fontRef>
+        </p:style>
+        <p:txBody>
+          <a:bodyPr rtlCol="0" anchor="ctr"/>
+          <a:lstStyle/>
+          <a:p>
+            <a:pPr algn="ctr"/>
+            <a:endParaRPr lang="en-SG"/>
+          </a:p>
+        </p:txBody>
+      </p:sp>
+      <p:cxnSp>
+        <p:nvCxnSpPr>
+          <p:cNvPr id="49" name="Elbow Connector 63">
+            <a:extLst>
+              <a:ext uri="{FF2B5EF4-FFF2-40B4-BE49-F238E27FC236}">
+                <a16:creationId xmlns:a16="http://schemas.microsoft.com/office/drawing/2014/main" id="{D729A16D-6DF1-4745-81BF-08712270C5A9}"/>
+              </a:ext>
+            </a:extLst>
+          </p:cNvPr>
+          <p:cNvCxnSpPr>
+            <a:cxnSpLocks/>
+            <a:stCxn id="16" idx="3"/>
+            <a:endCxn id="42" idx="3"/>
+          </p:cNvCxnSpPr>
+          <p:nvPr/>
+        </p:nvCxnSpPr>
+        <p:spPr>
+          <a:xfrm rot="5400000">
+            <a:off x="4773283" y="2171530"/>
+            <a:ext cx="1710751" cy="415692"/>
+          </a:xfrm>
+          <a:prstGeom prst="bentConnector2">
+            <a:avLst/>
+          </a:prstGeom>
+          <a:ln w="6350">
+            <a:solidFill>
+              <a:schemeClr val="accent3"/>
+            </a:solidFill>
+            <a:headEnd type="none" w="med" len="med"/>
+            <a:tailEnd type="none" w="med" len="med"/>
+          </a:ln>
+          <a:effectLst/>
+        </p:spPr>
+        <p:style>
+          <a:lnRef idx="1">
+            <a:schemeClr val="accent2"/>
+          </a:lnRef>
+          <a:fillRef idx="2">
+            <a:schemeClr val="accent2"/>
+          </a:fillRef>
+          <a:effectRef idx="1">
+            <a:schemeClr val="accent2"/>
+          </a:effectRef>
+          <a:fontRef idx="minor">
+            <a:schemeClr val="dk1"/>
+          </a:fontRef>
+        </p:style>
+      </p:cxnSp>
+      <p:sp>
+        <p:nvSpPr>
+          <p:cNvPr id="51" name="Rectangle 11">
+            <a:extLst>
+              <a:ext uri="{FF2B5EF4-FFF2-40B4-BE49-F238E27FC236}">
+                <a16:creationId xmlns:a16="http://schemas.microsoft.com/office/drawing/2014/main" id="{55C6CD0E-EF3E-488F-BC5C-7DD4EAD4C902}"/>
+              </a:ext>
+            </a:extLst>
+          </p:cNvPr>
+          <p:cNvSpPr/>
+          <p:nvPr/>
+        </p:nvSpPr>
+        <p:spPr>
+          <a:xfrm>
+            <a:off x="4149751" y="4589073"/>
+            <a:ext cx="1274955" cy="230829"/>
+          </a:xfrm>
+          <a:prstGeom prst="rect">
+            <a:avLst/>
+          </a:prstGeom>
+          <a:ln w="19050">
+            <a:solidFill>
+              <a:schemeClr val="accent3"/>
+            </a:solidFill>
+          </a:ln>
+          <a:effectLst/>
+        </p:spPr>
+        <p:style>
+          <a:lnRef idx="1">
+            <a:schemeClr val="accent3"/>
+          </a:lnRef>
+          <a:fillRef idx="2">
+            <a:schemeClr val="accent3"/>
+          </a:fillRef>
+          <a:effectRef idx="1">
+            <a:schemeClr val="accent3"/>
+          </a:effectRef>
+          <a:fontRef idx="minor">
+            <a:schemeClr val="dk1"/>
+          </a:fontRef>
+        </p:style>
+        <p:txBody>
+          <a:bodyPr rtlCol="0" anchor="ctr"/>
+          <a:lstStyle/>
+          <a:p>
+            <a:pPr algn="ctr"/>
+            <a:r>
+              <a:rPr lang="en-US" sz="1050" b="1" dirty="0">
+                <a:solidFill>
+                  <a:schemeClr val="accent3">
+                    <a:lumMod val="75000"/>
+                  </a:schemeClr>
+                </a:solidFill>
+              </a:rPr>
+              <a:t>MenuCard</a:t>
+            </a:r>
+            <a:endParaRPr lang="en-SG" sz="1050" b="1" dirty="0">
+              <a:solidFill>
+                <a:schemeClr val="accent3">
+                  <a:lumMod val="75000"/>
+                </a:schemeClr>
+              </a:solidFill>
+            </a:endParaRPr>
+          </a:p>
+        </p:txBody>
+      </p:sp>
+      <p:sp>
+        <p:nvSpPr>
+          <p:cNvPr id="52" name="Rectangle 11">
+            <a:extLst>
+              <a:ext uri="{FF2B5EF4-FFF2-40B4-BE49-F238E27FC236}">
+                <a16:creationId xmlns:a16="http://schemas.microsoft.com/office/drawing/2014/main" id="{8DEC7023-A1BB-441D-896A-AA4D0F2A9C58}"/>
+              </a:ext>
+            </a:extLst>
+          </p:cNvPr>
+          <p:cNvSpPr/>
+          <p:nvPr/>
+        </p:nvSpPr>
+        <p:spPr>
+          <a:xfrm>
+            <a:off x="4142770" y="4139122"/>
+            <a:ext cx="1274955" cy="230829"/>
+          </a:xfrm>
+          <a:prstGeom prst="rect">
+            <a:avLst/>
+          </a:prstGeom>
+          <a:ln w="19050">
+            <a:solidFill>
+              <a:schemeClr val="accent3"/>
+            </a:solidFill>
+          </a:ln>
+          <a:effectLst/>
+        </p:spPr>
+        <p:style>
+          <a:lnRef idx="1">
+            <a:schemeClr val="accent3"/>
+          </a:lnRef>
+          <a:fillRef idx="2">
+            <a:schemeClr val="accent3"/>
+          </a:fillRef>
+          <a:effectRef idx="1">
+            <a:schemeClr val="accent3"/>
+          </a:effectRef>
+          <a:fontRef idx="minor">
+            <a:schemeClr val="dk1"/>
+          </a:fontRef>
+        </p:style>
+        <p:txBody>
+          <a:bodyPr rtlCol="0" anchor="ctr"/>
+          <a:lstStyle/>
+          <a:p>
+            <a:pPr algn="ctr"/>
+            <a:r>
+              <a:rPr lang="en-US" sz="1050" b="1" dirty="0">
+                <a:solidFill>
+                  <a:schemeClr val="accent3">
+                    <a:lumMod val="75000"/>
+                  </a:schemeClr>
+                </a:solidFill>
+              </a:rPr>
+              <a:t>OrderCard</a:t>
+            </a:r>
+            <a:endParaRPr lang="en-SG" sz="1050" b="1" dirty="0">
+              <a:solidFill>
+                <a:schemeClr val="accent3">
+                  <a:lumMod val="75000"/>
+                </a:schemeClr>
+              </a:solidFill>
+            </a:endParaRPr>
+          </a:p>
+        </p:txBody>
+      </p:sp>
+      <p:cxnSp>
+        <p:nvCxnSpPr>
+          <p:cNvPr id="54" name="Elbow Connector 136">
+            <a:extLst>
+              <a:ext uri="{FF2B5EF4-FFF2-40B4-BE49-F238E27FC236}">
+                <a16:creationId xmlns:a16="http://schemas.microsoft.com/office/drawing/2014/main" id="{5A1C362D-D0D2-4BE7-8125-B31F0A7D7C40}"/>
+              </a:ext>
+            </a:extLst>
+          </p:cNvPr>
+          <p:cNvCxnSpPr>
+            <a:cxnSpLocks/>
+            <a:stCxn id="34" idx="2"/>
+          </p:cNvCxnSpPr>
+          <p:nvPr/>
+        </p:nvCxnSpPr>
+        <p:spPr>
+          <a:xfrm rot="16200000" flipH="1">
+            <a:off x="3738210" y="2831871"/>
+            <a:ext cx="112230" cy="696889"/>
+          </a:xfrm>
+          <a:prstGeom prst="bentConnector2">
+            <a:avLst/>
+          </a:prstGeom>
+          <a:ln w="19050">
+            <a:solidFill>
+              <a:schemeClr val="accent3"/>
+            </a:solidFill>
+            <a:headEnd type="none" w="med" len="med"/>
+            <a:tailEnd type="arrow" w="med" len="med"/>
+          </a:ln>
+          <a:effectLst/>
+        </p:spPr>
+        <p:style>
+          <a:lnRef idx="1">
+            <a:schemeClr val="accent2"/>
+          </a:lnRef>
+          <a:fillRef idx="2">
+            <a:schemeClr val="accent2"/>
+          </a:fillRef>
+          <a:effectRef idx="1">
+            <a:schemeClr val="accent2"/>
+          </a:effectRef>
+          <a:fontRef idx="minor">
+            <a:schemeClr val="dk1"/>
+          </a:fontRef>
+        </p:style>
+      </p:cxnSp>
+      <p:cxnSp>
+        <p:nvCxnSpPr>
+          <p:cNvPr id="55" name="Elbow Connector 136">
+            <a:extLst>
+              <a:ext uri="{FF2B5EF4-FFF2-40B4-BE49-F238E27FC236}">
+                <a16:creationId xmlns:a16="http://schemas.microsoft.com/office/drawing/2014/main" id="{125553B7-4DAF-44A8-B43F-E765662E772E}"/>
+              </a:ext>
+            </a:extLst>
+          </p:cNvPr>
+          <p:cNvCxnSpPr>
+            <a:cxnSpLocks/>
+            <a:stCxn id="34" idx="2"/>
+          </p:cNvCxnSpPr>
+          <p:nvPr/>
+        </p:nvCxnSpPr>
+        <p:spPr>
+          <a:xfrm rot="16200000" flipH="1">
+            <a:off x="3526834" y="3043248"/>
+            <a:ext cx="545476" cy="707382"/>
+          </a:xfrm>
+          <a:prstGeom prst="bentConnector2">
+            <a:avLst/>
+          </a:prstGeom>
+          <a:ln w="19050">
+            <a:solidFill>
+              <a:schemeClr val="accent3"/>
+            </a:solidFill>
+            <a:headEnd type="none" w="med" len="med"/>
+            <a:tailEnd type="arrow" w="med" len="med"/>
+          </a:ln>
+          <a:effectLst/>
+        </p:spPr>
+        <p:style>
+          <a:lnRef idx="1">
+            <a:schemeClr val="accent2"/>
+          </a:lnRef>
+          <a:fillRef idx="2">
+            <a:schemeClr val="accent2"/>
+          </a:fillRef>
+          <a:effectRef idx="1">
+            <a:schemeClr val="accent2"/>
+          </a:effectRef>
+          <a:fontRef idx="minor">
+            <a:schemeClr val="dk1"/>
+          </a:fontRef>
+        </p:style>
+      </p:cxnSp>
+      <p:cxnSp>
+        <p:nvCxnSpPr>
+          <p:cNvPr id="56" name="Elbow Connector 136">
+            <a:extLst>
+              <a:ext uri="{FF2B5EF4-FFF2-40B4-BE49-F238E27FC236}">
+                <a16:creationId xmlns:a16="http://schemas.microsoft.com/office/drawing/2014/main" id="{172C5460-9344-46BB-B3E6-5C357372E854}"/>
+              </a:ext>
+            </a:extLst>
+          </p:cNvPr>
+          <p:cNvCxnSpPr>
+            <a:cxnSpLocks/>
+            <a:stCxn id="36" idx="2"/>
+          </p:cNvCxnSpPr>
+          <p:nvPr/>
+        </p:nvCxnSpPr>
+        <p:spPr>
+          <a:xfrm rot="16200000" flipH="1">
+            <a:off x="3525485" y="4072997"/>
+            <a:ext cx="545474" cy="704686"/>
+          </a:xfrm>
+          <a:prstGeom prst="bentConnector2">
+            <a:avLst/>
+          </a:prstGeom>
+          <a:ln w="19050">
+            <a:solidFill>
+              <a:schemeClr val="accent3"/>
+            </a:solidFill>
+            <a:headEnd type="none" w="med" len="med"/>
+            <a:tailEnd type="arrow" w="med" len="med"/>
+          </a:ln>
+          <a:effectLst/>
+        </p:spPr>
+        <p:style>
+          <a:lnRef idx="1">
+            <a:schemeClr val="accent2"/>
+          </a:lnRef>
+          <a:fillRef idx="2">
+            <a:schemeClr val="accent2"/>
+          </a:fillRef>
+          <a:effectRef idx="1">
+            <a:schemeClr val="accent2"/>
+          </a:effectRef>
+          <a:fontRef idx="minor">
+            <a:schemeClr val="dk1"/>
+          </a:fontRef>
+        </p:style>
+      </p:cxnSp>
+      <p:cxnSp>
+        <p:nvCxnSpPr>
+          <p:cNvPr id="59" name="Elbow Connector 63">
+            <a:extLst>
+              <a:ext uri="{FF2B5EF4-FFF2-40B4-BE49-F238E27FC236}">
+                <a16:creationId xmlns:a16="http://schemas.microsoft.com/office/drawing/2014/main" id="{A4E57D68-2F40-4A50-A623-C5C83666B367}"/>
+              </a:ext>
+            </a:extLst>
+          </p:cNvPr>
+          <p:cNvCxnSpPr>
+            <a:cxnSpLocks/>
+            <a:stCxn id="16" idx="3"/>
+            <a:endCxn id="46" idx="3"/>
+          </p:cNvCxnSpPr>
+          <p:nvPr/>
+        </p:nvCxnSpPr>
+        <p:spPr>
+          <a:xfrm rot="5400000">
+            <a:off x="4561408" y="2383405"/>
+            <a:ext cx="2134501" cy="415692"/>
+          </a:xfrm>
+          <a:prstGeom prst="bentConnector2">
+            <a:avLst/>
+          </a:prstGeom>
+          <a:ln w="6350">
+            <a:solidFill>
+              <a:schemeClr val="accent3"/>
+            </a:solidFill>
+            <a:headEnd type="none" w="med" len="med"/>
+            <a:tailEnd type="none" w="med" len="med"/>
+          </a:ln>
+          <a:effectLst/>
+        </p:spPr>
+        <p:style>
+          <a:lnRef idx="1">
+            <a:schemeClr val="accent2"/>
+          </a:lnRef>
+          <a:fillRef idx="2">
+            <a:schemeClr val="accent2"/>
+          </a:fillRef>
+          <a:effectRef idx="1">
+            <a:schemeClr val="accent2"/>
+          </a:effectRef>
+          <a:fontRef idx="minor">
+            <a:schemeClr val="dk1"/>
+          </a:fontRef>
+        </p:style>
+      </p:cxnSp>
+      <p:sp>
+        <p:nvSpPr>
+          <p:cNvPr id="70" name="Freeform 117">
+            <a:extLst>
+              <a:ext uri="{FF2B5EF4-FFF2-40B4-BE49-F238E27FC236}">
+                <a16:creationId xmlns:a16="http://schemas.microsoft.com/office/drawing/2014/main" id="{9219A4AD-9F36-4897-B46C-B8CC38C338E8}"/>
+              </a:ext>
+            </a:extLst>
+          </p:cNvPr>
+          <p:cNvSpPr/>
+          <p:nvPr/>
+        </p:nvSpPr>
+        <p:spPr>
+          <a:xfrm flipV="1">
+            <a:off x="4421334" y="4819902"/>
+            <a:ext cx="2642195" cy="101600"/>
+          </a:xfrm>
+          <a:custGeom>
+            <a:avLst/>
+            <a:gdLst>
+              <a:gd name="connsiteX0" fmla="*/ 0 w 3048000"/>
+              <a:gd name="connsiteY0" fmla="*/ 203200 h 203200"/>
+              <a:gd name="connsiteX1" fmla="*/ 221673 w 3048000"/>
+              <a:gd name="connsiteY1" fmla="*/ 0 h 203200"/>
+              <a:gd name="connsiteX2" fmla="*/ 3048000 w 3048000"/>
+              <a:gd name="connsiteY2" fmla="*/ 0 h 203200"/>
+            </a:gdLst>
+            <a:ahLst/>
+            <a:cxnLst>
+              <a:cxn ang="0">
+                <a:pos x="connsiteX0" y="connsiteY0"/>
+              </a:cxn>
+              <a:cxn ang="0">
+                <a:pos x="connsiteX1" y="connsiteY1"/>
+              </a:cxn>
+              <a:cxn ang="0">
+                <a:pos x="connsiteX2" y="connsiteY2"/>
+              </a:cxn>
+            </a:cxnLst>
+            <a:rect l="l" t="t" r="r" b="b"/>
+            <a:pathLst>
+              <a:path w="3048000" h="203200">
+                <a:moveTo>
+                  <a:pt x="0" y="203200"/>
+                </a:moveTo>
+                <a:lnTo>
+                  <a:pt x="221673" y="0"/>
+                </a:lnTo>
+                <a:lnTo>
+                  <a:pt x="3048000" y="0"/>
+                </a:lnTo>
+              </a:path>
+            </a:pathLst>
+          </a:custGeom>
+          <a:noFill/>
+          <a:ln w="19050">
+            <a:solidFill>
+              <a:schemeClr val="accent3"/>
+            </a:solidFill>
+            <a:prstDash val="sysDot"/>
+            <a:headEnd type="none" w="med" len="med"/>
+            <a:tailEnd type="arrow" w="med" len="med"/>
+          </a:ln>
+          <a:effectLst/>
+        </p:spPr>
+        <p:style>
+          <a:lnRef idx="1">
+            <a:schemeClr val="accent2"/>
+          </a:lnRef>
+          <a:fillRef idx="2">
+            <a:schemeClr val="accent2"/>
+          </a:fillRef>
+          <a:effectRef idx="1">
+            <a:schemeClr val="accent2"/>
+          </a:effectRef>
+          <a:fontRef idx="minor">
+            <a:schemeClr val="dk1"/>
+          </a:fontRef>
+        </p:style>
+        <p:txBody>
+          <a:bodyPr rtlCol="0" anchor="ctr"/>
+          <a:lstStyle/>
+          <a:p>
+            <a:pPr algn="ctr"/>
+            <a:endParaRPr lang="en-SG"/>
+          </a:p>
+        </p:txBody>
+      </p:sp>
+      <p:cxnSp>
+        <p:nvCxnSpPr>
+          <p:cNvPr id="83" name="Elbow Connector 63">
+            <a:extLst>
+              <a:ext uri="{FF2B5EF4-FFF2-40B4-BE49-F238E27FC236}">
+                <a16:creationId xmlns:a16="http://schemas.microsoft.com/office/drawing/2014/main" id="{A415BA0D-3B6A-42AD-B798-04580504534D}"/>
+              </a:ext>
+            </a:extLst>
+          </p:cNvPr>
+          <p:cNvCxnSpPr>
+            <a:cxnSpLocks/>
+            <a:stCxn id="16" idx="3"/>
+            <a:endCxn id="51" idx="3"/>
+          </p:cNvCxnSpPr>
+          <p:nvPr/>
+        </p:nvCxnSpPr>
+        <p:spPr>
+          <a:xfrm rot="5400000">
+            <a:off x="4040362" y="2908345"/>
+            <a:ext cx="3180487" cy="411798"/>
+          </a:xfrm>
+          <a:prstGeom prst="bentConnector2">
+            <a:avLst/>
+          </a:prstGeom>
+          <a:ln w="6350">
+            <a:solidFill>
+              <a:schemeClr val="accent3"/>
+            </a:solidFill>
+            <a:headEnd type="none" w="med" len="med"/>
+            <a:tailEnd type="none" w="med" len="med"/>
+          </a:ln>
+          <a:effectLst/>
+        </p:spPr>
+        <p:style>
+          <a:lnRef idx="1">
+            <a:schemeClr val="accent2"/>
+          </a:lnRef>
+          <a:fillRef idx="2">
+            <a:schemeClr val="accent2"/>
+          </a:fillRef>
+          <a:effectRef idx="1">
+            <a:schemeClr val="accent2"/>
+          </a:effectRef>
+          <a:fontRef idx="minor">
+            <a:schemeClr val="dk1"/>
+          </a:fontRef>
+        </p:style>
+      </p:cxnSp>
     </p:spTree>
     <p:extLst>
       <p:ext uri="{BB962C8B-B14F-4D97-AF65-F5344CB8AC3E}">

</xml_diff>

<commit_message>
Update and change the UI UML diagram.
</commit_message>
<xml_diff>
--- a/docs/diagrams/UiComponentClassDiagram.pptx
+++ b/docs/diagrams/UiComponentClassDiagram.pptx
@@ -208,7 +208,7 @@
           <a:p>
             <a:fld id="{F5CC4B3F-88C1-4FFA-B1B6-F41C21DC6924}" type="datetimeFigureOut">
               <a:rPr lang="en-US" smtClean="0"/>
-              <a:t>2/27/2019</a:t>
+              <a:t>3/5/2019</a:t>
             </a:fld>
             <a:endParaRPr lang="en-US"/>
           </a:p>
@@ -475,6 +475,90 @@
 </p:notesMaster>
 </file>
 
+<file path=ppt/notesSlides/notesSlide1.xml><?xml version="1.0" encoding="utf-8"?>
+<p:notes xmlns:a="http://schemas.openxmlformats.org/drawingml/2006/main" xmlns:r="http://schemas.openxmlformats.org/officeDocument/2006/relationships" xmlns:p="http://schemas.openxmlformats.org/presentationml/2006/main">
+  <p:cSld>
+    <p:spTree>
+      <p:nvGrpSpPr>
+        <p:cNvPr id="1" name=""/>
+        <p:cNvGrpSpPr/>
+        <p:nvPr/>
+      </p:nvGrpSpPr>
+      <p:grpSpPr>
+        <a:xfrm>
+          <a:off x="0" y="0"/>
+          <a:ext cx="0" cy="0"/>
+          <a:chOff x="0" y="0"/>
+          <a:chExt cx="0" cy="0"/>
+        </a:xfrm>
+      </p:grpSpPr>
+      <p:sp>
+        <p:nvSpPr>
+          <p:cNvPr id="2" name="Slide Image Placeholder 1"/>
+          <p:cNvSpPr>
+            <a:spLocks noGrp="1" noRot="1" noChangeAspect="1"/>
+          </p:cNvSpPr>
+          <p:nvPr>
+            <p:ph type="sldImg"/>
+          </p:nvPr>
+        </p:nvSpPr>
+        <p:spPr/>
+      </p:sp>
+      <p:sp>
+        <p:nvSpPr>
+          <p:cNvPr id="3" name="Notes Placeholder 2"/>
+          <p:cNvSpPr>
+            <a:spLocks noGrp="1"/>
+          </p:cNvSpPr>
+          <p:nvPr>
+            <p:ph type="body" idx="1"/>
+          </p:nvPr>
+        </p:nvSpPr>
+        <p:spPr/>
+        <p:txBody>
+          <a:bodyPr/>
+          <a:lstStyle/>
+          <a:p>
+            <a:endParaRPr lang="en-GB" dirty="0"/>
+          </a:p>
+        </p:txBody>
+      </p:sp>
+      <p:sp>
+        <p:nvSpPr>
+          <p:cNvPr id="4" name="Slide Number Placeholder 3"/>
+          <p:cNvSpPr>
+            <a:spLocks noGrp="1"/>
+          </p:cNvSpPr>
+          <p:nvPr>
+            <p:ph type="sldNum" sz="quarter" idx="5"/>
+          </p:nvPr>
+        </p:nvSpPr>
+        <p:spPr/>
+        <p:txBody>
+          <a:bodyPr/>
+          <a:lstStyle/>
+          <a:p>
+            <a:fld id="{5A7AB025-77E3-4BD1-A2FD-B3183DBA47A3}" type="slidenum">
+              <a:rPr lang="en-US" smtClean="0"/>
+              <a:t>1</a:t>
+            </a:fld>
+            <a:endParaRPr lang="en-US"/>
+          </a:p>
+        </p:txBody>
+      </p:sp>
+    </p:spTree>
+    <p:extLst>
+      <p:ext uri="{BB962C8B-B14F-4D97-AF65-F5344CB8AC3E}">
+        <p14:creationId xmlns:p14="http://schemas.microsoft.com/office/powerpoint/2010/main" val="3569439305"/>
+      </p:ext>
+    </p:extLst>
+  </p:cSld>
+  <p:clrMapOvr>
+    <a:masterClrMapping/>
+  </p:clrMapOvr>
+</p:notes>
+</file>
+
 <file path=ppt/slideLayouts/slideLayout1.xml><?xml version="1.0" encoding="utf-8"?>
 <p:sldLayout xmlns:a="http://schemas.openxmlformats.org/drawingml/2006/main" xmlns:r="http://schemas.openxmlformats.org/officeDocument/2006/relationships" xmlns:p="http://schemas.openxmlformats.org/presentationml/2006/main" type="title" preserve="1">
   <p:cSld name="Title Slide">
@@ -654,7 +738,7 @@
           <a:p>
             <a:fld id="{78C97017-6FC3-485B-9764-EAC9E56C1D49}" type="datetimeFigureOut">
               <a:rPr lang="en-US" smtClean="0"/>
-              <a:t>2/27/2019</a:t>
+              <a:t>3/5/2019</a:t>
             </a:fld>
             <a:endParaRPr lang="en-US"/>
           </a:p>
@@ -822,7 +906,7 @@
           <a:p>
             <a:fld id="{78C97017-6FC3-485B-9764-EAC9E56C1D49}" type="datetimeFigureOut">
               <a:rPr lang="en-US" smtClean="0"/>
-              <a:t>2/27/2019</a:t>
+              <a:t>3/5/2019</a:t>
             </a:fld>
             <a:endParaRPr lang="en-US"/>
           </a:p>
@@ -1000,7 +1084,7 @@
           <a:p>
             <a:fld id="{78C97017-6FC3-485B-9764-EAC9E56C1D49}" type="datetimeFigureOut">
               <a:rPr lang="en-US" smtClean="0"/>
-              <a:t>2/27/2019</a:t>
+              <a:t>3/5/2019</a:t>
             </a:fld>
             <a:endParaRPr lang="en-US"/>
           </a:p>
@@ -1168,7 +1252,7 @@
           <a:p>
             <a:fld id="{78C97017-6FC3-485B-9764-EAC9E56C1D49}" type="datetimeFigureOut">
               <a:rPr lang="en-US" smtClean="0"/>
-              <a:t>2/27/2019</a:t>
+              <a:t>3/5/2019</a:t>
             </a:fld>
             <a:endParaRPr lang="en-US"/>
           </a:p>
@@ -1413,7 +1497,7 @@
           <a:p>
             <a:fld id="{78C97017-6FC3-485B-9764-EAC9E56C1D49}" type="datetimeFigureOut">
               <a:rPr lang="en-US" smtClean="0"/>
-              <a:t>2/27/2019</a:t>
+              <a:t>3/5/2019</a:t>
             </a:fld>
             <a:endParaRPr lang="en-US"/>
           </a:p>
@@ -1698,7 +1782,7 @@
           <a:p>
             <a:fld id="{78C97017-6FC3-485B-9764-EAC9E56C1D49}" type="datetimeFigureOut">
               <a:rPr lang="en-US" smtClean="0"/>
-              <a:t>2/27/2019</a:t>
+              <a:t>3/5/2019</a:t>
             </a:fld>
             <a:endParaRPr lang="en-US"/>
           </a:p>
@@ -2117,7 +2201,7 @@
           <a:p>
             <a:fld id="{78C97017-6FC3-485B-9764-EAC9E56C1D49}" type="datetimeFigureOut">
               <a:rPr lang="en-US" smtClean="0"/>
-              <a:t>2/27/2019</a:t>
+              <a:t>3/5/2019</a:t>
             </a:fld>
             <a:endParaRPr lang="en-US"/>
           </a:p>
@@ -2234,7 +2318,7 @@
           <a:p>
             <a:fld id="{78C97017-6FC3-485B-9764-EAC9E56C1D49}" type="datetimeFigureOut">
               <a:rPr lang="en-US" smtClean="0"/>
-              <a:t>2/27/2019</a:t>
+              <a:t>3/5/2019</a:t>
             </a:fld>
             <a:endParaRPr lang="en-US"/>
           </a:p>
@@ -2329,7 +2413,7 @@
           <a:p>
             <a:fld id="{78C97017-6FC3-485B-9764-EAC9E56C1D49}" type="datetimeFigureOut">
               <a:rPr lang="en-US" smtClean="0"/>
-              <a:t>2/27/2019</a:t>
+              <a:t>3/5/2019</a:t>
             </a:fld>
             <a:endParaRPr lang="en-US"/>
           </a:p>
@@ -2604,7 +2688,7 @@
           <a:p>
             <a:fld id="{78C97017-6FC3-485B-9764-EAC9E56C1D49}" type="datetimeFigureOut">
               <a:rPr lang="en-US" smtClean="0"/>
-              <a:t>2/27/2019</a:t>
+              <a:t>3/5/2019</a:t>
             </a:fld>
             <a:endParaRPr lang="en-US"/>
           </a:p>
@@ -2856,7 +2940,7 @@
           <a:p>
             <a:fld id="{78C97017-6FC3-485B-9764-EAC9E56C1D49}" type="datetimeFigureOut">
               <a:rPr lang="en-US" smtClean="0"/>
-              <a:t>2/27/2019</a:t>
+              <a:t>3/5/2019</a:t>
             </a:fld>
             <a:endParaRPr lang="en-US"/>
           </a:p>
@@ -3067,7 +3151,7 @@
           <a:p>
             <a:fld id="{78C97017-6FC3-485B-9764-EAC9E56C1D49}" type="datetimeFigureOut">
               <a:rPr lang="en-US" smtClean="0"/>
-              <a:t>2/27/2019</a:t>
+              <a:t>3/5/2019</a:t>
             </a:fld>
             <a:endParaRPr lang="en-US"/>
           </a:p>
@@ -3573,7 +3657,7 @@
         <p:spPr>
           <a:xfrm>
             <a:off x="2899063" y="2209801"/>
-            <a:ext cx="1093635" cy="236841"/>
+            <a:ext cx="1252769" cy="236841"/>
           </a:xfrm>
           <a:prstGeom prst="rect">
             <a:avLst/>
@@ -3886,7 +3970,7 @@
         <p:spPr>
           <a:xfrm>
             <a:off x="2899063" y="2887360"/>
-            <a:ext cx="1093635" cy="236841"/>
+            <a:ext cx="1266077" cy="236841"/>
           </a:xfrm>
           <a:prstGeom prst="rect">
             <a:avLst/>
@@ -3918,14 +4002,14 @@
           <a:p>
             <a:pPr algn="ctr"/>
             <a:r>
-              <a:rPr lang="en-US" sz="1050" b="1" dirty="0">
+              <a:rPr lang="en-US" sz="1050" b="1" dirty="0" err="1">
                 <a:solidFill>
                   <a:schemeClr val="accent3">
                     <a:lumMod val="75000"/>
                   </a:schemeClr>
                 </a:solidFill>
               </a:rPr>
-              <a:t>BrowserPanel</a:t>
+              <a:t>TableBrowserPanel</a:t>
             </a:r>
             <a:endParaRPr lang="en-SG" sz="1050" b="1" dirty="0">
               <a:solidFill>
@@ -3946,7 +4030,7 @@
         <p:spPr>
           <a:xfrm>
             <a:off x="2899062" y="4999719"/>
-            <a:ext cx="1093635" cy="236841"/>
+            <a:ext cx="1274955" cy="236841"/>
           </a:xfrm>
           <a:prstGeom prst="rect">
             <a:avLst/>
@@ -4006,7 +4090,7 @@
         <p:spPr>
           <a:xfrm>
             <a:off x="2899061" y="3915762"/>
-            <a:ext cx="1093635" cy="236841"/>
+            <a:ext cx="1264463" cy="236841"/>
           </a:xfrm>
           <a:prstGeom prst="rect">
             <a:avLst/>
@@ -4038,14 +4122,14 @@
           <a:p>
             <a:pPr algn="ctr"/>
             <a:r>
-              <a:rPr lang="en-US" sz="1050" b="1" dirty="0">
+              <a:rPr lang="en-US" sz="1050" b="1" dirty="0" err="1">
                 <a:solidFill>
                   <a:schemeClr val="accent3">
                     <a:lumMod val="75000"/>
                   </a:schemeClr>
                 </a:solidFill>
               </a:rPr>
-              <a:t>ListPanel</a:t>
+              <a:t>OrderItemListPanel</a:t>
             </a:r>
             <a:endParaRPr lang="en-SG" sz="1050" b="1" dirty="0">
               <a:solidFill>
@@ -4066,7 +4150,7 @@
         <p:spPr>
           <a:xfrm>
             <a:off x="2899063" y="5401960"/>
-            <a:ext cx="1093635" cy="236841"/>
+            <a:ext cx="1274954" cy="236841"/>
           </a:xfrm>
           <a:prstGeom prst="rect">
             <a:avLst/>
@@ -4169,6 +4253,7 @@
         <p:nvCxnSpPr>
           <p:cNvPr id="40" name="Elbow Connector 63"/>
           <p:cNvCxnSpPr>
+            <a:cxnSpLocks/>
             <a:stCxn id="39" idx="2"/>
             <a:endCxn id="3" idx="1"/>
           </p:cNvCxnSpPr>
@@ -4215,7 +4300,7 @@
         <p:spPr>
           <a:xfrm>
             <a:off x="2897334" y="2542309"/>
-            <a:ext cx="1095361" cy="236841"/>
+            <a:ext cx="1261208" cy="236841"/>
           </a:xfrm>
           <a:prstGeom prst="rect">
             <a:avLst/>
@@ -4270,6 +4355,7 @@
         <p:nvCxnSpPr>
           <p:cNvPr id="44" name="Elbow Connector 63"/>
           <p:cNvCxnSpPr>
+            <a:cxnSpLocks/>
             <a:stCxn id="39" idx="2"/>
             <a:endCxn id="34" idx="1"/>
           </p:cNvCxnSpPr>
@@ -4311,6 +4397,7 @@
         <p:nvCxnSpPr>
           <p:cNvPr id="47" name="Elbow Connector 63"/>
           <p:cNvCxnSpPr>
+            <a:cxnSpLocks/>
             <a:stCxn id="39" idx="2"/>
             <a:endCxn id="36" idx="1"/>
           </p:cNvCxnSpPr>
@@ -4352,6 +4439,7 @@
         <p:nvCxnSpPr>
           <p:cNvPr id="50" name="Elbow Connector 63"/>
           <p:cNvCxnSpPr>
+            <a:cxnSpLocks/>
             <a:stCxn id="39" idx="2"/>
             <a:endCxn id="35" idx="1"/>
           </p:cNvCxnSpPr>
@@ -4513,6 +4601,7 @@
         <p:nvCxnSpPr>
           <p:cNvPr id="74" name="Elbow Connector 63"/>
           <p:cNvCxnSpPr>
+            <a:cxnSpLocks/>
             <a:stCxn id="43" idx="3"/>
             <a:endCxn id="16" idx="3"/>
           </p:cNvCxnSpPr>
@@ -4520,8 +4609,8 @@
         </p:nvCxnSpPr>
         <p:spPr>
           <a:xfrm flipV="1">
-            <a:off x="3992695" y="1524001"/>
-            <a:ext cx="1843809" cy="1136729"/>
+            <a:off x="4158542" y="1524001"/>
+            <a:ext cx="1677962" cy="1136729"/>
           </a:xfrm>
           <a:prstGeom prst="bentConnector2">
             <a:avLst/>
@@ -4562,8 +4651,8 @@
         </p:nvCxnSpPr>
         <p:spPr>
           <a:xfrm rot="5400000">
-            <a:off x="4261847" y="2679880"/>
-            <a:ext cx="2730536" cy="418779"/>
+            <a:off x="4330794" y="2748827"/>
+            <a:ext cx="2730536" cy="280885"/>
           </a:xfrm>
           <a:prstGeom prst="bentConnector2">
             <a:avLst/>
@@ -4596,6 +4685,7 @@
         <p:nvCxnSpPr>
           <p:cNvPr id="82" name="Elbow Connector 63"/>
           <p:cNvCxnSpPr>
+            <a:cxnSpLocks/>
             <a:stCxn id="16" idx="3"/>
             <a:endCxn id="34" idx="3"/>
           </p:cNvCxnSpPr>
@@ -4603,8 +4693,8 @@
         </p:nvCxnSpPr>
         <p:spPr>
           <a:xfrm rot="5400000">
-            <a:off x="4173711" y="1342988"/>
-            <a:ext cx="1481780" cy="1843806"/>
+            <a:off x="4259932" y="1429209"/>
+            <a:ext cx="1481780" cy="1671364"/>
           </a:xfrm>
           <a:prstGeom prst="bentConnector2">
             <a:avLst/>
@@ -4685,8 +4775,8 @@
         </p:nvCxnSpPr>
         <p:spPr>
           <a:xfrm rot="5400000">
-            <a:off x="3716511" y="2998147"/>
-            <a:ext cx="2396180" cy="1843807"/>
+            <a:off x="3807172" y="3088806"/>
+            <a:ext cx="2396180" cy="1662489"/>
           </a:xfrm>
           <a:prstGeom prst="bentConnector2">
             <a:avLst/>
@@ -4726,8 +4816,8 @@
         </p:nvCxnSpPr>
         <p:spPr>
           <a:xfrm rot="5400000">
-            <a:off x="3515391" y="3199267"/>
-            <a:ext cx="2798421" cy="1843806"/>
+            <a:off x="3606050" y="3289926"/>
+            <a:ext cx="2798422" cy="1662488"/>
           </a:xfrm>
           <a:prstGeom prst="bentConnector2">
             <a:avLst/>
@@ -5021,6 +5111,7 @@
         <p:nvCxnSpPr>
           <p:cNvPr id="131" name="Elbow Connector 130"/>
           <p:cNvCxnSpPr>
+            <a:cxnSpLocks/>
             <a:stCxn id="39" idx="2"/>
             <a:endCxn id="43" idx="1"/>
           </p:cNvCxnSpPr>
@@ -5062,6 +5153,7 @@
         <p:nvCxnSpPr>
           <p:cNvPr id="132" name="Elbow Connector 63"/>
           <p:cNvCxnSpPr>
+            <a:cxnSpLocks/>
             <a:stCxn id="16" idx="3"/>
             <a:endCxn id="3" idx="3"/>
           </p:cNvCxnSpPr>
@@ -5069,8 +5161,8 @@
         </p:nvCxnSpPr>
         <p:spPr>
           <a:xfrm rot="5400000">
-            <a:off x="4512491" y="1004208"/>
-            <a:ext cx="804221" cy="1843806"/>
+            <a:off x="4592058" y="1083775"/>
+            <a:ext cx="804221" cy="1684672"/>
           </a:xfrm>
           <a:prstGeom prst="bentConnector2">
             <a:avLst/>
@@ -5105,13 +5197,14 @@
           <p:cNvCxnSpPr>
             <a:cxnSpLocks/>
             <a:stCxn id="36" idx="2"/>
+            <a:endCxn id="52" idx="1"/>
           </p:cNvCxnSpPr>
           <p:nvPr/>
         </p:nvCxnSpPr>
         <p:spPr>
           <a:xfrm rot="16200000" flipH="1">
-            <a:off x="3749643" y="3848839"/>
-            <a:ext cx="90996" cy="698524"/>
+            <a:off x="3855011" y="3828884"/>
+            <a:ext cx="101934" cy="749371"/>
           </a:xfrm>
           <a:prstGeom prst="bentConnector2">
             <a:avLst/>
@@ -5144,6 +5237,7 @@
         <p:nvCxnSpPr>
           <p:cNvPr id="140" name="Elbow Connector 63"/>
           <p:cNvCxnSpPr>
+            <a:cxnSpLocks/>
             <a:stCxn id="16" idx="3"/>
             <a:endCxn id="36" idx="3"/>
           </p:cNvCxnSpPr>
@@ -5151,8 +5245,8 @@
         </p:nvCxnSpPr>
         <p:spPr>
           <a:xfrm rot="5400000">
-            <a:off x="3659509" y="1857188"/>
-            <a:ext cx="2510182" cy="1843808"/>
+            <a:off x="3744923" y="1942602"/>
+            <a:ext cx="2510182" cy="1672980"/>
           </a:xfrm>
           <a:prstGeom prst="bentConnector2">
             <a:avLst/>
@@ -5465,7 +5559,7 @@
         </p:nvSpPr>
         <p:spPr>
           <a:xfrm>
-            <a:off x="4145858" y="3119337"/>
+            <a:off x="4283752" y="3119337"/>
             <a:ext cx="1274954" cy="230829"/>
           </a:xfrm>
           <a:prstGeom prst="rect">
@@ -5619,7 +5713,7 @@
         </p:nvSpPr>
         <p:spPr>
           <a:xfrm>
-            <a:off x="4145857" y="3543087"/>
+            <a:off x="4283752" y="3561235"/>
             <a:ext cx="1274955" cy="230829"/>
           </a:xfrm>
           <a:prstGeom prst="rect">
@@ -5652,7 +5746,7 @@
           <a:p>
             <a:pPr algn="ctr"/>
             <a:r>
-              <a:rPr lang="en-US" sz="1050" b="1" dirty="0" err="1">
+              <a:rPr lang="en-US" sz="1050" b="1">
                 <a:solidFill>
                   <a:schemeClr val="accent3">
                     <a:lumMod val="75000"/>
@@ -5777,8 +5871,8 @@
         </p:nvCxnSpPr>
         <p:spPr>
           <a:xfrm rot="5400000">
-            <a:off x="4773283" y="2171530"/>
-            <a:ext cx="1710751" cy="415692"/>
+            <a:off x="4842230" y="2240477"/>
+            <a:ext cx="1710751" cy="277798"/>
           </a:xfrm>
           <a:prstGeom prst="bentConnector2">
             <a:avLst/>
@@ -5821,7 +5915,7 @@
         </p:nvSpPr>
         <p:spPr>
           <a:xfrm>
-            <a:off x="4149751" y="4589073"/>
+            <a:off x="4287645" y="4589073"/>
             <a:ext cx="1274955" cy="230829"/>
           </a:xfrm>
           <a:prstGeom prst="rect">
@@ -5854,14 +5948,14 @@
           <a:p>
             <a:pPr algn="ctr"/>
             <a:r>
-              <a:rPr lang="en-US" sz="1050" b="1" dirty="0">
+              <a:rPr lang="en-US" sz="1050" b="1" dirty="0" err="1">
                 <a:solidFill>
                   <a:schemeClr val="accent3">
                     <a:lumMod val="75000"/>
                   </a:schemeClr>
                 </a:solidFill>
               </a:rPr>
-              <a:t>MenuCard</a:t>
+              <a:t>MenuItemListCard</a:t>
             </a:r>
             <a:endParaRPr lang="en-SG" sz="1050" b="1" dirty="0">
               <a:solidFill>
@@ -5887,7 +5981,7 @@
         </p:nvSpPr>
         <p:spPr>
           <a:xfrm>
-            <a:off x="4142770" y="4139122"/>
+            <a:off x="4280664" y="4139122"/>
             <a:ext cx="1274955" cy="230829"/>
           </a:xfrm>
           <a:prstGeom prst="rect">
@@ -5920,14 +6014,14 @@
           <a:p>
             <a:pPr algn="ctr"/>
             <a:r>
-              <a:rPr lang="en-US" sz="1050" b="1" dirty="0">
+              <a:rPr lang="en-US" sz="1050" b="1" dirty="0" err="1">
                 <a:solidFill>
                   <a:schemeClr val="accent3">
                     <a:lumMod val="75000"/>
                   </a:schemeClr>
                 </a:solidFill>
               </a:rPr>
-              <a:t>OrderCard</a:t>
+              <a:t>OrderItemListCard</a:t>
             </a:r>
             <a:endParaRPr lang="en-SG" sz="1050" b="1" dirty="0">
               <a:solidFill>
@@ -5951,13 +6045,14 @@
           <p:cNvCxnSpPr>
             <a:cxnSpLocks/>
             <a:stCxn id="34" idx="2"/>
+            <a:endCxn id="42" idx="1"/>
           </p:cNvCxnSpPr>
           <p:nvPr/>
         </p:nvCxnSpPr>
         <p:spPr>
           <a:xfrm rot="16200000" flipH="1">
-            <a:off x="3738210" y="2831871"/>
-            <a:ext cx="112230" cy="696889"/>
+            <a:off x="3852652" y="2803651"/>
+            <a:ext cx="110551" cy="751650"/>
           </a:xfrm>
           <a:prstGeom prst="bentConnector2">
             <a:avLst/>
@@ -5997,14 +6092,15 @@
           </p:cNvPr>
           <p:cNvCxnSpPr>
             <a:cxnSpLocks/>
-            <a:stCxn id="34" idx="2"/>
+            <a:stCxn id="85" idx="2"/>
+            <a:endCxn id="46" idx="1"/>
           </p:cNvCxnSpPr>
           <p:nvPr/>
         </p:nvCxnSpPr>
         <p:spPr>
           <a:xfrm rot="16200000" flipH="1">
-            <a:off x="3526834" y="3043248"/>
-            <a:ext cx="545476" cy="707382"/>
+            <a:off x="3858411" y="3251308"/>
+            <a:ext cx="107907" cy="742775"/>
           </a:xfrm>
           <a:prstGeom prst="bentConnector2">
             <a:avLst/>
@@ -6044,14 +6140,15 @@
           </p:cNvPr>
           <p:cNvCxnSpPr>
             <a:cxnSpLocks/>
-            <a:stCxn id="36" idx="2"/>
+            <a:stCxn id="57" idx="2"/>
+            <a:endCxn id="51" idx="1"/>
           </p:cNvCxnSpPr>
           <p:nvPr/>
         </p:nvCxnSpPr>
         <p:spPr>
           <a:xfrm rot="16200000" flipH="1">
-            <a:off x="3525485" y="4072997"/>
-            <a:ext cx="545474" cy="704686"/>
+            <a:off x="3853856" y="4270699"/>
+            <a:ext cx="118964" cy="748614"/>
           </a:xfrm>
           <a:prstGeom prst="bentConnector2">
             <a:avLst/>
@@ -6098,8 +6195,8 @@
         </p:nvCxnSpPr>
         <p:spPr>
           <a:xfrm rot="5400000">
-            <a:off x="4561408" y="2383405"/>
-            <a:ext cx="2134501" cy="415692"/>
+            <a:off x="4621282" y="2461427"/>
+            <a:ext cx="2152649" cy="277797"/>
           </a:xfrm>
           <a:prstGeom prst="bentConnector2">
             <a:avLst/>
@@ -6234,8 +6331,8 @@
         </p:nvCxnSpPr>
         <p:spPr>
           <a:xfrm rot="5400000">
-            <a:off x="4040362" y="2908345"/>
-            <a:ext cx="3180487" cy="411798"/>
+            <a:off x="4109309" y="2977292"/>
+            <a:ext cx="3180487" cy="273904"/>
           </a:xfrm>
           <a:prstGeom prst="bentConnector2">
             <a:avLst/>
@@ -6246,6 +6343,234 @@
             </a:solidFill>
             <a:headEnd type="none" w="med" len="med"/>
             <a:tailEnd type="none" w="med" len="med"/>
+          </a:ln>
+          <a:effectLst/>
+        </p:spPr>
+        <p:style>
+          <a:lnRef idx="1">
+            <a:schemeClr val="accent2"/>
+          </a:lnRef>
+          <a:fillRef idx="2">
+            <a:schemeClr val="accent2"/>
+          </a:fillRef>
+          <a:effectRef idx="1">
+            <a:schemeClr val="accent2"/>
+          </a:effectRef>
+          <a:fontRef idx="minor">
+            <a:schemeClr val="dk1"/>
+          </a:fontRef>
+        </p:style>
+      </p:cxnSp>
+      <p:sp>
+        <p:nvSpPr>
+          <p:cNvPr id="57" name="Rectangle 11">
+            <a:extLst>
+              <a:ext uri="{FF2B5EF4-FFF2-40B4-BE49-F238E27FC236}">
+                <a16:creationId xmlns:a16="http://schemas.microsoft.com/office/drawing/2014/main" id="{7C771CC9-4ADE-4720-A0A8-7B2F37E0F687}"/>
+              </a:ext>
+            </a:extLst>
+          </p:cNvPr>
+          <p:cNvSpPr/>
+          <p:nvPr/>
+        </p:nvSpPr>
+        <p:spPr>
+          <a:xfrm>
+            <a:off x="2904044" y="4348683"/>
+            <a:ext cx="1269973" cy="236841"/>
+          </a:xfrm>
+          <a:prstGeom prst="rect">
+            <a:avLst/>
+          </a:prstGeom>
+          <a:ln w="19050">
+            <a:solidFill>
+              <a:schemeClr val="accent3"/>
+            </a:solidFill>
+          </a:ln>
+          <a:effectLst/>
+        </p:spPr>
+        <p:style>
+          <a:lnRef idx="1">
+            <a:schemeClr val="accent3"/>
+          </a:lnRef>
+          <a:fillRef idx="2">
+            <a:schemeClr val="accent3"/>
+          </a:fillRef>
+          <a:effectRef idx="1">
+            <a:schemeClr val="accent3"/>
+          </a:effectRef>
+          <a:fontRef idx="minor">
+            <a:schemeClr val="dk1"/>
+          </a:fontRef>
+        </p:style>
+        <p:txBody>
+          <a:bodyPr rtlCol="0" anchor="ctr"/>
+          <a:lstStyle/>
+          <a:p>
+            <a:pPr algn="ctr"/>
+            <a:r>
+              <a:rPr lang="en-US" sz="1050" b="1" dirty="0" err="1">
+                <a:solidFill>
+                  <a:schemeClr val="accent3">
+                    <a:lumMod val="75000"/>
+                  </a:schemeClr>
+                </a:solidFill>
+              </a:rPr>
+              <a:t>MenuListPanel</a:t>
+            </a:r>
+            <a:endParaRPr lang="en-SG" sz="1050" b="1" dirty="0">
+              <a:solidFill>
+                <a:schemeClr val="accent3">
+                  <a:lumMod val="75000"/>
+                </a:schemeClr>
+              </a:solidFill>
+            </a:endParaRPr>
+          </a:p>
+        </p:txBody>
+      </p:sp>
+      <p:cxnSp>
+        <p:nvCxnSpPr>
+          <p:cNvPr id="58" name="Elbow Connector 63">
+            <a:extLst>
+              <a:ext uri="{FF2B5EF4-FFF2-40B4-BE49-F238E27FC236}">
+                <a16:creationId xmlns:a16="http://schemas.microsoft.com/office/drawing/2014/main" id="{B68EFAD5-3CFD-4058-847C-84EE3C3F8822}"/>
+              </a:ext>
+            </a:extLst>
+          </p:cNvPr>
+          <p:cNvCxnSpPr>
+            <a:cxnSpLocks/>
+            <a:stCxn id="39" idx="2"/>
+            <a:endCxn id="57" idx="1"/>
+          </p:cNvCxnSpPr>
+          <p:nvPr/>
+        </p:nvCxnSpPr>
+        <p:spPr>
+          <a:xfrm rot="16200000" flipH="1">
+            <a:off x="1632813" y="3195873"/>
+            <a:ext cx="2361078" cy="181383"/>
+          </a:xfrm>
+          <a:prstGeom prst="bentConnector2">
+            <a:avLst/>
+          </a:prstGeom>
+          <a:ln w="19050">
+            <a:solidFill>
+              <a:schemeClr val="accent3"/>
+            </a:solidFill>
+            <a:headEnd type="none" w="med" len="med"/>
+            <a:tailEnd type="arrow" w="med" len="med"/>
+          </a:ln>
+          <a:effectLst/>
+        </p:spPr>
+        <p:style>
+          <a:lnRef idx="1">
+            <a:schemeClr val="accent2"/>
+          </a:lnRef>
+          <a:fillRef idx="2">
+            <a:schemeClr val="accent2"/>
+          </a:fillRef>
+          <a:effectRef idx="1">
+            <a:schemeClr val="accent2"/>
+          </a:effectRef>
+          <a:fontRef idx="minor">
+            <a:schemeClr val="dk1"/>
+          </a:fontRef>
+        </p:style>
+      </p:cxnSp>
+      <p:sp>
+        <p:nvSpPr>
+          <p:cNvPr id="85" name="Rectangle 11">
+            <a:extLst>
+              <a:ext uri="{FF2B5EF4-FFF2-40B4-BE49-F238E27FC236}">
+                <a16:creationId xmlns:a16="http://schemas.microsoft.com/office/drawing/2014/main" id="{C3EDF5F5-0B9A-4EC0-BFD0-5772AB173BAE}"/>
+              </a:ext>
+            </a:extLst>
+          </p:cNvPr>
+          <p:cNvSpPr/>
+          <p:nvPr/>
+        </p:nvSpPr>
+        <p:spPr>
+          <a:xfrm>
+            <a:off x="2907938" y="3331902"/>
+            <a:ext cx="1266077" cy="236841"/>
+          </a:xfrm>
+          <a:prstGeom prst="rect">
+            <a:avLst/>
+          </a:prstGeom>
+          <a:ln w="19050">
+            <a:solidFill>
+              <a:schemeClr val="accent3"/>
+            </a:solidFill>
+          </a:ln>
+          <a:effectLst/>
+        </p:spPr>
+        <p:style>
+          <a:lnRef idx="1">
+            <a:schemeClr val="accent3"/>
+          </a:lnRef>
+          <a:fillRef idx="2">
+            <a:schemeClr val="accent3"/>
+          </a:fillRef>
+          <a:effectRef idx="1">
+            <a:schemeClr val="accent3"/>
+          </a:effectRef>
+          <a:fontRef idx="minor">
+            <a:schemeClr val="dk1"/>
+          </a:fontRef>
+        </p:style>
+        <p:txBody>
+          <a:bodyPr rtlCol="0" anchor="ctr"/>
+          <a:lstStyle/>
+          <a:p>
+            <a:pPr algn="ctr"/>
+            <a:r>
+              <a:rPr lang="en-US" sz="1050" b="1" dirty="0" err="1">
+                <a:solidFill>
+                  <a:schemeClr val="accent3">
+                    <a:lumMod val="75000"/>
+                  </a:schemeClr>
+                </a:solidFill>
+              </a:rPr>
+              <a:t>StatsBrowserPanel</a:t>
+            </a:r>
+            <a:endParaRPr lang="en-SG" sz="1050" b="1" dirty="0">
+              <a:solidFill>
+                <a:schemeClr val="accent3">
+                  <a:lumMod val="75000"/>
+                </a:schemeClr>
+              </a:solidFill>
+            </a:endParaRPr>
+          </a:p>
+        </p:txBody>
+      </p:sp>
+      <p:cxnSp>
+        <p:nvCxnSpPr>
+          <p:cNvPr id="92" name="Elbow Connector 63">
+            <a:extLst>
+              <a:ext uri="{FF2B5EF4-FFF2-40B4-BE49-F238E27FC236}">
+                <a16:creationId xmlns:a16="http://schemas.microsoft.com/office/drawing/2014/main" id="{18D81F03-E483-46FA-B8C6-7780BD6E5D61}"/>
+              </a:ext>
+            </a:extLst>
+          </p:cNvPr>
+          <p:cNvCxnSpPr>
+            <a:cxnSpLocks/>
+            <a:stCxn id="39" idx="2"/>
+            <a:endCxn id="85" idx="1"/>
+          </p:cNvCxnSpPr>
+          <p:nvPr/>
+        </p:nvCxnSpPr>
+        <p:spPr>
+          <a:xfrm rot="16200000" flipH="1">
+            <a:off x="2143151" y="2685535"/>
+            <a:ext cx="1344297" cy="185277"/>
+          </a:xfrm>
+          <a:prstGeom prst="bentConnector2">
+            <a:avLst/>
+          </a:prstGeom>
+          <a:ln w="19050">
+            <a:solidFill>
+              <a:schemeClr val="accent3"/>
+            </a:solidFill>
+            <a:headEnd type="none" w="med" len="med"/>
+            <a:tailEnd type="arrow" w="med" len="med"/>
           </a:ln>
           <a:effectLst/>
         </p:spPr>

</xml_diff>

<commit_message>
UI class diagram update
</commit_message>
<xml_diff>
--- a/docs/diagrams/UiComponentClassDiagram.pptx
+++ b/docs/diagrams/UiComponentClassDiagram.pptx
@@ -3450,8 +3450,8 @@
         </p:nvSpPr>
         <p:spPr>
           <a:xfrm>
-            <a:off x="1217465" y="1447800"/>
-            <a:ext cx="4917083" cy="3962400"/>
+            <a:off x="1217465" y="533400"/>
+            <a:ext cx="4917083" cy="4751236"/>
           </a:xfrm>
           <a:prstGeom prst="roundRect">
             <a:avLst>
@@ -3512,7 +3512,7 @@
         </p:nvSpPr>
         <p:spPr>
           <a:xfrm>
-            <a:off x="2095948" y="2341220"/>
+            <a:off x="2095948" y="1426820"/>
             <a:ext cx="1093635" cy="346760"/>
           </a:xfrm>
           <a:prstGeom prst="rect">
@@ -3572,7 +3572,7 @@
         </p:nvSpPr>
         <p:spPr>
           <a:xfrm>
-            <a:off x="2592528" y="2971800"/>
+            <a:off x="2592528" y="2057400"/>
             <a:ext cx="1366411" cy="236841"/>
           </a:xfrm>
           <a:prstGeom prst="rect">
@@ -3632,7 +3632,7 @@
         </p:nvSpPr>
         <p:spPr>
           <a:xfrm>
-            <a:off x="2092842" y="1770924"/>
+            <a:off x="2092842" y="856524"/>
             <a:ext cx="1093635" cy="346760"/>
           </a:xfrm>
           <a:prstGeom prst="rect">
@@ -3694,7 +3694,7 @@
         </p:nvCxnSpPr>
         <p:spPr>
           <a:xfrm rot="16200000" flipH="1">
-            <a:off x="2529445" y="2227899"/>
+            <a:off x="2529445" y="1313499"/>
             <a:ext cx="223536" cy="3106"/>
           </a:xfrm>
           <a:prstGeom prst="bentConnector3">
@@ -3734,7 +3734,7 @@
         </p:nvSpPr>
         <p:spPr>
           <a:xfrm rot="10800000" flipV="1">
-            <a:off x="5394717" y="2110477"/>
+            <a:off x="5394717" y="1196077"/>
             <a:ext cx="270504" cy="175523"/>
           </a:xfrm>
           <a:prstGeom prst="triangle">
@@ -3782,7 +3782,7 @@
         </p:nvCxnSpPr>
         <p:spPr>
           <a:xfrm flipV="1">
-            <a:off x="644735" y="2991937"/>
+            <a:off x="644735" y="2077537"/>
             <a:ext cx="684904" cy="1"/>
           </a:xfrm>
           <a:prstGeom prst="bentConnector3">
@@ -3825,7 +3825,7 @@
         </p:nvSpPr>
         <p:spPr>
           <a:xfrm rot="16200000">
-            <a:off x="5703829" y="2464877"/>
+            <a:off x="5703829" y="1550477"/>
             <a:ext cx="2362201" cy="328045"/>
           </a:xfrm>
           <a:prstGeom prst="roundRect">
@@ -3885,7 +3885,7 @@
         </p:nvSpPr>
         <p:spPr>
           <a:xfrm>
-            <a:off x="2592528" y="3649359"/>
+            <a:off x="2592528" y="2734959"/>
             <a:ext cx="1369870" cy="236841"/>
           </a:xfrm>
           <a:prstGeom prst="rect">
@@ -3945,7 +3945,7 @@
         </p:nvSpPr>
         <p:spPr>
           <a:xfrm>
-            <a:off x="2592527" y="4563759"/>
+            <a:off x="2592525" y="4326648"/>
             <a:ext cx="1369873" cy="236841"/>
           </a:xfrm>
           <a:prstGeom prst="rect">
@@ -4005,7 +4005,7 @@
         </p:nvSpPr>
         <p:spPr>
           <a:xfrm>
-            <a:off x="2592526" y="3991960"/>
+            <a:off x="2592526" y="3077560"/>
             <a:ext cx="1369874" cy="236841"/>
           </a:xfrm>
           <a:prstGeom prst="rect">
@@ -4065,7 +4065,7 @@
         </p:nvSpPr>
         <p:spPr>
           <a:xfrm>
-            <a:off x="4104467" y="4235867"/>
+            <a:off x="4104467" y="3321467"/>
             <a:ext cx="1166474" cy="236841"/>
           </a:xfrm>
           <a:prstGeom prst="rect">
@@ -4125,7 +4125,7 @@
         </p:nvSpPr>
         <p:spPr>
           <a:xfrm>
-            <a:off x="2592528" y="4966000"/>
+            <a:off x="2592526" y="4728889"/>
             <a:ext cx="1369872" cy="236841"/>
           </a:xfrm>
           <a:prstGeom prst="rect">
@@ -4185,7 +4185,7 @@
         </p:nvSpPr>
         <p:spPr>
           <a:xfrm>
-            <a:off x="2324548" y="2706452"/>
+            <a:off x="2324548" y="1792052"/>
             <a:ext cx="183156" cy="161573"/>
           </a:xfrm>
           <a:prstGeom prst="flowChartDecision">
@@ -4237,7 +4237,7 @@
         </p:nvCxnSpPr>
         <p:spPr>
           <a:xfrm rot="16200000" flipH="1">
-            <a:off x="2393229" y="2890922"/>
+            <a:off x="2393229" y="1976522"/>
             <a:ext cx="222196" cy="176402"/>
           </a:xfrm>
           <a:prstGeom prst="bentConnector2">
@@ -4275,7 +4275,7 @@
         </p:nvSpPr>
         <p:spPr>
           <a:xfrm>
-            <a:off x="2590799" y="3304308"/>
+            <a:off x="2590799" y="2389908"/>
             <a:ext cx="1369870" cy="236841"/>
           </a:xfrm>
           <a:prstGeom prst="rect">
@@ -4339,7 +4339,7 @@
         </p:nvCxnSpPr>
         <p:spPr>
           <a:xfrm rot="16200000" flipH="1">
-            <a:off x="2054450" y="3229701"/>
+            <a:off x="2054450" y="2315301"/>
             <a:ext cx="899755" cy="176402"/>
           </a:xfrm>
           <a:prstGeom prst="bentConnector2">
@@ -4381,7 +4381,7 @@
         </p:nvCxnSpPr>
         <p:spPr>
           <a:xfrm rot="16200000" flipH="1">
-            <a:off x="1883148" y="3401003"/>
+            <a:off x="1883148" y="2486603"/>
             <a:ext cx="1242356" cy="176400"/>
           </a:xfrm>
           <a:prstGeom prst="bentConnector2">
@@ -4423,8 +4423,8 @@
         </p:nvCxnSpPr>
         <p:spPr>
           <a:xfrm rot="16200000" flipH="1">
-            <a:off x="1597249" y="3686901"/>
-            <a:ext cx="1814155" cy="176401"/>
+            <a:off x="1258603" y="3111147"/>
+            <a:ext cx="2491444" cy="176399"/>
           </a:xfrm>
           <a:prstGeom prst="bentConnector2">
             <a:avLst/>
@@ -4464,8 +4464,8 @@
         </p:nvCxnSpPr>
         <p:spPr>
           <a:xfrm rot="16200000" flipH="1">
-            <a:off x="1184119" y="3676012"/>
-            <a:ext cx="2396440" cy="420378"/>
+            <a:off x="882451" y="3137234"/>
+            <a:ext cx="3032697" cy="387454"/>
           </a:xfrm>
           <a:prstGeom prst="bentConnector2">
             <a:avLst/>
@@ -4502,7 +4502,7 @@
         </p:nvSpPr>
         <p:spPr>
           <a:xfrm>
-            <a:off x="5143948" y="1770924"/>
+            <a:off x="5143948" y="856524"/>
             <a:ext cx="772043" cy="346760"/>
           </a:xfrm>
           <a:prstGeom prst="rect">
@@ -4585,7 +4585,7 @@
         </p:nvCxnSpPr>
         <p:spPr>
           <a:xfrm flipV="1">
-            <a:off x="3960669" y="2286000"/>
+            <a:off x="3960669" y="1371600"/>
             <a:ext cx="1569300" cy="1136729"/>
           </a:xfrm>
           <a:prstGeom prst="bentConnector2">
@@ -4627,7 +4627,7 @@
         </p:nvCxnSpPr>
         <p:spPr>
           <a:xfrm rot="5400000">
-            <a:off x="4366311" y="3190630"/>
+            <a:off x="4366311" y="2276230"/>
             <a:ext cx="2068288" cy="259028"/>
           </a:xfrm>
           <a:prstGeom prst="bentConnector2">
@@ -4669,7 +4669,7 @@
         </p:nvCxnSpPr>
         <p:spPr>
           <a:xfrm rot="5400000">
-            <a:off x="4005294" y="2243105"/>
+            <a:off x="4005294" y="1328705"/>
             <a:ext cx="1481780" cy="1567571"/>
           </a:xfrm>
           <a:prstGeom prst="bentConnector2">
@@ -4710,7 +4710,7 @@
         </p:nvCxnSpPr>
         <p:spPr>
           <a:xfrm flipV="1">
-            <a:off x="3189583" y="2286000"/>
+            <a:off x="3189583" y="1371600"/>
             <a:ext cx="2340386" cy="228600"/>
           </a:xfrm>
           <a:prstGeom prst="bentConnector2">
@@ -4752,8 +4752,8 @@
         </p:nvCxnSpPr>
         <p:spPr>
           <a:xfrm rot="5400000">
-            <a:off x="3548095" y="2700306"/>
-            <a:ext cx="2396180" cy="1567569"/>
+            <a:off x="3209450" y="2124549"/>
+            <a:ext cx="3073469" cy="1567571"/>
           </a:xfrm>
           <a:prstGeom prst="bentConnector2">
             <a:avLst/>
@@ -4794,8 +4794,8 @@
         </p:nvCxnSpPr>
         <p:spPr>
           <a:xfrm rot="5400000">
-            <a:off x="3346975" y="2901426"/>
-            <a:ext cx="2798421" cy="1567569"/>
+            <a:off x="3008329" y="2325670"/>
+            <a:ext cx="3475710" cy="1567571"/>
           </a:xfrm>
           <a:prstGeom prst="bentConnector2">
             <a:avLst/>
@@ -4834,7 +4834,7 @@
         </p:nvCxnSpPr>
         <p:spPr>
           <a:xfrm rot="5400000" flipH="1" flipV="1">
-            <a:off x="4594921" y="-355061"/>
+            <a:off x="4594921" y="-1269461"/>
             <a:ext cx="170724" cy="4081246"/>
           </a:xfrm>
           <a:prstGeom prst="bentConnector2">
@@ -4873,7 +4873,7 @@
         </p:nvSpPr>
         <p:spPr>
           <a:xfrm rot="16200000">
-            <a:off x="6213739" y="4560376"/>
+            <a:off x="6213739" y="3645976"/>
             <a:ext cx="1371599" cy="328045"/>
           </a:xfrm>
           <a:prstGeom prst="roundRect">
@@ -4933,7 +4933,7 @@
         </p:nvSpPr>
         <p:spPr>
           <a:xfrm rot="16200000">
-            <a:off x="956202" y="2861202"/>
+            <a:off x="956202" y="1946802"/>
             <a:ext cx="1093635" cy="346760"/>
           </a:xfrm>
           <a:prstGeom prst="rect">
@@ -5003,7 +5003,7 @@
         </p:nvSpPr>
         <p:spPr>
           <a:xfrm flipV="1">
-            <a:off x="1367767" y="2286001"/>
+            <a:off x="1367767" y="1371601"/>
             <a:ext cx="270504" cy="175523"/>
           </a:xfrm>
           <a:prstGeom prst="triangle">
@@ -5054,7 +5054,7 @@
         </p:nvCxnSpPr>
         <p:spPr>
           <a:xfrm rot="10800000" flipV="1">
-            <a:off x="1503020" y="1944303"/>
+            <a:off x="1503020" y="1029903"/>
             <a:ext cx="589823" cy="341697"/>
           </a:xfrm>
           <a:prstGeom prst="bentConnector2">
@@ -5097,7 +5097,7 @@
         </p:nvCxnSpPr>
         <p:spPr>
           <a:xfrm rot="16200000" flipH="1">
-            <a:off x="2226110" y="3058040"/>
+            <a:off x="2226110" y="2143640"/>
             <a:ext cx="554704" cy="174673"/>
           </a:xfrm>
           <a:prstGeom prst="bentConnector2">
@@ -5139,7 +5139,7 @@
         </p:nvCxnSpPr>
         <p:spPr>
           <a:xfrm rot="5400000">
-            <a:off x="4342344" y="1902595"/>
+            <a:off x="4342344" y="988195"/>
             <a:ext cx="804221" cy="1571030"/>
           </a:xfrm>
           <a:prstGeom prst="bentConnector2">
@@ -5181,7 +5181,7 @@
         </p:nvCxnSpPr>
         <p:spPr>
           <a:xfrm rot="16200000" flipH="1">
-            <a:off x="3628222" y="3878042"/>
+            <a:off x="3628222" y="2963642"/>
             <a:ext cx="125487" cy="827004"/>
           </a:xfrm>
           <a:prstGeom prst="bentConnector2">
@@ -5223,7 +5223,7 @@
         </p:nvCxnSpPr>
         <p:spPr>
           <a:xfrm rot="5400000">
-            <a:off x="3833995" y="2414406"/>
+            <a:off x="3833995" y="1500006"/>
             <a:ext cx="1824381" cy="1567569"/>
           </a:xfrm>
           <a:prstGeom prst="bentConnector2">
@@ -5261,7 +5261,7 @@
         </p:nvSpPr>
         <p:spPr>
           <a:xfrm>
-            <a:off x="5422048" y="2339335"/>
+            <a:off x="5422048" y="1424935"/>
             <a:ext cx="229325" cy="166560"/>
           </a:xfrm>
           <a:prstGeom prst="rect">
@@ -5314,7 +5314,7 @@
         </p:nvSpPr>
         <p:spPr>
           <a:xfrm>
-            <a:off x="3186477" y="2405681"/>
+            <a:off x="3186477" y="1491281"/>
             <a:ext cx="3537529" cy="45719"/>
           </a:xfrm>
           <a:custGeom>
@@ -5396,7 +5396,7 @@
         </p:nvSpPr>
         <p:spPr>
           <a:xfrm>
-            <a:off x="5431573" y="4488138"/>
+            <a:off x="5431573" y="3573738"/>
             <a:ext cx="229325" cy="160062"/>
           </a:xfrm>
           <a:prstGeom prst="rect">
@@ -5449,7 +5449,369 @@
         </p:nvSpPr>
         <p:spPr>
           <a:xfrm flipV="1">
-            <a:off x="4572000" y="4479432"/>
+            <a:off x="4572000" y="3565032"/>
+            <a:ext cx="2184994" cy="94875"/>
+          </a:xfrm>
+          <a:custGeom>
+            <a:avLst/>
+            <a:gdLst>
+              <a:gd name="connsiteX0" fmla="*/ 0 w 3048000"/>
+              <a:gd name="connsiteY0" fmla="*/ 203200 h 203200"/>
+              <a:gd name="connsiteX1" fmla="*/ 221673 w 3048000"/>
+              <a:gd name="connsiteY1" fmla="*/ 0 h 203200"/>
+              <a:gd name="connsiteX2" fmla="*/ 3048000 w 3048000"/>
+              <a:gd name="connsiteY2" fmla="*/ 0 h 203200"/>
+            </a:gdLst>
+            <a:ahLst/>
+            <a:cxnLst>
+              <a:cxn ang="0">
+                <a:pos x="connsiteX0" y="connsiteY0"/>
+              </a:cxn>
+              <a:cxn ang="0">
+                <a:pos x="connsiteX1" y="connsiteY1"/>
+              </a:cxn>
+              <a:cxn ang="0">
+                <a:pos x="connsiteX2" y="connsiteY2"/>
+              </a:cxn>
+            </a:cxnLst>
+            <a:rect l="l" t="t" r="r" b="b"/>
+            <a:pathLst>
+              <a:path w="3048000" h="203200">
+                <a:moveTo>
+                  <a:pt x="0" y="203200"/>
+                </a:moveTo>
+                <a:lnTo>
+                  <a:pt x="221673" y="0"/>
+                </a:lnTo>
+                <a:lnTo>
+                  <a:pt x="3048000" y="0"/>
+                </a:lnTo>
+              </a:path>
+            </a:pathLst>
+          </a:custGeom>
+          <a:noFill/>
+          <a:ln w="19050">
+            <a:solidFill>
+              <a:schemeClr val="accent3"/>
+            </a:solidFill>
+            <a:prstDash val="sysDot"/>
+            <a:headEnd type="none" w="med" len="med"/>
+            <a:tailEnd type="arrow" w="med" len="med"/>
+          </a:ln>
+          <a:effectLst/>
+        </p:spPr>
+        <p:style>
+          <a:lnRef idx="1">
+            <a:schemeClr val="accent2"/>
+          </a:lnRef>
+          <a:fillRef idx="2">
+            <a:schemeClr val="accent2"/>
+          </a:fillRef>
+          <a:effectRef idx="1">
+            <a:schemeClr val="accent2"/>
+          </a:effectRef>
+          <a:fontRef idx="minor">
+            <a:schemeClr val="dk1"/>
+          </a:fontRef>
+        </p:style>
+        <p:txBody>
+          <a:bodyPr rtlCol="0" anchor="ctr"/>
+          <a:lstStyle/>
+          <a:p>
+            <a:pPr algn="ctr"/>
+            <a:endParaRPr lang="en-SG"/>
+          </a:p>
+        </p:txBody>
+      </p:sp>
+      <p:sp>
+        <p:nvSpPr>
+          <p:cNvPr id="46" name="Rectangle 11">
+            <a:extLst>
+              <a:ext uri="{FF2B5EF4-FFF2-40B4-BE49-F238E27FC236}">
+                <a16:creationId xmlns:a16="http://schemas.microsoft.com/office/drawing/2014/main" id="{70748E91-867F-2643-8FF6-AC258BE8F2F5}"/>
+              </a:ext>
+            </a:extLst>
+          </p:cNvPr>
+          <p:cNvSpPr/>
+          <p:nvPr/>
+        </p:nvSpPr>
+        <p:spPr>
+          <a:xfrm>
+            <a:off x="2597002" y="3611004"/>
+            <a:ext cx="1369874" cy="236841"/>
+          </a:xfrm>
+          <a:prstGeom prst="rect">
+            <a:avLst/>
+          </a:prstGeom>
+          <a:ln w="19050">
+            <a:solidFill>
+              <a:schemeClr val="accent3"/>
+            </a:solidFill>
+          </a:ln>
+          <a:effectLst/>
+        </p:spPr>
+        <p:style>
+          <a:lnRef idx="1">
+            <a:schemeClr val="accent3"/>
+          </a:lnRef>
+          <a:fillRef idx="2">
+            <a:schemeClr val="accent3"/>
+          </a:fillRef>
+          <a:effectRef idx="1">
+            <a:schemeClr val="accent3"/>
+          </a:effectRef>
+          <a:fontRef idx="minor">
+            <a:schemeClr val="dk1"/>
+          </a:fontRef>
+        </p:style>
+        <p:txBody>
+          <a:bodyPr rtlCol="0" anchor="ctr"/>
+          <a:lstStyle/>
+          <a:p>
+            <a:pPr algn="ctr"/>
+            <a:r>
+              <a:rPr lang="en-US" sz="1050" b="1" dirty="0">
+                <a:solidFill>
+                  <a:schemeClr val="accent3">
+                    <a:lumMod val="75000"/>
+                  </a:schemeClr>
+                </a:solidFill>
+              </a:rPr>
+              <a:t>WorkListListPanel</a:t>
+            </a:r>
+            <a:endParaRPr lang="en-SG" sz="1050" b="1" dirty="0">
+              <a:solidFill>
+                <a:schemeClr val="accent3">
+                  <a:lumMod val="75000"/>
+                </a:schemeClr>
+              </a:solidFill>
+            </a:endParaRPr>
+          </a:p>
+        </p:txBody>
+      </p:sp>
+      <p:sp>
+        <p:nvSpPr>
+          <p:cNvPr id="48" name="Rectangle 11">
+            <a:extLst>
+              <a:ext uri="{FF2B5EF4-FFF2-40B4-BE49-F238E27FC236}">
+                <a16:creationId xmlns:a16="http://schemas.microsoft.com/office/drawing/2014/main" id="{FF09F446-8C96-824A-981C-5EDA08A569E5}"/>
+              </a:ext>
+            </a:extLst>
+          </p:cNvPr>
+          <p:cNvSpPr/>
+          <p:nvPr/>
+        </p:nvSpPr>
+        <p:spPr>
+          <a:xfrm>
+            <a:off x="4108943" y="3854911"/>
+            <a:ext cx="1166474" cy="236841"/>
+          </a:xfrm>
+          <a:prstGeom prst="rect">
+            <a:avLst/>
+          </a:prstGeom>
+          <a:ln w="19050">
+            <a:solidFill>
+              <a:schemeClr val="accent3"/>
+            </a:solidFill>
+          </a:ln>
+          <a:effectLst/>
+        </p:spPr>
+        <p:style>
+          <a:lnRef idx="1">
+            <a:schemeClr val="accent3"/>
+          </a:lnRef>
+          <a:fillRef idx="2">
+            <a:schemeClr val="accent3"/>
+          </a:fillRef>
+          <a:effectRef idx="1">
+            <a:schemeClr val="accent3"/>
+          </a:effectRef>
+          <a:fontRef idx="minor">
+            <a:schemeClr val="dk1"/>
+          </a:fontRef>
+        </p:style>
+        <p:txBody>
+          <a:bodyPr rtlCol="0" anchor="ctr"/>
+          <a:lstStyle/>
+          <a:p>
+            <a:pPr algn="ctr"/>
+            <a:r>
+              <a:rPr lang="en-US" sz="1050" b="1" dirty="0">
+                <a:solidFill>
+                  <a:schemeClr val="accent3">
+                    <a:lumMod val="75000"/>
+                  </a:schemeClr>
+                </a:solidFill>
+              </a:rPr>
+              <a:t>WorkListCard</a:t>
+            </a:r>
+            <a:endParaRPr lang="en-SG" sz="1050" b="1" dirty="0">
+              <a:solidFill>
+                <a:schemeClr val="accent3">
+                  <a:lumMod val="75000"/>
+                </a:schemeClr>
+              </a:solidFill>
+            </a:endParaRPr>
+          </a:p>
+        </p:txBody>
+      </p:sp>
+      <p:cxnSp>
+        <p:nvCxnSpPr>
+          <p:cNvPr id="49" name="Elbow Connector 63">
+            <a:extLst>
+              <a:ext uri="{FF2B5EF4-FFF2-40B4-BE49-F238E27FC236}">
+                <a16:creationId xmlns:a16="http://schemas.microsoft.com/office/drawing/2014/main" id="{184A9728-B6C3-C044-A18F-A963A2BDF16A}"/>
+              </a:ext>
+            </a:extLst>
+          </p:cNvPr>
+          <p:cNvCxnSpPr>
+            <a:cxnSpLocks/>
+            <a:endCxn id="46" idx="1"/>
+          </p:cNvCxnSpPr>
+          <p:nvPr/>
+        </p:nvCxnSpPr>
+        <p:spPr>
+          <a:xfrm rot="16200000" flipH="1">
+            <a:off x="1887624" y="3020047"/>
+            <a:ext cx="1242356" cy="176400"/>
+          </a:xfrm>
+          <a:prstGeom prst="bentConnector2">
+            <a:avLst/>
+          </a:prstGeom>
+          <a:ln w="19050">
+            <a:solidFill>
+              <a:schemeClr val="accent3"/>
+            </a:solidFill>
+            <a:headEnd type="none" w="med" len="med"/>
+            <a:tailEnd type="arrow" w="med" len="med"/>
+          </a:ln>
+          <a:effectLst/>
+        </p:spPr>
+        <p:style>
+          <a:lnRef idx="1">
+            <a:schemeClr val="accent2"/>
+          </a:lnRef>
+          <a:fillRef idx="2">
+            <a:schemeClr val="accent2"/>
+          </a:fillRef>
+          <a:effectRef idx="1">
+            <a:schemeClr val="accent2"/>
+          </a:effectRef>
+          <a:fontRef idx="minor">
+            <a:schemeClr val="dk1"/>
+          </a:fontRef>
+        </p:style>
+      </p:cxnSp>
+      <p:cxnSp>
+        <p:nvCxnSpPr>
+          <p:cNvPr id="51" name="Elbow Connector 63">
+            <a:extLst>
+              <a:ext uri="{FF2B5EF4-FFF2-40B4-BE49-F238E27FC236}">
+                <a16:creationId xmlns:a16="http://schemas.microsoft.com/office/drawing/2014/main" id="{DD05FDBB-E0C4-4746-A50E-6DB3E07FE0FB}"/>
+              </a:ext>
+            </a:extLst>
+          </p:cNvPr>
+          <p:cNvCxnSpPr>
+            <a:cxnSpLocks/>
+            <a:endCxn id="48" idx="3"/>
+          </p:cNvCxnSpPr>
+          <p:nvPr/>
+        </p:nvCxnSpPr>
+        <p:spPr>
+          <a:xfrm rot="5400000">
+            <a:off x="4370787" y="2809674"/>
+            <a:ext cx="2068288" cy="259028"/>
+          </a:xfrm>
+          <a:prstGeom prst="bentConnector2">
+            <a:avLst/>
+          </a:prstGeom>
+          <a:ln w="6350">
+            <a:solidFill>
+              <a:schemeClr val="accent3"/>
+            </a:solidFill>
+            <a:headEnd type="none" w="med" len="med"/>
+            <a:tailEnd type="none" w="med" len="med"/>
+          </a:ln>
+          <a:effectLst/>
+        </p:spPr>
+        <p:style>
+          <a:lnRef idx="1">
+            <a:schemeClr val="accent2"/>
+          </a:lnRef>
+          <a:fillRef idx="2">
+            <a:schemeClr val="accent2"/>
+          </a:fillRef>
+          <a:effectRef idx="1">
+            <a:schemeClr val="accent2"/>
+          </a:effectRef>
+          <a:fontRef idx="minor">
+            <a:schemeClr val="dk1"/>
+          </a:fontRef>
+        </p:style>
+      </p:cxnSp>
+      <p:cxnSp>
+        <p:nvCxnSpPr>
+          <p:cNvPr id="52" name="Elbow Connector 51">
+            <a:extLst>
+              <a:ext uri="{FF2B5EF4-FFF2-40B4-BE49-F238E27FC236}">
+                <a16:creationId xmlns:a16="http://schemas.microsoft.com/office/drawing/2014/main" id="{EAB45BCC-8FA6-EE44-BABC-C0B6170D4D0C}"/>
+              </a:ext>
+            </a:extLst>
+          </p:cNvPr>
+          <p:cNvCxnSpPr>
+            <a:cxnSpLocks/>
+            <a:stCxn id="46" idx="2"/>
+            <a:endCxn id="48" idx="1"/>
+          </p:cNvCxnSpPr>
+          <p:nvPr/>
+        </p:nvCxnSpPr>
+        <p:spPr>
+          <a:xfrm rot="16200000" flipH="1">
+            <a:off x="3632698" y="3497086"/>
+            <a:ext cx="125487" cy="827004"/>
+          </a:xfrm>
+          <a:prstGeom prst="bentConnector2">
+            <a:avLst/>
+          </a:prstGeom>
+          <a:ln w="19050">
+            <a:solidFill>
+              <a:schemeClr val="accent3"/>
+            </a:solidFill>
+            <a:headEnd type="none" w="med" len="med"/>
+            <a:tailEnd type="arrow" w="med" len="med"/>
+          </a:ln>
+          <a:effectLst/>
+        </p:spPr>
+        <p:style>
+          <a:lnRef idx="1">
+            <a:schemeClr val="accent2"/>
+          </a:lnRef>
+          <a:fillRef idx="2">
+            <a:schemeClr val="accent2"/>
+          </a:fillRef>
+          <a:effectRef idx="1">
+            <a:schemeClr val="accent2"/>
+          </a:effectRef>
+          <a:fontRef idx="minor">
+            <a:schemeClr val="dk1"/>
+          </a:fontRef>
+        </p:style>
+      </p:cxnSp>
+      <p:sp>
+        <p:nvSpPr>
+          <p:cNvPr id="54" name="Freeform 53">
+            <a:extLst>
+              <a:ext uri="{FF2B5EF4-FFF2-40B4-BE49-F238E27FC236}">
+                <a16:creationId xmlns:a16="http://schemas.microsoft.com/office/drawing/2014/main" id="{32ADD139-E668-8047-80AC-F84E3F58A81E}"/>
+              </a:ext>
+            </a:extLst>
+          </p:cNvPr>
+          <p:cNvSpPr/>
+          <p:nvPr/>
+        </p:nvSpPr>
+        <p:spPr>
+          <a:xfrm flipV="1">
+            <a:off x="4576476" y="4098476"/>
             <a:ext cx="2184994" cy="94875"/>
           </a:xfrm>
           <a:custGeom>

</xml_diff>

<commit_message>
UG: updated 3.2 UI component
</commit_message>
<xml_diff>
--- a/docs/diagrams/UiComponentClassDiagram.pptx
+++ b/docs/diagrams/UiComponentClassDiagram.pptx
@@ -208,7 +208,7 @@
           <a:p>
             <a:fld id="{F5CC4B3F-88C1-4FFA-B1B6-F41C21DC6924}" type="datetimeFigureOut">
               <a:rPr lang="en-US" smtClean="0"/>
-              <a:t>12/15/2018</a:t>
+              <a:t>4/1/2019</a:t>
             </a:fld>
             <a:endParaRPr lang="en-US"/>
           </a:p>
@@ -654,7 +654,7 @@
           <a:p>
             <a:fld id="{78C97017-6FC3-485B-9764-EAC9E56C1D49}" type="datetimeFigureOut">
               <a:rPr lang="en-US" smtClean="0"/>
-              <a:t>12/15/2018</a:t>
+              <a:t>4/1/2019</a:t>
             </a:fld>
             <a:endParaRPr lang="en-US"/>
           </a:p>
@@ -822,7 +822,7 @@
           <a:p>
             <a:fld id="{78C97017-6FC3-485B-9764-EAC9E56C1D49}" type="datetimeFigureOut">
               <a:rPr lang="en-US" smtClean="0"/>
-              <a:t>12/15/2018</a:t>
+              <a:t>4/1/2019</a:t>
             </a:fld>
             <a:endParaRPr lang="en-US"/>
           </a:p>
@@ -1000,7 +1000,7 @@
           <a:p>
             <a:fld id="{78C97017-6FC3-485B-9764-EAC9E56C1D49}" type="datetimeFigureOut">
               <a:rPr lang="en-US" smtClean="0"/>
-              <a:t>12/15/2018</a:t>
+              <a:t>4/1/2019</a:t>
             </a:fld>
             <a:endParaRPr lang="en-US"/>
           </a:p>
@@ -1168,7 +1168,7 @@
           <a:p>
             <a:fld id="{78C97017-6FC3-485B-9764-EAC9E56C1D49}" type="datetimeFigureOut">
               <a:rPr lang="en-US" smtClean="0"/>
-              <a:t>12/15/2018</a:t>
+              <a:t>4/1/2019</a:t>
             </a:fld>
             <a:endParaRPr lang="en-US"/>
           </a:p>
@@ -1413,7 +1413,7 @@
           <a:p>
             <a:fld id="{78C97017-6FC3-485B-9764-EAC9E56C1D49}" type="datetimeFigureOut">
               <a:rPr lang="en-US" smtClean="0"/>
-              <a:t>12/15/2018</a:t>
+              <a:t>4/1/2019</a:t>
             </a:fld>
             <a:endParaRPr lang="en-US"/>
           </a:p>
@@ -1698,7 +1698,7 @@
           <a:p>
             <a:fld id="{78C97017-6FC3-485B-9764-EAC9E56C1D49}" type="datetimeFigureOut">
               <a:rPr lang="en-US" smtClean="0"/>
-              <a:t>12/15/2018</a:t>
+              <a:t>4/1/2019</a:t>
             </a:fld>
             <a:endParaRPr lang="en-US"/>
           </a:p>
@@ -2117,7 +2117,7 @@
           <a:p>
             <a:fld id="{78C97017-6FC3-485B-9764-EAC9E56C1D49}" type="datetimeFigureOut">
               <a:rPr lang="en-US" smtClean="0"/>
-              <a:t>12/15/2018</a:t>
+              <a:t>4/1/2019</a:t>
             </a:fld>
             <a:endParaRPr lang="en-US"/>
           </a:p>
@@ -2234,7 +2234,7 @@
           <a:p>
             <a:fld id="{78C97017-6FC3-485B-9764-EAC9E56C1D49}" type="datetimeFigureOut">
               <a:rPr lang="en-US" smtClean="0"/>
-              <a:t>12/15/2018</a:t>
+              <a:t>4/1/2019</a:t>
             </a:fld>
             <a:endParaRPr lang="en-US"/>
           </a:p>
@@ -2329,7 +2329,7 @@
           <a:p>
             <a:fld id="{78C97017-6FC3-485B-9764-EAC9E56C1D49}" type="datetimeFigureOut">
               <a:rPr lang="en-US" smtClean="0"/>
-              <a:t>12/15/2018</a:t>
+              <a:t>4/1/2019</a:t>
             </a:fld>
             <a:endParaRPr lang="en-US"/>
           </a:p>
@@ -2604,7 +2604,7 @@
           <a:p>
             <a:fld id="{78C97017-6FC3-485B-9764-EAC9E56C1D49}" type="datetimeFigureOut">
               <a:rPr lang="en-US" smtClean="0"/>
-              <a:t>12/15/2018</a:t>
+              <a:t>4/1/2019</a:t>
             </a:fld>
             <a:endParaRPr lang="en-US"/>
           </a:p>
@@ -2856,7 +2856,7 @@
           <a:p>
             <a:fld id="{78C97017-6FC3-485B-9764-EAC9E56C1D49}" type="datetimeFigureOut">
               <a:rPr lang="en-US" smtClean="0"/>
-              <a:t>12/15/2018</a:t>
+              <a:t>4/1/2019</a:t>
             </a:fld>
             <a:endParaRPr lang="en-US"/>
           </a:p>
@@ -3067,7 +3067,7 @@
           <a:p>
             <a:fld id="{78C97017-6FC3-485B-9764-EAC9E56C1D49}" type="datetimeFigureOut">
               <a:rPr lang="en-US" smtClean="0"/>
-              <a:t>12/15/2018</a:t>
+              <a:t>4/1/2019</a:t>
             </a:fld>
             <a:endParaRPr lang="en-US"/>
           </a:p>
@@ -4045,7 +4045,7 @@
                   </a:schemeClr>
                 </a:solidFill>
               </a:rPr>
-              <a:t>PersonListPanel</a:t>
+              <a:t>RecordListPanel</a:t>
             </a:r>
             <a:endParaRPr lang="en-SG" sz="1050" b="1" dirty="0">
               <a:solidFill>
@@ -4105,7 +4105,7 @@
                   </a:schemeClr>
                 </a:solidFill>
               </a:rPr>
-              <a:t>PersonCard</a:t>
+              <a:t>RecordCard</a:t>
             </a:r>
             <a:endParaRPr lang="en-SG" sz="1050" b="1" dirty="0">
               <a:solidFill>
@@ -5202,14 +5202,13 @@
         <p:nvCxnSpPr>
           <p:cNvPr id="140" name="Elbow Connector 63"/>
           <p:cNvCxnSpPr>
-            <a:stCxn id="16" idx="3"/>
-            <a:endCxn id="36" idx="3"/>
+            <a:cxnSpLocks/>
           </p:cNvCxnSpPr>
           <p:nvPr/>
         </p:nvCxnSpPr>
         <p:spPr>
           <a:xfrm rot="5400000">
-            <a:off x="3695875" y="2276286"/>
+            <a:off x="3695875" y="2276287"/>
             <a:ext cx="1824381" cy="1843808"/>
           </a:xfrm>
           <a:prstGeom prst="bentConnector2">

</xml_diff>

<commit_message>
Updated DG/UI Component for v1.4
</commit_message>
<xml_diff>
--- a/docs/diagrams/UiComponentClassDiagram.pptx
+++ b/docs/diagrams/UiComponentClassDiagram.pptx
@@ -208,7 +208,7 @@
           <a:p>
             <a:fld id="{F5CC4B3F-88C1-4FFA-B1B6-F41C21DC6924}" type="datetimeFigureOut">
               <a:rPr lang="en-US" smtClean="0"/>
-              <a:t>3/12/2019</a:t>
+              <a:t>02-Apr-19</a:t>
             </a:fld>
             <a:endParaRPr lang="en-US"/>
           </a:p>
@@ -654,7 +654,7 @@
           <a:p>
             <a:fld id="{78C97017-6FC3-485B-9764-EAC9E56C1D49}" type="datetimeFigureOut">
               <a:rPr lang="en-US" smtClean="0"/>
-              <a:t>3/12/2019</a:t>
+              <a:t>02-Apr-19</a:t>
             </a:fld>
             <a:endParaRPr lang="en-US"/>
           </a:p>
@@ -822,7 +822,7 @@
           <a:p>
             <a:fld id="{78C97017-6FC3-485B-9764-EAC9E56C1D49}" type="datetimeFigureOut">
               <a:rPr lang="en-US" smtClean="0"/>
-              <a:t>3/12/2019</a:t>
+              <a:t>02-Apr-19</a:t>
             </a:fld>
             <a:endParaRPr lang="en-US"/>
           </a:p>
@@ -1000,7 +1000,7 @@
           <a:p>
             <a:fld id="{78C97017-6FC3-485B-9764-EAC9E56C1D49}" type="datetimeFigureOut">
               <a:rPr lang="en-US" smtClean="0"/>
-              <a:t>3/12/2019</a:t>
+              <a:t>02-Apr-19</a:t>
             </a:fld>
             <a:endParaRPr lang="en-US"/>
           </a:p>
@@ -1168,7 +1168,7 @@
           <a:p>
             <a:fld id="{78C97017-6FC3-485B-9764-EAC9E56C1D49}" type="datetimeFigureOut">
               <a:rPr lang="en-US" smtClean="0"/>
-              <a:t>3/12/2019</a:t>
+              <a:t>02-Apr-19</a:t>
             </a:fld>
             <a:endParaRPr lang="en-US"/>
           </a:p>
@@ -1413,7 +1413,7 @@
           <a:p>
             <a:fld id="{78C97017-6FC3-485B-9764-EAC9E56C1D49}" type="datetimeFigureOut">
               <a:rPr lang="en-US" smtClean="0"/>
-              <a:t>3/12/2019</a:t>
+              <a:t>02-Apr-19</a:t>
             </a:fld>
             <a:endParaRPr lang="en-US"/>
           </a:p>
@@ -1698,7 +1698,7 @@
           <a:p>
             <a:fld id="{78C97017-6FC3-485B-9764-EAC9E56C1D49}" type="datetimeFigureOut">
               <a:rPr lang="en-US" smtClean="0"/>
-              <a:t>3/12/2019</a:t>
+              <a:t>02-Apr-19</a:t>
             </a:fld>
             <a:endParaRPr lang="en-US"/>
           </a:p>
@@ -2117,7 +2117,7 @@
           <a:p>
             <a:fld id="{78C97017-6FC3-485B-9764-EAC9E56C1D49}" type="datetimeFigureOut">
               <a:rPr lang="en-US" smtClean="0"/>
-              <a:t>3/12/2019</a:t>
+              <a:t>02-Apr-19</a:t>
             </a:fld>
             <a:endParaRPr lang="en-US"/>
           </a:p>
@@ -2234,7 +2234,7 @@
           <a:p>
             <a:fld id="{78C97017-6FC3-485B-9764-EAC9E56C1D49}" type="datetimeFigureOut">
               <a:rPr lang="en-US" smtClean="0"/>
-              <a:t>3/12/2019</a:t>
+              <a:t>02-Apr-19</a:t>
             </a:fld>
             <a:endParaRPr lang="en-US"/>
           </a:p>
@@ -2329,7 +2329,7 @@
           <a:p>
             <a:fld id="{78C97017-6FC3-485B-9764-EAC9E56C1D49}" type="datetimeFigureOut">
               <a:rPr lang="en-US" smtClean="0"/>
-              <a:t>3/12/2019</a:t>
+              <a:t>02-Apr-19</a:t>
             </a:fld>
             <a:endParaRPr lang="en-US"/>
           </a:p>
@@ -2604,7 +2604,7 @@
           <a:p>
             <a:fld id="{78C97017-6FC3-485B-9764-EAC9E56C1D49}" type="datetimeFigureOut">
               <a:rPr lang="en-US" smtClean="0"/>
-              <a:t>3/12/2019</a:t>
+              <a:t>02-Apr-19</a:t>
             </a:fld>
             <a:endParaRPr lang="en-US"/>
           </a:p>
@@ -2856,7 +2856,7 @@
           <a:p>
             <a:fld id="{78C97017-6FC3-485B-9764-EAC9E56C1D49}" type="datetimeFigureOut">
               <a:rPr lang="en-US" smtClean="0"/>
-              <a:t>3/12/2019</a:t>
+              <a:t>02-Apr-19</a:t>
             </a:fld>
             <a:endParaRPr lang="en-US"/>
           </a:p>
@@ -3067,7 +3067,7 @@
           <a:p>
             <a:fld id="{78C97017-6FC3-485B-9764-EAC9E56C1D49}" type="datetimeFigureOut">
               <a:rPr lang="en-US" smtClean="0"/>
-              <a:t>3/12/2019</a:t>
+              <a:t>02-Apr-19</a:t>
             </a:fld>
             <a:endParaRPr lang="en-US"/>
           </a:p>
@@ -3450,8 +3450,8 @@
         </p:nvSpPr>
         <p:spPr>
           <a:xfrm>
-            <a:off x="1217465" y="1447800"/>
-            <a:ext cx="4917083" cy="3962400"/>
+            <a:off x="1371600" y="152400"/>
+            <a:ext cx="5873792" cy="6095996"/>
           </a:xfrm>
           <a:prstGeom prst="roundRect">
             <a:avLst>
@@ -3512,8 +3512,8 @@
         </p:nvSpPr>
         <p:spPr>
           <a:xfrm>
-            <a:off x="2095948" y="2341220"/>
-            <a:ext cx="1093635" cy="346760"/>
+            <a:off x="2250083" y="1463009"/>
+            <a:ext cx="1169802" cy="386771"/>
           </a:xfrm>
           <a:prstGeom prst="rect">
             <a:avLst/>
@@ -3572,8 +3572,8 @@
         </p:nvSpPr>
         <p:spPr>
           <a:xfrm>
-            <a:off x="2592528" y="2971800"/>
-            <a:ext cx="1093635" cy="236841"/>
+            <a:off x="2746663" y="2106272"/>
+            <a:ext cx="1169802" cy="264169"/>
           </a:xfrm>
           <a:prstGeom prst="rect">
             <a:avLst/>
@@ -3632,8 +3632,8 @@
         </p:nvSpPr>
         <p:spPr>
           <a:xfrm>
-            <a:off x="2092842" y="1770924"/>
-            <a:ext cx="1093635" cy="346760"/>
+            <a:off x="2246977" y="892713"/>
+            <a:ext cx="1169802" cy="386771"/>
           </a:xfrm>
           <a:prstGeom prst="rect">
             <a:avLst/>
@@ -3694,8 +3694,8 @@
         </p:nvCxnSpPr>
         <p:spPr>
           <a:xfrm rot="16200000" flipH="1">
-            <a:off x="2529445" y="2227899"/>
-            <a:ext cx="223536" cy="3106"/>
+            <a:off x="2741669" y="1369693"/>
+            <a:ext cx="183525" cy="3106"/>
           </a:xfrm>
           <a:prstGeom prst="bentConnector3">
             <a:avLst>
@@ -3734,8 +3734,8 @@
         </p:nvSpPr>
         <p:spPr>
           <a:xfrm rot="10800000" flipV="1">
-            <a:off x="5394717" y="2110477"/>
-            <a:ext cx="270504" cy="175523"/>
+            <a:off x="5548851" y="1252025"/>
+            <a:ext cx="289343" cy="195776"/>
           </a:xfrm>
           <a:prstGeom prst="triangle">
             <a:avLst/>
@@ -3777,13 +3777,15 @@
       <p:cxnSp>
         <p:nvCxnSpPr>
           <p:cNvPr id="19" name="Elbow Connector 122"/>
-          <p:cNvCxnSpPr/>
+          <p:cNvCxnSpPr>
+            <a:cxnSpLocks/>
+          </p:cNvCxnSpPr>
           <p:nvPr/>
         </p:nvCxnSpPr>
         <p:spPr>
           <a:xfrm flipV="1">
-            <a:off x="644735" y="2991937"/>
-            <a:ext cx="684904" cy="1"/>
+            <a:off x="722076" y="2133288"/>
+            <a:ext cx="732604" cy="2"/>
           </a:xfrm>
           <a:prstGeom prst="bentConnector3">
             <a:avLst>
@@ -3825,8 +3827,8 @@
         </p:nvSpPr>
         <p:spPr>
           <a:xfrm rot="16200000">
-            <a:off x="5703829" y="2464877"/>
-            <a:ext cx="2362201" cy="328045"/>
+            <a:off x="6234603" y="1331220"/>
+            <a:ext cx="2819400" cy="441993"/>
           </a:xfrm>
           <a:prstGeom prst="roundRect">
             <a:avLst/>
@@ -3864,14 +3866,14 @@
             <a:r>
               <a:rPr lang="en-US" sz="1100" b="1" dirty="0">
                 <a:solidFill>
-                  <a:schemeClr val="bg1"/>
+                  <a:schemeClr val="tx1"/>
                 </a:solidFill>
               </a:rPr>
               <a:t>Logic</a:t>
             </a:r>
             <a:endParaRPr lang="en-SG" sz="1100" b="1" dirty="0">
               <a:solidFill>
-                <a:schemeClr val="bg1"/>
+                <a:schemeClr val="tx1"/>
               </a:solidFill>
             </a:endParaRPr>
           </a:p>
@@ -3885,8 +3887,8 @@
         </p:nvSpPr>
         <p:spPr>
           <a:xfrm>
-            <a:off x="2592528" y="3649359"/>
-            <a:ext cx="1093635" cy="236841"/>
+            <a:off x="2746663" y="2783831"/>
+            <a:ext cx="1169802" cy="264169"/>
           </a:xfrm>
           <a:prstGeom prst="rect">
             <a:avLst/>
@@ -3945,8 +3947,8 @@
         </p:nvSpPr>
         <p:spPr>
           <a:xfrm>
-            <a:off x="2592527" y="4563759"/>
-            <a:ext cx="1093635" cy="236841"/>
+            <a:off x="2746662" y="3698231"/>
+            <a:ext cx="1169802" cy="264169"/>
           </a:xfrm>
           <a:prstGeom prst="rect">
             <a:avLst/>
@@ -4005,8 +4007,8 @@
         </p:nvSpPr>
         <p:spPr>
           <a:xfrm>
-            <a:off x="2592526" y="3991960"/>
-            <a:ext cx="1093635" cy="236841"/>
+            <a:off x="2746661" y="3126432"/>
+            <a:ext cx="1169802" cy="264169"/>
           </a:xfrm>
           <a:prstGeom prst="rect">
             <a:avLst/>
@@ -4065,8 +4067,8 @@
         </p:nvSpPr>
         <p:spPr>
           <a:xfrm>
-            <a:off x="3839323" y="4228801"/>
-            <a:ext cx="1040906" cy="236841"/>
+            <a:off x="3935387" y="4900100"/>
+            <a:ext cx="1400347" cy="264169"/>
           </a:xfrm>
           <a:prstGeom prst="rect">
             <a:avLst/>
@@ -4105,7 +4107,7 @@
                   </a:schemeClr>
                 </a:solidFill>
               </a:rPr>
-              <a:t>PlaceCard</a:t>
+              <a:t>ExpandedPlacePanel</a:t>
             </a:r>
             <a:endParaRPr lang="en-SG" sz="1050" b="1" dirty="0">
               <a:solidFill>
@@ -4125,8 +4127,8 @@
         </p:nvSpPr>
         <p:spPr>
           <a:xfrm>
-            <a:off x="2592528" y="4966000"/>
-            <a:ext cx="1093635" cy="236841"/>
+            <a:off x="2746663" y="4100472"/>
+            <a:ext cx="1169802" cy="264169"/>
           </a:xfrm>
           <a:prstGeom prst="rect">
             <a:avLst/>
@@ -4185,8 +4187,8 @@
         </p:nvSpPr>
         <p:spPr>
           <a:xfrm>
-            <a:off x="2324548" y="2706452"/>
-            <a:ext cx="183156" cy="161573"/>
+            <a:off x="2478683" y="1849610"/>
+            <a:ext cx="195912" cy="180216"/>
           </a:xfrm>
           <a:prstGeom prst="flowChartDecision">
             <a:avLst/>
@@ -4236,8 +4238,8 @@
         </p:nvCxnSpPr>
         <p:spPr>
           <a:xfrm rot="16200000" flipH="1">
-            <a:off x="2393229" y="2890922"/>
-            <a:ext cx="222196" cy="176402"/>
+            <a:off x="2557386" y="2049079"/>
+            <a:ext cx="208531" cy="170024"/>
           </a:xfrm>
           <a:prstGeom prst="bentConnector2">
             <a:avLst/>
@@ -4274,8 +4276,8 @@
         </p:nvSpPr>
         <p:spPr>
           <a:xfrm>
-            <a:off x="2590799" y="3304308"/>
-            <a:ext cx="1095361" cy="236841"/>
+            <a:off x="2744934" y="2438780"/>
+            <a:ext cx="1171648" cy="264169"/>
           </a:xfrm>
           <a:prstGeom prst="rect">
             <a:avLst/>
@@ -4337,8 +4339,8 @@
         </p:nvCxnSpPr>
         <p:spPr>
           <a:xfrm rot="16200000" flipH="1">
-            <a:off x="2054450" y="3229701"/>
-            <a:ext cx="899755" cy="176402"/>
+            <a:off x="2218606" y="2387859"/>
+            <a:ext cx="886090" cy="170024"/>
           </a:xfrm>
           <a:prstGeom prst="bentConnector2">
             <a:avLst/>
@@ -4378,8 +4380,8 @@
         </p:nvCxnSpPr>
         <p:spPr>
           <a:xfrm rot="16200000" flipH="1">
-            <a:off x="1883148" y="3401003"/>
-            <a:ext cx="1242356" cy="176400"/>
+            <a:off x="2047305" y="2559160"/>
+            <a:ext cx="1228691" cy="170022"/>
           </a:xfrm>
           <a:prstGeom prst="bentConnector2">
             <a:avLst/>
@@ -4419,8 +4421,8 @@
         </p:nvCxnSpPr>
         <p:spPr>
           <a:xfrm rot="16200000" flipH="1">
-            <a:off x="1597249" y="3686901"/>
-            <a:ext cx="1814155" cy="176401"/>
+            <a:off x="1761405" y="2845059"/>
+            <a:ext cx="1800490" cy="170023"/>
           </a:xfrm>
           <a:prstGeom prst="bentConnector2">
             <a:avLst/>
@@ -4459,8 +4461,8 @@
         </p:nvCxnSpPr>
         <p:spPr>
           <a:xfrm rot="16200000" flipH="1">
-            <a:off x="1184119" y="3676012"/>
-            <a:ext cx="2396440" cy="420377"/>
+            <a:off x="1345086" y="2830980"/>
+            <a:ext cx="2382776" cy="420378"/>
           </a:xfrm>
           <a:prstGeom prst="bentConnector2">
             <a:avLst/>
@@ -4497,8 +4499,8 @@
         </p:nvSpPr>
         <p:spPr>
           <a:xfrm>
-            <a:off x="5143948" y="1770924"/>
-            <a:ext cx="772043" cy="346760"/>
+            <a:off x="5298083" y="892713"/>
+            <a:ext cx="825812" cy="386771"/>
           </a:xfrm>
           <a:prstGeom prst="rect">
             <a:avLst/>
@@ -4579,8 +4581,8 @@
         </p:nvCxnSpPr>
         <p:spPr>
           <a:xfrm flipV="1">
-            <a:off x="3686160" y="2286000"/>
-            <a:ext cx="1843809" cy="1136729"/>
+            <a:off x="3916582" y="1447801"/>
+            <a:ext cx="1776940" cy="1123064"/>
           </a:xfrm>
           <a:prstGeom prst="bentConnector2">
             <a:avLst/>
@@ -4613,6 +4615,7 @@
         <p:nvCxnSpPr>
           <p:cNvPr id="77" name="Elbow Connector 63"/>
           <p:cNvCxnSpPr>
+            <a:cxnSpLocks/>
             <a:stCxn id="16" idx="3"/>
             <a:endCxn id="37" idx="3"/>
           </p:cNvCxnSpPr>
@@ -4620,8 +4623,8 @@
         </p:nvCxnSpPr>
         <p:spPr>
           <a:xfrm rot="5400000">
-            <a:off x="4174488" y="2991741"/>
-            <a:ext cx="2061222" cy="649740"/>
+            <a:off x="3722436" y="3061099"/>
+            <a:ext cx="3584384" cy="357788"/>
           </a:xfrm>
           <a:prstGeom prst="bentConnector2">
             <a:avLst/>
@@ -4661,8 +4664,8 @@
         </p:nvCxnSpPr>
         <p:spPr>
           <a:xfrm rot="5400000">
-            <a:off x="3867176" y="2104987"/>
-            <a:ext cx="1481780" cy="1843806"/>
+            <a:off x="4070937" y="1293330"/>
+            <a:ext cx="1468115" cy="1777057"/>
           </a:xfrm>
           <a:prstGeom prst="bentConnector2">
             <a:avLst/>
@@ -4702,8 +4705,8 @@
         </p:nvCxnSpPr>
         <p:spPr>
           <a:xfrm flipV="1">
-            <a:off x="3189583" y="2286000"/>
-            <a:ext cx="2340386" cy="228600"/>
+            <a:off x="3419885" y="1447801"/>
+            <a:ext cx="2273637" cy="208594"/>
           </a:xfrm>
           <a:prstGeom prst="bentConnector2">
             <a:avLst/>
@@ -4743,8 +4746,8 @@
         </p:nvCxnSpPr>
         <p:spPr>
           <a:xfrm rot="5400000">
-            <a:off x="3409976" y="2562187"/>
-            <a:ext cx="2396180" cy="1843807"/>
+            <a:off x="3613736" y="1750529"/>
+            <a:ext cx="2382515" cy="1777058"/>
           </a:xfrm>
           <a:prstGeom prst="bentConnector2">
             <a:avLst/>
@@ -4784,8 +4787,8 @@
         </p:nvCxnSpPr>
         <p:spPr>
           <a:xfrm rot="5400000">
-            <a:off x="3208856" y="2763307"/>
-            <a:ext cx="2798421" cy="1843806"/>
+            <a:off x="3412616" y="1951651"/>
+            <a:ext cx="2784756" cy="1777057"/>
           </a:xfrm>
           <a:prstGeom prst="bentConnector2">
             <a:avLst/>
@@ -4818,14 +4821,14 @@
         <p:nvCxnSpPr>
           <p:cNvPr id="107" name="Elbow Connector 106"/>
           <p:cNvCxnSpPr>
-            <a:stCxn id="9" idx="0"/>
+            <a:cxnSpLocks/>
           </p:cNvCxnSpPr>
           <p:nvPr/>
         </p:nvCxnSpPr>
         <p:spPr>
           <a:xfrm rot="5400000" flipH="1" flipV="1">
-            <a:off x="4594921" y="-355061"/>
-            <a:ext cx="170724" cy="4081246"/>
+            <a:off x="5336367" y="-1204107"/>
+            <a:ext cx="130713" cy="4043163"/>
           </a:xfrm>
           <a:prstGeom prst="bentConnector2">
             <a:avLst/>
@@ -4863,8 +4866,8 @@
         </p:nvSpPr>
         <p:spPr>
           <a:xfrm rot="16200000">
-            <a:off x="6213739" y="4560376"/>
-            <a:ext cx="1371599" cy="328045"/>
+            <a:off x="6744512" y="3655320"/>
+            <a:ext cx="1828800" cy="441994"/>
           </a:xfrm>
           <a:prstGeom prst="roundRect">
             <a:avLst/>
@@ -4902,14 +4905,14 @@
             <a:r>
               <a:rPr lang="en-US" sz="1100" b="1" dirty="0">
                 <a:solidFill>
-                  <a:schemeClr val="bg1"/>
+                  <a:schemeClr val="tx1"/>
                 </a:solidFill>
               </a:rPr>
               <a:t>Model</a:t>
             </a:r>
             <a:endParaRPr lang="en-SG" sz="1100" b="1" dirty="0">
               <a:solidFill>
-                <a:schemeClr val="bg1"/>
+                <a:schemeClr val="tx1"/>
               </a:solidFill>
             </a:endParaRPr>
           </a:p>
@@ -4923,8 +4926,8 @@
         </p:nvSpPr>
         <p:spPr>
           <a:xfrm rot="16200000">
-            <a:off x="956202" y="2861202"/>
-            <a:ext cx="1093635" cy="346760"/>
+            <a:off x="1059318" y="1947833"/>
+            <a:ext cx="1219824" cy="370910"/>
           </a:xfrm>
           <a:prstGeom prst="rect">
             <a:avLst/>
@@ -4993,8 +4996,8 @@
         </p:nvSpPr>
         <p:spPr>
           <a:xfrm flipV="1">
-            <a:off x="1367767" y="2286001"/>
-            <a:ext cx="270504" cy="175523"/>
+            <a:off x="1521901" y="1427548"/>
+            <a:ext cx="289343" cy="195776"/>
           </a:xfrm>
           <a:prstGeom prst="triangle">
             <a:avLst/>
@@ -5044,8 +5047,8 @@
         </p:nvCxnSpPr>
         <p:spPr>
           <a:xfrm rot="10800000" flipV="1">
-            <a:off x="1503020" y="1944303"/>
-            <a:ext cx="589823" cy="341697"/>
+            <a:off x="1666573" y="1086098"/>
+            <a:ext cx="580404" cy="341449"/>
           </a:xfrm>
           <a:prstGeom prst="bentConnector2">
             <a:avLst/>
@@ -5086,8 +5089,8 @@
         </p:nvCxnSpPr>
         <p:spPr>
           <a:xfrm rot="16200000" flipH="1">
-            <a:off x="2226110" y="3058040"/>
-            <a:ext cx="554704" cy="174673"/>
+            <a:off x="2390267" y="2216197"/>
+            <a:ext cx="541039" cy="168295"/>
           </a:xfrm>
           <a:prstGeom prst="bentConnector2">
             <a:avLst/>
@@ -5127,8 +5130,8 @@
         </p:nvCxnSpPr>
         <p:spPr>
           <a:xfrm rot="5400000">
-            <a:off x="4205956" y="1766207"/>
-            <a:ext cx="804221" cy="1843806"/>
+            <a:off x="4409716" y="954551"/>
+            <a:ext cx="790556" cy="1777057"/>
           </a:xfrm>
           <a:prstGeom prst="bentConnector2">
             <a:avLst/>
@@ -5161,15 +5164,16 @@
         <p:nvCxnSpPr>
           <p:cNvPr id="137" name="Elbow Connector 136"/>
           <p:cNvCxnSpPr>
-            <a:stCxn id="36" idx="2"/>
+            <a:cxnSpLocks/>
+            <a:stCxn id="45" idx="2"/>
             <a:endCxn id="37" idx="1"/>
           </p:cNvCxnSpPr>
           <p:nvPr/>
         </p:nvCxnSpPr>
         <p:spPr>
           <a:xfrm rot="16200000" flipH="1">
-            <a:off x="3430123" y="3938021"/>
-            <a:ext cx="118421" cy="699979"/>
+            <a:off x="3526556" y="4623353"/>
+            <a:ext cx="205821" cy="611841"/>
           </a:xfrm>
           <a:prstGeom prst="bentConnector2">
             <a:avLst/>
@@ -5209,8 +5213,8 @@
         </p:nvCxnSpPr>
         <p:spPr>
           <a:xfrm rot="5400000">
-            <a:off x="3695875" y="2276286"/>
-            <a:ext cx="1824381" cy="1843808"/>
+            <a:off x="3899635" y="1464630"/>
+            <a:ext cx="1810716" cy="1777059"/>
           </a:xfrm>
           <a:prstGeom prst="bentConnector2">
             <a:avLst/>
@@ -5247,8 +5251,8 @@
         </p:nvSpPr>
         <p:spPr>
           <a:xfrm>
-            <a:off x="5422048" y="2339335"/>
-            <a:ext cx="229325" cy="166560"/>
+            <a:off x="5576183" y="1481917"/>
+            <a:ext cx="245296" cy="185778"/>
           </a:xfrm>
           <a:prstGeom prst="rect">
             <a:avLst/>
@@ -5300,8 +5304,8 @@
         </p:nvSpPr>
         <p:spPr>
           <a:xfrm>
-            <a:off x="3186477" y="2405681"/>
-            <a:ext cx="3537529" cy="45719"/>
+            <a:off x="3426278" y="1592509"/>
+            <a:ext cx="3982419" cy="59926"/>
           </a:xfrm>
           <a:custGeom>
             <a:avLst/>
@@ -5382,8 +5386,8 @@
         </p:nvSpPr>
         <p:spPr>
           <a:xfrm>
-            <a:off x="5431573" y="4488138"/>
-            <a:ext cx="229325" cy="160062"/>
+            <a:off x="5585708" y="3631469"/>
+            <a:ext cx="245296" cy="178531"/>
           </a:xfrm>
           <a:prstGeom prst="rect">
             <a:avLst/>
@@ -5434,9 +5438,819 @@
           <p:nvPr/>
         </p:nvSpPr>
         <p:spPr>
+          <a:xfrm>
+            <a:off x="4604377" y="4111881"/>
+            <a:ext cx="2818929" cy="846741"/>
+          </a:xfrm>
+          <a:custGeom>
+            <a:avLst/>
+            <a:gdLst>
+              <a:gd name="connsiteX0" fmla="*/ 0 w 3048000"/>
+              <a:gd name="connsiteY0" fmla="*/ 203200 h 203200"/>
+              <a:gd name="connsiteX1" fmla="*/ 221673 w 3048000"/>
+              <a:gd name="connsiteY1" fmla="*/ 0 h 203200"/>
+              <a:gd name="connsiteX2" fmla="*/ 3048000 w 3048000"/>
+              <a:gd name="connsiteY2" fmla="*/ 0 h 203200"/>
+            </a:gdLst>
+            <a:ahLst/>
+            <a:cxnLst>
+              <a:cxn ang="0">
+                <a:pos x="connsiteX0" y="connsiteY0"/>
+              </a:cxn>
+              <a:cxn ang="0">
+                <a:pos x="connsiteX1" y="connsiteY1"/>
+              </a:cxn>
+              <a:cxn ang="0">
+                <a:pos x="connsiteX2" y="connsiteY2"/>
+              </a:cxn>
+            </a:cxnLst>
+            <a:rect l="l" t="t" r="r" b="b"/>
+            <a:pathLst>
+              <a:path w="3048000" h="203200">
+                <a:moveTo>
+                  <a:pt x="0" y="203200"/>
+                </a:moveTo>
+                <a:lnTo>
+                  <a:pt x="221673" y="0"/>
+                </a:lnTo>
+                <a:lnTo>
+                  <a:pt x="3048000" y="0"/>
+                </a:lnTo>
+              </a:path>
+            </a:pathLst>
+          </a:custGeom>
+          <a:noFill/>
+          <a:ln w="19050">
+            <a:solidFill>
+              <a:schemeClr val="accent3"/>
+            </a:solidFill>
+            <a:prstDash val="sysDot"/>
+            <a:headEnd type="none" w="med" len="med"/>
+            <a:tailEnd type="arrow" w="med" len="med"/>
+          </a:ln>
+          <a:effectLst/>
+        </p:spPr>
+        <p:style>
+          <a:lnRef idx="1">
+            <a:schemeClr val="accent2"/>
+          </a:lnRef>
+          <a:fillRef idx="2">
+            <a:schemeClr val="accent2"/>
+          </a:fillRef>
+          <a:effectRef idx="1">
+            <a:schemeClr val="accent2"/>
+          </a:effectRef>
+          <a:fontRef idx="minor">
+            <a:schemeClr val="dk1"/>
+          </a:fontRef>
+        </p:style>
+        <p:txBody>
+          <a:bodyPr rtlCol="0" anchor="ctr"/>
+          <a:lstStyle/>
+          <a:p>
+            <a:pPr algn="ctr"/>
+            <a:endParaRPr lang="en-SG"/>
+          </a:p>
+        </p:txBody>
+      </p:sp>
+      <p:sp>
+        <p:nvSpPr>
+          <p:cNvPr id="45" name="Rectangle 11">
+            <a:extLst>
+              <a:ext uri="{FF2B5EF4-FFF2-40B4-BE49-F238E27FC236}">
+                <a16:creationId xmlns:a16="http://schemas.microsoft.com/office/drawing/2014/main" id="{1AF5F877-3EB7-4E68-B2AB-D87A5C5CCA3D}"/>
+              </a:ext>
+            </a:extLst>
+          </p:cNvPr>
+          <p:cNvSpPr/>
+          <p:nvPr/>
+        </p:nvSpPr>
+        <p:spPr>
+          <a:xfrm>
+            <a:off x="2738645" y="4562195"/>
+            <a:ext cx="1169802" cy="264169"/>
+          </a:xfrm>
+          <a:prstGeom prst="rect">
+            <a:avLst/>
+          </a:prstGeom>
+          <a:ln w="19050">
+            <a:solidFill>
+              <a:schemeClr val="accent3"/>
+            </a:solidFill>
+          </a:ln>
+          <a:effectLst/>
+        </p:spPr>
+        <p:style>
+          <a:lnRef idx="1">
+            <a:schemeClr val="accent3"/>
+          </a:lnRef>
+          <a:fillRef idx="2">
+            <a:schemeClr val="accent3"/>
+          </a:fillRef>
+          <a:effectRef idx="1">
+            <a:schemeClr val="accent3"/>
+          </a:effectRef>
+          <a:fontRef idx="minor">
+            <a:schemeClr val="dk1"/>
+          </a:fontRef>
+        </p:style>
+        <p:txBody>
+          <a:bodyPr rtlCol="0" anchor="ctr"/>
+          <a:lstStyle/>
+          <a:p>
+            <a:pPr algn="ctr"/>
+            <a:r>
+              <a:rPr lang="en-US" sz="1050" b="1" dirty="0" err="1">
+                <a:solidFill>
+                  <a:schemeClr val="accent3">
+                    <a:lumMod val="75000"/>
+                  </a:schemeClr>
+                </a:solidFill>
+              </a:rPr>
+              <a:t>RightParentPanel</a:t>
+            </a:r>
+            <a:endParaRPr lang="en-SG" sz="1050" b="1" dirty="0">
+              <a:solidFill>
+                <a:schemeClr val="accent3">
+                  <a:lumMod val="75000"/>
+                </a:schemeClr>
+              </a:solidFill>
+            </a:endParaRPr>
+          </a:p>
+        </p:txBody>
+      </p:sp>
+      <p:cxnSp>
+        <p:nvCxnSpPr>
+          <p:cNvPr id="46" name="Elbow Connector 63">
+            <a:extLst>
+              <a:ext uri="{FF2B5EF4-FFF2-40B4-BE49-F238E27FC236}">
+                <a16:creationId xmlns:a16="http://schemas.microsoft.com/office/drawing/2014/main" id="{966A8F91-0DF8-42FC-BA4A-B0029A6371F1}"/>
+              </a:ext>
+            </a:extLst>
+          </p:cNvPr>
+          <p:cNvCxnSpPr>
+            <a:cxnSpLocks/>
+            <a:endCxn id="45" idx="1"/>
+          </p:cNvCxnSpPr>
+          <p:nvPr/>
+        </p:nvCxnSpPr>
+        <p:spPr>
+          <a:xfrm rot="16200000" flipH="1">
+            <a:off x="2215502" y="4171137"/>
+            <a:ext cx="884280" cy="162006"/>
+          </a:xfrm>
+          <a:prstGeom prst="bentConnector2">
+            <a:avLst/>
+          </a:prstGeom>
+          <a:ln w="19050">
+            <a:solidFill>
+              <a:schemeClr val="accent3"/>
+            </a:solidFill>
+            <a:headEnd type="none" w="med" len="med"/>
+            <a:tailEnd type="arrow" w="med" len="med"/>
+          </a:ln>
+          <a:effectLst/>
+        </p:spPr>
+        <p:style>
+          <a:lnRef idx="1">
+            <a:schemeClr val="accent2"/>
+          </a:lnRef>
+          <a:fillRef idx="2">
+            <a:schemeClr val="accent2"/>
+          </a:fillRef>
+          <a:effectRef idx="1">
+            <a:schemeClr val="accent2"/>
+          </a:effectRef>
+          <a:fontRef idx="minor">
+            <a:schemeClr val="dk1"/>
+          </a:fontRef>
+        </p:style>
+      </p:cxnSp>
+      <p:sp>
+        <p:nvSpPr>
+          <p:cNvPr id="49" name="Rectangle 11">
+            <a:extLst>
+              <a:ext uri="{FF2B5EF4-FFF2-40B4-BE49-F238E27FC236}">
+                <a16:creationId xmlns:a16="http://schemas.microsoft.com/office/drawing/2014/main" id="{F3F4D06E-7067-44AD-9184-A518CB020802}"/>
+              </a:ext>
+            </a:extLst>
+          </p:cNvPr>
+          <p:cNvSpPr/>
+          <p:nvPr/>
+        </p:nvSpPr>
+        <p:spPr>
+          <a:xfrm>
+            <a:off x="4130827" y="3460203"/>
+            <a:ext cx="1113400" cy="264169"/>
+          </a:xfrm>
+          <a:prstGeom prst="rect">
+            <a:avLst/>
+          </a:prstGeom>
+          <a:ln w="19050">
+            <a:solidFill>
+              <a:schemeClr val="accent3"/>
+            </a:solidFill>
+          </a:ln>
+          <a:effectLst/>
+        </p:spPr>
+        <p:style>
+          <a:lnRef idx="1">
+            <a:schemeClr val="accent3"/>
+          </a:lnRef>
+          <a:fillRef idx="2">
+            <a:schemeClr val="accent3"/>
+          </a:fillRef>
+          <a:effectRef idx="1">
+            <a:schemeClr val="accent3"/>
+          </a:effectRef>
+          <a:fontRef idx="minor">
+            <a:schemeClr val="dk1"/>
+          </a:fontRef>
+        </p:style>
+        <p:txBody>
+          <a:bodyPr rtlCol="0" anchor="ctr"/>
+          <a:lstStyle/>
+          <a:p>
+            <a:pPr algn="ctr"/>
+            <a:r>
+              <a:rPr lang="en-US" sz="1050" b="1" dirty="0" err="1">
+                <a:solidFill>
+                  <a:schemeClr val="accent3">
+                    <a:lumMod val="75000"/>
+                  </a:schemeClr>
+                </a:solidFill>
+              </a:rPr>
+              <a:t>PlaceCard</a:t>
+            </a:r>
+            <a:endParaRPr lang="en-SG" sz="1050" b="1" dirty="0">
+              <a:solidFill>
+                <a:schemeClr val="accent3">
+                  <a:lumMod val="75000"/>
+                </a:schemeClr>
+              </a:solidFill>
+            </a:endParaRPr>
+          </a:p>
+        </p:txBody>
+      </p:sp>
+      <p:cxnSp>
+        <p:nvCxnSpPr>
+          <p:cNvPr id="51" name="Elbow Connector 136">
+            <a:extLst>
+              <a:ext uri="{FF2B5EF4-FFF2-40B4-BE49-F238E27FC236}">
+                <a16:creationId xmlns:a16="http://schemas.microsoft.com/office/drawing/2014/main" id="{D735BB94-6629-4493-8536-8FC3C75EBC74}"/>
+              </a:ext>
+            </a:extLst>
+          </p:cNvPr>
+          <p:cNvCxnSpPr>
+            <a:cxnSpLocks/>
+            <a:stCxn id="36" idx="2"/>
+            <a:endCxn id="49" idx="1"/>
+          </p:cNvCxnSpPr>
+          <p:nvPr/>
+        </p:nvCxnSpPr>
+        <p:spPr>
+          <a:xfrm rot="16200000" flipH="1">
+            <a:off x="3630351" y="3091811"/>
+            <a:ext cx="201687" cy="799265"/>
+          </a:xfrm>
+          <a:prstGeom prst="bentConnector2">
+            <a:avLst/>
+          </a:prstGeom>
+          <a:ln w="19050">
+            <a:solidFill>
+              <a:schemeClr val="accent3"/>
+            </a:solidFill>
+            <a:headEnd type="none" w="med" len="med"/>
+            <a:tailEnd type="arrow" w="med" len="med"/>
+          </a:ln>
+          <a:effectLst/>
+        </p:spPr>
+        <p:style>
+          <a:lnRef idx="1">
+            <a:schemeClr val="accent2"/>
+          </a:lnRef>
+          <a:fillRef idx="2">
+            <a:schemeClr val="accent2"/>
+          </a:fillRef>
+          <a:effectRef idx="1">
+            <a:schemeClr val="accent2"/>
+          </a:effectRef>
+          <a:fontRef idx="minor">
+            <a:schemeClr val="dk1"/>
+          </a:fontRef>
+        </p:style>
+      </p:cxnSp>
+      <p:sp>
+        <p:nvSpPr>
+          <p:cNvPr id="52" name="Freeform 117">
+            <a:extLst>
+              <a:ext uri="{FF2B5EF4-FFF2-40B4-BE49-F238E27FC236}">
+                <a16:creationId xmlns:a16="http://schemas.microsoft.com/office/drawing/2014/main" id="{296B990B-57E4-470D-8EE3-EC72132B08B8}"/>
+              </a:ext>
+            </a:extLst>
+          </p:cNvPr>
+          <p:cNvSpPr/>
+          <p:nvPr/>
+        </p:nvSpPr>
+        <p:spPr>
           <a:xfrm flipV="1">
-            <a:off x="4114799" y="4472708"/>
-            <a:ext cx="2642195" cy="101600"/>
+            <a:off x="4669355" y="3708134"/>
+            <a:ext cx="2768560" cy="165719"/>
+          </a:xfrm>
+          <a:custGeom>
+            <a:avLst/>
+            <a:gdLst>
+              <a:gd name="connsiteX0" fmla="*/ 0 w 3048000"/>
+              <a:gd name="connsiteY0" fmla="*/ 203200 h 203200"/>
+              <a:gd name="connsiteX1" fmla="*/ 221673 w 3048000"/>
+              <a:gd name="connsiteY1" fmla="*/ 0 h 203200"/>
+              <a:gd name="connsiteX2" fmla="*/ 3048000 w 3048000"/>
+              <a:gd name="connsiteY2" fmla="*/ 0 h 203200"/>
+            </a:gdLst>
+            <a:ahLst/>
+            <a:cxnLst>
+              <a:cxn ang="0">
+                <a:pos x="connsiteX0" y="connsiteY0"/>
+              </a:cxn>
+              <a:cxn ang="0">
+                <a:pos x="connsiteX1" y="connsiteY1"/>
+              </a:cxn>
+              <a:cxn ang="0">
+                <a:pos x="connsiteX2" y="connsiteY2"/>
+              </a:cxn>
+            </a:cxnLst>
+            <a:rect l="l" t="t" r="r" b="b"/>
+            <a:pathLst>
+              <a:path w="3048000" h="203200">
+                <a:moveTo>
+                  <a:pt x="0" y="203200"/>
+                </a:moveTo>
+                <a:lnTo>
+                  <a:pt x="221673" y="0"/>
+                </a:lnTo>
+                <a:lnTo>
+                  <a:pt x="3048000" y="0"/>
+                </a:lnTo>
+              </a:path>
+            </a:pathLst>
+          </a:custGeom>
+          <a:noFill/>
+          <a:ln w="19050">
+            <a:solidFill>
+              <a:schemeClr val="accent3"/>
+            </a:solidFill>
+            <a:prstDash val="sysDot"/>
+            <a:headEnd type="none" w="med" len="med"/>
+            <a:tailEnd type="arrow" w="med" len="med"/>
+          </a:ln>
+          <a:effectLst/>
+        </p:spPr>
+        <p:style>
+          <a:lnRef idx="1">
+            <a:schemeClr val="accent2"/>
+          </a:lnRef>
+          <a:fillRef idx="2">
+            <a:schemeClr val="accent2"/>
+          </a:fillRef>
+          <a:effectRef idx="1">
+            <a:schemeClr val="accent2"/>
+          </a:effectRef>
+          <a:fontRef idx="minor">
+            <a:schemeClr val="dk1"/>
+          </a:fontRef>
+        </p:style>
+        <p:txBody>
+          <a:bodyPr rtlCol="0" anchor="ctr"/>
+          <a:lstStyle/>
+          <a:p>
+            <a:pPr algn="ctr"/>
+            <a:endParaRPr lang="en-SG"/>
+          </a:p>
+        </p:txBody>
+      </p:sp>
+      <p:cxnSp>
+        <p:nvCxnSpPr>
+          <p:cNvPr id="55" name="Elbow Connector 63">
+            <a:extLst>
+              <a:ext uri="{FF2B5EF4-FFF2-40B4-BE49-F238E27FC236}">
+                <a16:creationId xmlns:a16="http://schemas.microsoft.com/office/drawing/2014/main" id="{FE3258DC-0AB6-41B3-A71B-EF8E40E35BB7}"/>
+              </a:ext>
+            </a:extLst>
+          </p:cNvPr>
+          <p:cNvCxnSpPr/>
+          <p:nvPr/>
+        </p:nvCxnSpPr>
+        <p:spPr>
+          <a:xfrm rot="5400000">
+            <a:off x="4409715" y="3410648"/>
+            <a:ext cx="790556" cy="1777057"/>
+          </a:xfrm>
+          <a:prstGeom prst="bentConnector2">
+            <a:avLst/>
+          </a:prstGeom>
+          <a:ln w="6350">
+            <a:solidFill>
+              <a:schemeClr val="accent3"/>
+            </a:solidFill>
+            <a:headEnd type="none" w="med" len="med"/>
+            <a:tailEnd type="none" w="med" len="med"/>
+          </a:ln>
+          <a:effectLst/>
+        </p:spPr>
+        <p:style>
+          <a:lnRef idx="1">
+            <a:schemeClr val="accent2"/>
+          </a:lnRef>
+          <a:fillRef idx="2">
+            <a:schemeClr val="accent2"/>
+          </a:fillRef>
+          <a:effectRef idx="1">
+            <a:schemeClr val="accent2"/>
+          </a:effectRef>
+          <a:fontRef idx="minor">
+            <a:schemeClr val="dk1"/>
+          </a:fontRef>
+        </p:style>
+      </p:cxnSp>
+      <p:sp>
+        <p:nvSpPr>
+          <p:cNvPr id="58" name="Rectangle 11">
+            <a:extLst>
+              <a:ext uri="{FF2B5EF4-FFF2-40B4-BE49-F238E27FC236}">
+                <a16:creationId xmlns:a16="http://schemas.microsoft.com/office/drawing/2014/main" id="{AD0FD51F-F80D-4D4C-ACAB-0D02CD98D100}"/>
+              </a:ext>
+            </a:extLst>
+          </p:cNvPr>
+          <p:cNvSpPr/>
+          <p:nvPr/>
+        </p:nvSpPr>
+        <p:spPr>
+          <a:xfrm>
+            <a:off x="3949996" y="5287796"/>
+            <a:ext cx="1400347" cy="264169"/>
+          </a:xfrm>
+          <a:prstGeom prst="rect">
+            <a:avLst/>
+          </a:prstGeom>
+          <a:ln w="19050">
+            <a:solidFill>
+              <a:schemeClr val="accent3"/>
+            </a:solidFill>
+          </a:ln>
+          <a:effectLst/>
+        </p:spPr>
+        <p:style>
+          <a:lnRef idx="1">
+            <a:schemeClr val="accent3"/>
+          </a:lnRef>
+          <a:fillRef idx="2">
+            <a:schemeClr val="accent3"/>
+          </a:fillRef>
+          <a:effectRef idx="1">
+            <a:schemeClr val="accent3"/>
+          </a:effectRef>
+          <a:fontRef idx="minor">
+            <a:schemeClr val="dk1"/>
+          </a:fontRef>
+        </p:style>
+        <p:txBody>
+          <a:bodyPr rtlCol="0" anchor="ctr"/>
+          <a:lstStyle/>
+          <a:p>
+            <a:pPr algn="ctr"/>
+            <a:r>
+              <a:rPr lang="en-US" sz="1050" b="1" dirty="0" err="1">
+                <a:solidFill>
+                  <a:schemeClr val="accent3">
+                    <a:lumMod val="75000"/>
+                  </a:schemeClr>
+                </a:solidFill>
+              </a:rPr>
+              <a:t>DisplayListPanel</a:t>
+            </a:r>
+            <a:endParaRPr lang="en-SG" sz="1050" b="1" dirty="0">
+              <a:solidFill>
+                <a:schemeClr val="accent3">
+                  <a:lumMod val="75000"/>
+                </a:schemeClr>
+              </a:solidFill>
+            </a:endParaRPr>
+          </a:p>
+        </p:txBody>
+      </p:sp>
+      <p:cxnSp>
+        <p:nvCxnSpPr>
+          <p:cNvPr id="59" name="Elbow Connector 63">
+            <a:extLst>
+              <a:ext uri="{FF2B5EF4-FFF2-40B4-BE49-F238E27FC236}">
+                <a16:creationId xmlns:a16="http://schemas.microsoft.com/office/drawing/2014/main" id="{2513FE4D-8ADC-45CA-8CE2-9E401007B88B}"/>
+              </a:ext>
+            </a:extLst>
+          </p:cNvPr>
+          <p:cNvCxnSpPr>
+            <a:cxnSpLocks/>
+            <a:endCxn id="58" idx="3"/>
+          </p:cNvCxnSpPr>
+          <p:nvPr/>
+        </p:nvCxnSpPr>
+        <p:spPr>
+          <a:xfrm rot="5400000">
+            <a:off x="3737045" y="3448795"/>
+            <a:ext cx="3584384" cy="357788"/>
+          </a:xfrm>
+          <a:prstGeom prst="bentConnector2">
+            <a:avLst/>
+          </a:prstGeom>
+          <a:ln w="6350">
+            <a:solidFill>
+              <a:schemeClr val="accent3"/>
+            </a:solidFill>
+            <a:headEnd type="none" w="med" len="med"/>
+            <a:tailEnd type="none" w="med" len="med"/>
+          </a:ln>
+          <a:effectLst/>
+        </p:spPr>
+        <p:style>
+          <a:lnRef idx="1">
+            <a:schemeClr val="accent2"/>
+          </a:lnRef>
+          <a:fillRef idx="2">
+            <a:schemeClr val="accent2"/>
+          </a:fillRef>
+          <a:effectRef idx="1">
+            <a:schemeClr val="accent2"/>
+          </a:effectRef>
+          <a:fontRef idx="minor">
+            <a:schemeClr val="dk1"/>
+          </a:fontRef>
+        </p:style>
+      </p:cxnSp>
+      <p:cxnSp>
+        <p:nvCxnSpPr>
+          <p:cNvPr id="60" name="Elbow Connector 136">
+            <a:extLst>
+              <a:ext uri="{FF2B5EF4-FFF2-40B4-BE49-F238E27FC236}">
+                <a16:creationId xmlns:a16="http://schemas.microsoft.com/office/drawing/2014/main" id="{8C3C08FE-5E1C-4BC7-B686-BB455CE70DD8}"/>
+              </a:ext>
+            </a:extLst>
+          </p:cNvPr>
+          <p:cNvCxnSpPr>
+            <a:cxnSpLocks/>
+            <a:stCxn id="45" idx="2"/>
+            <a:endCxn id="58" idx="1"/>
+          </p:cNvCxnSpPr>
+          <p:nvPr/>
+        </p:nvCxnSpPr>
+        <p:spPr>
+          <a:xfrm rot="16200000" flipH="1">
+            <a:off x="3340013" y="4809897"/>
+            <a:ext cx="593517" cy="626450"/>
+          </a:xfrm>
+          <a:prstGeom prst="bentConnector2">
+            <a:avLst/>
+          </a:prstGeom>
+          <a:ln w="19050">
+            <a:solidFill>
+              <a:schemeClr val="accent3"/>
+            </a:solidFill>
+            <a:headEnd type="none" w="med" len="med"/>
+            <a:tailEnd type="arrow" w="med" len="med"/>
+          </a:ln>
+          <a:effectLst/>
+        </p:spPr>
+        <p:style>
+          <a:lnRef idx="1">
+            <a:schemeClr val="accent2"/>
+          </a:lnRef>
+          <a:fillRef idx="2">
+            <a:schemeClr val="accent2"/>
+          </a:fillRef>
+          <a:effectRef idx="1">
+            <a:schemeClr val="accent2"/>
+          </a:effectRef>
+          <a:fontRef idx="minor">
+            <a:schemeClr val="dk1"/>
+          </a:fontRef>
+        </p:style>
+      </p:cxnSp>
+      <p:sp>
+        <p:nvSpPr>
+          <p:cNvPr id="62" name="Freeform 117">
+            <a:extLst>
+              <a:ext uri="{FF2B5EF4-FFF2-40B4-BE49-F238E27FC236}">
+                <a16:creationId xmlns:a16="http://schemas.microsoft.com/office/drawing/2014/main" id="{531F9DF6-FDC6-41FE-834D-B3A556B39A3E}"/>
+              </a:ext>
+            </a:extLst>
+          </p:cNvPr>
+          <p:cNvSpPr/>
+          <p:nvPr/>
+        </p:nvSpPr>
+        <p:spPr>
+          <a:xfrm>
+            <a:off x="5350343" y="4546864"/>
+            <a:ext cx="2069262" cy="703441"/>
+          </a:xfrm>
+          <a:custGeom>
+            <a:avLst/>
+            <a:gdLst>
+              <a:gd name="connsiteX0" fmla="*/ 0 w 3048000"/>
+              <a:gd name="connsiteY0" fmla="*/ 203200 h 203200"/>
+              <a:gd name="connsiteX1" fmla="*/ 221673 w 3048000"/>
+              <a:gd name="connsiteY1" fmla="*/ 0 h 203200"/>
+              <a:gd name="connsiteX2" fmla="*/ 3048000 w 3048000"/>
+              <a:gd name="connsiteY2" fmla="*/ 0 h 203200"/>
+            </a:gdLst>
+            <a:ahLst/>
+            <a:cxnLst>
+              <a:cxn ang="0">
+                <a:pos x="connsiteX0" y="connsiteY0"/>
+              </a:cxn>
+              <a:cxn ang="0">
+                <a:pos x="connsiteX1" y="connsiteY1"/>
+              </a:cxn>
+              <a:cxn ang="0">
+                <a:pos x="connsiteX2" y="connsiteY2"/>
+              </a:cxn>
+            </a:cxnLst>
+            <a:rect l="l" t="t" r="r" b="b"/>
+            <a:pathLst>
+              <a:path w="3048000" h="203200">
+                <a:moveTo>
+                  <a:pt x="0" y="203200"/>
+                </a:moveTo>
+                <a:lnTo>
+                  <a:pt x="221673" y="0"/>
+                </a:lnTo>
+                <a:lnTo>
+                  <a:pt x="3048000" y="0"/>
+                </a:lnTo>
+              </a:path>
+            </a:pathLst>
+          </a:custGeom>
+          <a:noFill/>
+          <a:ln w="19050">
+            <a:solidFill>
+              <a:schemeClr val="accent3"/>
+            </a:solidFill>
+            <a:prstDash val="sysDot"/>
+            <a:headEnd type="none" w="med" len="med"/>
+            <a:tailEnd type="arrow" w="med" len="med"/>
+          </a:ln>
+          <a:effectLst/>
+        </p:spPr>
+        <p:style>
+          <a:lnRef idx="1">
+            <a:schemeClr val="accent2"/>
+          </a:lnRef>
+          <a:fillRef idx="2">
+            <a:schemeClr val="accent2"/>
+          </a:fillRef>
+          <a:effectRef idx="1">
+            <a:schemeClr val="accent2"/>
+          </a:effectRef>
+          <a:fontRef idx="minor">
+            <a:schemeClr val="dk1"/>
+          </a:fontRef>
+        </p:style>
+        <p:txBody>
+          <a:bodyPr rtlCol="0" anchor="ctr"/>
+          <a:lstStyle/>
+          <a:p>
+            <a:pPr algn="ctr"/>
+            <a:endParaRPr lang="en-SG"/>
+          </a:p>
+        </p:txBody>
+      </p:sp>
+      <p:sp>
+        <p:nvSpPr>
+          <p:cNvPr id="65" name="Rectangle 11">
+            <a:extLst>
+              <a:ext uri="{FF2B5EF4-FFF2-40B4-BE49-F238E27FC236}">
+                <a16:creationId xmlns:a16="http://schemas.microsoft.com/office/drawing/2014/main" id="{9896F569-75DA-4420-9D21-4E01A116D5F5}"/>
+              </a:ext>
+            </a:extLst>
+          </p:cNvPr>
+          <p:cNvSpPr/>
+          <p:nvPr/>
+        </p:nvSpPr>
+        <p:spPr>
+          <a:xfrm>
+            <a:off x="5006387" y="5628641"/>
+            <a:ext cx="1400347" cy="264169"/>
+          </a:xfrm>
+          <a:prstGeom prst="rect">
+            <a:avLst/>
+          </a:prstGeom>
+          <a:ln w="19050">
+            <a:solidFill>
+              <a:schemeClr val="accent3"/>
+            </a:solidFill>
+          </a:ln>
+          <a:effectLst/>
+        </p:spPr>
+        <p:style>
+          <a:lnRef idx="1">
+            <a:schemeClr val="accent3"/>
+          </a:lnRef>
+          <a:fillRef idx="2">
+            <a:schemeClr val="accent3"/>
+          </a:fillRef>
+          <a:effectRef idx="1">
+            <a:schemeClr val="accent3"/>
+          </a:effectRef>
+          <a:fontRef idx="minor">
+            <a:schemeClr val="dk1"/>
+          </a:fontRef>
+        </p:style>
+        <p:txBody>
+          <a:bodyPr rtlCol="0" anchor="ctr"/>
+          <a:lstStyle/>
+          <a:p>
+            <a:pPr algn="ctr"/>
+            <a:r>
+              <a:rPr lang="en-US" sz="1050" b="1" dirty="0" err="1">
+                <a:solidFill>
+                  <a:schemeClr val="accent3">
+                    <a:lumMod val="75000"/>
+                  </a:schemeClr>
+                </a:solidFill>
+              </a:rPr>
+              <a:t>DisplayCard</a:t>
+            </a:r>
+            <a:endParaRPr lang="en-SG" sz="1050" b="1" dirty="0">
+              <a:solidFill>
+                <a:schemeClr val="accent3">
+                  <a:lumMod val="75000"/>
+                </a:schemeClr>
+              </a:solidFill>
+            </a:endParaRPr>
+          </a:p>
+        </p:txBody>
+      </p:sp>
+      <p:cxnSp>
+        <p:nvCxnSpPr>
+          <p:cNvPr id="67" name="Elbow Connector 136">
+            <a:extLst>
+              <a:ext uri="{FF2B5EF4-FFF2-40B4-BE49-F238E27FC236}">
+                <a16:creationId xmlns:a16="http://schemas.microsoft.com/office/drawing/2014/main" id="{F6B64D5E-B5C5-49FD-9B69-2A7E1678FABA}"/>
+              </a:ext>
+            </a:extLst>
+          </p:cNvPr>
+          <p:cNvCxnSpPr>
+            <a:cxnSpLocks/>
+            <a:stCxn id="58" idx="2"/>
+            <a:endCxn id="65" idx="1"/>
+          </p:cNvCxnSpPr>
+          <p:nvPr/>
+        </p:nvCxnSpPr>
+        <p:spPr>
+          <a:xfrm rot="16200000" flipH="1">
+            <a:off x="4723898" y="5478236"/>
+            <a:ext cx="208761" cy="356217"/>
+          </a:xfrm>
+          <a:prstGeom prst="bentConnector2">
+            <a:avLst/>
+          </a:prstGeom>
+          <a:ln w="19050">
+            <a:solidFill>
+              <a:schemeClr val="accent3"/>
+            </a:solidFill>
+            <a:headEnd type="none" w="med" len="med"/>
+            <a:tailEnd type="arrow" w="med" len="med"/>
+          </a:ln>
+          <a:effectLst/>
+        </p:spPr>
+        <p:style>
+          <a:lnRef idx="1">
+            <a:schemeClr val="accent2"/>
+          </a:lnRef>
+          <a:fillRef idx="2">
+            <a:schemeClr val="accent2"/>
+          </a:fillRef>
+          <a:effectRef idx="1">
+            <a:schemeClr val="accent2"/>
+          </a:effectRef>
+          <a:fontRef idx="minor">
+            <a:schemeClr val="dk1"/>
+          </a:fontRef>
+        </p:style>
+      </p:cxnSp>
+      <p:sp>
+        <p:nvSpPr>
+          <p:cNvPr id="68" name="Freeform 117">
+            <a:extLst>
+              <a:ext uri="{FF2B5EF4-FFF2-40B4-BE49-F238E27FC236}">
+                <a16:creationId xmlns:a16="http://schemas.microsoft.com/office/drawing/2014/main" id="{9C3EE9D2-7979-432C-9A2D-D214EBAA5DB6}"/>
+              </a:ext>
+            </a:extLst>
+          </p:cNvPr>
+          <p:cNvSpPr/>
+          <p:nvPr/>
+        </p:nvSpPr>
+        <p:spPr>
+          <a:xfrm>
+            <a:off x="5947575" y="4368206"/>
+            <a:ext cx="1490340" cy="1260434"/>
           </a:xfrm>
           <a:custGeom>
             <a:avLst/>

</xml_diff>

<commit_message>
Refactor Display Card to Chart Card, and DisplayListPanel to ChartListPanel.
</commit_message>
<xml_diff>
--- a/docs/diagrams/UiComponentClassDiagram.pptx
+++ b/docs/diagrams/UiComponentClassDiagram.pptx
@@ -208,7 +208,7 @@
           <a:p>
             <a:fld id="{F5CC4B3F-88C1-4FFA-B1B6-F41C21DC6924}" type="datetimeFigureOut">
               <a:rPr lang="en-US" smtClean="0"/>
-              <a:t>02-Apr-19</a:t>
+              <a:t>09-Apr-19</a:t>
             </a:fld>
             <a:endParaRPr lang="en-US"/>
           </a:p>
@@ -654,7 +654,7 @@
           <a:p>
             <a:fld id="{78C97017-6FC3-485B-9764-EAC9E56C1D49}" type="datetimeFigureOut">
               <a:rPr lang="en-US" smtClean="0"/>
-              <a:t>02-Apr-19</a:t>
+              <a:t>09-Apr-19</a:t>
             </a:fld>
             <a:endParaRPr lang="en-US"/>
           </a:p>
@@ -822,7 +822,7 @@
           <a:p>
             <a:fld id="{78C97017-6FC3-485B-9764-EAC9E56C1D49}" type="datetimeFigureOut">
               <a:rPr lang="en-US" smtClean="0"/>
-              <a:t>02-Apr-19</a:t>
+              <a:t>09-Apr-19</a:t>
             </a:fld>
             <a:endParaRPr lang="en-US"/>
           </a:p>
@@ -1000,7 +1000,7 @@
           <a:p>
             <a:fld id="{78C97017-6FC3-485B-9764-EAC9E56C1D49}" type="datetimeFigureOut">
               <a:rPr lang="en-US" smtClean="0"/>
-              <a:t>02-Apr-19</a:t>
+              <a:t>09-Apr-19</a:t>
             </a:fld>
             <a:endParaRPr lang="en-US"/>
           </a:p>
@@ -1168,7 +1168,7 @@
           <a:p>
             <a:fld id="{78C97017-6FC3-485B-9764-EAC9E56C1D49}" type="datetimeFigureOut">
               <a:rPr lang="en-US" smtClean="0"/>
-              <a:t>02-Apr-19</a:t>
+              <a:t>09-Apr-19</a:t>
             </a:fld>
             <a:endParaRPr lang="en-US"/>
           </a:p>
@@ -1413,7 +1413,7 @@
           <a:p>
             <a:fld id="{78C97017-6FC3-485B-9764-EAC9E56C1D49}" type="datetimeFigureOut">
               <a:rPr lang="en-US" smtClean="0"/>
-              <a:t>02-Apr-19</a:t>
+              <a:t>09-Apr-19</a:t>
             </a:fld>
             <a:endParaRPr lang="en-US"/>
           </a:p>
@@ -1698,7 +1698,7 @@
           <a:p>
             <a:fld id="{78C97017-6FC3-485B-9764-EAC9E56C1D49}" type="datetimeFigureOut">
               <a:rPr lang="en-US" smtClean="0"/>
-              <a:t>02-Apr-19</a:t>
+              <a:t>09-Apr-19</a:t>
             </a:fld>
             <a:endParaRPr lang="en-US"/>
           </a:p>
@@ -2117,7 +2117,7 @@
           <a:p>
             <a:fld id="{78C97017-6FC3-485B-9764-EAC9E56C1D49}" type="datetimeFigureOut">
               <a:rPr lang="en-US" smtClean="0"/>
-              <a:t>02-Apr-19</a:t>
+              <a:t>09-Apr-19</a:t>
             </a:fld>
             <a:endParaRPr lang="en-US"/>
           </a:p>
@@ -2234,7 +2234,7 @@
           <a:p>
             <a:fld id="{78C97017-6FC3-485B-9764-EAC9E56C1D49}" type="datetimeFigureOut">
               <a:rPr lang="en-US" smtClean="0"/>
-              <a:t>02-Apr-19</a:t>
+              <a:t>09-Apr-19</a:t>
             </a:fld>
             <a:endParaRPr lang="en-US"/>
           </a:p>
@@ -2329,7 +2329,7 @@
           <a:p>
             <a:fld id="{78C97017-6FC3-485B-9764-EAC9E56C1D49}" type="datetimeFigureOut">
               <a:rPr lang="en-US" smtClean="0"/>
-              <a:t>02-Apr-19</a:t>
+              <a:t>09-Apr-19</a:t>
             </a:fld>
             <a:endParaRPr lang="en-US"/>
           </a:p>
@@ -2604,7 +2604,7 @@
           <a:p>
             <a:fld id="{78C97017-6FC3-485B-9764-EAC9E56C1D49}" type="datetimeFigureOut">
               <a:rPr lang="en-US" smtClean="0"/>
-              <a:t>02-Apr-19</a:t>
+              <a:t>09-Apr-19</a:t>
             </a:fld>
             <a:endParaRPr lang="en-US"/>
           </a:p>
@@ -2856,7 +2856,7 @@
           <a:p>
             <a:fld id="{78C97017-6FC3-485B-9764-EAC9E56C1D49}" type="datetimeFigureOut">
               <a:rPr lang="en-US" smtClean="0"/>
-              <a:t>02-Apr-19</a:t>
+              <a:t>09-Apr-19</a:t>
             </a:fld>
             <a:endParaRPr lang="en-US"/>
           </a:p>
@@ -3067,7 +3067,7 @@
           <a:p>
             <a:fld id="{78C97017-6FC3-485B-9764-EAC9E56C1D49}" type="datetimeFigureOut">
               <a:rPr lang="en-US" smtClean="0"/>
-              <a:t>02-Apr-19</a:t>
+              <a:t>09-Apr-19</a:t>
             </a:fld>
             <a:endParaRPr lang="en-US"/>
           </a:p>
@@ -3450,8 +3450,8 @@
         </p:nvSpPr>
         <p:spPr>
           <a:xfrm>
-            <a:off x="1371600" y="152400"/>
-            <a:ext cx="5873792" cy="6095996"/>
+            <a:off x="990600" y="152400"/>
+            <a:ext cx="6254792" cy="5453576"/>
           </a:xfrm>
           <a:prstGeom prst="roundRect">
             <a:avLst>
@@ -3545,7 +3545,7 @@
           <a:p>
             <a:pPr algn="ctr"/>
             <a:r>
-              <a:rPr lang="en-US" sz="1050" b="1" dirty="0" err="1">
+              <a:rPr lang="en-US" sz="1050" b="1" dirty="0">
                 <a:solidFill>
                   <a:schemeClr val="accent3">
                     <a:lumMod val="75000"/>
@@ -3605,7 +3605,7 @@
           <a:p>
             <a:pPr algn="ctr"/>
             <a:r>
-              <a:rPr lang="en-US" sz="1050" b="1" dirty="0" err="1">
+              <a:rPr lang="en-US" sz="1050" b="1" dirty="0">
                 <a:solidFill>
                   <a:schemeClr val="accent3">
                     <a:lumMod val="75000"/>
@@ -3668,7 +3668,7 @@
           <a:p>
             <a:pPr algn="ctr"/>
             <a:r>
-              <a:rPr lang="en-US" sz="1050" dirty="0" err="1">
+              <a:rPr lang="en-US" sz="1050" dirty="0">
                 <a:solidFill>
                   <a:schemeClr val="bg1"/>
                 </a:solidFill>
@@ -3783,9 +3783,9 @@
           <p:nvPr/>
         </p:nvCxnSpPr>
         <p:spPr>
-          <a:xfrm flipV="1">
-            <a:off x="722076" y="2133288"/>
-            <a:ext cx="732604" cy="2"/>
+          <a:xfrm>
+            <a:off x="533400" y="2131672"/>
+            <a:ext cx="935766" cy="12700"/>
           </a:xfrm>
           <a:prstGeom prst="bentConnector3">
             <a:avLst>
@@ -3881,13 +3881,13 @@
       </p:sp>
       <p:sp>
         <p:nvSpPr>
-          <p:cNvPr id="34" name="Rectangle 11"/>
+          <p:cNvPr id="35" name="Rectangle 11"/>
           <p:cNvSpPr/>
           <p:nvPr/>
         </p:nvSpPr>
         <p:spPr>
           <a:xfrm>
-            <a:off x="2746663" y="2783831"/>
+            <a:off x="2746662" y="3368021"/>
             <a:ext cx="1169802" cy="264169"/>
           </a:xfrm>
           <a:prstGeom prst="rect">
@@ -3920,14 +3920,14 @@
           <a:p>
             <a:pPr algn="ctr"/>
             <a:r>
-              <a:rPr lang="en-US" sz="1050" b="1" dirty="0" err="1">
+              <a:rPr lang="en-US" sz="1050" b="1" dirty="0">
                 <a:solidFill>
                   <a:schemeClr val="accent3">
                     <a:lumMod val="75000"/>
                   </a:schemeClr>
                 </a:solidFill>
               </a:rPr>
-              <a:t>BrowserPanel</a:t>
+              <a:t>StatusBarFooter</a:t>
             </a:r>
             <a:endParaRPr lang="en-SG" sz="1050" b="1" dirty="0">
               <a:solidFill>
@@ -3941,13 +3941,13 @@
       </p:sp>
       <p:sp>
         <p:nvSpPr>
-          <p:cNvPr id="35" name="Rectangle 11"/>
+          <p:cNvPr id="36" name="Rectangle 11"/>
           <p:cNvSpPr/>
           <p:nvPr/>
         </p:nvSpPr>
         <p:spPr>
           <a:xfrm>
-            <a:off x="2746662" y="3698231"/>
+            <a:off x="2746661" y="2796222"/>
             <a:ext cx="1169802" cy="264169"/>
           </a:xfrm>
           <a:prstGeom prst="rect">
@@ -3980,14 +3980,14 @@
           <a:p>
             <a:pPr algn="ctr"/>
             <a:r>
-              <a:rPr lang="en-US" sz="1050" b="1" dirty="0" err="1">
+              <a:rPr lang="en-US" sz="1050" b="1" dirty="0">
                 <a:solidFill>
                   <a:schemeClr val="accent3">
                     <a:lumMod val="75000"/>
                   </a:schemeClr>
                 </a:solidFill>
               </a:rPr>
-              <a:t>StatusBarFooter</a:t>
+              <a:t>PlaceListPanel</a:t>
             </a:r>
             <a:endParaRPr lang="en-SG" sz="1050" b="1" dirty="0">
               <a:solidFill>
@@ -4001,14 +4001,14 @@
       </p:sp>
       <p:sp>
         <p:nvSpPr>
-          <p:cNvPr id="36" name="Rectangle 11"/>
+          <p:cNvPr id="37" name="Rectangle 11"/>
           <p:cNvSpPr/>
           <p:nvPr/>
         </p:nvSpPr>
         <p:spPr>
           <a:xfrm>
-            <a:off x="2746661" y="3126432"/>
-            <a:ext cx="1169802" cy="264169"/>
+            <a:off x="3843880" y="4464918"/>
+            <a:ext cx="1400347" cy="264169"/>
           </a:xfrm>
           <a:prstGeom prst="rect">
             <a:avLst/>
@@ -4040,14 +4040,14 @@
           <a:p>
             <a:pPr algn="ctr"/>
             <a:r>
-              <a:rPr lang="en-US" sz="1050" b="1" dirty="0" err="1">
+              <a:rPr lang="en-US" sz="1050" b="1" dirty="0">
                 <a:solidFill>
                   <a:schemeClr val="accent3">
                     <a:lumMod val="75000"/>
                   </a:schemeClr>
                 </a:solidFill>
               </a:rPr>
-              <a:t>PlaceListPanel</a:t>
+              <a:t>ExpandedPlacePanel</a:t>
             </a:r>
             <a:endParaRPr lang="en-SG" sz="1050" b="1" dirty="0">
               <a:solidFill>
@@ -4061,14 +4061,14 @@
       </p:sp>
       <p:sp>
         <p:nvSpPr>
-          <p:cNvPr id="37" name="Rectangle 11"/>
+          <p:cNvPr id="38" name="Rectangle 11"/>
           <p:cNvSpPr/>
           <p:nvPr/>
         </p:nvSpPr>
         <p:spPr>
           <a:xfrm>
-            <a:off x="3935387" y="4900100"/>
-            <a:ext cx="1400347" cy="264169"/>
+            <a:off x="2740490" y="3708134"/>
+            <a:ext cx="1169802" cy="264169"/>
           </a:xfrm>
           <a:prstGeom prst="rect">
             <a:avLst/>
@@ -4100,67 +4100,7 @@
           <a:p>
             <a:pPr algn="ctr"/>
             <a:r>
-              <a:rPr lang="en-US" sz="1050" b="1" dirty="0" err="1">
-                <a:solidFill>
-                  <a:schemeClr val="accent3">
-                    <a:lumMod val="75000"/>
-                  </a:schemeClr>
-                </a:solidFill>
-              </a:rPr>
-              <a:t>ExpandedPlacePanel</a:t>
-            </a:r>
-            <a:endParaRPr lang="en-SG" sz="1050" b="1" dirty="0">
-              <a:solidFill>
-                <a:schemeClr val="accent3">
-                  <a:lumMod val="75000"/>
-                </a:schemeClr>
-              </a:solidFill>
-            </a:endParaRPr>
-          </a:p>
-        </p:txBody>
-      </p:sp>
-      <p:sp>
-        <p:nvSpPr>
-          <p:cNvPr id="38" name="Rectangle 11"/>
-          <p:cNvSpPr/>
-          <p:nvPr/>
-        </p:nvSpPr>
-        <p:spPr>
-          <a:xfrm>
-            <a:off x="2746663" y="4100472"/>
-            <a:ext cx="1169802" cy="264169"/>
-          </a:xfrm>
-          <a:prstGeom prst="rect">
-            <a:avLst/>
-          </a:prstGeom>
-          <a:ln w="19050">
-            <a:solidFill>
-              <a:schemeClr val="accent3"/>
-            </a:solidFill>
-          </a:ln>
-          <a:effectLst/>
-        </p:spPr>
-        <p:style>
-          <a:lnRef idx="1">
-            <a:schemeClr val="accent3"/>
-          </a:lnRef>
-          <a:fillRef idx="2">
-            <a:schemeClr val="accent3"/>
-          </a:fillRef>
-          <a:effectRef idx="1">
-            <a:schemeClr val="accent3"/>
-          </a:effectRef>
-          <a:fontRef idx="minor">
-            <a:schemeClr val="dk1"/>
-          </a:fontRef>
-        </p:style>
-        <p:txBody>
-          <a:bodyPr rtlCol="0" anchor="ctr"/>
-          <a:lstStyle/>
-          <a:p>
-            <a:pPr algn="ctr"/>
-            <a:r>
-              <a:rPr lang="en-US" sz="1050" b="1" dirty="0" err="1">
+              <a:rPr lang="en-US" sz="1050" b="1" dirty="0">
                 <a:solidFill>
                   <a:schemeClr val="accent3">
                     <a:lumMod val="75000"/>
@@ -4276,7 +4216,7 @@
         </p:nvSpPr>
         <p:spPr>
           <a:xfrm>
-            <a:off x="2744934" y="2438780"/>
+            <a:off x="2738645" y="2453935"/>
             <a:ext cx="1171648" cy="264169"/>
           </a:xfrm>
           <a:prstGeom prst="rect">
@@ -4309,7 +4249,7 @@
           <a:p>
             <a:pPr algn="ctr"/>
             <a:r>
-              <a:rPr lang="en-US" sz="1050" b="1" dirty="0" err="1">
+              <a:rPr lang="en-US" sz="1050" b="1" dirty="0">
                 <a:solidFill>
                   <a:schemeClr val="accent3">
                     <a:lumMod val="75000"/>
@@ -4328,47 +4268,6 @@
           </a:p>
         </p:txBody>
       </p:sp>
-      <p:cxnSp>
-        <p:nvCxnSpPr>
-          <p:cNvPr id="44" name="Elbow Connector 63"/>
-          <p:cNvCxnSpPr>
-            <a:stCxn id="39" idx="2"/>
-            <a:endCxn id="34" idx="1"/>
-          </p:cNvCxnSpPr>
-          <p:nvPr/>
-        </p:nvCxnSpPr>
-        <p:spPr>
-          <a:xfrm rot="16200000" flipH="1">
-            <a:off x="2218606" y="2387859"/>
-            <a:ext cx="886090" cy="170024"/>
-          </a:xfrm>
-          <a:prstGeom prst="bentConnector2">
-            <a:avLst/>
-          </a:prstGeom>
-          <a:ln w="19050">
-            <a:solidFill>
-              <a:schemeClr val="accent3"/>
-            </a:solidFill>
-            <a:headEnd type="none" w="med" len="med"/>
-            <a:tailEnd type="arrow" w="med" len="med"/>
-          </a:ln>
-          <a:effectLst/>
-        </p:spPr>
-        <p:style>
-          <a:lnRef idx="1">
-            <a:schemeClr val="accent2"/>
-          </a:lnRef>
-          <a:fillRef idx="2">
-            <a:schemeClr val="accent2"/>
-          </a:fillRef>
-          <a:effectRef idx="1">
-            <a:schemeClr val="accent2"/>
-          </a:effectRef>
-          <a:fontRef idx="minor">
-            <a:schemeClr val="dk1"/>
-          </a:fontRef>
-        </p:style>
-      </p:cxnSp>
       <p:cxnSp>
         <p:nvCxnSpPr>
           <p:cNvPr id="47" name="Elbow Connector 63"/>
@@ -4380,8 +4279,8 @@
         </p:nvCxnSpPr>
         <p:spPr>
           <a:xfrm rot="16200000" flipH="1">
-            <a:off x="2047305" y="2559160"/>
-            <a:ext cx="1228691" cy="170022"/>
+            <a:off x="2212410" y="2394055"/>
+            <a:ext cx="898481" cy="170022"/>
           </a:xfrm>
           <a:prstGeom prst="bentConnector2">
             <a:avLst/>
@@ -4421,8 +4320,8 @@
         </p:nvCxnSpPr>
         <p:spPr>
           <a:xfrm rot="16200000" flipH="1">
-            <a:off x="1761405" y="2845059"/>
-            <a:ext cx="1800490" cy="170023"/>
+            <a:off x="1926510" y="2679954"/>
+            <a:ext cx="1470280" cy="170023"/>
           </a:xfrm>
           <a:prstGeom prst="bentConnector2">
             <a:avLst/>
@@ -4461,7 +4360,7 @@
         </p:nvCxnSpPr>
         <p:spPr>
           <a:xfrm rot="16200000" flipH="1">
-            <a:off x="1345086" y="2830980"/>
+            <a:off x="1338913" y="2438642"/>
             <a:ext cx="2382776" cy="420378"/>
           </a:xfrm>
           <a:prstGeom prst="bentConnector2">
@@ -4551,7 +4450,7 @@
               </a:rPr>
             </a:br>
             <a:r>
-              <a:rPr lang="en-US" sz="1050" b="1" dirty="0" err="1">
+              <a:rPr lang="en-US" sz="1050" b="1" dirty="0">
                 <a:solidFill>
                   <a:schemeClr val="accent3">
                     <a:lumMod val="75000"/>
@@ -4581,8 +4480,8 @@
         </p:nvCxnSpPr>
         <p:spPr>
           <a:xfrm flipV="1">
-            <a:off x="3916582" y="1447801"/>
-            <a:ext cx="1776940" cy="1123064"/>
+            <a:off x="3910293" y="1447801"/>
+            <a:ext cx="1783229" cy="1138219"/>
           </a:xfrm>
           <a:prstGeom prst="bentConnector2">
             <a:avLst/>
@@ -4623,49 +4522,8 @@
         </p:nvCxnSpPr>
         <p:spPr>
           <a:xfrm rot="5400000">
-            <a:off x="3722436" y="3061099"/>
-            <a:ext cx="3584384" cy="357788"/>
-          </a:xfrm>
-          <a:prstGeom prst="bentConnector2">
-            <a:avLst/>
-          </a:prstGeom>
-          <a:ln w="6350">
-            <a:solidFill>
-              <a:schemeClr val="accent3"/>
-            </a:solidFill>
-            <a:headEnd type="none" w="med" len="med"/>
-            <a:tailEnd type="none" w="med" len="med"/>
-          </a:ln>
-          <a:effectLst/>
-        </p:spPr>
-        <p:style>
-          <a:lnRef idx="1">
-            <a:schemeClr val="accent2"/>
-          </a:lnRef>
-          <a:fillRef idx="2">
-            <a:schemeClr val="accent2"/>
-          </a:fillRef>
-          <a:effectRef idx="1">
-            <a:schemeClr val="accent2"/>
-          </a:effectRef>
-          <a:fontRef idx="minor">
-            <a:schemeClr val="dk1"/>
-          </a:fontRef>
-        </p:style>
-      </p:cxnSp>
-      <p:cxnSp>
-        <p:nvCxnSpPr>
-          <p:cNvPr id="82" name="Elbow Connector 63"/>
-          <p:cNvCxnSpPr>
-            <a:stCxn id="16" idx="3"/>
-            <a:endCxn id="34" idx="3"/>
-          </p:cNvCxnSpPr>
-          <p:nvPr/>
-        </p:nvCxnSpPr>
-        <p:spPr>
-          <a:xfrm rot="5400000">
-            <a:off x="4070937" y="1293330"/>
-            <a:ext cx="1468115" cy="1777057"/>
+            <a:off x="3894274" y="2797755"/>
+            <a:ext cx="3149202" cy="449295"/>
           </a:xfrm>
           <a:prstGeom prst="bentConnector2">
             <a:avLst/>
@@ -4746,8 +4604,8 @@
         </p:nvCxnSpPr>
         <p:spPr>
           <a:xfrm rot="5400000">
-            <a:off x="3613736" y="1750529"/>
-            <a:ext cx="2382515" cy="1777058"/>
+            <a:off x="3778841" y="1585424"/>
+            <a:ext cx="2052305" cy="1777058"/>
           </a:xfrm>
           <a:prstGeom prst="bentConnector2">
             <a:avLst/>
@@ -4787,8 +4645,8 @@
         </p:nvCxnSpPr>
         <p:spPr>
           <a:xfrm rot="5400000">
-            <a:off x="3412616" y="1951651"/>
-            <a:ext cx="2784756" cy="1777057"/>
+            <a:off x="3605698" y="1752395"/>
+            <a:ext cx="2392418" cy="1783230"/>
           </a:xfrm>
           <a:prstGeom prst="bentConnector2">
             <a:avLst/>
@@ -4973,7 +4831,7 @@
           <a:p>
             <a:pPr algn="ctr"/>
             <a:r>
-              <a:rPr lang="en-US" sz="1050" dirty="0" err="1">
+              <a:rPr lang="en-US" sz="1050" dirty="0">
                 <a:solidFill>
                   <a:schemeClr val="bg1"/>
                 </a:solidFill>
@@ -5089,8 +4947,8 @@
         </p:nvCxnSpPr>
         <p:spPr>
           <a:xfrm rot="16200000" flipH="1">
-            <a:off x="2390267" y="2216197"/>
-            <a:ext cx="541039" cy="168295"/>
+            <a:off x="2379545" y="2226920"/>
+            <a:ext cx="556194" cy="162006"/>
           </a:xfrm>
           <a:prstGeom prst="bentConnector2">
             <a:avLst/>
@@ -5172,8 +5030,8 @@
         </p:nvCxnSpPr>
         <p:spPr>
           <a:xfrm rot="16200000" flipH="1">
-            <a:off x="3526556" y="4623353"/>
-            <a:ext cx="205821" cy="611841"/>
+            <a:off x="3444701" y="4197823"/>
+            <a:ext cx="286041" cy="512318"/>
           </a:xfrm>
           <a:prstGeom prst="bentConnector2">
             <a:avLst/>
@@ -5213,8 +5071,8 @@
         </p:nvCxnSpPr>
         <p:spPr>
           <a:xfrm rot="5400000">
-            <a:off x="3899635" y="1464630"/>
-            <a:ext cx="1810716" cy="1777059"/>
+            <a:off x="4064740" y="1299525"/>
+            <a:ext cx="1480506" cy="1777059"/>
           </a:xfrm>
           <a:prstGeom prst="bentConnector2">
             <a:avLst/>
@@ -5386,7 +5244,7 @@
         </p:nvSpPr>
         <p:spPr>
           <a:xfrm>
-            <a:off x="5585708" y="3631469"/>
+            <a:off x="5585708" y="3301259"/>
             <a:ext cx="245296" cy="178531"/>
           </a:xfrm>
           <a:prstGeom prst="rect">
@@ -5439,8 +5297,8 @@
         </p:nvSpPr>
         <p:spPr>
           <a:xfrm>
-            <a:off x="4604377" y="4111881"/>
-            <a:ext cx="2818929" cy="846741"/>
+            <a:off x="5258836" y="4079519"/>
+            <a:ext cx="2164470" cy="517485"/>
           </a:xfrm>
           <a:custGeom>
             <a:avLst/>
@@ -5527,7 +5385,7 @@
         </p:nvSpPr>
         <p:spPr>
           <a:xfrm>
-            <a:off x="2738645" y="4562195"/>
+            <a:off x="2746661" y="4046793"/>
             <a:ext cx="1169802" cy="264169"/>
           </a:xfrm>
           <a:prstGeom prst="rect">
@@ -5560,7 +5418,7 @@
           <a:p>
             <a:pPr algn="ctr"/>
             <a:r>
-              <a:rPr lang="en-US" sz="1050" b="1" dirty="0" err="1">
+              <a:rPr lang="en-US" sz="1050" b="1" dirty="0">
                 <a:solidFill>
                   <a:schemeClr val="accent3">
                     <a:lumMod val="75000"/>
@@ -5596,7 +5454,7 @@
         </p:nvCxnSpPr>
         <p:spPr>
           <a:xfrm rot="16200000" flipH="1">
-            <a:off x="2215502" y="4171137"/>
+            <a:off x="2223518" y="3655735"/>
             <a:ext cx="884280" cy="162006"/>
           </a:xfrm>
           <a:prstGeom prst="bentConnector2">
@@ -5640,7 +5498,7 @@
         </p:nvSpPr>
         <p:spPr>
           <a:xfrm>
-            <a:off x="4130827" y="3460203"/>
+            <a:off x="4130827" y="3129993"/>
             <a:ext cx="1113400" cy="264169"/>
           </a:xfrm>
           <a:prstGeom prst="rect">
@@ -5673,7 +5531,7 @@
           <a:p>
             <a:pPr algn="ctr"/>
             <a:r>
-              <a:rPr lang="en-US" sz="1050" b="1" dirty="0" err="1">
+              <a:rPr lang="en-US" sz="1050" b="1" dirty="0">
                 <a:solidFill>
                   <a:schemeClr val="accent3">
                     <a:lumMod val="75000"/>
@@ -5710,7 +5568,7 @@
         </p:nvCxnSpPr>
         <p:spPr>
           <a:xfrm rot="16200000" flipH="1">
-            <a:off x="3630351" y="3091811"/>
+            <a:off x="3630351" y="2761601"/>
             <a:ext cx="201687" cy="799265"/>
           </a:xfrm>
           <a:prstGeom prst="bentConnector2">
@@ -5754,8 +5612,8 @@
         </p:nvSpPr>
         <p:spPr>
           <a:xfrm flipV="1">
-            <a:off x="4669355" y="3708134"/>
-            <a:ext cx="2768560" cy="165719"/>
+            <a:off x="5238053" y="3273957"/>
+            <a:ext cx="2199861" cy="599895"/>
           </a:xfrm>
           <a:custGeom>
             <a:avLst/>
@@ -5837,16 +5695,21 @@
               </a:ext>
             </a:extLst>
           </p:cNvPr>
-          <p:cNvCxnSpPr/>
+          <p:cNvCxnSpPr>
+            <a:cxnSpLocks/>
+            <a:endCxn id="45" idx="3"/>
+          </p:cNvCxnSpPr>
           <p:nvPr/>
         </p:nvCxnSpPr>
         <p:spPr>
-          <a:xfrm rot="5400000">
-            <a:off x="4409715" y="3410648"/>
-            <a:ext cx="790556" cy="1777057"/>
-          </a:xfrm>
-          <a:prstGeom prst="bentConnector2">
-            <a:avLst/>
+          <a:xfrm rot="10800000" flipV="1">
+            <a:off x="3916464" y="3573688"/>
+            <a:ext cx="1777061" cy="605190"/>
+          </a:xfrm>
+          <a:prstGeom prst="bentConnector3">
+            <a:avLst>
+              <a:gd name="adj1" fmla="val 161"/>
+            </a:avLst>
           </a:prstGeom>
           <a:ln w="6350">
             <a:solidFill>
@@ -5886,7 +5749,7 @@
         </p:nvSpPr>
         <p:spPr>
           <a:xfrm>
-            <a:off x="3949996" y="5287796"/>
+            <a:off x="3850274" y="4790717"/>
             <a:ext cx="1400347" cy="264169"/>
           </a:xfrm>
           <a:prstGeom prst="rect">
@@ -5919,14 +5782,14 @@
           <a:p>
             <a:pPr algn="ctr"/>
             <a:r>
-              <a:rPr lang="en-US" sz="1050" b="1" dirty="0" err="1">
+              <a:rPr lang="en-US" sz="1050" b="1" dirty="0">
                 <a:solidFill>
                   <a:schemeClr val="accent3">
                     <a:lumMod val="75000"/>
                   </a:schemeClr>
                 </a:solidFill>
               </a:rPr>
-              <a:t>DisplayListPanel</a:t>
+              <a:t>ChartListPanel</a:t>
             </a:r>
             <a:endParaRPr lang="en-SG" sz="1050" b="1" dirty="0">
               <a:solidFill>
@@ -5949,14 +5812,15 @@
           </p:cNvPr>
           <p:cNvCxnSpPr>
             <a:cxnSpLocks/>
+            <a:stCxn id="16" idx="3"/>
             <a:endCxn id="58" idx="3"/>
           </p:cNvCxnSpPr>
           <p:nvPr/>
         </p:nvCxnSpPr>
         <p:spPr>
           <a:xfrm rot="5400000">
-            <a:off x="3737045" y="3448795"/>
-            <a:ext cx="3584384" cy="357788"/>
+            <a:off x="3734572" y="2963851"/>
+            <a:ext cx="3475001" cy="442901"/>
           </a:xfrm>
           <a:prstGeom prst="bentConnector2">
             <a:avLst/>
@@ -6003,8 +5867,8 @@
         </p:nvCxnSpPr>
         <p:spPr>
           <a:xfrm rot="16200000" flipH="1">
-            <a:off x="3340013" y="4809897"/>
-            <a:ext cx="593517" cy="626450"/>
+            <a:off x="3284998" y="4357526"/>
+            <a:ext cx="611840" cy="518712"/>
           </a:xfrm>
           <a:prstGeom prst="bentConnector2">
             <a:avLst/>
@@ -6047,8 +5911,8 @@
         </p:nvSpPr>
         <p:spPr>
           <a:xfrm>
-            <a:off x="5350343" y="4546864"/>
-            <a:ext cx="2069262" cy="703441"/>
+            <a:off x="5250620" y="4294556"/>
+            <a:ext cx="2168985" cy="611840"/>
           </a:xfrm>
           <a:custGeom>
             <a:avLst/>
@@ -6135,7 +5999,7 @@
         </p:nvSpPr>
         <p:spPr>
           <a:xfrm>
-            <a:off x="5006387" y="5628641"/>
+            <a:off x="4953434" y="5154979"/>
             <a:ext cx="1400347" cy="264169"/>
           </a:xfrm>
           <a:prstGeom prst="rect">
@@ -6168,14 +6032,14 @@
           <a:p>
             <a:pPr algn="ctr"/>
             <a:r>
-              <a:rPr lang="en-US" sz="1050" b="1" dirty="0" err="1">
+              <a:rPr lang="en-US" sz="1050" b="1" dirty="0">
                 <a:solidFill>
                   <a:schemeClr val="accent3">
                     <a:lumMod val="75000"/>
                   </a:schemeClr>
                 </a:solidFill>
               </a:rPr>
-              <a:t>DisplayCard</a:t>
+              <a:t>ChartCard</a:t>
             </a:r>
             <a:endParaRPr lang="en-SG" sz="1050" b="1" dirty="0">
               <a:solidFill>
@@ -6205,8 +6069,8 @@
         </p:nvCxnSpPr>
         <p:spPr>
           <a:xfrm rot="16200000" flipH="1">
-            <a:off x="4723898" y="5478236"/>
-            <a:ext cx="208761" cy="356217"/>
+            <a:off x="4635852" y="4969482"/>
+            <a:ext cx="232178" cy="402986"/>
           </a:xfrm>
           <a:prstGeom prst="bentConnector2">
             <a:avLst/>
@@ -6249,8 +6113,8 @@
         </p:nvSpPr>
         <p:spPr>
           <a:xfrm>
-            <a:off x="5947575" y="4368206"/>
-            <a:ext cx="1490340" cy="1260434"/>
+            <a:off x="6353779" y="4495801"/>
+            <a:ext cx="1084135" cy="791264"/>
           </a:xfrm>
           <a:custGeom>
             <a:avLst/>

</xml_diff>

<commit_message>
Updated the UI class diagram of developer guide
</commit_message>
<xml_diff>
--- a/docs/diagrams/UiComponentClassDiagram.pptx
+++ b/docs/diagrams/UiComponentClassDiagram.pptx
@@ -208,7 +208,7 @@
           <a:p>
             <a:fld id="{F5CC4B3F-88C1-4FFA-B1B6-F41C21DC6924}" type="datetimeFigureOut">
               <a:rPr lang="en-US" smtClean="0"/>
-              <a:t>4/1/2019</a:t>
+              <a:t>4/11/2019</a:t>
             </a:fld>
             <a:endParaRPr lang="en-US"/>
           </a:p>
@@ -654,7 +654,7 @@
           <a:p>
             <a:fld id="{78C97017-6FC3-485B-9764-EAC9E56C1D49}" type="datetimeFigureOut">
               <a:rPr lang="en-US" smtClean="0"/>
-              <a:t>4/1/2019</a:t>
+              <a:t>4/11/2019</a:t>
             </a:fld>
             <a:endParaRPr lang="en-US"/>
           </a:p>
@@ -822,7 +822,7 @@
           <a:p>
             <a:fld id="{78C97017-6FC3-485B-9764-EAC9E56C1D49}" type="datetimeFigureOut">
               <a:rPr lang="en-US" smtClean="0"/>
-              <a:t>4/1/2019</a:t>
+              <a:t>4/11/2019</a:t>
             </a:fld>
             <a:endParaRPr lang="en-US"/>
           </a:p>
@@ -1000,7 +1000,7 @@
           <a:p>
             <a:fld id="{78C97017-6FC3-485B-9764-EAC9E56C1D49}" type="datetimeFigureOut">
               <a:rPr lang="en-US" smtClean="0"/>
-              <a:t>4/1/2019</a:t>
+              <a:t>4/11/2019</a:t>
             </a:fld>
             <a:endParaRPr lang="en-US"/>
           </a:p>
@@ -1168,7 +1168,7 @@
           <a:p>
             <a:fld id="{78C97017-6FC3-485B-9764-EAC9E56C1D49}" type="datetimeFigureOut">
               <a:rPr lang="en-US" smtClean="0"/>
-              <a:t>4/1/2019</a:t>
+              <a:t>4/11/2019</a:t>
             </a:fld>
             <a:endParaRPr lang="en-US"/>
           </a:p>
@@ -1413,7 +1413,7 @@
           <a:p>
             <a:fld id="{78C97017-6FC3-485B-9764-EAC9E56C1D49}" type="datetimeFigureOut">
               <a:rPr lang="en-US" smtClean="0"/>
-              <a:t>4/1/2019</a:t>
+              <a:t>4/11/2019</a:t>
             </a:fld>
             <a:endParaRPr lang="en-US"/>
           </a:p>
@@ -1698,7 +1698,7 @@
           <a:p>
             <a:fld id="{78C97017-6FC3-485B-9764-EAC9E56C1D49}" type="datetimeFigureOut">
               <a:rPr lang="en-US" smtClean="0"/>
-              <a:t>4/1/2019</a:t>
+              <a:t>4/11/2019</a:t>
             </a:fld>
             <a:endParaRPr lang="en-US"/>
           </a:p>
@@ -2117,7 +2117,7 @@
           <a:p>
             <a:fld id="{78C97017-6FC3-485B-9764-EAC9E56C1D49}" type="datetimeFigureOut">
               <a:rPr lang="en-US" smtClean="0"/>
-              <a:t>4/1/2019</a:t>
+              <a:t>4/11/2019</a:t>
             </a:fld>
             <a:endParaRPr lang="en-US"/>
           </a:p>
@@ -2234,7 +2234,7 @@
           <a:p>
             <a:fld id="{78C97017-6FC3-485B-9764-EAC9E56C1D49}" type="datetimeFigureOut">
               <a:rPr lang="en-US" smtClean="0"/>
-              <a:t>4/1/2019</a:t>
+              <a:t>4/11/2019</a:t>
             </a:fld>
             <a:endParaRPr lang="en-US"/>
           </a:p>
@@ -2329,7 +2329,7 @@
           <a:p>
             <a:fld id="{78C97017-6FC3-485B-9764-EAC9E56C1D49}" type="datetimeFigureOut">
               <a:rPr lang="en-US" smtClean="0"/>
-              <a:t>4/1/2019</a:t>
+              <a:t>4/11/2019</a:t>
             </a:fld>
             <a:endParaRPr lang="en-US"/>
           </a:p>
@@ -2604,7 +2604,7 @@
           <a:p>
             <a:fld id="{78C97017-6FC3-485B-9764-EAC9E56C1D49}" type="datetimeFigureOut">
               <a:rPr lang="en-US" smtClean="0"/>
-              <a:t>4/1/2019</a:t>
+              <a:t>4/11/2019</a:t>
             </a:fld>
             <a:endParaRPr lang="en-US"/>
           </a:p>
@@ -2856,7 +2856,7 @@
           <a:p>
             <a:fld id="{78C97017-6FC3-485B-9764-EAC9E56C1D49}" type="datetimeFigureOut">
               <a:rPr lang="en-US" smtClean="0"/>
-              <a:t>4/1/2019</a:t>
+              <a:t>4/11/2019</a:t>
             </a:fld>
             <a:endParaRPr lang="en-US"/>
           </a:p>
@@ -3067,7 +3067,7 @@
           <a:p>
             <a:fld id="{78C97017-6FC3-485B-9764-EAC9E56C1D49}" type="datetimeFigureOut">
               <a:rPr lang="en-US" smtClean="0"/>
-              <a:t>4/1/2019</a:t>
+              <a:t>4/11/2019</a:t>
             </a:fld>
             <a:endParaRPr lang="en-US"/>
           </a:p>
@@ -3450,8 +3450,8 @@
         </p:nvSpPr>
         <p:spPr>
           <a:xfrm>
-            <a:off x="1217465" y="1447800"/>
-            <a:ext cx="4917083" cy="3962400"/>
+            <a:off x="1217465" y="1447799"/>
+            <a:ext cx="4917083" cy="4571989"/>
           </a:xfrm>
           <a:prstGeom prst="roundRect">
             <a:avLst>
@@ -3945,7 +3945,7 @@
         </p:nvSpPr>
         <p:spPr>
           <a:xfrm>
-            <a:off x="2592527" y="4563759"/>
+            <a:off x="2595950" y="4586434"/>
             <a:ext cx="1093635" cy="236841"/>
           </a:xfrm>
           <a:prstGeom prst="rect">
@@ -4125,7 +4125,7 @@
         </p:nvSpPr>
         <p:spPr>
           <a:xfrm>
-            <a:off x="2592528" y="4966000"/>
+            <a:off x="2590797" y="5654591"/>
             <a:ext cx="1093635" cy="236841"/>
           </a:xfrm>
           <a:prstGeom prst="rect">
@@ -4419,8 +4419,8 @@
         </p:nvCxnSpPr>
         <p:spPr>
           <a:xfrm rot="16200000" flipH="1">
-            <a:off x="1597249" y="3686901"/>
-            <a:ext cx="1814155" cy="176401"/>
+            <a:off x="1587623" y="3696528"/>
+            <a:ext cx="1836830" cy="179824"/>
           </a:xfrm>
           <a:prstGeom prst="bentConnector2">
             <a:avLst/>
@@ -4453,14 +4453,15 @@
         <p:nvCxnSpPr>
           <p:cNvPr id="53" name="Elbow Connector 63"/>
           <p:cNvCxnSpPr>
+            <a:cxnSpLocks/>
             <a:endCxn id="38" idx="1"/>
           </p:cNvCxnSpPr>
           <p:nvPr/>
         </p:nvCxnSpPr>
         <p:spPr>
           <a:xfrm rot="16200000" flipH="1">
-            <a:off x="1184119" y="3676012"/>
-            <a:ext cx="2396440" cy="420377"/>
+            <a:off x="830342" y="4012557"/>
+            <a:ext cx="3096406" cy="424503"/>
           </a:xfrm>
           <a:prstGeom prst="bentConnector2">
             <a:avLst/>
@@ -4743,8 +4744,8 @@
         </p:nvCxnSpPr>
         <p:spPr>
           <a:xfrm rot="5400000">
-            <a:off x="3409976" y="2562187"/>
-            <a:ext cx="2396180" cy="1843807"/>
+            <a:off x="3400350" y="2575235"/>
+            <a:ext cx="2418855" cy="1840384"/>
           </a:xfrm>
           <a:prstGeom prst="bentConnector2">
             <a:avLst/>
@@ -4784,8 +4785,8 @@
         </p:nvCxnSpPr>
         <p:spPr>
           <a:xfrm rot="5400000">
-            <a:off x="3208856" y="2763307"/>
-            <a:ext cx="2798421" cy="1843806"/>
+            <a:off x="2863695" y="3106738"/>
+            <a:ext cx="3487012" cy="1845537"/>
           </a:xfrm>
           <a:prstGeom prst="bentConnector2">
             <a:avLst/>
@@ -4863,8 +4864,8 @@
         </p:nvSpPr>
         <p:spPr>
           <a:xfrm rot="16200000">
-            <a:off x="6213739" y="4560376"/>
-            <a:ext cx="1371599" cy="328045"/>
+            <a:off x="5908944" y="4865170"/>
+            <a:ext cx="1981189" cy="328045"/>
           </a:xfrm>
           <a:prstGeom prst="roundRect">
             <a:avLst/>
@@ -5436,6 +5437,498 @@
           <a:xfrm flipV="1">
             <a:off x="4114799" y="4472708"/>
             <a:ext cx="2642195" cy="101600"/>
+          </a:xfrm>
+          <a:custGeom>
+            <a:avLst/>
+            <a:gdLst>
+              <a:gd name="connsiteX0" fmla="*/ 0 w 3048000"/>
+              <a:gd name="connsiteY0" fmla="*/ 203200 h 203200"/>
+              <a:gd name="connsiteX1" fmla="*/ 221673 w 3048000"/>
+              <a:gd name="connsiteY1" fmla="*/ 0 h 203200"/>
+              <a:gd name="connsiteX2" fmla="*/ 3048000 w 3048000"/>
+              <a:gd name="connsiteY2" fmla="*/ 0 h 203200"/>
+            </a:gdLst>
+            <a:ahLst/>
+            <a:cxnLst>
+              <a:cxn ang="0">
+                <a:pos x="connsiteX0" y="connsiteY0"/>
+              </a:cxn>
+              <a:cxn ang="0">
+                <a:pos x="connsiteX1" y="connsiteY1"/>
+              </a:cxn>
+              <a:cxn ang="0">
+                <a:pos x="connsiteX2" y="connsiteY2"/>
+              </a:cxn>
+            </a:cxnLst>
+            <a:rect l="l" t="t" r="r" b="b"/>
+            <a:pathLst>
+              <a:path w="3048000" h="203200">
+                <a:moveTo>
+                  <a:pt x="0" y="203200"/>
+                </a:moveTo>
+                <a:lnTo>
+                  <a:pt x="221673" y="0"/>
+                </a:lnTo>
+                <a:lnTo>
+                  <a:pt x="3048000" y="0"/>
+                </a:lnTo>
+              </a:path>
+            </a:pathLst>
+          </a:custGeom>
+          <a:noFill/>
+          <a:ln w="19050">
+            <a:solidFill>
+              <a:schemeClr val="accent3"/>
+            </a:solidFill>
+            <a:prstDash val="sysDot"/>
+            <a:headEnd type="none" w="med" len="med"/>
+            <a:tailEnd type="arrow" w="med" len="med"/>
+          </a:ln>
+          <a:effectLst/>
+        </p:spPr>
+        <p:style>
+          <a:lnRef idx="1">
+            <a:schemeClr val="accent2"/>
+          </a:lnRef>
+          <a:fillRef idx="2">
+            <a:schemeClr val="accent2"/>
+          </a:fillRef>
+          <a:effectRef idx="1">
+            <a:schemeClr val="accent2"/>
+          </a:effectRef>
+          <a:fontRef idx="minor">
+            <a:schemeClr val="dk1"/>
+          </a:fontRef>
+        </p:style>
+        <p:txBody>
+          <a:bodyPr rtlCol="0" anchor="ctr"/>
+          <a:lstStyle/>
+          <a:p>
+            <a:pPr algn="ctr"/>
+            <a:endParaRPr lang="en-SG"/>
+          </a:p>
+        </p:txBody>
+      </p:sp>
+      <p:sp>
+        <p:nvSpPr>
+          <p:cNvPr id="56" name="Rectangle 11">
+            <a:extLst>
+              <a:ext uri="{FF2B5EF4-FFF2-40B4-BE49-F238E27FC236}">
+                <a16:creationId xmlns:a16="http://schemas.microsoft.com/office/drawing/2014/main" id="{EEE768CA-57A4-4DC3-8E2C-56E01E07A3FA}"/>
+              </a:ext>
+            </a:extLst>
+          </p:cNvPr>
+          <p:cNvSpPr/>
+          <p:nvPr/>
+        </p:nvSpPr>
+        <p:spPr>
+          <a:xfrm>
+            <a:off x="2589067" y="4947087"/>
+            <a:ext cx="1093635" cy="236841"/>
+          </a:xfrm>
+          <a:prstGeom prst="rect">
+            <a:avLst/>
+          </a:prstGeom>
+          <a:ln w="19050">
+            <a:solidFill>
+              <a:schemeClr val="accent3"/>
+            </a:solidFill>
+          </a:ln>
+          <a:effectLst/>
+        </p:spPr>
+        <p:style>
+          <a:lnRef idx="1">
+            <a:schemeClr val="accent3"/>
+          </a:lnRef>
+          <a:fillRef idx="2">
+            <a:schemeClr val="accent3"/>
+          </a:fillRef>
+          <a:effectRef idx="1">
+            <a:schemeClr val="accent3"/>
+          </a:effectRef>
+          <a:fontRef idx="minor">
+            <a:schemeClr val="dk1"/>
+          </a:fontRef>
+        </p:style>
+        <p:txBody>
+          <a:bodyPr rtlCol="0" anchor="ctr"/>
+          <a:lstStyle/>
+          <a:p>
+            <a:pPr algn="ctr"/>
+            <a:r>
+              <a:rPr lang="en-US" sz="1050" b="1" dirty="0" err="1">
+                <a:solidFill>
+                  <a:schemeClr val="accent3">
+                    <a:lumMod val="75000"/>
+                  </a:schemeClr>
+                </a:solidFill>
+              </a:rPr>
+              <a:t>BudgetPanel</a:t>
+            </a:r>
+            <a:endParaRPr lang="en-SG" sz="1050" b="1" dirty="0">
+              <a:solidFill>
+                <a:schemeClr val="accent3">
+                  <a:lumMod val="75000"/>
+                </a:schemeClr>
+              </a:solidFill>
+            </a:endParaRPr>
+          </a:p>
+        </p:txBody>
+      </p:sp>
+      <p:cxnSp>
+        <p:nvCxnSpPr>
+          <p:cNvPr id="57" name="Elbow Connector 63">
+            <a:extLst>
+              <a:ext uri="{FF2B5EF4-FFF2-40B4-BE49-F238E27FC236}">
+                <a16:creationId xmlns:a16="http://schemas.microsoft.com/office/drawing/2014/main" id="{D760BF2A-59FB-4996-8EAA-A19C0D9B3AF2}"/>
+              </a:ext>
+            </a:extLst>
+          </p:cNvPr>
+          <p:cNvCxnSpPr>
+            <a:endCxn id="56" idx="1"/>
+          </p:cNvCxnSpPr>
+          <p:nvPr/>
+        </p:nvCxnSpPr>
+        <p:spPr>
+          <a:xfrm rot="16200000" flipH="1">
+            <a:off x="2050989" y="4527429"/>
+            <a:ext cx="899755" cy="176402"/>
+          </a:xfrm>
+          <a:prstGeom prst="bentConnector2">
+            <a:avLst/>
+          </a:prstGeom>
+          <a:ln w="19050">
+            <a:solidFill>
+              <a:schemeClr val="accent3"/>
+            </a:solidFill>
+            <a:headEnd type="none" w="med" len="med"/>
+            <a:tailEnd type="arrow" w="med" len="med"/>
+          </a:ln>
+          <a:effectLst/>
+        </p:spPr>
+        <p:style>
+          <a:lnRef idx="1">
+            <a:schemeClr val="accent2"/>
+          </a:lnRef>
+          <a:fillRef idx="2">
+            <a:schemeClr val="accent2"/>
+          </a:fillRef>
+          <a:effectRef idx="1">
+            <a:schemeClr val="accent2"/>
+          </a:effectRef>
+          <a:fontRef idx="minor">
+            <a:schemeClr val="dk1"/>
+          </a:fontRef>
+        </p:style>
+      </p:cxnSp>
+      <p:sp>
+        <p:nvSpPr>
+          <p:cNvPr id="58" name="Rectangle 11">
+            <a:extLst>
+              <a:ext uri="{FF2B5EF4-FFF2-40B4-BE49-F238E27FC236}">
+                <a16:creationId xmlns:a16="http://schemas.microsoft.com/office/drawing/2014/main" id="{EF1B31F6-A59F-4393-B5E9-89CBF101E3B1}"/>
+              </a:ext>
+            </a:extLst>
+          </p:cNvPr>
+          <p:cNvSpPr/>
+          <p:nvPr/>
+        </p:nvSpPr>
+        <p:spPr>
+          <a:xfrm>
+            <a:off x="2585644" y="5302348"/>
+            <a:ext cx="1093635" cy="236841"/>
+          </a:xfrm>
+          <a:prstGeom prst="rect">
+            <a:avLst/>
+          </a:prstGeom>
+          <a:ln w="19050">
+            <a:solidFill>
+              <a:schemeClr val="accent3"/>
+            </a:solidFill>
+          </a:ln>
+          <a:effectLst/>
+        </p:spPr>
+        <p:style>
+          <a:lnRef idx="1">
+            <a:schemeClr val="accent3"/>
+          </a:lnRef>
+          <a:fillRef idx="2">
+            <a:schemeClr val="accent3"/>
+          </a:fillRef>
+          <a:effectRef idx="1">
+            <a:schemeClr val="accent3"/>
+          </a:effectRef>
+          <a:fontRef idx="minor">
+            <a:schemeClr val="dk1"/>
+          </a:fontRef>
+        </p:style>
+        <p:txBody>
+          <a:bodyPr rtlCol="0" anchor="ctr"/>
+          <a:lstStyle/>
+          <a:p>
+            <a:pPr algn="ctr"/>
+            <a:r>
+              <a:rPr lang="en-US" sz="1050" b="1" dirty="0" err="1">
+                <a:solidFill>
+                  <a:schemeClr val="accent3">
+                    <a:lumMod val="75000"/>
+                  </a:schemeClr>
+                </a:solidFill>
+              </a:rPr>
+              <a:t>SummaryPanel</a:t>
+            </a:r>
+            <a:endParaRPr lang="en-US" sz="1050" b="1" dirty="0">
+              <a:solidFill>
+                <a:schemeClr val="accent3">
+                  <a:lumMod val="75000"/>
+                </a:schemeClr>
+              </a:solidFill>
+            </a:endParaRPr>
+          </a:p>
+        </p:txBody>
+      </p:sp>
+      <p:cxnSp>
+        <p:nvCxnSpPr>
+          <p:cNvPr id="59" name="Elbow Connector 63">
+            <a:extLst>
+              <a:ext uri="{FF2B5EF4-FFF2-40B4-BE49-F238E27FC236}">
+                <a16:creationId xmlns:a16="http://schemas.microsoft.com/office/drawing/2014/main" id="{6D5B516B-050C-464B-935F-0FAE146897DF}"/>
+              </a:ext>
+            </a:extLst>
+          </p:cNvPr>
+          <p:cNvCxnSpPr>
+            <a:endCxn id="58" idx="1"/>
+          </p:cNvCxnSpPr>
+          <p:nvPr/>
+        </p:nvCxnSpPr>
+        <p:spPr>
+          <a:xfrm rot="16200000" flipH="1">
+            <a:off x="2047566" y="4882690"/>
+            <a:ext cx="899755" cy="176402"/>
+          </a:xfrm>
+          <a:prstGeom prst="bentConnector2">
+            <a:avLst/>
+          </a:prstGeom>
+          <a:ln w="19050">
+            <a:solidFill>
+              <a:schemeClr val="accent3"/>
+            </a:solidFill>
+            <a:headEnd type="none" w="med" len="med"/>
+            <a:tailEnd type="arrow" w="med" len="med"/>
+          </a:ln>
+          <a:effectLst/>
+        </p:spPr>
+        <p:style>
+          <a:lnRef idx="1">
+            <a:schemeClr val="accent2"/>
+          </a:lnRef>
+          <a:fillRef idx="2">
+            <a:schemeClr val="accent2"/>
+          </a:fillRef>
+          <a:effectRef idx="1">
+            <a:schemeClr val="accent2"/>
+          </a:effectRef>
+          <a:fontRef idx="minor">
+            <a:schemeClr val="dk1"/>
+          </a:fontRef>
+        </p:style>
+      </p:cxnSp>
+      <p:cxnSp>
+        <p:nvCxnSpPr>
+          <p:cNvPr id="60" name="Elbow Connector 63">
+            <a:extLst>
+              <a:ext uri="{FF2B5EF4-FFF2-40B4-BE49-F238E27FC236}">
+                <a16:creationId xmlns:a16="http://schemas.microsoft.com/office/drawing/2014/main" id="{CBF7D48D-177C-4DDC-AC30-ADC17CAE8EE3}"/>
+              </a:ext>
+            </a:extLst>
+          </p:cNvPr>
+          <p:cNvCxnSpPr>
+            <a:cxnSpLocks/>
+          </p:cNvCxnSpPr>
+          <p:nvPr/>
+        </p:nvCxnSpPr>
+        <p:spPr>
+          <a:xfrm rot="5400000">
+            <a:off x="3217697" y="2844142"/>
+            <a:ext cx="2777291" cy="1846651"/>
+          </a:xfrm>
+          <a:prstGeom prst="bentConnector3">
+            <a:avLst>
+              <a:gd name="adj1" fmla="val 50000"/>
+            </a:avLst>
+          </a:prstGeom>
+          <a:ln w="6350">
+            <a:solidFill>
+              <a:schemeClr val="accent3"/>
+            </a:solidFill>
+            <a:headEnd type="none" w="med" len="med"/>
+            <a:tailEnd type="none" w="med" len="med"/>
+          </a:ln>
+          <a:effectLst/>
+        </p:spPr>
+        <p:style>
+          <a:lnRef idx="1">
+            <a:schemeClr val="accent2"/>
+          </a:lnRef>
+          <a:fillRef idx="2">
+            <a:schemeClr val="accent2"/>
+          </a:fillRef>
+          <a:effectRef idx="1">
+            <a:schemeClr val="accent2"/>
+          </a:effectRef>
+          <a:fontRef idx="minor">
+            <a:schemeClr val="dk1"/>
+          </a:fontRef>
+        </p:style>
+      </p:cxnSp>
+      <p:cxnSp>
+        <p:nvCxnSpPr>
+          <p:cNvPr id="61" name="Elbow Connector 63">
+            <a:extLst>
+              <a:ext uri="{FF2B5EF4-FFF2-40B4-BE49-F238E27FC236}">
+                <a16:creationId xmlns:a16="http://schemas.microsoft.com/office/drawing/2014/main" id="{714D2E90-8F5F-4D11-ABD6-52CBE2F447CA}"/>
+              </a:ext>
+            </a:extLst>
+          </p:cNvPr>
+          <p:cNvCxnSpPr/>
+          <p:nvPr/>
+        </p:nvCxnSpPr>
+        <p:spPr>
+          <a:xfrm rot="5400000">
+            <a:off x="3398257" y="3297235"/>
+            <a:ext cx="2418855" cy="1840384"/>
+          </a:xfrm>
+          <a:prstGeom prst="bentConnector2">
+            <a:avLst/>
+          </a:prstGeom>
+          <a:ln w="6350">
+            <a:solidFill>
+              <a:schemeClr val="accent3"/>
+            </a:solidFill>
+            <a:headEnd type="none" w="med" len="med"/>
+            <a:tailEnd type="none" w="med" len="med"/>
+          </a:ln>
+          <a:effectLst/>
+        </p:spPr>
+        <p:style>
+          <a:lnRef idx="1">
+            <a:schemeClr val="accent2"/>
+          </a:lnRef>
+          <a:fillRef idx="2">
+            <a:schemeClr val="accent2"/>
+          </a:fillRef>
+          <a:effectRef idx="1">
+            <a:schemeClr val="accent2"/>
+          </a:effectRef>
+          <a:fontRef idx="minor">
+            <a:schemeClr val="dk1"/>
+          </a:fontRef>
+        </p:style>
+      </p:cxnSp>
+      <p:sp>
+        <p:nvSpPr>
+          <p:cNvPr id="62" name="Freeform 117">
+            <a:extLst>
+              <a:ext uri="{FF2B5EF4-FFF2-40B4-BE49-F238E27FC236}">
+                <a16:creationId xmlns:a16="http://schemas.microsoft.com/office/drawing/2014/main" id="{38C23337-FDA6-4FFB-BA1E-99074838D69A}"/>
+              </a:ext>
+            </a:extLst>
+          </p:cNvPr>
+          <p:cNvSpPr/>
+          <p:nvPr/>
+        </p:nvSpPr>
+        <p:spPr>
+          <a:xfrm flipV="1">
+            <a:off x="3286103" y="5195375"/>
+            <a:ext cx="3449412" cy="45719"/>
+          </a:xfrm>
+          <a:custGeom>
+            <a:avLst/>
+            <a:gdLst>
+              <a:gd name="connsiteX0" fmla="*/ 0 w 3048000"/>
+              <a:gd name="connsiteY0" fmla="*/ 203200 h 203200"/>
+              <a:gd name="connsiteX1" fmla="*/ 221673 w 3048000"/>
+              <a:gd name="connsiteY1" fmla="*/ 0 h 203200"/>
+              <a:gd name="connsiteX2" fmla="*/ 3048000 w 3048000"/>
+              <a:gd name="connsiteY2" fmla="*/ 0 h 203200"/>
+            </a:gdLst>
+            <a:ahLst/>
+            <a:cxnLst>
+              <a:cxn ang="0">
+                <a:pos x="connsiteX0" y="connsiteY0"/>
+              </a:cxn>
+              <a:cxn ang="0">
+                <a:pos x="connsiteX1" y="connsiteY1"/>
+              </a:cxn>
+              <a:cxn ang="0">
+                <a:pos x="connsiteX2" y="connsiteY2"/>
+              </a:cxn>
+            </a:cxnLst>
+            <a:rect l="l" t="t" r="r" b="b"/>
+            <a:pathLst>
+              <a:path w="3048000" h="203200">
+                <a:moveTo>
+                  <a:pt x="0" y="203200"/>
+                </a:moveTo>
+                <a:lnTo>
+                  <a:pt x="221673" y="0"/>
+                </a:lnTo>
+                <a:lnTo>
+                  <a:pt x="3048000" y="0"/>
+                </a:lnTo>
+              </a:path>
+            </a:pathLst>
+          </a:custGeom>
+          <a:noFill/>
+          <a:ln w="19050">
+            <a:solidFill>
+              <a:schemeClr val="accent3"/>
+            </a:solidFill>
+            <a:prstDash val="sysDot"/>
+            <a:headEnd type="none" w="med" len="med"/>
+            <a:tailEnd type="arrow" w="med" len="med"/>
+          </a:ln>
+          <a:effectLst/>
+        </p:spPr>
+        <p:style>
+          <a:lnRef idx="1">
+            <a:schemeClr val="accent2"/>
+          </a:lnRef>
+          <a:fillRef idx="2">
+            <a:schemeClr val="accent2"/>
+          </a:fillRef>
+          <a:effectRef idx="1">
+            <a:schemeClr val="accent2"/>
+          </a:effectRef>
+          <a:fontRef idx="minor">
+            <a:schemeClr val="dk1"/>
+          </a:fontRef>
+        </p:style>
+        <p:txBody>
+          <a:bodyPr rtlCol="0" anchor="ctr"/>
+          <a:lstStyle/>
+          <a:p>
+            <a:pPr algn="ctr"/>
+            <a:endParaRPr lang="en-SG"/>
+          </a:p>
+        </p:txBody>
+      </p:sp>
+      <p:sp>
+        <p:nvSpPr>
+          <p:cNvPr id="63" name="Freeform 117">
+            <a:extLst>
+              <a:ext uri="{FF2B5EF4-FFF2-40B4-BE49-F238E27FC236}">
+                <a16:creationId xmlns:a16="http://schemas.microsoft.com/office/drawing/2014/main" id="{91A600B8-5CD0-4BA2-95AA-B8A8B3CD1D7F}"/>
+              </a:ext>
+            </a:extLst>
+          </p:cNvPr>
+          <p:cNvSpPr/>
+          <p:nvPr/>
+        </p:nvSpPr>
+        <p:spPr>
+          <a:xfrm flipV="1">
+            <a:off x="3286103" y="5558939"/>
+            <a:ext cx="3449412" cy="45719"/>
           </a:xfrm>
           <a:custGeom>
             <a:avLst/>

</xml_diff>

<commit_message>
Update the Ui Class Diagram
</commit_message>
<xml_diff>
--- a/docs/diagrams/UiComponentClassDiagram.pptx
+++ b/docs/diagrams/UiComponentClassDiagram.pptx
@@ -208,7 +208,7 @@
           <a:p>
             <a:fld id="{F5CC4B3F-88C1-4FFA-B1B6-F41C21DC6924}" type="datetimeFigureOut">
               <a:rPr lang="en-US" smtClean="0"/>
-              <a:t>3/5/2019</a:t>
+              <a:t>4/13/2019</a:t>
             </a:fld>
             <a:endParaRPr lang="en-US"/>
           </a:p>
@@ -738,7 +738,7 @@
           <a:p>
             <a:fld id="{78C97017-6FC3-485B-9764-EAC9E56C1D49}" type="datetimeFigureOut">
               <a:rPr lang="en-US" smtClean="0"/>
-              <a:t>3/5/2019</a:t>
+              <a:t>4/13/2019</a:t>
             </a:fld>
             <a:endParaRPr lang="en-US"/>
           </a:p>
@@ -906,7 +906,7 @@
           <a:p>
             <a:fld id="{78C97017-6FC3-485B-9764-EAC9E56C1D49}" type="datetimeFigureOut">
               <a:rPr lang="en-US" smtClean="0"/>
-              <a:t>3/5/2019</a:t>
+              <a:t>4/13/2019</a:t>
             </a:fld>
             <a:endParaRPr lang="en-US"/>
           </a:p>
@@ -1084,7 +1084,7 @@
           <a:p>
             <a:fld id="{78C97017-6FC3-485B-9764-EAC9E56C1D49}" type="datetimeFigureOut">
               <a:rPr lang="en-US" smtClean="0"/>
-              <a:t>3/5/2019</a:t>
+              <a:t>4/13/2019</a:t>
             </a:fld>
             <a:endParaRPr lang="en-US"/>
           </a:p>
@@ -1252,7 +1252,7 @@
           <a:p>
             <a:fld id="{78C97017-6FC3-485B-9764-EAC9E56C1D49}" type="datetimeFigureOut">
               <a:rPr lang="en-US" smtClean="0"/>
-              <a:t>3/5/2019</a:t>
+              <a:t>4/13/2019</a:t>
             </a:fld>
             <a:endParaRPr lang="en-US"/>
           </a:p>
@@ -1497,7 +1497,7 @@
           <a:p>
             <a:fld id="{78C97017-6FC3-485B-9764-EAC9E56C1D49}" type="datetimeFigureOut">
               <a:rPr lang="en-US" smtClean="0"/>
-              <a:t>3/5/2019</a:t>
+              <a:t>4/13/2019</a:t>
             </a:fld>
             <a:endParaRPr lang="en-US"/>
           </a:p>
@@ -1782,7 +1782,7 @@
           <a:p>
             <a:fld id="{78C97017-6FC3-485B-9764-EAC9E56C1D49}" type="datetimeFigureOut">
               <a:rPr lang="en-US" smtClean="0"/>
-              <a:t>3/5/2019</a:t>
+              <a:t>4/13/2019</a:t>
             </a:fld>
             <a:endParaRPr lang="en-US"/>
           </a:p>
@@ -2201,7 +2201,7 @@
           <a:p>
             <a:fld id="{78C97017-6FC3-485B-9764-EAC9E56C1D49}" type="datetimeFigureOut">
               <a:rPr lang="en-US" smtClean="0"/>
-              <a:t>3/5/2019</a:t>
+              <a:t>4/13/2019</a:t>
             </a:fld>
             <a:endParaRPr lang="en-US"/>
           </a:p>
@@ -2318,7 +2318,7 @@
           <a:p>
             <a:fld id="{78C97017-6FC3-485B-9764-EAC9E56C1D49}" type="datetimeFigureOut">
               <a:rPr lang="en-US" smtClean="0"/>
-              <a:t>3/5/2019</a:t>
+              <a:t>4/13/2019</a:t>
             </a:fld>
             <a:endParaRPr lang="en-US"/>
           </a:p>
@@ -2413,7 +2413,7 @@
           <a:p>
             <a:fld id="{78C97017-6FC3-485B-9764-EAC9E56C1D49}" type="datetimeFigureOut">
               <a:rPr lang="en-US" smtClean="0"/>
-              <a:t>3/5/2019</a:t>
+              <a:t>4/13/2019</a:t>
             </a:fld>
             <a:endParaRPr lang="en-US"/>
           </a:p>
@@ -2688,7 +2688,7 @@
           <a:p>
             <a:fld id="{78C97017-6FC3-485B-9764-EAC9E56C1D49}" type="datetimeFigureOut">
               <a:rPr lang="en-US" smtClean="0"/>
-              <a:t>3/5/2019</a:t>
+              <a:t>4/13/2019</a:t>
             </a:fld>
             <a:endParaRPr lang="en-US"/>
           </a:p>
@@ -2940,7 +2940,7 @@
           <a:p>
             <a:fld id="{78C97017-6FC3-485B-9764-EAC9E56C1D49}" type="datetimeFigureOut">
               <a:rPr lang="en-US" smtClean="0"/>
-              <a:t>3/5/2019</a:t>
+              <a:t>4/13/2019</a:t>
             </a:fld>
             <a:endParaRPr lang="en-US"/>
           </a:p>
@@ -3005,9 +3005,14 @@
 <p:sldMaster xmlns:a="http://schemas.openxmlformats.org/drawingml/2006/main" xmlns:r="http://schemas.openxmlformats.org/officeDocument/2006/relationships" xmlns:p="http://schemas.openxmlformats.org/presentationml/2006/main">
   <p:cSld>
     <p:bg>
-      <p:bgRef idx="1001">
-        <a:schemeClr val="bg1"/>
-      </p:bgRef>
+      <p:bgPr>
+        <a:solidFill>
+          <a:schemeClr val="bg1">
+            <a:alpha val="0"/>
+          </a:schemeClr>
+        </a:solidFill>
+        <a:effectLst/>
+      </p:bgPr>
     </p:bg>
     <p:spTree>
       <p:nvGrpSpPr>
@@ -3151,7 +3156,7 @@
           <a:p>
             <a:fld id="{78C97017-6FC3-485B-9764-EAC9E56C1D49}" type="datetimeFigureOut">
               <a:rPr lang="en-US" smtClean="0"/>
-              <a:t>3/5/2019</a:t>
+              <a:t>4/13/2019</a:t>
             </a:fld>
             <a:endParaRPr lang="en-US"/>
           </a:p>
@@ -3510,7 +3515,7 @@
 </file>
 
 <file path=ppt/slides/slide1.xml><?xml version="1.0" encoding="utf-8"?>
-<p:sld xmlns:a="http://schemas.openxmlformats.org/drawingml/2006/main" xmlns:r="http://schemas.openxmlformats.org/officeDocument/2006/relationships" xmlns:p="http://schemas.openxmlformats.org/presentationml/2006/main">
+<p:sld xmlns:a="http://schemas.openxmlformats.org/drawingml/2006/main" xmlns:r="http://schemas.openxmlformats.org/officeDocument/2006/relationships" xmlns:p="http://schemas.openxmlformats.org/presentationml/2006/main" showMasterSp="0">
   <p:cSld>
     <p:spTree>
       <p:nvGrpSpPr>
@@ -3534,8 +3539,8 @@
         </p:nvSpPr>
         <p:spPr>
           <a:xfrm>
-            <a:off x="1524000" y="685800"/>
-            <a:ext cx="5200755" cy="5105401"/>
+            <a:off x="499138" y="94272"/>
+            <a:ext cx="7578062" cy="6611326"/>
           </a:xfrm>
           <a:prstGeom prst="roundRect">
             <a:avLst>
@@ -3596,7 +3601,7 @@
         </p:nvSpPr>
         <p:spPr>
           <a:xfrm>
-            <a:off x="2402483" y="1579221"/>
+            <a:off x="1451213" y="844795"/>
             <a:ext cx="1093635" cy="346760"/>
           </a:xfrm>
           <a:prstGeom prst="rect">
@@ -3656,8 +3661,8 @@
         </p:nvSpPr>
         <p:spPr>
           <a:xfrm>
-            <a:off x="2899063" y="2209801"/>
-            <a:ext cx="1252769" cy="236841"/>
+            <a:off x="2678527" y="1140663"/>
+            <a:ext cx="1620222" cy="295107"/>
           </a:xfrm>
           <a:prstGeom prst="rect">
             <a:avLst/>
@@ -3716,7 +3721,7 @@
         </p:nvSpPr>
         <p:spPr>
           <a:xfrm>
-            <a:off x="2399377" y="1008925"/>
+            <a:off x="1454941" y="304800"/>
             <a:ext cx="1093635" cy="346760"/>
           </a:xfrm>
           <a:prstGeom prst="rect">
@@ -3771,14 +3776,14 @@
         <p:nvCxnSpPr>
           <p:cNvPr id="10" name="Elbow Connector 63"/>
           <p:cNvCxnSpPr>
-            <a:stCxn id="9" idx="2"/>
+            <a:cxnSpLocks/>
             <a:endCxn id="2" idx="0"/>
           </p:cNvCxnSpPr>
           <p:nvPr/>
         </p:nvCxnSpPr>
         <p:spPr>
           <a:xfrm rot="16200000" flipH="1">
-            <a:off x="2835980" y="1465900"/>
+            <a:off x="1884710" y="731474"/>
             <a:ext cx="223536" cy="3106"/>
           </a:xfrm>
           <a:prstGeom prst="bentConnector3">
@@ -3818,7 +3823,7 @@
         </p:nvSpPr>
         <p:spPr>
           <a:xfrm rot="10800000" flipV="1">
-            <a:off x="5701252" y="1348478"/>
+            <a:off x="7260982" y="632564"/>
             <a:ext cx="270504" cy="175523"/>
           </a:xfrm>
           <a:prstGeom prst="triangle">
@@ -3861,13 +3866,15 @@
       <p:cxnSp>
         <p:nvCxnSpPr>
           <p:cNvPr id="19" name="Elbow Connector 122"/>
-          <p:cNvCxnSpPr/>
+          <p:cNvCxnSpPr>
+            <a:cxnSpLocks/>
+          </p:cNvCxnSpPr>
           <p:nvPr/>
         </p:nvCxnSpPr>
         <p:spPr>
-          <a:xfrm flipV="1">
-            <a:off x="951270" y="2229938"/>
-            <a:ext cx="684904" cy="1"/>
+          <a:xfrm>
+            <a:off x="245013" y="1219200"/>
+            <a:ext cx="439891" cy="1"/>
           </a:xfrm>
           <a:prstGeom prst="bentConnector3">
             <a:avLst>
@@ -3909,8 +3916,8 @@
         </p:nvSpPr>
         <p:spPr>
           <a:xfrm rot="16200000">
-            <a:off x="6031474" y="1681767"/>
-            <a:ext cx="2319981" cy="328045"/>
+            <a:off x="7456316" y="954670"/>
+            <a:ext cx="2076269" cy="355473"/>
           </a:xfrm>
           <a:prstGeom prst="roundRect">
             <a:avLst/>
@@ -3969,8 +3976,8 @@
         </p:nvSpPr>
         <p:spPr>
           <a:xfrm>
-            <a:off x="2899063" y="2887360"/>
-            <a:ext cx="1266077" cy="236841"/>
+            <a:off x="2690199" y="1906325"/>
+            <a:ext cx="1588760" cy="264218"/>
           </a:xfrm>
           <a:prstGeom prst="rect">
             <a:avLst/>
@@ -4009,7 +4016,7 @@
                   </a:schemeClr>
                 </a:solidFill>
               </a:rPr>
-              <a:t>TableBrowserPanel</a:t>
+              <a:t>OrderItemListPanel</a:t>
             </a:r>
             <a:endParaRPr lang="en-SG" sz="1050" b="1" dirty="0">
               <a:solidFill>
@@ -4029,8 +4036,8 @@
         </p:nvSpPr>
         <p:spPr>
           <a:xfrm>
-            <a:off x="2899062" y="4999719"/>
-            <a:ext cx="1274955" cy="236841"/>
+            <a:off x="2691115" y="6048744"/>
+            <a:ext cx="1578727" cy="244524"/>
           </a:xfrm>
           <a:prstGeom prst="rect">
             <a:avLst/>
@@ -4083,14 +4090,14 @@
       </p:sp>
       <p:sp>
         <p:nvSpPr>
-          <p:cNvPr id="36" name="Rectangle 11"/>
+          <p:cNvPr id="38" name="Rectangle 11"/>
           <p:cNvSpPr/>
           <p:nvPr/>
         </p:nvSpPr>
         <p:spPr>
           <a:xfrm>
-            <a:off x="2899061" y="3915762"/>
-            <a:ext cx="1264463" cy="236841"/>
+            <a:off x="2699228" y="6373401"/>
+            <a:ext cx="1578726" cy="253364"/>
           </a:xfrm>
           <a:prstGeom prst="rect">
             <a:avLst/>
@@ -4122,66 +4129,6 @@
           <a:p>
             <a:pPr algn="ctr"/>
             <a:r>
-              <a:rPr lang="en-US" sz="1050" b="1" dirty="0" err="1">
-                <a:solidFill>
-                  <a:schemeClr val="accent3">
-                    <a:lumMod val="75000"/>
-                  </a:schemeClr>
-                </a:solidFill>
-              </a:rPr>
-              <a:t>OrderItemListPanel</a:t>
-            </a:r>
-            <a:endParaRPr lang="en-SG" sz="1050" b="1" dirty="0">
-              <a:solidFill>
-                <a:schemeClr val="accent3">
-                  <a:lumMod val="75000"/>
-                </a:schemeClr>
-              </a:solidFill>
-            </a:endParaRPr>
-          </a:p>
-        </p:txBody>
-      </p:sp>
-      <p:sp>
-        <p:nvSpPr>
-          <p:cNvPr id="38" name="Rectangle 11"/>
-          <p:cNvSpPr/>
-          <p:nvPr/>
-        </p:nvSpPr>
-        <p:spPr>
-          <a:xfrm>
-            <a:off x="2899063" y="5401960"/>
-            <a:ext cx="1274954" cy="236841"/>
-          </a:xfrm>
-          <a:prstGeom prst="rect">
-            <a:avLst/>
-          </a:prstGeom>
-          <a:ln w="19050">
-            <a:solidFill>
-              <a:schemeClr val="accent3"/>
-            </a:solidFill>
-          </a:ln>
-          <a:effectLst/>
-        </p:spPr>
-        <p:style>
-          <a:lnRef idx="1">
-            <a:schemeClr val="accent3"/>
-          </a:lnRef>
-          <a:fillRef idx="2">
-            <a:schemeClr val="accent3"/>
-          </a:fillRef>
-          <a:effectRef idx="1">
-            <a:schemeClr val="accent3"/>
-          </a:effectRef>
-          <a:fontRef idx="minor">
-            <a:schemeClr val="dk1"/>
-          </a:fontRef>
-        </p:style>
-        <p:txBody>
-          <a:bodyPr rtlCol="0" anchor="ctr"/>
-          <a:lstStyle/>
-          <a:p>
-            <a:pPr algn="ctr"/>
-            <a:r>
               <a:rPr lang="en-US" sz="1050" b="1" dirty="0">
                 <a:solidFill>
                   <a:schemeClr val="accent3">
@@ -4209,7 +4156,7 @@
         </p:nvSpPr>
         <p:spPr>
           <a:xfrm>
-            <a:off x="2631083" y="1944453"/>
+            <a:off x="1679813" y="1210027"/>
             <a:ext cx="183156" cy="161573"/>
           </a:xfrm>
           <a:prstGeom prst="flowChartDecision">
@@ -4254,18 +4201,20 @@
           <p:cNvPr id="40" name="Elbow Connector 63"/>
           <p:cNvCxnSpPr>
             <a:cxnSpLocks/>
-            <a:stCxn id="39" idx="2"/>
+            <a:stCxn id="39" idx="3"/>
             <a:endCxn id="3" idx="1"/>
           </p:cNvCxnSpPr>
           <p:nvPr/>
         </p:nvCxnSpPr>
         <p:spPr>
-          <a:xfrm rot="16200000" flipH="1">
-            <a:off x="2699764" y="2128923"/>
-            <a:ext cx="222196" cy="176402"/>
-          </a:xfrm>
-          <a:prstGeom prst="bentConnector2">
-            <a:avLst/>
+          <a:xfrm flipV="1">
+            <a:off x="1862969" y="1288217"/>
+            <a:ext cx="815558" cy="2597"/>
+          </a:xfrm>
+          <a:prstGeom prst="bentConnector3">
+            <a:avLst>
+              <a:gd name="adj1" fmla="val 50000"/>
+            </a:avLst>
           </a:prstGeom>
           <a:ln w="19050">
             <a:solidFill>
@@ -4299,8 +4248,8 @@
         </p:nvSpPr>
         <p:spPr>
           <a:xfrm>
-            <a:off x="2897334" y="2542309"/>
-            <a:ext cx="1261208" cy="236841"/>
+            <a:off x="2681398" y="1580823"/>
+            <a:ext cx="1590751" cy="250386"/>
           </a:xfrm>
           <a:prstGeom prst="rect">
             <a:avLst/>
@@ -4363,50 +4312,8 @@
         </p:nvCxnSpPr>
         <p:spPr>
           <a:xfrm rot="16200000" flipH="1">
-            <a:off x="2360985" y="2467702"/>
-            <a:ext cx="899755" cy="176402"/>
-          </a:xfrm>
-          <a:prstGeom prst="bentConnector2">
-            <a:avLst/>
-          </a:prstGeom>
-          <a:ln w="19050">
-            <a:solidFill>
-              <a:schemeClr val="accent3"/>
-            </a:solidFill>
-            <a:headEnd type="none" w="med" len="med"/>
-            <a:tailEnd type="arrow" w="med" len="med"/>
-          </a:ln>
-          <a:effectLst/>
-        </p:spPr>
-        <p:style>
-          <a:lnRef idx="1">
-            <a:schemeClr val="accent2"/>
-          </a:lnRef>
-          <a:fillRef idx="2">
-            <a:schemeClr val="accent2"/>
-          </a:fillRef>
-          <a:effectRef idx="1">
-            <a:schemeClr val="accent2"/>
-          </a:effectRef>
-          <a:fontRef idx="minor">
-            <a:schemeClr val="dk1"/>
-          </a:fontRef>
-        </p:style>
-      </p:cxnSp>
-      <p:cxnSp>
-        <p:nvCxnSpPr>
-          <p:cNvPr id="47" name="Elbow Connector 63"/>
-          <p:cNvCxnSpPr>
-            <a:cxnSpLocks/>
-            <a:stCxn id="39" idx="2"/>
-            <a:endCxn id="36" idx="1"/>
-          </p:cNvCxnSpPr>
-          <p:nvPr/>
-        </p:nvCxnSpPr>
-        <p:spPr>
-          <a:xfrm rot="16200000" flipH="1">
-            <a:off x="1846783" y="2981904"/>
-            <a:ext cx="1928157" cy="176400"/>
+            <a:off x="1897378" y="1245613"/>
+            <a:ext cx="666834" cy="918808"/>
           </a:xfrm>
           <a:prstGeom prst="bentConnector2">
             <a:avLst/>
@@ -4447,8 +4354,8 @@
         </p:nvCxnSpPr>
         <p:spPr>
           <a:xfrm rot="16200000" flipH="1">
-            <a:off x="1304804" y="3523882"/>
-            <a:ext cx="3012114" cy="176401"/>
+            <a:off x="-168450" y="3311441"/>
+            <a:ext cx="4799406" cy="919724"/>
           </a:xfrm>
           <a:prstGeom prst="bentConnector2">
             <a:avLst/>
@@ -4488,8 +4395,8 @@
         </p:nvCxnSpPr>
         <p:spPr>
           <a:xfrm rot="16200000" flipH="1">
-            <a:off x="909661" y="3530979"/>
-            <a:ext cx="3594398" cy="384406"/>
+            <a:off x="-545547" y="3255308"/>
+            <a:ext cx="5308528" cy="1181021"/>
           </a:xfrm>
           <a:prstGeom prst="bentConnector2">
             <a:avLst/>
@@ -4526,7 +4433,7 @@
         </p:nvSpPr>
         <p:spPr>
           <a:xfrm>
-            <a:off x="5450483" y="1008925"/>
+            <a:off x="7010400" y="304800"/>
             <a:ext cx="772043" cy="346760"/>
           </a:xfrm>
           <a:prstGeom prst="rect">
@@ -4609,50 +4516,8 @@
         </p:nvCxnSpPr>
         <p:spPr>
           <a:xfrm flipV="1">
-            <a:off x="4158542" y="1524001"/>
-            <a:ext cx="1677962" cy="1136729"/>
-          </a:xfrm>
-          <a:prstGeom prst="bentConnector2">
-            <a:avLst/>
-          </a:prstGeom>
-          <a:ln w="6350">
-            <a:solidFill>
-              <a:schemeClr val="accent3"/>
-            </a:solidFill>
-            <a:headEnd type="none" w="med" len="med"/>
-            <a:tailEnd type="none" w="med" len="med"/>
-          </a:ln>
-          <a:effectLst/>
-        </p:spPr>
-        <p:style>
-          <a:lnRef idx="1">
-            <a:schemeClr val="accent2"/>
-          </a:lnRef>
-          <a:fillRef idx="2">
-            <a:schemeClr val="accent2"/>
-          </a:fillRef>
-          <a:effectRef idx="1">
-            <a:schemeClr val="accent2"/>
-          </a:effectRef>
-          <a:fontRef idx="minor">
-            <a:schemeClr val="dk1"/>
-          </a:fontRef>
-        </p:style>
-      </p:cxnSp>
-      <p:cxnSp>
-        <p:nvCxnSpPr>
-          <p:cNvPr id="77" name="Elbow Connector 63"/>
-          <p:cNvCxnSpPr>
-            <a:cxnSpLocks/>
-            <a:stCxn id="16" idx="3"/>
-            <a:endCxn id="52" idx="3"/>
-          </p:cNvCxnSpPr>
-          <p:nvPr/>
-        </p:nvCxnSpPr>
-        <p:spPr>
-          <a:xfrm rot="5400000">
-            <a:off x="4330794" y="2748827"/>
-            <a:ext cx="2730536" cy="280885"/>
+            <a:off x="4272149" y="808087"/>
+            <a:ext cx="3124085" cy="897929"/>
           </a:xfrm>
           <a:prstGeom prst="bentConnector2">
             <a:avLst/>
@@ -4693,8 +4558,8 @@
         </p:nvCxnSpPr>
         <p:spPr>
           <a:xfrm rot="5400000">
-            <a:off x="4259932" y="1429209"/>
-            <a:ext cx="1481780" cy="1671364"/>
+            <a:off x="5222424" y="-135377"/>
+            <a:ext cx="1230347" cy="3117275"/>
           </a:xfrm>
           <a:prstGeom prst="bentConnector2">
             <a:avLst/>
@@ -4727,6 +4592,7 @@
         <p:nvCxnSpPr>
           <p:cNvPr id="88" name="Elbow Connector 63"/>
           <p:cNvCxnSpPr>
+            <a:cxnSpLocks/>
             <a:stCxn id="2" idx="3"/>
             <a:endCxn id="16" idx="3"/>
           </p:cNvCxnSpPr>
@@ -4734,8 +4600,8 @@
         </p:nvCxnSpPr>
         <p:spPr>
           <a:xfrm flipV="1">
-            <a:off x="3496118" y="1524001"/>
-            <a:ext cx="2340386" cy="228600"/>
+            <a:off x="2544848" y="808087"/>
+            <a:ext cx="4851386" cy="210088"/>
           </a:xfrm>
           <a:prstGeom prst="bentConnector2">
             <a:avLst/>
@@ -4769,14 +4635,15 @@
           <p:cNvPr id="91" name="Elbow Connector 63"/>
           <p:cNvCxnSpPr>
             <a:cxnSpLocks/>
+            <a:stCxn id="16" idx="3"/>
             <a:endCxn id="35" idx="3"/>
           </p:cNvCxnSpPr>
           <p:nvPr/>
         </p:nvCxnSpPr>
         <p:spPr>
           <a:xfrm rot="5400000">
-            <a:off x="3807172" y="3088806"/>
-            <a:ext cx="2396180" cy="1662489"/>
+            <a:off x="3151579" y="1926350"/>
+            <a:ext cx="5362919" cy="3126392"/>
           </a:xfrm>
           <a:prstGeom prst="bentConnector2">
             <a:avLst/>
@@ -4810,14 +4677,15 @@
           <p:cNvPr id="94" name="Elbow Connector 63"/>
           <p:cNvCxnSpPr>
             <a:cxnSpLocks/>
+            <a:stCxn id="16" idx="3"/>
             <a:endCxn id="38" idx="3"/>
           </p:cNvCxnSpPr>
           <p:nvPr/>
         </p:nvCxnSpPr>
         <p:spPr>
           <a:xfrm rot="5400000">
-            <a:off x="3606050" y="3289926"/>
-            <a:ext cx="2798422" cy="1662488"/>
+            <a:off x="2991096" y="2094945"/>
+            <a:ext cx="5691996" cy="3118280"/>
           </a:xfrm>
           <a:prstGeom prst="bentConnector2">
             <a:avLst/>
@@ -4850,14 +4718,14 @@
         <p:nvCxnSpPr>
           <p:cNvPr id="107" name="Elbow Connector 106"/>
           <p:cNvCxnSpPr>
-            <a:stCxn id="9" idx="0"/>
+            <a:cxnSpLocks/>
           </p:cNvCxnSpPr>
           <p:nvPr/>
         </p:nvCxnSpPr>
         <p:spPr>
           <a:xfrm rot="5400000" flipH="1" flipV="1">
-            <a:off x="4901456" y="-1117060"/>
-            <a:ext cx="170724" cy="4081246"/>
+            <a:off x="5103751" y="-2873392"/>
+            <a:ext cx="125274" cy="6329259"/>
           </a:xfrm>
           <a:prstGeom prst="bentConnector2">
             <a:avLst/>
@@ -4895,8 +4763,8 @@
         </p:nvSpPr>
         <p:spPr>
           <a:xfrm rot="16200000">
-            <a:off x="5870143" y="4291246"/>
-            <a:ext cx="2671863" cy="328045"/>
+            <a:off x="6286812" y="4293517"/>
+            <a:ext cx="4444503" cy="355475"/>
           </a:xfrm>
           <a:prstGeom prst="roundRect">
             <a:avLst/>
@@ -4955,7 +4823,7 @@
         </p:nvSpPr>
         <p:spPr>
           <a:xfrm rot="16200000">
-            <a:off x="1262737" y="2099203"/>
+            <a:off x="311467" y="1386919"/>
             <a:ext cx="1093635" cy="346760"/>
           </a:xfrm>
           <a:prstGeom prst="rect">
@@ -5025,7 +4893,7 @@
         </p:nvSpPr>
         <p:spPr>
           <a:xfrm flipV="1">
-            <a:off x="1674302" y="1524002"/>
+            <a:off x="723032" y="838200"/>
             <a:ext cx="270504" cy="175523"/>
           </a:xfrm>
           <a:prstGeom prst="triangle">
@@ -5069,14 +4937,14 @@
         <p:nvCxnSpPr>
           <p:cNvPr id="121" name="Elbow Connector 63"/>
           <p:cNvCxnSpPr>
-            <a:stCxn id="9" idx="1"/>
+            <a:cxnSpLocks/>
             <a:endCxn id="120" idx="3"/>
           </p:cNvCxnSpPr>
           <p:nvPr/>
         </p:nvCxnSpPr>
         <p:spPr>
           <a:xfrm rot="10800000" flipV="1">
-            <a:off x="1809555" y="1182304"/>
+            <a:off x="858285" y="496502"/>
             <a:ext cx="589823" cy="341697"/>
           </a:xfrm>
           <a:prstGeom prst="bentConnector2">
@@ -5119,8 +4987,8 @@
         </p:nvCxnSpPr>
         <p:spPr>
           <a:xfrm rot="16200000" flipH="1">
-            <a:off x="2532645" y="2296041"/>
-            <a:ext cx="554704" cy="174673"/>
+            <a:off x="2059186" y="1083804"/>
+            <a:ext cx="334416" cy="910007"/>
           </a:xfrm>
           <a:prstGeom prst="bentConnector2">
             <a:avLst/>
@@ -5155,17 +5023,19 @@
           <p:cNvCxnSpPr>
             <a:cxnSpLocks/>
             <a:stCxn id="16" idx="3"/>
-            <a:endCxn id="3" idx="3"/>
+            <a:endCxn id="3" idx="2"/>
           </p:cNvCxnSpPr>
           <p:nvPr/>
         </p:nvCxnSpPr>
         <p:spPr>
           <a:xfrm rot="5400000">
-            <a:off x="4592058" y="1083775"/>
-            <a:ext cx="804221" cy="1684672"/>
-          </a:xfrm>
-          <a:prstGeom prst="bentConnector2">
-            <a:avLst/>
+            <a:off x="5128595" y="-831870"/>
+            <a:ext cx="627683" cy="3907596"/>
+          </a:xfrm>
+          <a:prstGeom prst="bentConnector3">
+            <a:avLst>
+              <a:gd name="adj1" fmla="val 112390"/>
+            </a:avLst>
           </a:prstGeom>
           <a:ln w="6350">
             <a:solidFill>
@@ -5191,143 +5061,6 @@
           </a:fontRef>
         </p:style>
       </p:cxnSp>
-      <p:cxnSp>
-        <p:nvCxnSpPr>
-          <p:cNvPr id="137" name="Elbow Connector 136"/>
-          <p:cNvCxnSpPr>
-            <a:cxnSpLocks/>
-            <a:stCxn id="36" idx="2"/>
-            <a:endCxn id="52" idx="1"/>
-          </p:cNvCxnSpPr>
-          <p:nvPr/>
-        </p:nvCxnSpPr>
-        <p:spPr>
-          <a:xfrm rot="16200000" flipH="1">
-            <a:off x="3855011" y="3828884"/>
-            <a:ext cx="101934" cy="749371"/>
-          </a:xfrm>
-          <a:prstGeom prst="bentConnector2">
-            <a:avLst/>
-          </a:prstGeom>
-          <a:ln w="19050">
-            <a:solidFill>
-              <a:schemeClr val="accent3"/>
-            </a:solidFill>
-            <a:headEnd type="none" w="med" len="med"/>
-            <a:tailEnd type="arrow" w="med" len="med"/>
-          </a:ln>
-          <a:effectLst/>
-        </p:spPr>
-        <p:style>
-          <a:lnRef idx="1">
-            <a:schemeClr val="accent2"/>
-          </a:lnRef>
-          <a:fillRef idx="2">
-            <a:schemeClr val="accent2"/>
-          </a:fillRef>
-          <a:effectRef idx="1">
-            <a:schemeClr val="accent2"/>
-          </a:effectRef>
-          <a:fontRef idx="minor">
-            <a:schemeClr val="dk1"/>
-          </a:fontRef>
-        </p:style>
-      </p:cxnSp>
-      <p:cxnSp>
-        <p:nvCxnSpPr>
-          <p:cNvPr id="140" name="Elbow Connector 63"/>
-          <p:cNvCxnSpPr>
-            <a:cxnSpLocks/>
-            <a:stCxn id="16" idx="3"/>
-            <a:endCxn id="36" idx="3"/>
-          </p:cNvCxnSpPr>
-          <p:nvPr/>
-        </p:nvCxnSpPr>
-        <p:spPr>
-          <a:xfrm rot="5400000">
-            <a:off x="3744923" y="1942602"/>
-            <a:ext cx="2510182" cy="1672980"/>
-          </a:xfrm>
-          <a:prstGeom prst="bentConnector2">
-            <a:avLst/>
-          </a:prstGeom>
-          <a:ln w="6350">
-            <a:solidFill>
-              <a:schemeClr val="accent3"/>
-            </a:solidFill>
-            <a:headEnd type="none" w="med" len="med"/>
-            <a:tailEnd type="none" w="med" len="med"/>
-          </a:ln>
-          <a:effectLst/>
-        </p:spPr>
-        <p:style>
-          <a:lnRef idx="1">
-            <a:schemeClr val="accent2"/>
-          </a:lnRef>
-          <a:fillRef idx="2">
-            <a:schemeClr val="accent2"/>
-          </a:fillRef>
-          <a:effectRef idx="1">
-            <a:schemeClr val="accent2"/>
-          </a:effectRef>
-          <a:fontRef idx="minor">
-            <a:schemeClr val="dk1"/>
-          </a:fontRef>
-        </p:style>
-      </p:cxnSp>
-      <p:sp>
-        <p:nvSpPr>
-          <p:cNvPr id="143" name="Rectangle 142"/>
-          <p:cNvSpPr/>
-          <p:nvPr/>
-        </p:nvSpPr>
-        <p:spPr>
-          <a:xfrm>
-            <a:off x="5728583" y="1577336"/>
-            <a:ext cx="229325" cy="166560"/>
-          </a:xfrm>
-          <a:prstGeom prst="rect">
-            <a:avLst/>
-          </a:prstGeom>
-          <a:solidFill>
-            <a:schemeClr val="accent3">
-              <a:lumMod val="20000"/>
-              <a:lumOff val="80000"/>
-              <a:alpha val="80000"/>
-            </a:schemeClr>
-          </a:solidFill>
-          <a:ln>
-            <a:noFill/>
-          </a:ln>
-          <a:effectLst>
-            <a:softEdge rad="31750"/>
-          </a:effectLst>
-        </p:spPr>
-        <p:style>
-          <a:lnRef idx="2">
-            <a:schemeClr val="accent1">
-              <a:shade val="50000"/>
-            </a:schemeClr>
-          </a:lnRef>
-          <a:fillRef idx="1">
-            <a:schemeClr val="accent1"/>
-          </a:fillRef>
-          <a:effectRef idx="0">
-            <a:schemeClr val="accent1"/>
-          </a:effectRef>
-          <a:fontRef idx="minor">
-            <a:schemeClr val="lt1"/>
-          </a:fontRef>
-        </p:style>
-        <p:txBody>
-          <a:bodyPr rtlCol="0" anchor="ctr"/>
-          <a:lstStyle/>
-          <a:p>
-            <a:pPr algn="ctr"/>
-            <a:endParaRPr lang="en-SG"/>
-          </a:p>
-        </p:txBody>
-      </p:sp>
       <p:sp>
         <p:nvSpPr>
           <p:cNvPr id="116" name="Freeform 115"/>
@@ -5336,8 +5069,8 @@
         </p:nvSpPr>
         <p:spPr>
           <a:xfrm>
-            <a:off x="3493012" y="1643682"/>
-            <a:ext cx="3537529" cy="45719"/>
+            <a:off x="2544847" y="914400"/>
+            <a:ext cx="5786477" cy="58925"/>
           </a:xfrm>
           <a:custGeom>
             <a:avLst/>
@@ -5465,14 +5198,20 @@
       </p:sp>
       <p:sp>
         <p:nvSpPr>
-          <p:cNvPr id="118" name="Freeform 117"/>
+          <p:cNvPr id="45" name="Freeform 117">
+            <a:extLst>
+              <a:ext uri="{FF2B5EF4-FFF2-40B4-BE49-F238E27FC236}">
+                <a16:creationId xmlns:a16="http://schemas.microsoft.com/office/drawing/2014/main" id="{07A19E23-C4A7-4A7D-9549-AE5EB1EB8940}"/>
+              </a:ext>
+            </a:extLst>
+          </p:cNvPr>
           <p:cNvSpPr/>
           <p:nvPr/>
         </p:nvSpPr>
         <p:spPr>
           <a:xfrm flipV="1">
-            <a:off x="4421334" y="4396510"/>
-            <a:ext cx="2642195" cy="101600"/>
+            <a:off x="5726658" y="2327518"/>
+            <a:ext cx="2604360" cy="140996"/>
           </a:xfrm>
           <a:custGeom>
             <a:avLst/>
@@ -5547,10 +5286,10 @@
       </p:sp>
       <p:sp>
         <p:nvSpPr>
-          <p:cNvPr id="42" name="Rectangle 11">
+          <p:cNvPr id="48" name="Freeform 117">
             <a:extLst>
               <a:ext uri="{FF2B5EF4-FFF2-40B4-BE49-F238E27FC236}">
-                <a16:creationId xmlns:a16="http://schemas.microsoft.com/office/drawing/2014/main" id="{93275EE9-C2B9-422D-9421-63CBC62A18E4}"/>
+                <a16:creationId xmlns:a16="http://schemas.microsoft.com/office/drawing/2014/main" id="{A5F759FE-52CA-423A-A4E8-77CB6F4F5A5B}"/>
               </a:ext>
             </a:extLst>
           </p:cNvPr>
@@ -5558,75 +5297,9 @@
           <p:nvPr/>
         </p:nvSpPr>
         <p:spPr>
-          <a:xfrm>
-            <a:off x="4283752" y="3119337"/>
-            <a:ext cx="1274954" cy="230829"/>
-          </a:xfrm>
-          <a:prstGeom prst="rect">
-            <a:avLst/>
-          </a:prstGeom>
-          <a:ln w="19050">
-            <a:solidFill>
-              <a:schemeClr val="accent3"/>
-            </a:solidFill>
-          </a:ln>
-          <a:effectLst/>
-        </p:spPr>
-        <p:style>
-          <a:lnRef idx="1">
-            <a:schemeClr val="accent3"/>
-          </a:lnRef>
-          <a:fillRef idx="2">
-            <a:schemeClr val="accent3"/>
-          </a:fillRef>
-          <a:effectRef idx="1">
-            <a:schemeClr val="accent3"/>
-          </a:effectRef>
-          <a:fontRef idx="minor">
-            <a:schemeClr val="dk1"/>
-          </a:fontRef>
-        </p:style>
-        <p:txBody>
-          <a:bodyPr rtlCol="0" anchor="ctr"/>
-          <a:lstStyle/>
-          <a:p>
-            <a:pPr algn="ctr"/>
-            <a:r>
-              <a:rPr lang="en-US" sz="1050" b="1" dirty="0">
-                <a:solidFill>
-                  <a:schemeClr val="accent3">
-                    <a:lumMod val="75000"/>
-                  </a:schemeClr>
-                </a:solidFill>
-              </a:rPr>
-              <a:t>TableCard</a:t>
-            </a:r>
-            <a:endParaRPr lang="en-SG" sz="1050" b="1" dirty="0">
-              <a:solidFill>
-                <a:schemeClr val="accent3">
-                  <a:lumMod val="75000"/>
-                </a:schemeClr>
-              </a:solidFill>
-            </a:endParaRPr>
-          </a:p>
-        </p:txBody>
-      </p:sp>
-      <p:sp>
-        <p:nvSpPr>
-          <p:cNvPr id="45" name="Freeform 117">
-            <a:extLst>
-              <a:ext uri="{FF2B5EF4-FFF2-40B4-BE49-F238E27FC236}">
-                <a16:creationId xmlns:a16="http://schemas.microsoft.com/office/drawing/2014/main" id="{07A19E23-C4A7-4A7D-9549-AE5EB1EB8940}"/>
-              </a:ext>
-            </a:extLst>
-          </p:cNvPr>
-          <p:cNvSpPr/>
-          <p:nvPr/>
-        </p:nvSpPr>
-        <p:spPr>
           <a:xfrm flipV="1">
-            <a:off x="4421334" y="3363244"/>
-            <a:ext cx="2642195" cy="101600"/>
+            <a:off x="5752864" y="2825175"/>
+            <a:ext cx="2588149" cy="176739"/>
           </a:xfrm>
           <a:custGeom>
             <a:avLst/>
@@ -5699,12 +5372,108 @@
           </a:p>
         </p:txBody>
       </p:sp>
-      <p:sp>
-        <p:nvSpPr>
-          <p:cNvPr id="46" name="Rectangle 11">
+      <p:cxnSp>
+        <p:nvCxnSpPr>
+          <p:cNvPr id="54" name="Elbow Connector 136">
             <a:extLst>
               <a:ext uri="{FF2B5EF4-FFF2-40B4-BE49-F238E27FC236}">
-                <a16:creationId xmlns:a16="http://schemas.microsoft.com/office/drawing/2014/main" id="{CF41DF3E-BFEE-446C-AD0E-7A6DA7A36889}"/>
+                <a16:creationId xmlns:a16="http://schemas.microsoft.com/office/drawing/2014/main" id="{5A1C362D-D0D2-4BE7-8125-B31F0A7D7C40}"/>
+              </a:ext>
+            </a:extLst>
+          </p:cNvPr>
+          <p:cNvCxnSpPr>
+            <a:cxnSpLocks/>
+            <a:stCxn id="34" idx="2"/>
+            <a:endCxn id="239" idx="1"/>
+          </p:cNvCxnSpPr>
+          <p:nvPr/>
+        </p:nvCxnSpPr>
+        <p:spPr>
+          <a:xfrm rot="16200000" flipH="1">
+            <a:off x="4426657" y="1228464"/>
+            <a:ext cx="78461" cy="1962617"/>
+          </a:xfrm>
+          <a:prstGeom prst="bentConnector2">
+            <a:avLst/>
+          </a:prstGeom>
+          <a:ln w="19050">
+            <a:solidFill>
+              <a:schemeClr val="accent3"/>
+            </a:solidFill>
+            <a:headEnd type="none" w="med" len="med"/>
+            <a:tailEnd type="arrow" w="med" len="med"/>
+          </a:ln>
+          <a:effectLst/>
+        </p:spPr>
+        <p:style>
+          <a:lnRef idx="1">
+            <a:schemeClr val="accent2"/>
+          </a:lnRef>
+          <a:fillRef idx="2">
+            <a:schemeClr val="accent2"/>
+          </a:fillRef>
+          <a:effectRef idx="1">
+            <a:schemeClr val="accent2"/>
+          </a:effectRef>
+          <a:fontRef idx="minor">
+            <a:schemeClr val="dk1"/>
+          </a:fontRef>
+        </p:style>
+      </p:cxnSp>
+      <p:cxnSp>
+        <p:nvCxnSpPr>
+          <p:cNvPr id="55" name="Elbow Connector 136">
+            <a:extLst>
+              <a:ext uri="{FF2B5EF4-FFF2-40B4-BE49-F238E27FC236}">
+                <a16:creationId xmlns:a16="http://schemas.microsoft.com/office/drawing/2014/main" id="{125553B7-4DAF-44A8-B43F-E765662E772E}"/>
+              </a:ext>
+            </a:extLst>
+          </p:cNvPr>
+          <p:cNvCxnSpPr>
+            <a:cxnSpLocks/>
+            <a:stCxn id="85" idx="2"/>
+            <a:endCxn id="238" idx="1"/>
+          </p:cNvCxnSpPr>
+          <p:nvPr/>
+        </p:nvCxnSpPr>
+        <p:spPr>
+          <a:xfrm rot="16200000" flipH="1">
+            <a:off x="4414339" y="1753329"/>
+            <a:ext cx="100614" cy="1951406"/>
+          </a:xfrm>
+          <a:prstGeom prst="bentConnector2">
+            <a:avLst/>
+          </a:prstGeom>
+          <a:ln w="19050">
+            <a:solidFill>
+              <a:schemeClr val="accent3"/>
+            </a:solidFill>
+            <a:headEnd type="none" w="med" len="med"/>
+            <a:tailEnd type="arrow" w="med" len="med"/>
+          </a:ln>
+          <a:effectLst/>
+        </p:spPr>
+        <p:style>
+          <a:lnRef idx="1">
+            <a:schemeClr val="accent2"/>
+          </a:lnRef>
+          <a:fillRef idx="2">
+            <a:schemeClr val="accent2"/>
+          </a:fillRef>
+          <a:effectRef idx="1">
+            <a:schemeClr val="accent2"/>
+          </a:effectRef>
+          <a:fontRef idx="minor">
+            <a:schemeClr val="dk1"/>
+          </a:fontRef>
+        </p:style>
+      </p:cxnSp>
+      <p:sp>
+        <p:nvSpPr>
+          <p:cNvPr id="85" name="Rectangle 11">
+            <a:extLst>
+              <a:ext uri="{FF2B5EF4-FFF2-40B4-BE49-F238E27FC236}">
+                <a16:creationId xmlns:a16="http://schemas.microsoft.com/office/drawing/2014/main" id="{C3EDF5F5-0B9A-4EC0-BFD0-5772AB173BAE}"/>
               </a:ext>
             </a:extLst>
           </p:cNvPr>
@@ -5713,8 +5482,8 @@
         </p:nvSpPr>
         <p:spPr>
           <a:xfrm>
-            <a:off x="4283752" y="3561235"/>
-            <a:ext cx="1274955" cy="230829"/>
+            <a:off x="2702982" y="2431146"/>
+            <a:ext cx="1571921" cy="247579"/>
           </a:xfrm>
           <a:prstGeom prst="rect">
             <a:avLst/>
@@ -5746,14 +5515,14 @@
           <a:p>
             <a:pPr algn="ctr"/>
             <a:r>
-              <a:rPr lang="en-US" sz="1050" b="1">
+              <a:rPr lang="en-US" sz="1050" b="1" dirty="0" err="1">
                 <a:solidFill>
                   <a:schemeClr val="accent3">
                     <a:lumMod val="75000"/>
                   </a:schemeClr>
                 </a:solidFill>
               </a:rPr>
-              <a:t>StatsCard</a:t>
+              <a:t>TableFlowPanel</a:t>
             </a:r>
             <a:endParaRPr lang="en-SG" sz="1050" b="1" dirty="0">
               <a:solidFill>
@@ -5765,12 +5534,60 @@
           </a:p>
         </p:txBody>
       </p:sp>
-      <p:sp>
-        <p:nvSpPr>
-          <p:cNvPr id="48" name="Freeform 117">
+      <p:cxnSp>
+        <p:nvCxnSpPr>
+          <p:cNvPr id="92" name="Elbow Connector 63">
             <a:extLst>
               <a:ext uri="{FF2B5EF4-FFF2-40B4-BE49-F238E27FC236}">
-                <a16:creationId xmlns:a16="http://schemas.microsoft.com/office/drawing/2014/main" id="{A5F759FE-52CA-423A-A4E8-77CB6F4F5A5B}"/>
+                <a16:creationId xmlns:a16="http://schemas.microsoft.com/office/drawing/2014/main" id="{18D81F03-E483-46FA-B8C6-7780BD6E5D61}"/>
+              </a:ext>
+            </a:extLst>
+          </p:cNvPr>
+          <p:cNvCxnSpPr>
+            <a:cxnSpLocks/>
+            <a:stCxn id="39" idx="2"/>
+            <a:endCxn id="85" idx="1"/>
+          </p:cNvCxnSpPr>
+          <p:nvPr/>
+        </p:nvCxnSpPr>
+        <p:spPr>
+          <a:xfrm rot="16200000" flipH="1">
+            <a:off x="1645518" y="1497472"/>
+            <a:ext cx="1183336" cy="931591"/>
+          </a:xfrm>
+          <a:prstGeom prst="bentConnector2">
+            <a:avLst/>
+          </a:prstGeom>
+          <a:ln w="19050">
+            <a:solidFill>
+              <a:schemeClr val="accent3"/>
+            </a:solidFill>
+            <a:headEnd type="none" w="med" len="med"/>
+            <a:tailEnd type="arrow" w="med" len="med"/>
+          </a:ln>
+          <a:effectLst/>
+        </p:spPr>
+        <p:style>
+          <a:lnRef idx="1">
+            <a:schemeClr val="accent2"/>
+          </a:lnRef>
+          <a:fillRef idx="2">
+            <a:schemeClr val="accent2"/>
+          </a:fillRef>
+          <a:effectRef idx="1">
+            <a:schemeClr val="accent2"/>
+          </a:effectRef>
+          <a:fontRef idx="minor">
+            <a:schemeClr val="dk1"/>
+          </a:fontRef>
+        </p:style>
+      </p:cxnSp>
+      <p:sp>
+        <p:nvSpPr>
+          <p:cNvPr id="93" name="Rectangle 11">
+            <a:extLst>
+              <a:ext uri="{FF2B5EF4-FFF2-40B4-BE49-F238E27FC236}">
+                <a16:creationId xmlns:a16="http://schemas.microsoft.com/office/drawing/2014/main" id="{E92BEE96-F82B-471A-AE47-9BBF5440458F}"/>
               </a:ext>
             </a:extLst>
           </p:cNvPr>
@@ -5778,9 +5595,1145 @@
           <p:nvPr/>
         </p:nvSpPr>
         <p:spPr>
+          <a:xfrm>
+            <a:off x="2673003" y="5486400"/>
+            <a:ext cx="1604097" cy="230631"/>
+          </a:xfrm>
+          <a:prstGeom prst="rect">
+            <a:avLst/>
+          </a:prstGeom>
+          <a:ln w="19050">
+            <a:solidFill>
+              <a:schemeClr val="accent3"/>
+            </a:solidFill>
+          </a:ln>
+          <a:effectLst/>
+        </p:spPr>
+        <p:style>
+          <a:lnRef idx="1">
+            <a:schemeClr val="accent3"/>
+          </a:lnRef>
+          <a:fillRef idx="2">
+            <a:schemeClr val="accent3"/>
+          </a:fillRef>
+          <a:effectRef idx="1">
+            <a:schemeClr val="accent3"/>
+          </a:effectRef>
+          <a:fontRef idx="minor">
+            <a:schemeClr val="dk1"/>
+          </a:fontRef>
+        </p:style>
+        <p:txBody>
+          <a:bodyPr rtlCol="0" anchor="ctr"/>
+          <a:lstStyle/>
+          <a:p>
+            <a:pPr algn="ctr"/>
+            <a:r>
+              <a:rPr lang="en-US" sz="1050" b="1" dirty="0" err="1">
+                <a:solidFill>
+                  <a:schemeClr val="accent3">
+                    <a:lumMod val="75000"/>
+                  </a:schemeClr>
+                </a:solidFill>
+              </a:rPr>
+              <a:t>StatisticsFlowPanel</a:t>
+            </a:r>
+            <a:endParaRPr lang="en-SG" sz="1050" b="1" dirty="0">
+              <a:solidFill>
+                <a:schemeClr val="accent3">
+                  <a:lumMod val="75000"/>
+                </a:schemeClr>
+              </a:solidFill>
+            </a:endParaRPr>
+          </a:p>
+        </p:txBody>
+      </p:sp>
+      <p:sp>
+        <p:nvSpPr>
+          <p:cNvPr id="105" name="Rectangle 11">
+            <a:extLst>
+              <a:ext uri="{FF2B5EF4-FFF2-40B4-BE49-F238E27FC236}">
+                <a16:creationId xmlns:a16="http://schemas.microsoft.com/office/drawing/2014/main" id="{557A4EA9-6E95-4E05-8D2A-6BCCE49D546F}"/>
+              </a:ext>
+            </a:extLst>
+          </p:cNvPr>
+          <p:cNvSpPr/>
+          <p:nvPr/>
+        </p:nvSpPr>
+        <p:spPr>
+          <a:xfrm>
+            <a:off x="2677444" y="4419600"/>
+            <a:ext cx="1583943" cy="228600"/>
+          </a:xfrm>
+          <a:prstGeom prst="rect">
+            <a:avLst/>
+          </a:prstGeom>
+          <a:ln w="19050">
+            <a:solidFill>
+              <a:schemeClr val="accent3"/>
+            </a:solidFill>
+          </a:ln>
+          <a:effectLst/>
+        </p:spPr>
+        <p:style>
+          <a:lnRef idx="1">
+            <a:schemeClr val="accent3"/>
+          </a:lnRef>
+          <a:fillRef idx="2">
+            <a:schemeClr val="accent3"/>
+          </a:fillRef>
+          <a:effectRef idx="1">
+            <a:schemeClr val="accent3"/>
+          </a:effectRef>
+          <a:fontRef idx="minor">
+            <a:schemeClr val="dk1"/>
+          </a:fontRef>
+        </p:style>
+        <p:txBody>
+          <a:bodyPr rtlCol="0" anchor="ctr"/>
+          <a:lstStyle/>
+          <a:p>
+            <a:pPr algn="ctr"/>
+            <a:r>
+              <a:rPr lang="en-US" sz="1050" b="1" dirty="0" err="1">
+                <a:solidFill>
+                  <a:schemeClr val="accent3">
+                    <a:lumMod val="75000"/>
+                  </a:schemeClr>
+                </a:solidFill>
+              </a:rPr>
+              <a:t>BillPanel</a:t>
+            </a:r>
+            <a:endParaRPr lang="en-SG" sz="1050" b="1" dirty="0">
+              <a:solidFill>
+                <a:schemeClr val="accent3">
+                  <a:lumMod val="75000"/>
+                </a:schemeClr>
+              </a:solidFill>
+            </a:endParaRPr>
+          </a:p>
+        </p:txBody>
+      </p:sp>
+      <p:cxnSp>
+        <p:nvCxnSpPr>
+          <p:cNvPr id="186" name="Elbow Connector 63">
+            <a:extLst>
+              <a:ext uri="{FF2B5EF4-FFF2-40B4-BE49-F238E27FC236}">
+                <a16:creationId xmlns:a16="http://schemas.microsoft.com/office/drawing/2014/main" id="{4817D36C-CB6A-4B14-885E-1F5FCC59BD57}"/>
+              </a:ext>
+            </a:extLst>
+          </p:cNvPr>
+          <p:cNvCxnSpPr>
+            <a:cxnSpLocks/>
+            <a:stCxn id="16" idx="3"/>
+            <a:endCxn id="105" idx="3"/>
+          </p:cNvCxnSpPr>
+          <p:nvPr/>
+        </p:nvCxnSpPr>
+        <p:spPr>
+          <a:xfrm rot="5400000">
+            <a:off x="3965905" y="1103570"/>
+            <a:ext cx="3725813" cy="3134847"/>
+          </a:xfrm>
+          <a:prstGeom prst="bentConnector2">
+            <a:avLst/>
+          </a:prstGeom>
+          <a:ln w="6350">
+            <a:solidFill>
+              <a:schemeClr val="accent3"/>
+            </a:solidFill>
+            <a:headEnd type="none" w="med" len="med"/>
+            <a:tailEnd type="none" w="med" len="med"/>
+          </a:ln>
+          <a:effectLst/>
+        </p:spPr>
+        <p:style>
+          <a:lnRef idx="1">
+            <a:schemeClr val="accent2"/>
+          </a:lnRef>
+          <a:fillRef idx="2">
+            <a:schemeClr val="accent2"/>
+          </a:fillRef>
+          <a:effectRef idx="1">
+            <a:schemeClr val="accent2"/>
+          </a:effectRef>
+          <a:fontRef idx="minor">
+            <a:schemeClr val="dk1"/>
+          </a:fontRef>
+        </p:style>
+      </p:cxnSp>
+      <p:cxnSp>
+        <p:nvCxnSpPr>
+          <p:cNvPr id="189" name="Elbow Connector 63">
+            <a:extLst>
+              <a:ext uri="{FF2B5EF4-FFF2-40B4-BE49-F238E27FC236}">
+                <a16:creationId xmlns:a16="http://schemas.microsoft.com/office/drawing/2014/main" id="{2B1E7F3B-0ABC-4F02-9C61-11217F7B11F7}"/>
+              </a:ext>
+            </a:extLst>
+          </p:cNvPr>
+          <p:cNvCxnSpPr>
+            <a:cxnSpLocks/>
+            <a:stCxn id="39" idx="2"/>
+            <a:endCxn id="105" idx="1"/>
+          </p:cNvCxnSpPr>
+          <p:nvPr/>
+        </p:nvCxnSpPr>
+        <p:spPr>
+          <a:xfrm rot="16200000" flipH="1">
+            <a:off x="643267" y="2499723"/>
+            <a:ext cx="3162300" cy="906053"/>
+          </a:xfrm>
+          <a:prstGeom prst="bentConnector2">
+            <a:avLst/>
+          </a:prstGeom>
+          <a:ln w="19050">
+            <a:solidFill>
+              <a:schemeClr val="accent3"/>
+            </a:solidFill>
+            <a:headEnd type="none" w="med" len="med"/>
+            <a:tailEnd type="arrow" w="med" len="med"/>
+          </a:ln>
+          <a:effectLst/>
+        </p:spPr>
+        <p:style>
+          <a:lnRef idx="1">
+            <a:schemeClr val="accent2"/>
+          </a:lnRef>
+          <a:fillRef idx="2">
+            <a:schemeClr val="accent2"/>
+          </a:fillRef>
+          <a:effectRef idx="1">
+            <a:schemeClr val="accent2"/>
+          </a:effectRef>
+          <a:fontRef idx="minor">
+            <a:schemeClr val="dk1"/>
+          </a:fontRef>
+        </p:style>
+      </p:cxnSp>
+      <p:sp>
+        <p:nvSpPr>
+          <p:cNvPr id="238" name="Rectangle 11">
+            <a:extLst>
+              <a:ext uri="{FF2B5EF4-FFF2-40B4-BE49-F238E27FC236}">
+                <a16:creationId xmlns:a16="http://schemas.microsoft.com/office/drawing/2014/main" id="{0CCFDB88-F73F-476C-AA5F-AD1309D87FA2}"/>
+              </a:ext>
+            </a:extLst>
+          </p:cNvPr>
+          <p:cNvSpPr/>
+          <p:nvPr/>
+        </p:nvSpPr>
+        <p:spPr>
+          <a:xfrm>
+            <a:off x="5440349" y="2638345"/>
+            <a:ext cx="1591912" cy="281987"/>
+          </a:xfrm>
+          <a:prstGeom prst="rect">
+            <a:avLst/>
+          </a:prstGeom>
+          <a:ln w="19050">
+            <a:solidFill>
+              <a:schemeClr val="accent3"/>
+            </a:solidFill>
+          </a:ln>
+          <a:effectLst/>
+        </p:spPr>
+        <p:style>
+          <a:lnRef idx="1">
+            <a:schemeClr val="accent3"/>
+          </a:lnRef>
+          <a:fillRef idx="2">
+            <a:schemeClr val="accent3"/>
+          </a:fillRef>
+          <a:effectRef idx="1">
+            <a:schemeClr val="accent3"/>
+          </a:effectRef>
+          <a:fontRef idx="minor">
+            <a:schemeClr val="dk1"/>
+          </a:fontRef>
+        </p:style>
+        <p:txBody>
+          <a:bodyPr rtlCol="0" anchor="ctr"/>
+          <a:lstStyle/>
+          <a:p>
+            <a:pPr algn="ctr"/>
+            <a:r>
+              <a:rPr lang="en-US" sz="1050" b="1" dirty="0" err="1">
+                <a:solidFill>
+                  <a:schemeClr val="accent3">
+                    <a:lumMod val="75000"/>
+                  </a:schemeClr>
+                </a:solidFill>
+              </a:rPr>
+              <a:t>TableCard</a:t>
+            </a:r>
+            <a:endParaRPr lang="en-SG" sz="1050" b="1" dirty="0">
+              <a:solidFill>
+                <a:schemeClr val="accent3">
+                  <a:lumMod val="75000"/>
+                </a:schemeClr>
+              </a:solidFill>
+            </a:endParaRPr>
+          </a:p>
+        </p:txBody>
+      </p:sp>
+      <p:sp>
+        <p:nvSpPr>
+          <p:cNvPr id="239" name="Rectangle 11">
+            <a:extLst>
+              <a:ext uri="{FF2B5EF4-FFF2-40B4-BE49-F238E27FC236}">
+                <a16:creationId xmlns:a16="http://schemas.microsoft.com/office/drawing/2014/main" id="{322B0B19-1502-41EE-90C0-63DF0C4212D9}"/>
+              </a:ext>
+            </a:extLst>
+          </p:cNvPr>
+          <p:cNvSpPr/>
+          <p:nvPr/>
+        </p:nvSpPr>
+        <p:spPr>
+          <a:xfrm>
+            <a:off x="5447196" y="2107336"/>
+            <a:ext cx="1585065" cy="283335"/>
+          </a:xfrm>
+          <a:prstGeom prst="rect">
+            <a:avLst/>
+          </a:prstGeom>
+          <a:ln w="19050">
+            <a:solidFill>
+              <a:schemeClr val="accent3"/>
+            </a:solidFill>
+          </a:ln>
+          <a:effectLst/>
+        </p:spPr>
+        <p:style>
+          <a:lnRef idx="1">
+            <a:schemeClr val="accent3"/>
+          </a:lnRef>
+          <a:fillRef idx="2">
+            <a:schemeClr val="accent3"/>
+          </a:fillRef>
+          <a:effectRef idx="1">
+            <a:schemeClr val="accent3"/>
+          </a:effectRef>
+          <a:fontRef idx="minor">
+            <a:schemeClr val="dk1"/>
+          </a:fontRef>
+        </p:style>
+        <p:txBody>
+          <a:bodyPr rtlCol="0" anchor="ctr"/>
+          <a:lstStyle/>
+          <a:p>
+            <a:pPr algn="ctr"/>
+            <a:r>
+              <a:rPr lang="en-US" sz="1050" b="1" dirty="0" err="1">
+                <a:solidFill>
+                  <a:schemeClr val="accent3">
+                    <a:lumMod val="75000"/>
+                  </a:schemeClr>
+                </a:solidFill>
+              </a:rPr>
+              <a:t>OrderItemCard</a:t>
+            </a:r>
+            <a:endParaRPr lang="en-SG" sz="1050" b="1" dirty="0">
+              <a:solidFill>
+                <a:schemeClr val="accent3">
+                  <a:lumMod val="75000"/>
+                </a:schemeClr>
+              </a:solidFill>
+            </a:endParaRPr>
+          </a:p>
+        </p:txBody>
+      </p:sp>
+      <p:sp>
+        <p:nvSpPr>
+          <p:cNvPr id="243" name="Rectangle 11">
+            <a:extLst>
+              <a:ext uri="{FF2B5EF4-FFF2-40B4-BE49-F238E27FC236}">
+                <a16:creationId xmlns:a16="http://schemas.microsoft.com/office/drawing/2014/main" id="{72AA3FF6-BB33-4CB5-8BD7-6553507AE728}"/>
+              </a:ext>
+            </a:extLst>
+          </p:cNvPr>
+          <p:cNvSpPr/>
+          <p:nvPr/>
+        </p:nvSpPr>
+        <p:spPr>
+          <a:xfrm>
+            <a:off x="2708344" y="2925713"/>
+            <a:ext cx="1563805" cy="328325"/>
+          </a:xfrm>
+          <a:prstGeom prst="rect">
+            <a:avLst/>
+          </a:prstGeom>
+          <a:ln w="19050">
+            <a:solidFill>
+              <a:schemeClr val="accent3"/>
+            </a:solidFill>
+          </a:ln>
+          <a:effectLst/>
+        </p:spPr>
+        <p:style>
+          <a:lnRef idx="1">
+            <a:schemeClr val="accent3"/>
+          </a:lnRef>
+          <a:fillRef idx="2">
+            <a:schemeClr val="accent3"/>
+          </a:fillRef>
+          <a:effectRef idx="1">
+            <a:schemeClr val="accent3"/>
+          </a:effectRef>
+          <a:fontRef idx="minor">
+            <a:schemeClr val="dk1"/>
+          </a:fontRef>
+        </p:style>
+        <p:txBody>
+          <a:bodyPr rtlCol="0" anchor="ctr"/>
+          <a:lstStyle/>
+          <a:p>
+            <a:pPr algn="ctr"/>
+            <a:r>
+              <a:rPr lang="en-US" sz="1050" b="1" dirty="0" err="1">
+                <a:solidFill>
+                  <a:schemeClr val="accent3">
+                    <a:lumMod val="75000"/>
+                  </a:schemeClr>
+                </a:solidFill>
+              </a:rPr>
+              <a:t>MenuItemFlowPanel</a:t>
+            </a:r>
+            <a:endParaRPr lang="en-SG" sz="1050" b="1" dirty="0">
+              <a:solidFill>
+                <a:schemeClr val="accent3">
+                  <a:lumMod val="75000"/>
+                </a:schemeClr>
+              </a:solidFill>
+            </a:endParaRPr>
+          </a:p>
+        </p:txBody>
+      </p:sp>
+      <p:sp>
+        <p:nvSpPr>
+          <p:cNvPr id="246" name="Rectangle 11">
+            <a:extLst>
+              <a:ext uri="{FF2B5EF4-FFF2-40B4-BE49-F238E27FC236}">
+                <a16:creationId xmlns:a16="http://schemas.microsoft.com/office/drawing/2014/main" id="{47A45DE4-02E9-4216-B5C3-DE366F2B26A3}"/>
+              </a:ext>
+            </a:extLst>
+          </p:cNvPr>
+          <p:cNvSpPr/>
+          <p:nvPr/>
+        </p:nvSpPr>
+        <p:spPr>
+          <a:xfrm>
+            <a:off x="2696343" y="3507996"/>
+            <a:ext cx="1586560" cy="305100"/>
+          </a:xfrm>
+          <a:prstGeom prst="rect">
+            <a:avLst/>
+          </a:prstGeom>
+          <a:ln w="19050">
+            <a:solidFill>
+              <a:schemeClr val="accent3"/>
+            </a:solidFill>
+          </a:ln>
+          <a:effectLst/>
+        </p:spPr>
+        <p:style>
+          <a:lnRef idx="1">
+            <a:schemeClr val="accent3"/>
+          </a:lnRef>
+          <a:fillRef idx="2">
+            <a:schemeClr val="accent3"/>
+          </a:fillRef>
+          <a:effectRef idx="1">
+            <a:schemeClr val="accent3"/>
+          </a:effectRef>
+          <a:fontRef idx="minor">
+            <a:schemeClr val="dk1"/>
+          </a:fontRef>
+        </p:style>
+        <p:txBody>
+          <a:bodyPr rtlCol="0" anchor="ctr"/>
+          <a:lstStyle/>
+          <a:p>
+            <a:pPr algn="ctr"/>
+            <a:r>
+              <a:rPr lang="en-US" sz="1050" b="1" dirty="0" err="1">
+                <a:solidFill>
+                  <a:schemeClr val="accent3">
+                    <a:lumMod val="75000"/>
+                  </a:schemeClr>
+                </a:solidFill>
+              </a:rPr>
+              <a:t>MenuListPanel</a:t>
+            </a:r>
+            <a:endParaRPr lang="en-SG" sz="1050" b="1" dirty="0">
+              <a:solidFill>
+                <a:schemeClr val="accent3">
+                  <a:lumMod val="75000"/>
+                </a:schemeClr>
+              </a:solidFill>
+            </a:endParaRPr>
+          </a:p>
+        </p:txBody>
+      </p:sp>
+      <p:sp>
+        <p:nvSpPr>
+          <p:cNvPr id="247" name="Rectangle 11">
+            <a:extLst>
+              <a:ext uri="{FF2B5EF4-FFF2-40B4-BE49-F238E27FC236}">
+                <a16:creationId xmlns:a16="http://schemas.microsoft.com/office/drawing/2014/main" id="{6F4AF6F8-0600-4B76-8610-44C85CFCA376}"/>
+              </a:ext>
+            </a:extLst>
+          </p:cNvPr>
+          <p:cNvSpPr/>
+          <p:nvPr/>
+        </p:nvSpPr>
+        <p:spPr>
+          <a:xfrm>
+            <a:off x="2708344" y="3977258"/>
+            <a:ext cx="1553043" cy="289942"/>
+          </a:xfrm>
+          <a:prstGeom prst="rect">
+            <a:avLst/>
+          </a:prstGeom>
+          <a:ln w="19050">
+            <a:solidFill>
+              <a:schemeClr val="accent3"/>
+            </a:solidFill>
+          </a:ln>
+          <a:effectLst/>
+        </p:spPr>
+        <p:style>
+          <a:lnRef idx="1">
+            <a:schemeClr val="accent3"/>
+          </a:lnRef>
+          <a:fillRef idx="2">
+            <a:schemeClr val="accent3"/>
+          </a:fillRef>
+          <a:effectRef idx="1">
+            <a:schemeClr val="accent3"/>
+          </a:effectRef>
+          <a:fontRef idx="minor">
+            <a:schemeClr val="dk1"/>
+          </a:fontRef>
+        </p:style>
+        <p:txBody>
+          <a:bodyPr rtlCol="0" anchor="ctr"/>
+          <a:lstStyle/>
+          <a:p>
+            <a:pPr algn="ctr"/>
+            <a:r>
+              <a:rPr lang="en-US" sz="1050" b="1" dirty="0" err="1">
+                <a:solidFill>
+                  <a:schemeClr val="accent3">
+                    <a:lumMod val="75000"/>
+                  </a:schemeClr>
+                </a:solidFill>
+              </a:rPr>
+              <a:t>PopularMenuListPanel</a:t>
+            </a:r>
+            <a:endParaRPr lang="en-SG" sz="1050" b="1" dirty="0">
+              <a:solidFill>
+                <a:schemeClr val="accent3">
+                  <a:lumMod val="75000"/>
+                </a:schemeClr>
+              </a:solidFill>
+            </a:endParaRPr>
+          </a:p>
+        </p:txBody>
+      </p:sp>
+      <p:cxnSp>
+        <p:nvCxnSpPr>
+          <p:cNvPr id="253" name="Elbow Connector 63">
+            <a:extLst>
+              <a:ext uri="{FF2B5EF4-FFF2-40B4-BE49-F238E27FC236}">
+                <a16:creationId xmlns:a16="http://schemas.microsoft.com/office/drawing/2014/main" id="{CD323D01-5F2D-40F6-892F-AFE1E579F8E2}"/>
+              </a:ext>
+            </a:extLst>
+          </p:cNvPr>
+          <p:cNvCxnSpPr>
+            <a:cxnSpLocks/>
+            <a:stCxn id="39" idx="2"/>
+            <a:endCxn id="243" idx="1"/>
+          </p:cNvCxnSpPr>
+          <p:nvPr/>
+        </p:nvCxnSpPr>
+        <p:spPr>
+          <a:xfrm rot="16200000" flipH="1">
+            <a:off x="1380729" y="1762261"/>
+            <a:ext cx="1718276" cy="936953"/>
+          </a:xfrm>
+          <a:prstGeom prst="bentConnector2">
+            <a:avLst/>
+          </a:prstGeom>
+          <a:ln w="19050">
+            <a:solidFill>
+              <a:schemeClr val="accent3"/>
+            </a:solidFill>
+            <a:headEnd type="none" w="med" len="med"/>
+            <a:tailEnd type="arrow" w="med" len="med"/>
+          </a:ln>
+          <a:effectLst/>
+        </p:spPr>
+        <p:style>
+          <a:lnRef idx="1">
+            <a:schemeClr val="accent2"/>
+          </a:lnRef>
+          <a:fillRef idx="2">
+            <a:schemeClr val="accent2"/>
+          </a:fillRef>
+          <a:effectRef idx="1">
+            <a:schemeClr val="accent2"/>
+          </a:effectRef>
+          <a:fontRef idx="minor">
+            <a:schemeClr val="dk1"/>
+          </a:fontRef>
+        </p:style>
+      </p:cxnSp>
+      <p:cxnSp>
+        <p:nvCxnSpPr>
+          <p:cNvPr id="256" name="Elbow Connector 63">
+            <a:extLst>
+              <a:ext uri="{FF2B5EF4-FFF2-40B4-BE49-F238E27FC236}">
+                <a16:creationId xmlns:a16="http://schemas.microsoft.com/office/drawing/2014/main" id="{67FBEB2C-FABE-4506-B256-F931F6597970}"/>
+              </a:ext>
+            </a:extLst>
+          </p:cNvPr>
+          <p:cNvCxnSpPr>
+            <a:cxnSpLocks/>
+            <a:stCxn id="39" idx="2"/>
+            <a:endCxn id="246" idx="1"/>
+          </p:cNvCxnSpPr>
+          <p:nvPr/>
+        </p:nvCxnSpPr>
+        <p:spPr>
+          <a:xfrm rot="16200000" flipH="1">
+            <a:off x="1089394" y="2053597"/>
+            <a:ext cx="2288946" cy="924952"/>
+          </a:xfrm>
+          <a:prstGeom prst="bentConnector2">
+            <a:avLst/>
+          </a:prstGeom>
+          <a:ln w="19050">
+            <a:solidFill>
+              <a:schemeClr val="accent3"/>
+            </a:solidFill>
+            <a:headEnd type="none" w="med" len="med"/>
+            <a:tailEnd type="arrow" w="med" len="med"/>
+          </a:ln>
+          <a:effectLst/>
+        </p:spPr>
+        <p:style>
+          <a:lnRef idx="1">
+            <a:schemeClr val="accent2"/>
+          </a:lnRef>
+          <a:fillRef idx="2">
+            <a:schemeClr val="accent2"/>
+          </a:fillRef>
+          <a:effectRef idx="1">
+            <a:schemeClr val="accent2"/>
+          </a:effectRef>
+          <a:fontRef idx="minor">
+            <a:schemeClr val="dk1"/>
+          </a:fontRef>
+        </p:style>
+      </p:cxnSp>
+      <p:cxnSp>
+        <p:nvCxnSpPr>
+          <p:cNvPr id="259" name="Elbow Connector 63">
+            <a:extLst>
+              <a:ext uri="{FF2B5EF4-FFF2-40B4-BE49-F238E27FC236}">
+                <a16:creationId xmlns:a16="http://schemas.microsoft.com/office/drawing/2014/main" id="{9E7612D7-4993-4445-A8B1-7803430F3002}"/>
+              </a:ext>
+            </a:extLst>
+          </p:cNvPr>
+          <p:cNvCxnSpPr>
+            <a:cxnSpLocks/>
+            <a:stCxn id="39" idx="2"/>
+            <a:endCxn id="247" idx="1"/>
+          </p:cNvCxnSpPr>
+          <p:nvPr/>
+        </p:nvCxnSpPr>
+        <p:spPr>
+          <a:xfrm rot="16200000" flipH="1">
+            <a:off x="864553" y="2278437"/>
+            <a:ext cx="2750629" cy="936953"/>
+          </a:xfrm>
+          <a:prstGeom prst="bentConnector2">
+            <a:avLst/>
+          </a:prstGeom>
+          <a:ln w="19050">
+            <a:solidFill>
+              <a:schemeClr val="accent3"/>
+            </a:solidFill>
+            <a:headEnd type="none" w="med" len="med"/>
+            <a:tailEnd type="arrow" w="med" len="med"/>
+          </a:ln>
+          <a:effectLst/>
+        </p:spPr>
+        <p:style>
+          <a:lnRef idx="1">
+            <a:schemeClr val="accent2"/>
+          </a:lnRef>
+          <a:fillRef idx="2">
+            <a:schemeClr val="accent2"/>
+          </a:fillRef>
+          <a:effectRef idx="1">
+            <a:schemeClr val="accent2"/>
+          </a:effectRef>
+          <a:fontRef idx="minor">
+            <a:schemeClr val="dk1"/>
+          </a:fontRef>
+        </p:style>
+      </p:cxnSp>
+      <p:cxnSp>
+        <p:nvCxnSpPr>
+          <p:cNvPr id="262" name="Elbow Connector 63">
+            <a:extLst>
+              <a:ext uri="{FF2B5EF4-FFF2-40B4-BE49-F238E27FC236}">
+                <a16:creationId xmlns:a16="http://schemas.microsoft.com/office/drawing/2014/main" id="{9A6AC780-0938-4899-83CB-69343BFC240B}"/>
+              </a:ext>
+            </a:extLst>
+          </p:cNvPr>
+          <p:cNvCxnSpPr>
+            <a:cxnSpLocks/>
+            <a:stCxn id="39" idx="2"/>
+            <a:endCxn id="93" idx="1"/>
+          </p:cNvCxnSpPr>
+          <p:nvPr/>
+        </p:nvCxnSpPr>
+        <p:spPr>
+          <a:xfrm rot="16200000" flipH="1">
+            <a:off x="107139" y="3035852"/>
+            <a:ext cx="4230116" cy="901612"/>
+          </a:xfrm>
+          <a:prstGeom prst="bentConnector2">
+            <a:avLst/>
+          </a:prstGeom>
+          <a:ln w="19050">
+            <a:solidFill>
+              <a:schemeClr val="accent3"/>
+            </a:solidFill>
+            <a:headEnd type="none" w="med" len="med"/>
+            <a:tailEnd type="arrow" w="med" len="med"/>
+          </a:ln>
+          <a:effectLst/>
+        </p:spPr>
+        <p:style>
+          <a:lnRef idx="1">
+            <a:schemeClr val="accent2"/>
+          </a:lnRef>
+          <a:fillRef idx="2">
+            <a:schemeClr val="accent2"/>
+          </a:fillRef>
+          <a:effectRef idx="1">
+            <a:schemeClr val="accent2"/>
+          </a:effectRef>
+          <a:fontRef idx="minor">
+            <a:schemeClr val="dk1"/>
+          </a:fontRef>
+        </p:style>
+      </p:cxnSp>
+      <p:cxnSp>
+        <p:nvCxnSpPr>
+          <p:cNvPr id="282" name="Elbow Connector 136">
+            <a:extLst>
+              <a:ext uri="{FF2B5EF4-FFF2-40B4-BE49-F238E27FC236}">
+                <a16:creationId xmlns:a16="http://schemas.microsoft.com/office/drawing/2014/main" id="{494B3B67-9945-49B9-BF10-74276DE35E9C}"/>
+              </a:ext>
+            </a:extLst>
+          </p:cNvPr>
+          <p:cNvCxnSpPr>
+            <a:cxnSpLocks/>
+            <a:stCxn id="93" idx="0"/>
+            <a:endCxn id="226" idx="1"/>
+          </p:cNvCxnSpPr>
+          <p:nvPr/>
+        </p:nvCxnSpPr>
+        <p:spPr>
+          <a:xfrm rot="5400000" flipH="1" flipV="1">
+            <a:off x="4350058" y="4382260"/>
+            <a:ext cx="229135" cy="1979146"/>
+          </a:xfrm>
+          <a:prstGeom prst="bentConnector2">
+            <a:avLst/>
+          </a:prstGeom>
+          <a:ln w="19050">
+            <a:solidFill>
+              <a:schemeClr val="accent3"/>
+            </a:solidFill>
+            <a:headEnd type="none" w="med" len="med"/>
+            <a:tailEnd type="arrow" w="med" len="med"/>
+          </a:ln>
+          <a:effectLst/>
+        </p:spPr>
+        <p:style>
+          <a:lnRef idx="1">
+            <a:schemeClr val="accent2"/>
+          </a:lnRef>
+          <a:fillRef idx="2">
+            <a:schemeClr val="accent2"/>
+          </a:fillRef>
+          <a:effectRef idx="1">
+            <a:schemeClr val="accent2"/>
+          </a:effectRef>
+          <a:fontRef idx="minor">
+            <a:schemeClr val="dk1"/>
+          </a:fontRef>
+        </p:style>
+      </p:cxnSp>
+      <p:cxnSp>
+        <p:nvCxnSpPr>
+          <p:cNvPr id="289" name="Elbow Connector 136">
+            <a:extLst>
+              <a:ext uri="{FF2B5EF4-FFF2-40B4-BE49-F238E27FC236}">
+                <a16:creationId xmlns:a16="http://schemas.microsoft.com/office/drawing/2014/main" id="{0CD3730A-366E-4E98-B779-D16D22FBB15D}"/>
+              </a:ext>
+            </a:extLst>
+          </p:cNvPr>
+          <p:cNvCxnSpPr>
+            <a:cxnSpLocks/>
+            <a:stCxn id="227" idx="1"/>
+            <a:endCxn id="81" idx="1"/>
+          </p:cNvCxnSpPr>
+          <p:nvPr/>
+        </p:nvCxnSpPr>
+        <p:spPr>
+          <a:xfrm rot="10800000">
+            <a:off x="5446816" y="4782566"/>
+            <a:ext cx="7383" cy="894322"/>
+          </a:xfrm>
+          <a:prstGeom prst="bentConnector3">
+            <a:avLst>
+              <a:gd name="adj1" fmla="val 8175918"/>
+            </a:avLst>
+          </a:prstGeom>
+          <a:ln w="19050">
+            <a:solidFill>
+              <a:schemeClr val="accent3"/>
+            </a:solidFill>
+            <a:headEnd type="arrow" w="med" len="med"/>
+            <a:tailEnd type="arrow" w="med" len="med"/>
+          </a:ln>
+          <a:effectLst/>
+        </p:spPr>
+        <p:style>
+          <a:lnRef idx="1">
+            <a:schemeClr val="accent2"/>
+          </a:lnRef>
+          <a:fillRef idx="2">
+            <a:schemeClr val="accent2"/>
+          </a:fillRef>
+          <a:effectRef idx="1">
+            <a:schemeClr val="accent2"/>
+          </a:effectRef>
+          <a:fontRef idx="minor">
+            <a:schemeClr val="dk1"/>
+          </a:fontRef>
+        </p:style>
+      </p:cxnSp>
+      <p:cxnSp>
+        <p:nvCxnSpPr>
+          <p:cNvPr id="317" name="Elbow Connector 63">
+            <a:extLst>
+              <a:ext uri="{FF2B5EF4-FFF2-40B4-BE49-F238E27FC236}">
+                <a16:creationId xmlns:a16="http://schemas.microsoft.com/office/drawing/2014/main" id="{83E83CCD-8152-405C-B225-69F90FC2722D}"/>
+              </a:ext>
+            </a:extLst>
+          </p:cNvPr>
+          <p:cNvCxnSpPr>
+            <a:cxnSpLocks/>
+            <a:stCxn id="16" idx="3"/>
+            <a:endCxn id="227" idx="3"/>
+          </p:cNvCxnSpPr>
+          <p:nvPr/>
+        </p:nvCxnSpPr>
+        <p:spPr>
+          <a:xfrm rot="5400000">
+            <a:off x="4786710" y="3067363"/>
+            <a:ext cx="4868801" cy="350248"/>
+          </a:xfrm>
+          <a:prstGeom prst="bentConnector2">
+            <a:avLst/>
+          </a:prstGeom>
+          <a:ln w="6350">
+            <a:solidFill>
+              <a:schemeClr val="accent3"/>
+            </a:solidFill>
+            <a:headEnd type="none" w="med" len="med"/>
+            <a:tailEnd type="none" w="med" len="med"/>
+          </a:ln>
+          <a:effectLst/>
+        </p:spPr>
+        <p:style>
+          <a:lnRef idx="1">
+            <a:schemeClr val="accent2"/>
+          </a:lnRef>
+          <a:fillRef idx="2">
+            <a:schemeClr val="accent2"/>
+          </a:fillRef>
+          <a:effectRef idx="1">
+            <a:schemeClr val="accent2"/>
+          </a:effectRef>
+          <a:fontRef idx="minor">
+            <a:schemeClr val="dk1"/>
+          </a:fontRef>
+        </p:style>
+      </p:cxnSp>
+      <p:cxnSp>
+        <p:nvCxnSpPr>
+          <p:cNvPr id="320" name="Elbow Connector 63">
+            <a:extLst>
+              <a:ext uri="{FF2B5EF4-FFF2-40B4-BE49-F238E27FC236}">
+                <a16:creationId xmlns:a16="http://schemas.microsoft.com/office/drawing/2014/main" id="{5E23CEB9-D0EF-4AEE-81D4-4362973C75DC}"/>
+              </a:ext>
+            </a:extLst>
+          </p:cNvPr>
+          <p:cNvCxnSpPr>
+            <a:cxnSpLocks/>
+            <a:stCxn id="16" idx="3"/>
+            <a:endCxn id="226" idx="3"/>
+          </p:cNvCxnSpPr>
+          <p:nvPr/>
+        </p:nvCxnSpPr>
+        <p:spPr>
+          <a:xfrm rot="5400000">
+            <a:off x="4996521" y="2857552"/>
+            <a:ext cx="4449178" cy="350249"/>
+          </a:xfrm>
+          <a:prstGeom prst="bentConnector2">
+            <a:avLst/>
+          </a:prstGeom>
+          <a:ln w="6350">
+            <a:solidFill>
+              <a:schemeClr val="accent3"/>
+            </a:solidFill>
+            <a:headEnd type="none" w="med" len="med"/>
+            <a:tailEnd type="none" w="med" len="med"/>
+          </a:ln>
+          <a:effectLst/>
+        </p:spPr>
+        <p:style>
+          <a:lnRef idx="1">
+            <a:schemeClr val="accent2"/>
+          </a:lnRef>
+          <a:fillRef idx="2">
+            <a:schemeClr val="accent2"/>
+          </a:fillRef>
+          <a:effectRef idx="1">
+            <a:schemeClr val="accent2"/>
+          </a:effectRef>
+          <a:fontRef idx="minor">
+            <a:schemeClr val="dk1"/>
+          </a:fontRef>
+        </p:style>
+      </p:cxnSp>
+      <p:cxnSp>
+        <p:nvCxnSpPr>
+          <p:cNvPr id="323" name="Elbow Connector 63">
+            <a:extLst>
+              <a:ext uri="{FF2B5EF4-FFF2-40B4-BE49-F238E27FC236}">
+                <a16:creationId xmlns:a16="http://schemas.microsoft.com/office/drawing/2014/main" id="{462A5438-9907-4A45-916F-7095D4005230}"/>
+              </a:ext>
+            </a:extLst>
+          </p:cNvPr>
+          <p:cNvCxnSpPr>
+            <a:cxnSpLocks/>
+            <a:stCxn id="16" idx="3"/>
+            <a:endCxn id="81" idx="3"/>
+          </p:cNvCxnSpPr>
+          <p:nvPr/>
+        </p:nvCxnSpPr>
+        <p:spPr>
+          <a:xfrm rot="5400000">
+            <a:off x="5232169" y="2618500"/>
+            <a:ext cx="3974479" cy="353652"/>
+          </a:xfrm>
+          <a:prstGeom prst="bentConnector2">
+            <a:avLst/>
+          </a:prstGeom>
+          <a:ln w="6350">
+            <a:solidFill>
+              <a:schemeClr val="accent3"/>
+            </a:solidFill>
+            <a:headEnd type="none" w="med" len="med"/>
+            <a:tailEnd type="none" w="med" len="med"/>
+          </a:ln>
+          <a:effectLst/>
+        </p:spPr>
+        <p:style>
+          <a:lnRef idx="1">
+            <a:schemeClr val="accent2"/>
+          </a:lnRef>
+          <a:fillRef idx="2">
+            <a:schemeClr val="accent2"/>
+          </a:fillRef>
+          <a:effectRef idx="1">
+            <a:schemeClr val="accent2"/>
+          </a:effectRef>
+          <a:fontRef idx="minor">
+            <a:schemeClr val="dk1"/>
+          </a:fontRef>
+        </p:style>
+      </p:cxnSp>
+      <p:cxnSp>
+        <p:nvCxnSpPr>
+          <p:cNvPr id="326" name="Elbow Connector 63">
+            <a:extLst>
+              <a:ext uri="{FF2B5EF4-FFF2-40B4-BE49-F238E27FC236}">
+                <a16:creationId xmlns:a16="http://schemas.microsoft.com/office/drawing/2014/main" id="{B806FF3F-C41C-42DE-9695-1CB793FE4CAB}"/>
+              </a:ext>
+            </a:extLst>
+          </p:cNvPr>
+          <p:cNvCxnSpPr>
+            <a:cxnSpLocks/>
+            <a:stCxn id="16" idx="3"/>
+            <a:endCxn id="237" idx="3"/>
+          </p:cNvCxnSpPr>
+          <p:nvPr/>
+        </p:nvCxnSpPr>
+        <p:spPr>
+          <a:xfrm rot="5400000">
+            <a:off x="5937996" y="1898321"/>
+            <a:ext cx="2548473" cy="368005"/>
+          </a:xfrm>
+          <a:prstGeom prst="bentConnector2">
+            <a:avLst/>
+          </a:prstGeom>
+          <a:ln w="6350">
+            <a:solidFill>
+              <a:schemeClr val="accent3"/>
+            </a:solidFill>
+            <a:headEnd type="none" w="med" len="med"/>
+            <a:tailEnd type="none" w="med" len="med"/>
+          </a:ln>
+          <a:effectLst/>
+        </p:spPr>
+        <p:style>
+          <a:lnRef idx="1">
+            <a:schemeClr val="accent2"/>
+          </a:lnRef>
+          <a:fillRef idx="2">
+            <a:schemeClr val="accent2"/>
+          </a:fillRef>
+          <a:effectRef idx="1">
+            <a:schemeClr val="accent2"/>
+          </a:effectRef>
+          <a:fontRef idx="minor">
+            <a:schemeClr val="dk1"/>
+          </a:fontRef>
+        </p:style>
+      </p:cxnSp>
+      <p:cxnSp>
+        <p:nvCxnSpPr>
+          <p:cNvPr id="342" name="Elbow Connector 63">
+            <a:extLst>
+              <a:ext uri="{FF2B5EF4-FFF2-40B4-BE49-F238E27FC236}">
+                <a16:creationId xmlns:a16="http://schemas.microsoft.com/office/drawing/2014/main" id="{EB895C31-9270-461E-A97C-8E35CE3DAA10}"/>
+              </a:ext>
+            </a:extLst>
+          </p:cNvPr>
+          <p:cNvCxnSpPr>
+            <a:cxnSpLocks/>
+            <a:stCxn id="16" idx="3"/>
+            <a:endCxn id="238" idx="3"/>
+          </p:cNvCxnSpPr>
+          <p:nvPr/>
+        </p:nvCxnSpPr>
+        <p:spPr>
+          <a:xfrm rot="5400000">
+            <a:off x="6228622" y="1611727"/>
+            <a:ext cx="1971252" cy="363973"/>
+          </a:xfrm>
+          <a:prstGeom prst="bentConnector2">
+            <a:avLst/>
+          </a:prstGeom>
+          <a:ln w="6350">
+            <a:solidFill>
+              <a:schemeClr val="accent3"/>
+            </a:solidFill>
+            <a:headEnd type="none" w="med" len="med"/>
+            <a:tailEnd type="none" w="med" len="med"/>
+          </a:ln>
+          <a:effectLst/>
+        </p:spPr>
+        <p:style>
+          <a:lnRef idx="1">
+            <a:schemeClr val="accent2"/>
+          </a:lnRef>
+          <a:fillRef idx="2">
+            <a:schemeClr val="accent2"/>
+          </a:fillRef>
+          <a:effectRef idx="1">
+            <a:schemeClr val="accent2"/>
+          </a:effectRef>
+          <a:fontRef idx="minor">
+            <a:schemeClr val="dk1"/>
+          </a:fontRef>
+        </p:style>
+      </p:cxnSp>
+      <p:cxnSp>
+        <p:nvCxnSpPr>
+          <p:cNvPr id="345" name="Elbow Connector 63">
+            <a:extLst>
+              <a:ext uri="{FF2B5EF4-FFF2-40B4-BE49-F238E27FC236}">
+                <a16:creationId xmlns:a16="http://schemas.microsoft.com/office/drawing/2014/main" id="{861C14FF-977A-49B5-A819-A875F15D9D17}"/>
+              </a:ext>
+            </a:extLst>
+          </p:cNvPr>
+          <p:cNvCxnSpPr>
+            <a:cxnSpLocks/>
+            <a:stCxn id="16" idx="3"/>
+            <a:endCxn id="239" idx="3"/>
+          </p:cNvCxnSpPr>
+          <p:nvPr/>
+        </p:nvCxnSpPr>
+        <p:spPr>
+          <a:xfrm rot="5400000">
+            <a:off x="6493790" y="1346559"/>
+            <a:ext cx="1440917" cy="363973"/>
+          </a:xfrm>
+          <a:prstGeom prst="bentConnector2">
+            <a:avLst/>
+          </a:prstGeom>
+          <a:ln w="6350">
+            <a:solidFill>
+              <a:schemeClr val="accent3"/>
+            </a:solidFill>
+            <a:headEnd type="none" w="med" len="med"/>
+            <a:tailEnd type="none" w="med" len="med"/>
+          </a:ln>
+          <a:effectLst/>
+        </p:spPr>
+        <p:style>
+          <a:lnRef idx="1">
+            <a:schemeClr val="accent2"/>
+          </a:lnRef>
+          <a:fillRef idx="2">
+            <a:schemeClr val="accent2"/>
+          </a:fillRef>
+          <a:effectRef idx="1">
+            <a:schemeClr val="accent2"/>
+          </a:effectRef>
+          <a:fontRef idx="minor">
+            <a:schemeClr val="dk1"/>
+          </a:fontRef>
+        </p:style>
+      </p:cxnSp>
+      <p:sp>
+        <p:nvSpPr>
+          <p:cNvPr id="364" name="Freeform 117">
+            <a:extLst>
+              <a:ext uri="{FF2B5EF4-FFF2-40B4-BE49-F238E27FC236}">
+                <a16:creationId xmlns:a16="http://schemas.microsoft.com/office/drawing/2014/main" id="{224F70B3-6C2F-43BD-89E8-75CE26AA7457}"/>
+              </a:ext>
+            </a:extLst>
+          </p:cNvPr>
+          <p:cNvSpPr/>
+          <p:nvPr/>
+        </p:nvSpPr>
+        <p:spPr>
           <a:xfrm flipV="1">
-            <a:off x="4421334" y="3786994"/>
-            <a:ext cx="2642195" cy="101600"/>
+            <a:off x="5752864" y="3411060"/>
+            <a:ext cx="2588149" cy="176739"/>
           </a:xfrm>
           <a:custGeom>
             <a:avLst/>
@@ -5853,60 +6806,12 @@
           </a:p>
         </p:txBody>
       </p:sp>
-      <p:cxnSp>
-        <p:nvCxnSpPr>
-          <p:cNvPr id="49" name="Elbow Connector 63">
+      <p:sp>
+        <p:nvSpPr>
+          <p:cNvPr id="237" name="Rectangle 11">
             <a:extLst>
               <a:ext uri="{FF2B5EF4-FFF2-40B4-BE49-F238E27FC236}">
-                <a16:creationId xmlns:a16="http://schemas.microsoft.com/office/drawing/2014/main" id="{D729A16D-6DF1-4745-81BF-08712270C5A9}"/>
-              </a:ext>
-            </a:extLst>
-          </p:cNvPr>
-          <p:cNvCxnSpPr>
-            <a:cxnSpLocks/>
-            <a:stCxn id="16" idx="3"/>
-            <a:endCxn id="42" idx="3"/>
-          </p:cNvCxnSpPr>
-          <p:nvPr/>
-        </p:nvCxnSpPr>
-        <p:spPr>
-          <a:xfrm rot="5400000">
-            <a:off x="4842230" y="2240477"/>
-            <a:ext cx="1710751" cy="277798"/>
-          </a:xfrm>
-          <a:prstGeom prst="bentConnector2">
-            <a:avLst/>
-          </a:prstGeom>
-          <a:ln w="6350">
-            <a:solidFill>
-              <a:schemeClr val="accent3"/>
-            </a:solidFill>
-            <a:headEnd type="none" w="med" len="med"/>
-            <a:tailEnd type="none" w="med" len="med"/>
-          </a:ln>
-          <a:effectLst/>
-        </p:spPr>
-        <p:style>
-          <a:lnRef idx="1">
-            <a:schemeClr val="accent2"/>
-          </a:lnRef>
-          <a:fillRef idx="2">
-            <a:schemeClr val="accent2"/>
-          </a:fillRef>
-          <a:effectRef idx="1">
-            <a:schemeClr val="accent2"/>
-          </a:effectRef>
-          <a:fontRef idx="minor">
-            <a:schemeClr val="dk1"/>
-          </a:fontRef>
-        </p:style>
-      </p:cxnSp>
-      <p:sp>
-        <p:nvSpPr>
-          <p:cNvPr id="51" name="Rectangle 11">
-            <a:extLst>
-              <a:ext uri="{FF2B5EF4-FFF2-40B4-BE49-F238E27FC236}">
-                <a16:creationId xmlns:a16="http://schemas.microsoft.com/office/drawing/2014/main" id="{55C6CD0E-EF3E-488F-BC5C-7DD4EAD4C902}"/>
+                <a16:creationId xmlns:a16="http://schemas.microsoft.com/office/drawing/2014/main" id="{056C86EB-14AB-49AF-B338-DE12B12644BC}"/>
               </a:ext>
             </a:extLst>
           </p:cNvPr>
@@ -5915,8 +6820,8 @@
         </p:nvSpPr>
         <p:spPr>
           <a:xfrm>
-            <a:off x="4287645" y="4589073"/>
-            <a:ext cx="1274955" cy="230829"/>
+            <a:off x="5444380" y="3224178"/>
+            <a:ext cx="1583849" cy="264763"/>
           </a:xfrm>
           <a:prstGeom prst="rect">
             <a:avLst/>
@@ -5955,7 +6860,7 @@
                   </a:schemeClr>
                 </a:solidFill>
               </a:rPr>
-              <a:t>MenuItemListCard</a:t>
+              <a:t>MenuItemCard</a:t>
             </a:r>
             <a:endParaRPr lang="en-SG" sz="1050" b="1" dirty="0">
               <a:solidFill>
@@ -5969,10 +6874,10 @@
       </p:sp>
       <p:sp>
         <p:nvSpPr>
-          <p:cNvPr id="52" name="Rectangle 11">
+          <p:cNvPr id="365" name="Freeform 117">
             <a:extLst>
               <a:ext uri="{FF2B5EF4-FFF2-40B4-BE49-F238E27FC236}">
-                <a16:creationId xmlns:a16="http://schemas.microsoft.com/office/drawing/2014/main" id="{8DEC7023-A1BB-441D-896A-AA4D0F2A9C58}"/>
+                <a16:creationId xmlns:a16="http://schemas.microsoft.com/office/drawing/2014/main" id="{4D22FF41-7FC1-421F-8077-2472A0FDCA68}"/>
               </a:ext>
             </a:extLst>
           </p:cNvPr>
@@ -5980,267 +6885,9 @@
           <p:nvPr/>
         </p:nvSpPr>
         <p:spPr>
-          <a:xfrm>
-            <a:off x="4280664" y="4139122"/>
-            <a:ext cx="1274955" cy="230829"/>
-          </a:xfrm>
-          <a:prstGeom prst="rect">
-            <a:avLst/>
-          </a:prstGeom>
-          <a:ln w="19050">
-            <a:solidFill>
-              <a:schemeClr val="accent3"/>
-            </a:solidFill>
-          </a:ln>
-          <a:effectLst/>
-        </p:spPr>
-        <p:style>
-          <a:lnRef idx="1">
-            <a:schemeClr val="accent3"/>
-          </a:lnRef>
-          <a:fillRef idx="2">
-            <a:schemeClr val="accent3"/>
-          </a:fillRef>
-          <a:effectRef idx="1">
-            <a:schemeClr val="accent3"/>
-          </a:effectRef>
-          <a:fontRef idx="minor">
-            <a:schemeClr val="dk1"/>
-          </a:fontRef>
-        </p:style>
-        <p:txBody>
-          <a:bodyPr rtlCol="0" anchor="ctr"/>
-          <a:lstStyle/>
-          <a:p>
-            <a:pPr algn="ctr"/>
-            <a:r>
-              <a:rPr lang="en-US" sz="1050" b="1" dirty="0" err="1">
-                <a:solidFill>
-                  <a:schemeClr val="accent3">
-                    <a:lumMod val="75000"/>
-                  </a:schemeClr>
-                </a:solidFill>
-              </a:rPr>
-              <a:t>OrderItemListCard</a:t>
-            </a:r>
-            <a:endParaRPr lang="en-SG" sz="1050" b="1" dirty="0">
-              <a:solidFill>
-                <a:schemeClr val="accent3">
-                  <a:lumMod val="75000"/>
-                </a:schemeClr>
-              </a:solidFill>
-            </a:endParaRPr>
-          </a:p>
-        </p:txBody>
-      </p:sp>
-      <p:cxnSp>
-        <p:nvCxnSpPr>
-          <p:cNvPr id="54" name="Elbow Connector 136">
-            <a:extLst>
-              <a:ext uri="{FF2B5EF4-FFF2-40B4-BE49-F238E27FC236}">
-                <a16:creationId xmlns:a16="http://schemas.microsoft.com/office/drawing/2014/main" id="{5A1C362D-D0D2-4BE7-8125-B31F0A7D7C40}"/>
-              </a:ext>
-            </a:extLst>
-          </p:cNvPr>
-          <p:cNvCxnSpPr>
-            <a:cxnSpLocks/>
-            <a:stCxn id="34" idx="2"/>
-            <a:endCxn id="42" idx="1"/>
-          </p:cNvCxnSpPr>
-          <p:nvPr/>
-        </p:nvCxnSpPr>
-        <p:spPr>
-          <a:xfrm rot="16200000" flipH="1">
-            <a:off x="3852652" y="2803651"/>
-            <a:ext cx="110551" cy="751650"/>
-          </a:xfrm>
-          <a:prstGeom prst="bentConnector2">
-            <a:avLst/>
-          </a:prstGeom>
-          <a:ln w="19050">
-            <a:solidFill>
-              <a:schemeClr val="accent3"/>
-            </a:solidFill>
-            <a:headEnd type="none" w="med" len="med"/>
-            <a:tailEnd type="arrow" w="med" len="med"/>
-          </a:ln>
-          <a:effectLst/>
-        </p:spPr>
-        <p:style>
-          <a:lnRef idx="1">
-            <a:schemeClr val="accent2"/>
-          </a:lnRef>
-          <a:fillRef idx="2">
-            <a:schemeClr val="accent2"/>
-          </a:fillRef>
-          <a:effectRef idx="1">
-            <a:schemeClr val="accent2"/>
-          </a:effectRef>
-          <a:fontRef idx="minor">
-            <a:schemeClr val="dk1"/>
-          </a:fontRef>
-        </p:style>
-      </p:cxnSp>
-      <p:cxnSp>
-        <p:nvCxnSpPr>
-          <p:cNvPr id="55" name="Elbow Connector 136">
-            <a:extLst>
-              <a:ext uri="{FF2B5EF4-FFF2-40B4-BE49-F238E27FC236}">
-                <a16:creationId xmlns:a16="http://schemas.microsoft.com/office/drawing/2014/main" id="{125553B7-4DAF-44A8-B43F-E765662E772E}"/>
-              </a:ext>
-            </a:extLst>
-          </p:cNvPr>
-          <p:cNvCxnSpPr>
-            <a:cxnSpLocks/>
-            <a:stCxn id="85" idx="2"/>
-            <a:endCxn id="46" idx="1"/>
-          </p:cNvCxnSpPr>
-          <p:nvPr/>
-        </p:nvCxnSpPr>
-        <p:spPr>
-          <a:xfrm rot="16200000" flipH="1">
-            <a:off x="3858411" y="3251308"/>
-            <a:ext cx="107907" cy="742775"/>
-          </a:xfrm>
-          <a:prstGeom prst="bentConnector2">
-            <a:avLst/>
-          </a:prstGeom>
-          <a:ln w="19050">
-            <a:solidFill>
-              <a:schemeClr val="accent3"/>
-            </a:solidFill>
-            <a:headEnd type="none" w="med" len="med"/>
-            <a:tailEnd type="arrow" w="med" len="med"/>
-          </a:ln>
-          <a:effectLst/>
-        </p:spPr>
-        <p:style>
-          <a:lnRef idx="1">
-            <a:schemeClr val="accent2"/>
-          </a:lnRef>
-          <a:fillRef idx="2">
-            <a:schemeClr val="accent2"/>
-          </a:fillRef>
-          <a:effectRef idx="1">
-            <a:schemeClr val="accent2"/>
-          </a:effectRef>
-          <a:fontRef idx="minor">
-            <a:schemeClr val="dk1"/>
-          </a:fontRef>
-        </p:style>
-      </p:cxnSp>
-      <p:cxnSp>
-        <p:nvCxnSpPr>
-          <p:cNvPr id="56" name="Elbow Connector 136">
-            <a:extLst>
-              <a:ext uri="{FF2B5EF4-FFF2-40B4-BE49-F238E27FC236}">
-                <a16:creationId xmlns:a16="http://schemas.microsoft.com/office/drawing/2014/main" id="{172C5460-9344-46BB-B3E6-5C357372E854}"/>
-              </a:ext>
-            </a:extLst>
-          </p:cNvPr>
-          <p:cNvCxnSpPr>
-            <a:cxnSpLocks/>
-            <a:stCxn id="57" idx="2"/>
-            <a:endCxn id="51" idx="1"/>
-          </p:cNvCxnSpPr>
-          <p:nvPr/>
-        </p:nvCxnSpPr>
-        <p:spPr>
-          <a:xfrm rot="16200000" flipH="1">
-            <a:off x="3853856" y="4270699"/>
-            <a:ext cx="118964" cy="748614"/>
-          </a:xfrm>
-          <a:prstGeom prst="bentConnector2">
-            <a:avLst/>
-          </a:prstGeom>
-          <a:ln w="19050">
-            <a:solidFill>
-              <a:schemeClr val="accent3"/>
-            </a:solidFill>
-            <a:headEnd type="none" w="med" len="med"/>
-            <a:tailEnd type="arrow" w="med" len="med"/>
-          </a:ln>
-          <a:effectLst/>
-        </p:spPr>
-        <p:style>
-          <a:lnRef idx="1">
-            <a:schemeClr val="accent2"/>
-          </a:lnRef>
-          <a:fillRef idx="2">
-            <a:schemeClr val="accent2"/>
-          </a:fillRef>
-          <a:effectRef idx="1">
-            <a:schemeClr val="accent2"/>
-          </a:effectRef>
-          <a:fontRef idx="minor">
-            <a:schemeClr val="dk1"/>
-          </a:fontRef>
-        </p:style>
-      </p:cxnSp>
-      <p:cxnSp>
-        <p:nvCxnSpPr>
-          <p:cNvPr id="59" name="Elbow Connector 63">
-            <a:extLst>
-              <a:ext uri="{FF2B5EF4-FFF2-40B4-BE49-F238E27FC236}">
-                <a16:creationId xmlns:a16="http://schemas.microsoft.com/office/drawing/2014/main" id="{A4E57D68-2F40-4A50-A623-C5C83666B367}"/>
-              </a:ext>
-            </a:extLst>
-          </p:cNvPr>
-          <p:cNvCxnSpPr>
-            <a:cxnSpLocks/>
-            <a:stCxn id="16" idx="3"/>
-            <a:endCxn id="46" idx="3"/>
-          </p:cNvCxnSpPr>
-          <p:nvPr/>
-        </p:nvCxnSpPr>
-        <p:spPr>
-          <a:xfrm rot="5400000">
-            <a:off x="4621282" y="2461427"/>
-            <a:ext cx="2152649" cy="277797"/>
-          </a:xfrm>
-          <a:prstGeom prst="bentConnector2">
-            <a:avLst/>
-          </a:prstGeom>
-          <a:ln w="6350">
-            <a:solidFill>
-              <a:schemeClr val="accent3"/>
-            </a:solidFill>
-            <a:headEnd type="none" w="med" len="med"/>
-            <a:tailEnd type="none" w="med" len="med"/>
-          </a:ln>
-          <a:effectLst/>
-        </p:spPr>
-        <p:style>
-          <a:lnRef idx="1">
-            <a:schemeClr val="accent2"/>
-          </a:lnRef>
-          <a:fillRef idx="2">
-            <a:schemeClr val="accent2"/>
-          </a:fillRef>
-          <a:effectRef idx="1">
-            <a:schemeClr val="accent2"/>
-          </a:effectRef>
-          <a:fontRef idx="minor">
-            <a:schemeClr val="dk1"/>
-          </a:fontRef>
-        </p:style>
-      </p:cxnSp>
-      <p:sp>
-        <p:nvSpPr>
-          <p:cNvPr id="70" name="Freeform 117">
-            <a:extLst>
-              <a:ext uri="{FF2B5EF4-FFF2-40B4-BE49-F238E27FC236}">
-                <a16:creationId xmlns:a16="http://schemas.microsoft.com/office/drawing/2014/main" id="{9219A4AD-9F36-4897-B46C-B8CC38C338E8}"/>
-              </a:ext>
-            </a:extLst>
-          </p:cNvPr>
-          <p:cNvSpPr/>
-          <p:nvPr/>
-        </p:nvSpPr>
-        <p:spPr>
           <a:xfrm flipV="1">
-            <a:off x="4421334" y="4819902"/>
-            <a:ext cx="2642195" cy="101600"/>
+            <a:off x="5752864" y="4828399"/>
+            <a:ext cx="2588149" cy="176739"/>
           </a:xfrm>
           <a:custGeom>
             <a:avLst/>
@@ -6313,60 +6960,12 @@
           </a:p>
         </p:txBody>
       </p:sp>
-      <p:cxnSp>
-        <p:nvCxnSpPr>
-          <p:cNvPr id="83" name="Elbow Connector 63">
+      <p:sp>
+        <p:nvSpPr>
+          <p:cNvPr id="81" name="Rectangle 11">
             <a:extLst>
               <a:ext uri="{FF2B5EF4-FFF2-40B4-BE49-F238E27FC236}">
-                <a16:creationId xmlns:a16="http://schemas.microsoft.com/office/drawing/2014/main" id="{A415BA0D-3B6A-42AD-B798-04580504534D}"/>
-              </a:ext>
-            </a:extLst>
-          </p:cNvPr>
-          <p:cNvCxnSpPr>
-            <a:cxnSpLocks/>
-            <a:stCxn id="16" idx="3"/>
-            <a:endCxn id="51" idx="3"/>
-          </p:cNvCxnSpPr>
-          <p:nvPr/>
-        </p:nvCxnSpPr>
-        <p:spPr>
-          <a:xfrm rot="5400000">
-            <a:off x="4109309" y="2977292"/>
-            <a:ext cx="3180487" cy="273904"/>
-          </a:xfrm>
-          <a:prstGeom prst="bentConnector2">
-            <a:avLst/>
-          </a:prstGeom>
-          <a:ln w="6350">
-            <a:solidFill>
-              <a:schemeClr val="accent3"/>
-            </a:solidFill>
-            <a:headEnd type="none" w="med" len="med"/>
-            <a:tailEnd type="none" w="med" len="med"/>
-          </a:ln>
-          <a:effectLst/>
-        </p:spPr>
-        <p:style>
-          <a:lnRef idx="1">
-            <a:schemeClr val="accent2"/>
-          </a:lnRef>
-          <a:fillRef idx="2">
-            <a:schemeClr val="accent2"/>
-          </a:fillRef>
-          <a:effectRef idx="1">
-            <a:schemeClr val="accent2"/>
-          </a:effectRef>
-          <a:fontRef idx="minor">
-            <a:schemeClr val="dk1"/>
-          </a:fontRef>
-        </p:style>
-      </p:cxnSp>
-      <p:sp>
-        <p:nvSpPr>
-          <p:cNvPr id="57" name="Rectangle 11">
-            <a:extLst>
-              <a:ext uri="{FF2B5EF4-FFF2-40B4-BE49-F238E27FC236}">
-                <a16:creationId xmlns:a16="http://schemas.microsoft.com/office/drawing/2014/main" id="{7C771CC9-4ADE-4720-A0A8-7B2F37E0F687}"/>
+                <a16:creationId xmlns:a16="http://schemas.microsoft.com/office/drawing/2014/main" id="{E3EC05C9-8682-4AEA-ACD7-523B64E2EF14}"/>
               </a:ext>
             </a:extLst>
           </p:cNvPr>
@@ -6375,8 +6974,8 @@
         </p:nvSpPr>
         <p:spPr>
           <a:xfrm>
-            <a:off x="2904044" y="4348683"/>
-            <a:ext cx="1269973" cy="236841"/>
+            <a:off x="5446815" y="4648200"/>
+            <a:ext cx="1595767" cy="268731"/>
           </a:xfrm>
           <a:prstGeom prst="rect">
             <a:avLst/>
@@ -6415,7 +7014,7 @@
                   </a:schemeClr>
                 </a:solidFill>
               </a:rPr>
-              <a:t>MenuListPanel</a:t>
+              <a:t>DailyStatisticsCard</a:t>
             </a:r>
             <a:endParaRPr lang="en-SG" sz="1050" b="1" dirty="0">
               <a:solidFill>
@@ -6427,34 +7026,66 @@
           </a:p>
         </p:txBody>
       </p:sp>
-      <p:cxnSp>
-        <p:nvCxnSpPr>
-          <p:cNvPr id="58" name="Elbow Connector 63">
+      <p:sp>
+        <p:nvSpPr>
+          <p:cNvPr id="366" name="Freeform 117">
             <a:extLst>
               <a:ext uri="{FF2B5EF4-FFF2-40B4-BE49-F238E27FC236}">
-                <a16:creationId xmlns:a16="http://schemas.microsoft.com/office/drawing/2014/main" id="{B68EFAD5-3CFD-4058-847C-84EE3C3F8822}"/>
+                <a16:creationId xmlns:a16="http://schemas.microsoft.com/office/drawing/2014/main" id="{EB89D904-DC19-4CB5-91CE-723D68508E37}"/>
               </a:ext>
             </a:extLst>
           </p:cNvPr>
-          <p:cNvCxnSpPr>
-            <a:cxnSpLocks/>
-            <a:stCxn id="39" idx="2"/>
-            <a:endCxn id="57" idx="1"/>
-          </p:cNvCxnSpPr>
+          <p:cNvSpPr/>
           <p:nvPr/>
-        </p:nvCxnSpPr>
-        <p:spPr>
-          <a:xfrm rot="16200000" flipH="1">
-            <a:off x="1632813" y="3195873"/>
-            <a:ext cx="2361078" cy="181383"/>
-          </a:xfrm>
-          <a:prstGeom prst="bentConnector2">
+        </p:nvSpPr>
+        <p:spPr>
+          <a:xfrm flipV="1">
+            <a:off x="5771202" y="5282227"/>
+            <a:ext cx="2588149" cy="176739"/>
+          </a:xfrm>
+          <a:custGeom>
             <a:avLst/>
-          </a:prstGeom>
+            <a:gdLst>
+              <a:gd name="connsiteX0" fmla="*/ 0 w 3048000"/>
+              <a:gd name="connsiteY0" fmla="*/ 203200 h 203200"/>
+              <a:gd name="connsiteX1" fmla="*/ 221673 w 3048000"/>
+              <a:gd name="connsiteY1" fmla="*/ 0 h 203200"/>
+              <a:gd name="connsiteX2" fmla="*/ 3048000 w 3048000"/>
+              <a:gd name="connsiteY2" fmla="*/ 0 h 203200"/>
+            </a:gdLst>
+            <a:ahLst/>
+            <a:cxnLst>
+              <a:cxn ang="0">
+                <a:pos x="connsiteX0" y="connsiteY0"/>
+              </a:cxn>
+              <a:cxn ang="0">
+                <a:pos x="connsiteX1" y="connsiteY1"/>
+              </a:cxn>
+              <a:cxn ang="0">
+                <a:pos x="connsiteX2" y="connsiteY2"/>
+              </a:cxn>
+            </a:cxnLst>
+            <a:rect l="l" t="t" r="r" b="b"/>
+            <a:pathLst>
+              <a:path w="3048000" h="203200">
+                <a:moveTo>
+                  <a:pt x="0" y="203200"/>
+                </a:moveTo>
+                <a:lnTo>
+                  <a:pt x="221673" y="0"/>
+                </a:lnTo>
+                <a:lnTo>
+                  <a:pt x="3048000" y="0"/>
+                </a:lnTo>
+              </a:path>
+            </a:pathLst>
+          </a:custGeom>
+          <a:noFill/>
           <a:ln w="19050">
             <a:solidFill>
               <a:schemeClr val="accent3"/>
             </a:solidFill>
+            <a:prstDash val="sysDot"/>
             <a:headEnd type="none" w="med" len="med"/>
             <a:tailEnd type="arrow" w="med" len="med"/>
           </a:ln>
@@ -6474,13 +7105,21 @@
             <a:schemeClr val="dk1"/>
           </a:fontRef>
         </p:style>
-      </p:cxnSp>
-      <p:sp>
-        <p:nvSpPr>
-          <p:cNvPr id="85" name="Rectangle 11">
+        <p:txBody>
+          <a:bodyPr rtlCol="0" anchor="ctr"/>
+          <a:lstStyle/>
+          <a:p>
+            <a:pPr algn="ctr"/>
+            <a:endParaRPr lang="en-SG"/>
+          </a:p>
+        </p:txBody>
+      </p:sp>
+      <p:sp>
+        <p:nvSpPr>
+          <p:cNvPr id="226" name="Rectangle 11">
             <a:extLst>
               <a:ext uri="{FF2B5EF4-FFF2-40B4-BE49-F238E27FC236}">
-                <a16:creationId xmlns:a16="http://schemas.microsoft.com/office/drawing/2014/main" id="{C3EDF5F5-0B9A-4EC0-BFD0-5772AB173BAE}"/>
+                <a16:creationId xmlns:a16="http://schemas.microsoft.com/office/drawing/2014/main" id="{49AD6FB9-54D7-451A-AF26-D94AC216CAEA}"/>
               </a:ext>
             </a:extLst>
           </p:cNvPr>
@@ -6489,8 +7128,8 @@
         </p:nvSpPr>
         <p:spPr>
           <a:xfrm>
-            <a:off x="2907938" y="3331902"/>
-            <a:ext cx="1266077" cy="236841"/>
+            <a:off x="5454198" y="5126866"/>
+            <a:ext cx="1591787" cy="260798"/>
           </a:xfrm>
           <a:prstGeom prst="rect">
             <a:avLst/>
@@ -6529,7 +7168,7 @@
                   </a:schemeClr>
                 </a:solidFill>
               </a:rPr>
-              <a:t>StatsBrowserPanel</a:t>
+              <a:t>MonthlyStatisticsCard</a:t>
             </a:r>
             <a:endParaRPr lang="en-SG" sz="1050" b="1" dirty="0">
               <a:solidFill>
@@ -6541,26 +7180,490 @@
           </a:p>
         </p:txBody>
       </p:sp>
+      <p:sp>
+        <p:nvSpPr>
+          <p:cNvPr id="367" name="Freeform 117">
+            <a:extLst>
+              <a:ext uri="{FF2B5EF4-FFF2-40B4-BE49-F238E27FC236}">
+                <a16:creationId xmlns:a16="http://schemas.microsoft.com/office/drawing/2014/main" id="{112155A0-76A9-437D-8D28-7CF82FE4EF9F}"/>
+              </a:ext>
+            </a:extLst>
+          </p:cNvPr>
+          <p:cNvSpPr/>
+          <p:nvPr/>
+        </p:nvSpPr>
+        <p:spPr>
+          <a:xfrm flipV="1">
+            <a:off x="5771202" y="5717031"/>
+            <a:ext cx="2588149" cy="176739"/>
+          </a:xfrm>
+          <a:custGeom>
+            <a:avLst/>
+            <a:gdLst>
+              <a:gd name="connsiteX0" fmla="*/ 0 w 3048000"/>
+              <a:gd name="connsiteY0" fmla="*/ 203200 h 203200"/>
+              <a:gd name="connsiteX1" fmla="*/ 221673 w 3048000"/>
+              <a:gd name="connsiteY1" fmla="*/ 0 h 203200"/>
+              <a:gd name="connsiteX2" fmla="*/ 3048000 w 3048000"/>
+              <a:gd name="connsiteY2" fmla="*/ 0 h 203200"/>
+            </a:gdLst>
+            <a:ahLst/>
+            <a:cxnLst>
+              <a:cxn ang="0">
+                <a:pos x="connsiteX0" y="connsiteY0"/>
+              </a:cxn>
+              <a:cxn ang="0">
+                <a:pos x="connsiteX1" y="connsiteY1"/>
+              </a:cxn>
+              <a:cxn ang="0">
+                <a:pos x="connsiteX2" y="connsiteY2"/>
+              </a:cxn>
+            </a:cxnLst>
+            <a:rect l="l" t="t" r="r" b="b"/>
+            <a:pathLst>
+              <a:path w="3048000" h="203200">
+                <a:moveTo>
+                  <a:pt x="0" y="203200"/>
+                </a:moveTo>
+                <a:lnTo>
+                  <a:pt x="221673" y="0"/>
+                </a:lnTo>
+                <a:lnTo>
+                  <a:pt x="3048000" y="0"/>
+                </a:lnTo>
+              </a:path>
+            </a:pathLst>
+          </a:custGeom>
+          <a:noFill/>
+          <a:ln w="19050">
+            <a:solidFill>
+              <a:schemeClr val="accent3"/>
+            </a:solidFill>
+            <a:prstDash val="sysDot"/>
+            <a:headEnd type="none" w="med" len="med"/>
+            <a:tailEnd type="arrow" w="med" len="med"/>
+          </a:ln>
+          <a:effectLst/>
+        </p:spPr>
+        <p:style>
+          <a:lnRef idx="1">
+            <a:schemeClr val="accent2"/>
+          </a:lnRef>
+          <a:fillRef idx="2">
+            <a:schemeClr val="accent2"/>
+          </a:fillRef>
+          <a:effectRef idx="1">
+            <a:schemeClr val="accent2"/>
+          </a:effectRef>
+          <a:fontRef idx="minor">
+            <a:schemeClr val="dk1"/>
+          </a:fontRef>
+        </p:style>
+        <p:txBody>
+          <a:bodyPr rtlCol="0" anchor="ctr"/>
+          <a:lstStyle/>
+          <a:p>
+            <a:pPr algn="ctr"/>
+            <a:endParaRPr lang="en-SG"/>
+          </a:p>
+        </p:txBody>
+      </p:sp>
+      <p:sp>
+        <p:nvSpPr>
+          <p:cNvPr id="227" name="Rectangle 11">
+            <a:extLst>
+              <a:ext uri="{FF2B5EF4-FFF2-40B4-BE49-F238E27FC236}">
+                <a16:creationId xmlns:a16="http://schemas.microsoft.com/office/drawing/2014/main" id="{6BB6E17B-2E06-494F-8F3C-D20EB35C488B}"/>
+              </a:ext>
+            </a:extLst>
+          </p:cNvPr>
+          <p:cNvSpPr/>
+          <p:nvPr/>
+        </p:nvSpPr>
+        <p:spPr>
+          <a:xfrm>
+            <a:off x="5454198" y="5535220"/>
+            <a:ext cx="1591788" cy="283335"/>
+          </a:xfrm>
+          <a:prstGeom prst="rect">
+            <a:avLst/>
+          </a:prstGeom>
+          <a:ln w="19050">
+            <a:solidFill>
+              <a:schemeClr val="accent3"/>
+            </a:solidFill>
+          </a:ln>
+          <a:effectLst/>
+        </p:spPr>
+        <p:style>
+          <a:lnRef idx="1">
+            <a:schemeClr val="accent3"/>
+          </a:lnRef>
+          <a:fillRef idx="2">
+            <a:schemeClr val="accent3"/>
+          </a:fillRef>
+          <a:effectRef idx="1">
+            <a:schemeClr val="accent3"/>
+          </a:effectRef>
+          <a:fontRef idx="minor">
+            <a:schemeClr val="dk1"/>
+          </a:fontRef>
+        </p:style>
+        <p:txBody>
+          <a:bodyPr rtlCol="0" anchor="ctr"/>
+          <a:lstStyle/>
+          <a:p>
+            <a:pPr algn="ctr"/>
+            <a:r>
+              <a:rPr lang="en-US" sz="1050" b="1" dirty="0" err="1">
+                <a:solidFill>
+                  <a:schemeClr val="accent3">
+                    <a:lumMod val="75000"/>
+                  </a:schemeClr>
+                </a:solidFill>
+              </a:rPr>
+              <a:t>YearlyStatisticsCard</a:t>
+            </a:r>
+            <a:endParaRPr lang="en-SG" sz="1050" b="1" dirty="0">
+              <a:solidFill>
+                <a:schemeClr val="accent3">
+                  <a:lumMod val="75000"/>
+                </a:schemeClr>
+              </a:solidFill>
+            </a:endParaRPr>
+          </a:p>
+        </p:txBody>
+      </p:sp>
       <p:cxnSp>
         <p:nvCxnSpPr>
-          <p:cNvPr id="92" name="Elbow Connector 63">
+          <p:cNvPr id="72" name="Elbow Connector 136">
             <a:extLst>
               <a:ext uri="{FF2B5EF4-FFF2-40B4-BE49-F238E27FC236}">
-                <a16:creationId xmlns:a16="http://schemas.microsoft.com/office/drawing/2014/main" id="{18D81F03-E483-46FA-B8C6-7780BD6E5D61}"/>
+                <a16:creationId xmlns:a16="http://schemas.microsoft.com/office/drawing/2014/main" id="{A318E624-186C-499F-BFD3-1A2E7B0E9896}"/>
               </a:ext>
             </a:extLst>
           </p:cNvPr>
           <p:cNvCxnSpPr>
             <a:cxnSpLocks/>
-            <a:stCxn id="39" idx="2"/>
-            <a:endCxn id="85" idx="1"/>
+            <a:stCxn id="3" idx="3"/>
+            <a:endCxn id="75" idx="1"/>
           </p:cNvCxnSpPr>
           <p:nvPr/>
         </p:nvCxnSpPr>
         <p:spPr>
+          <a:xfrm>
+            <a:off x="4298749" y="1288217"/>
+            <a:ext cx="1154796" cy="1215"/>
+          </a:xfrm>
+          <a:prstGeom prst="bentConnector3">
+            <a:avLst>
+              <a:gd name="adj1" fmla="val 50000"/>
+            </a:avLst>
+          </a:prstGeom>
+          <a:ln w="19050">
+            <a:solidFill>
+              <a:schemeClr val="accent3"/>
+            </a:solidFill>
+            <a:headEnd type="none" w="med" len="med"/>
+            <a:tailEnd type="arrow" w="med" len="med"/>
+          </a:ln>
+          <a:effectLst/>
+        </p:spPr>
+        <p:style>
+          <a:lnRef idx="1">
+            <a:schemeClr val="accent2"/>
+          </a:lnRef>
+          <a:fillRef idx="2">
+            <a:schemeClr val="accent2"/>
+          </a:fillRef>
+          <a:effectRef idx="1">
+            <a:schemeClr val="accent2"/>
+          </a:effectRef>
+          <a:fontRef idx="minor">
+            <a:schemeClr val="dk1"/>
+          </a:fontRef>
+        </p:style>
+      </p:cxnSp>
+      <p:sp>
+        <p:nvSpPr>
+          <p:cNvPr id="75" name="Rectangle 11">
+            <a:extLst>
+              <a:ext uri="{FF2B5EF4-FFF2-40B4-BE49-F238E27FC236}">
+                <a16:creationId xmlns:a16="http://schemas.microsoft.com/office/drawing/2014/main" id="{733B14E4-8CB2-41B8-9266-C4D05EE4EFCA}"/>
+              </a:ext>
+            </a:extLst>
+          </p:cNvPr>
+          <p:cNvSpPr/>
+          <p:nvPr/>
+        </p:nvSpPr>
+        <p:spPr>
+          <a:xfrm>
+            <a:off x="5453545" y="1147764"/>
+            <a:ext cx="1585065" cy="283335"/>
+          </a:xfrm>
+          <a:prstGeom prst="rect">
+            <a:avLst/>
+          </a:prstGeom>
+          <a:ln w="19050">
+            <a:solidFill>
+              <a:schemeClr val="accent3"/>
+            </a:solidFill>
+          </a:ln>
+          <a:effectLst/>
+        </p:spPr>
+        <p:style>
+          <a:lnRef idx="1">
+            <a:schemeClr val="accent3"/>
+          </a:lnRef>
+          <a:fillRef idx="2">
+            <a:schemeClr val="accent3"/>
+          </a:fillRef>
+          <a:effectRef idx="1">
+            <a:schemeClr val="accent3"/>
+          </a:effectRef>
+          <a:fontRef idx="minor">
+            <a:schemeClr val="dk1"/>
+          </a:fontRef>
+        </p:style>
+        <p:txBody>
+          <a:bodyPr rtlCol="0" anchor="ctr"/>
+          <a:lstStyle/>
+          <a:p>
+            <a:pPr algn="ctr"/>
+            <a:r>
+              <a:rPr lang="en-US" sz="1050" b="1" dirty="0" err="1">
+                <a:solidFill>
+                  <a:schemeClr val="accent3">
+                    <a:lumMod val="75000"/>
+                  </a:schemeClr>
+                </a:solidFill>
+              </a:rPr>
+              <a:t>ListElementPointer</a:t>
+            </a:r>
+            <a:endParaRPr lang="en-SG" sz="1050" b="1" dirty="0">
+              <a:solidFill>
+                <a:schemeClr val="accent3">
+                  <a:lumMod val="75000"/>
+                </a:schemeClr>
+              </a:solidFill>
+            </a:endParaRPr>
+          </a:p>
+        </p:txBody>
+      </p:sp>
+      <p:cxnSp>
+        <p:nvCxnSpPr>
+          <p:cNvPr id="79" name="Elbow Connector 63">
+            <a:extLst>
+              <a:ext uri="{FF2B5EF4-FFF2-40B4-BE49-F238E27FC236}">
+                <a16:creationId xmlns:a16="http://schemas.microsoft.com/office/drawing/2014/main" id="{E43E1E03-FE28-4B0B-8C6E-0115F4B3E7A8}"/>
+              </a:ext>
+            </a:extLst>
+          </p:cNvPr>
+          <p:cNvCxnSpPr>
+            <a:cxnSpLocks/>
+            <a:stCxn id="16" idx="3"/>
+            <a:endCxn id="85" idx="3"/>
+          </p:cNvCxnSpPr>
+          <p:nvPr/>
+        </p:nvCxnSpPr>
+        <p:spPr>
+          <a:xfrm rot="5400000">
+            <a:off x="4962145" y="120846"/>
+            <a:ext cx="1746849" cy="3121331"/>
+          </a:xfrm>
+          <a:prstGeom prst="bentConnector2">
+            <a:avLst/>
+          </a:prstGeom>
+          <a:ln w="6350">
+            <a:solidFill>
+              <a:schemeClr val="accent3"/>
+            </a:solidFill>
+            <a:headEnd type="none" w="med" len="med"/>
+            <a:tailEnd type="none" w="med" len="med"/>
+          </a:ln>
+          <a:effectLst/>
+        </p:spPr>
+        <p:style>
+          <a:lnRef idx="1">
+            <a:schemeClr val="accent2"/>
+          </a:lnRef>
+          <a:fillRef idx="2">
+            <a:schemeClr val="accent2"/>
+          </a:fillRef>
+          <a:effectRef idx="1">
+            <a:schemeClr val="accent2"/>
+          </a:effectRef>
+          <a:fontRef idx="minor">
+            <a:schemeClr val="dk1"/>
+          </a:fontRef>
+        </p:style>
+      </p:cxnSp>
+      <p:cxnSp>
+        <p:nvCxnSpPr>
+          <p:cNvPr id="95" name="Elbow Connector 63">
+            <a:extLst>
+              <a:ext uri="{FF2B5EF4-FFF2-40B4-BE49-F238E27FC236}">
+                <a16:creationId xmlns:a16="http://schemas.microsoft.com/office/drawing/2014/main" id="{79BBF7DB-52E5-4132-B210-D564D614EADA}"/>
+              </a:ext>
+            </a:extLst>
+          </p:cNvPr>
+          <p:cNvCxnSpPr>
+            <a:cxnSpLocks/>
+            <a:stCxn id="16" idx="3"/>
+            <a:endCxn id="243" idx="3"/>
+          </p:cNvCxnSpPr>
+          <p:nvPr/>
+        </p:nvCxnSpPr>
+        <p:spPr>
+          <a:xfrm rot="5400000">
+            <a:off x="4693298" y="386939"/>
+            <a:ext cx="2281789" cy="3124085"/>
+          </a:xfrm>
+          <a:prstGeom prst="bentConnector2">
+            <a:avLst/>
+          </a:prstGeom>
+          <a:ln w="6350">
+            <a:solidFill>
+              <a:schemeClr val="accent3"/>
+            </a:solidFill>
+            <a:headEnd type="none" w="med" len="med"/>
+            <a:tailEnd type="none" w="med" len="med"/>
+          </a:ln>
+          <a:effectLst/>
+        </p:spPr>
+        <p:style>
+          <a:lnRef idx="1">
+            <a:schemeClr val="accent2"/>
+          </a:lnRef>
+          <a:fillRef idx="2">
+            <a:schemeClr val="accent2"/>
+          </a:fillRef>
+          <a:effectRef idx="1">
+            <a:schemeClr val="accent2"/>
+          </a:effectRef>
+          <a:fontRef idx="minor">
+            <a:schemeClr val="dk1"/>
+          </a:fontRef>
+        </p:style>
+      </p:cxnSp>
+      <p:cxnSp>
+        <p:nvCxnSpPr>
+          <p:cNvPr id="103" name="Elbow Connector 63">
+            <a:extLst>
+              <a:ext uri="{FF2B5EF4-FFF2-40B4-BE49-F238E27FC236}">
+                <a16:creationId xmlns:a16="http://schemas.microsoft.com/office/drawing/2014/main" id="{E734C0A5-BE58-47A9-8807-085D5D4E4C85}"/>
+              </a:ext>
+            </a:extLst>
+          </p:cNvPr>
+          <p:cNvCxnSpPr>
+            <a:cxnSpLocks/>
+            <a:stCxn id="16" idx="3"/>
+            <a:endCxn id="246" idx="2"/>
+          </p:cNvCxnSpPr>
+          <p:nvPr/>
+        </p:nvCxnSpPr>
+        <p:spPr>
+          <a:xfrm rot="5400000">
+            <a:off x="3940425" y="357286"/>
+            <a:ext cx="3005009" cy="3906611"/>
+          </a:xfrm>
+          <a:prstGeom prst="bentConnector3">
+            <a:avLst>
+              <a:gd name="adj1" fmla="val 102588"/>
+            </a:avLst>
+          </a:prstGeom>
+          <a:ln w="6350">
+            <a:solidFill>
+              <a:schemeClr val="accent3"/>
+            </a:solidFill>
+            <a:headEnd type="none" w="med" len="med"/>
+            <a:tailEnd type="none" w="med" len="med"/>
+          </a:ln>
+          <a:effectLst/>
+        </p:spPr>
+        <p:style>
+          <a:lnRef idx="1">
+            <a:schemeClr val="accent2"/>
+          </a:lnRef>
+          <a:fillRef idx="2">
+            <a:schemeClr val="accent2"/>
+          </a:fillRef>
+          <a:effectRef idx="1">
+            <a:schemeClr val="accent2"/>
+          </a:effectRef>
+          <a:fontRef idx="minor">
+            <a:schemeClr val="dk1"/>
+          </a:fontRef>
+        </p:style>
+      </p:cxnSp>
+      <p:cxnSp>
+        <p:nvCxnSpPr>
+          <p:cNvPr id="108" name="Elbow Connector 63">
+            <a:extLst>
+              <a:ext uri="{FF2B5EF4-FFF2-40B4-BE49-F238E27FC236}">
+                <a16:creationId xmlns:a16="http://schemas.microsoft.com/office/drawing/2014/main" id="{3262ED26-76D8-42D9-9E13-0BF06151A0B0}"/>
+              </a:ext>
+            </a:extLst>
+          </p:cNvPr>
+          <p:cNvCxnSpPr>
+            <a:cxnSpLocks/>
+          </p:cNvCxnSpPr>
+          <p:nvPr/>
+        </p:nvCxnSpPr>
+        <p:spPr>
+          <a:xfrm rot="5400000">
+            <a:off x="3712719" y="583684"/>
+            <a:ext cx="3458104" cy="3908927"/>
+          </a:xfrm>
+          <a:prstGeom prst="bentConnector3">
+            <a:avLst>
+              <a:gd name="adj1" fmla="val 101704"/>
+            </a:avLst>
+          </a:prstGeom>
+          <a:ln w="6350">
+            <a:solidFill>
+              <a:schemeClr val="accent3"/>
+            </a:solidFill>
+            <a:headEnd type="none" w="med" len="med"/>
+            <a:tailEnd type="none" w="med" len="med"/>
+          </a:ln>
+          <a:effectLst/>
+        </p:spPr>
+        <p:style>
+          <a:lnRef idx="1">
+            <a:schemeClr val="accent2"/>
+          </a:lnRef>
+          <a:fillRef idx="2">
+            <a:schemeClr val="accent2"/>
+          </a:fillRef>
+          <a:effectRef idx="1">
+            <a:schemeClr val="accent2"/>
+          </a:effectRef>
+          <a:fontRef idx="minor">
+            <a:schemeClr val="dk1"/>
+          </a:fontRef>
+        </p:style>
+      </p:cxnSp>
+      <p:cxnSp>
+        <p:nvCxnSpPr>
+          <p:cNvPr id="111" name="Elbow Connector 136">
+            <a:extLst>
+              <a:ext uri="{FF2B5EF4-FFF2-40B4-BE49-F238E27FC236}">
+                <a16:creationId xmlns:a16="http://schemas.microsoft.com/office/drawing/2014/main" id="{94611D28-3BD8-4654-83F4-B89EFA915B6F}"/>
+              </a:ext>
+            </a:extLst>
+          </p:cNvPr>
+          <p:cNvCxnSpPr>
+            <a:cxnSpLocks/>
+            <a:stCxn id="243" idx="2"/>
+            <a:endCxn id="237" idx="1"/>
+          </p:cNvCxnSpPr>
+          <p:nvPr/>
+        </p:nvCxnSpPr>
+        <p:spPr>
           <a:xfrm rot="16200000" flipH="1">
-            <a:off x="2143151" y="2685535"/>
-            <a:ext cx="1344297" cy="185277"/>
+            <a:off x="4416052" y="2328232"/>
+            <a:ext cx="102522" cy="1954133"/>
           </a:xfrm>
           <a:prstGeom prst="bentConnector2">
             <a:avLst/>
@@ -6570,7 +7673,157 @@
               <a:schemeClr val="accent3"/>
             </a:solidFill>
             <a:headEnd type="none" w="med" len="med"/>
+            <a:tailEnd type="none" w="med" len="med"/>
+          </a:ln>
+          <a:effectLst/>
+        </p:spPr>
+        <p:style>
+          <a:lnRef idx="1">
+            <a:schemeClr val="accent2"/>
+          </a:lnRef>
+          <a:fillRef idx="2">
+            <a:schemeClr val="accent2"/>
+          </a:fillRef>
+          <a:effectRef idx="1">
+            <a:schemeClr val="accent2"/>
+          </a:effectRef>
+          <a:fontRef idx="minor">
+            <a:schemeClr val="dk1"/>
+          </a:fontRef>
+        </p:style>
+      </p:cxnSp>
+      <p:cxnSp>
+        <p:nvCxnSpPr>
+          <p:cNvPr id="115" name="Elbow Connector 136">
+            <a:extLst>
+              <a:ext uri="{FF2B5EF4-FFF2-40B4-BE49-F238E27FC236}">
+                <a16:creationId xmlns:a16="http://schemas.microsoft.com/office/drawing/2014/main" id="{A2E6A0A1-F9DA-4D33-800D-581712C3736F}"/>
+              </a:ext>
+            </a:extLst>
+          </p:cNvPr>
+          <p:cNvCxnSpPr>
+            <a:cxnSpLocks/>
+            <a:stCxn id="247" idx="3"/>
+            <a:endCxn id="237" idx="1"/>
+          </p:cNvCxnSpPr>
+          <p:nvPr/>
+        </p:nvCxnSpPr>
+        <p:spPr>
+          <a:xfrm flipV="1">
+            <a:off x="4261387" y="3356560"/>
+            <a:ext cx="1182993" cy="765669"/>
+          </a:xfrm>
+          <a:prstGeom prst="bentConnector3">
+            <a:avLst>
+              <a:gd name="adj1" fmla="val 50797"/>
+            </a:avLst>
+          </a:prstGeom>
+          <a:ln w="19050">
+            <a:solidFill>
+              <a:schemeClr val="accent3"/>
+            </a:solidFill>
+            <a:headEnd type="none" w="med" len="med"/>
             <a:tailEnd type="arrow" w="med" len="med"/>
+          </a:ln>
+          <a:effectLst/>
+        </p:spPr>
+        <p:style>
+          <a:lnRef idx="1">
+            <a:schemeClr val="accent2"/>
+          </a:lnRef>
+          <a:fillRef idx="2">
+            <a:schemeClr val="accent2"/>
+          </a:fillRef>
+          <a:effectRef idx="1">
+            <a:schemeClr val="accent2"/>
+          </a:effectRef>
+          <a:fontRef idx="minor">
+            <a:schemeClr val="dk1"/>
+          </a:fontRef>
+        </p:style>
+      </p:cxnSp>
+      <p:cxnSp>
+        <p:nvCxnSpPr>
+          <p:cNvPr id="359" name="Elbow Connector 136">
+            <a:extLst>
+              <a:ext uri="{FF2B5EF4-FFF2-40B4-BE49-F238E27FC236}">
+                <a16:creationId xmlns:a16="http://schemas.microsoft.com/office/drawing/2014/main" id="{B6614D5B-DC8B-4A8A-B911-18BD383EF8CF}"/>
+              </a:ext>
+            </a:extLst>
+          </p:cNvPr>
+          <p:cNvCxnSpPr>
+            <a:cxnSpLocks/>
+            <a:stCxn id="246" idx="3"/>
+            <a:endCxn id="237" idx="1"/>
+          </p:cNvCxnSpPr>
+          <p:nvPr/>
+        </p:nvCxnSpPr>
+        <p:spPr>
+          <a:xfrm flipV="1">
+            <a:off x="4282903" y="3356560"/>
+            <a:ext cx="1161477" cy="303986"/>
+          </a:xfrm>
+          <a:prstGeom prst="bentConnector3">
+            <a:avLst>
+              <a:gd name="adj1" fmla="val 50000"/>
+            </a:avLst>
+          </a:prstGeom>
+          <a:ln w="19050">
+            <a:solidFill>
+              <a:schemeClr val="accent3"/>
+            </a:solidFill>
+            <a:headEnd type="none" w="med" len="med"/>
+            <a:tailEnd type="none" w="med" len="med"/>
+          </a:ln>
+          <a:effectLst/>
+        </p:spPr>
+        <p:style>
+          <a:lnRef idx="1">
+            <a:schemeClr val="accent2"/>
+          </a:lnRef>
+          <a:fillRef idx="2">
+            <a:schemeClr val="accent2"/>
+          </a:fillRef>
+          <a:effectRef idx="1">
+            <a:schemeClr val="accent2"/>
+          </a:effectRef>
+          <a:fontRef idx="minor">
+            <a:schemeClr val="dk1"/>
+          </a:fontRef>
+        </p:style>
+      </p:cxnSp>
+      <p:cxnSp>
+        <p:nvCxnSpPr>
+          <p:cNvPr id="383" name="Elbow Connector 63">
+            <a:extLst>
+              <a:ext uri="{FF2B5EF4-FFF2-40B4-BE49-F238E27FC236}">
+                <a16:creationId xmlns:a16="http://schemas.microsoft.com/office/drawing/2014/main" id="{7A48FCA3-D9C5-47C8-84C8-85304EC1F9C0}"/>
+              </a:ext>
+            </a:extLst>
+          </p:cNvPr>
+          <p:cNvCxnSpPr>
+            <a:cxnSpLocks/>
+            <a:stCxn id="16" idx="3"/>
+            <a:endCxn id="93" idx="2"/>
+          </p:cNvCxnSpPr>
+          <p:nvPr/>
+        </p:nvCxnSpPr>
+        <p:spPr>
+          <a:xfrm rot="5400000">
+            <a:off x="2981171" y="1301968"/>
+            <a:ext cx="4908944" cy="3921182"/>
+          </a:xfrm>
+          <a:prstGeom prst="bentConnector3">
+            <a:avLst>
+              <a:gd name="adj1" fmla="val 105233"/>
+            </a:avLst>
+          </a:prstGeom>
+          <a:ln w="6350">
+            <a:solidFill>
+              <a:schemeClr val="accent3"/>
+            </a:solidFill>
+            <a:headEnd type="none" w="med" len="med"/>
+            <a:tailEnd type="none" w="med" len="med"/>
           </a:ln>
           <a:effectLst/>
         </p:spPr>

</xml_diff>

<commit_message>
updated diagrams in DG
</commit_message>
<xml_diff>
--- a/docs/diagrams/UiComponentClassDiagram.pptx
+++ b/docs/diagrams/UiComponentClassDiagram.pptx
@@ -109,7 +109,7 @@
   </p:defaultTextStyle>
   <p:extLst>
     <p:ext uri="{EFAFB233-063F-42B5-8137-9DF3F51BA10A}">
-      <p15:sldGuideLst xmlns:p15="http://schemas.microsoft.com/office/powerpoint/2012/main">
+      <p15:sldGuideLst xmlns:p15="http://schemas.microsoft.com/office/powerpoint/2012/main" xmlns="">
         <p15:guide id="1" orient="horz" pos="1488">
           <p15:clr>
             <a:srgbClr val="A4A3A4"/>
@@ -208,7 +208,8 @@
           <a:p>
             <a:fld id="{F5CC4B3F-88C1-4FFA-B1B6-F41C21DC6924}" type="datetimeFigureOut">
               <a:rPr lang="en-US" smtClean="0"/>
-              <a:t>12/15/2018</a:t>
+              <a:pPr/>
+              <a:t>4/14/2019</a:t>
             </a:fld>
             <a:endParaRPr lang="en-US"/>
           </a:p>
@@ -366,6 +367,7 @@
           <a:p>
             <a:fld id="{5A7AB025-77E3-4BD1-A2FD-B3183DBA47A3}" type="slidenum">
               <a:rPr lang="en-US" smtClean="0"/>
+              <a:pPr/>
               <a:t>‹#›</a:t>
             </a:fld>
             <a:endParaRPr lang="en-US"/>
@@ -375,7 +377,7 @@
     </p:spTree>
     <p:extLst>
       <p:ext uri="{BB962C8B-B14F-4D97-AF65-F5344CB8AC3E}">
-        <p14:creationId xmlns:p14="http://schemas.microsoft.com/office/powerpoint/2010/main" val="2023976206"/>
+        <p14:creationId xmlns:p14="http://schemas.microsoft.com/office/powerpoint/2010/main" xmlns="" val="2023976206"/>
       </p:ext>
     </p:extLst>
   </p:cSld>
@@ -654,7 +656,8 @@
           <a:p>
             <a:fld id="{78C97017-6FC3-485B-9764-EAC9E56C1D49}" type="datetimeFigureOut">
               <a:rPr lang="en-US" smtClean="0"/>
-              <a:t>12/15/2018</a:t>
+              <a:pPr/>
+              <a:t>4/14/2019</a:t>
             </a:fld>
             <a:endParaRPr lang="en-US"/>
           </a:p>
@@ -696,6 +699,7 @@
           <a:p>
             <a:fld id="{FB34683C-161B-4520-BF45-B179E228CF2A}" type="slidenum">
               <a:rPr lang="en-US" smtClean="0"/>
+              <a:pPr/>
               <a:t>‹#›</a:t>
             </a:fld>
             <a:endParaRPr lang="en-US"/>
@@ -705,7 +709,7 @@
     </p:spTree>
     <p:extLst>
       <p:ext uri="{BB962C8B-B14F-4D97-AF65-F5344CB8AC3E}">
-        <p14:creationId xmlns:p14="http://schemas.microsoft.com/office/powerpoint/2010/main" val="3246593157"/>
+        <p14:creationId xmlns:p14="http://schemas.microsoft.com/office/powerpoint/2010/main" xmlns="" val="3246593157"/>
       </p:ext>
     </p:extLst>
   </p:cSld>
@@ -822,7 +826,8 @@
           <a:p>
             <a:fld id="{78C97017-6FC3-485B-9764-EAC9E56C1D49}" type="datetimeFigureOut">
               <a:rPr lang="en-US" smtClean="0"/>
-              <a:t>12/15/2018</a:t>
+              <a:pPr/>
+              <a:t>4/14/2019</a:t>
             </a:fld>
             <a:endParaRPr lang="en-US"/>
           </a:p>
@@ -864,6 +869,7 @@
           <a:p>
             <a:fld id="{FB34683C-161B-4520-BF45-B179E228CF2A}" type="slidenum">
               <a:rPr lang="en-US" smtClean="0"/>
+              <a:pPr/>
               <a:t>‹#›</a:t>
             </a:fld>
             <a:endParaRPr lang="en-US"/>
@@ -873,7 +879,7 @@
     </p:spTree>
     <p:extLst>
       <p:ext uri="{BB962C8B-B14F-4D97-AF65-F5344CB8AC3E}">
-        <p14:creationId xmlns:p14="http://schemas.microsoft.com/office/powerpoint/2010/main" val="2707025021"/>
+        <p14:creationId xmlns:p14="http://schemas.microsoft.com/office/powerpoint/2010/main" xmlns="" val="2707025021"/>
       </p:ext>
     </p:extLst>
   </p:cSld>
@@ -1000,7 +1006,8 @@
           <a:p>
             <a:fld id="{78C97017-6FC3-485B-9764-EAC9E56C1D49}" type="datetimeFigureOut">
               <a:rPr lang="en-US" smtClean="0"/>
-              <a:t>12/15/2018</a:t>
+              <a:pPr/>
+              <a:t>4/14/2019</a:t>
             </a:fld>
             <a:endParaRPr lang="en-US"/>
           </a:p>
@@ -1042,6 +1049,7 @@
           <a:p>
             <a:fld id="{FB34683C-161B-4520-BF45-B179E228CF2A}" type="slidenum">
               <a:rPr lang="en-US" smtClean="0"/>
+              <a:pPr/>
               <a:t>‹#›</a:t>
             </a:fld>
             <a:endParaRPr lang="en-US"/>
@@ -1051,7 +1059,7 @@
     </p:spTree>
     <p:extLst>
       <p:ext uri="{BB962C8B-B14F-4D97-AF65-F5344CB8AC3E}">
-        <p14:creationId xmlns:p14="http://schemas.microsoft.com/office/powerpoint/2010/main" val="568378986"/>
+        <p14:creationId xmlns:p14="http://schemas.microsoft.com/office/powerpoint/2010/main" xmlns="" val="568378986"/>
       </p:ext>
     </p:extLst>
   </p:cSld>
@@ -1168,7 +1176,8 @@
           <a:p>
             <a:fld id="{78C97017-6FC3-485B-9764-EAC9E56C1D49}" type="datetimeFigureOut">
               <a:rPr lang="en-US" smtClean="0"/>
-              <a:t>12/15/2018</a:t>
+              <a:pPr/>
+              <a:t>4/14/2019</a:t>
             </a:fld>
             <a:endParaRPr lang="en-US"/>
           </a:p>
@@ -1210,6 +1219,7 @@
           <a:p>
             <a:fld id="{FB34683C-161B-4520-BF45-B179E228CF2A}" type="slidenum">
               <a:rPr lang="en-US" smtClean="0"/>
+              <a:pPr/>
               <a:t>‹#›</a:t>
             </a:fld>
             <a:endParaRPr lang="en-US"/>
@@ -1219,7 +1229,7 @@
     </p:spTree>
     <p:extLst>
       <p:ext uri="{BB962C8B-B14F-4D97-AF65-F5344CB8AC3E}">
-        <p14:creationId xmlns:p14="http://schemas.microsoft.com/office/powerpoint/2010/main" val="266658052"/>
+        <p14:creationId xmlns:p14="http://schemas.microsoft.com/office/powerpoint/2010/main" xmlns="" val="266658052"/>
       </p:ext>
     </p:extLst>
   </p:cSld>
@@ -1413,7 +1423,8 @@
           <a:p>
             <a:fld id="{78C97017-6FC3-485B-9764-EAC9E56C1D49}" type="datetimeFigureOut">
               <a:rPr lang="en-US" smtClean="0"/>
-              <a:t>12/15/2018</a:t>
+              <a:pPr/>
+              <a:t>4/14/2019</a:t>
             </a:fld>
             <a:endParaRPr lang="en-US"/>
           </a:p>
@@ -1455,6 +1466,7 @@
           <a:p>
             <a:fld id="{FB34683C-161B-4520-BF45-B179E228CF2A}" type="slidenum">
               <a:rPr lang="en-US" smtClean="0"/>
+              <a:pPr/>
               <a:t>‹#›</a:t>
             </a:fld>
             <a:endParaRPr lang="en-US"/>
@@ -1464,7 +1476,7 @@
     </p:spTree>
     <p:extLst>
       <p:ext uri="{BB962C8B-B14F-4D97-AF65-F5344CB8AC3E}">
-        <p14:creationId xmlns:p14="http://schemas.microsoft.com/office/powerpoint/2010/main" val="474686344"/>
+        <p14:creationId xmlns:p14="http://schemas.microsoft.com/office/powerpoint/2010/main" xmlns="" val="474686344"/>
       </p:ext>
     </p:extLst>
   </p:cSld>
@@ -1698,7 +1710,8 @@
           <a:p>
             <a:fld id="{78C97017-6FC3-485B-9764-EAC9E56C1D49}" type="datetimeFigureOut">
               <a:rPr lang="en-US" smtClean="0"/>
-              <a:t>12/15/2018</a:t>
+              <a:pPr/>
+              <a:t>4/14/2019</a:t>
             </a:fld>
             <a:endParaRPr lang="en-US"/>
           </a:p>
@@ -1740,6 +1753,7 @@
           <a:p>
             <a:fld id="{FB34683C-161B-4520-BF45-B179E228CF2A}" type="slidenum">
               <a:rPr lang="en-US" smtClean="0"/>
+              <a:pPr/>
               <a:t>‹#›</a:t>
             </a:fld>
             <a:endParaRPr lang="en-US"/>
@@ -1749,7 +1763,7 @@
     </p:spTree>
     <p:extLst>
       <p:ext uri="{BB962C8B-B14F-4D97-AF65-F5344CB8AC3E}">
-        <p14:creationId xmlns:p14="http://schemas.microsoft.com/office/powerpoint/2010/main" val="562293251"/>
+        <p14:creationId xmlns:p14="http://schemas.microsoft.com/office/powerpoint/2010/main" xmlns="" val="562293251"/>
       </p:ext>
     </p:extLst>
   </p:cSld>
@@ -2117,7 +2131,8 @@
           <a:p>
             <a:fld id="{78C97017-6FC3-485B-9764-EAC9E56C1D49}" type="datetimeFigureOut">
               <a:rPr lang="en-US" smtClean="0"/>
-              <a:t>12/15/2018</a:t>
+              <a:pPr/>
+              <a:t>4/14/2019</a:t>
             </a:fld>
             <a:endParaRPr lang="en-US"/>
           </a:p>
@@ -2159,6 +2174,7 @@
           <a:p>
             <a:fld id="{FB34683C-161B-4520-BF45-B179E228CF2A}" type="slidenum">
               <a:rPr lang="en-US" smtClean="0"/>
+              <a:pPr/>
               <a:t>‹#›</a:t>
             </a:fld>
             <a:endParaRPr lang="en-US"/>
@@ -2168,7 +2184,7 @@
     </p:spTree>
     <p:extLst>
       <p:ext uri="{BB962C8B-B14F-4D97-AF65-F5344CB8AC3E}">
-        <p14:creationId xmlns:p14="http://schemas.microsoft.com/office/powerpoint/2010/main" val="1126424250"/>
+        <p14:creationId xmlns:p14="http://schemas.microsoft.com/office/powerpoint/2010/main" xmlns="" val="1126424250"/>
       </p:ext>
     </p:extLst>
   </p:cSld>
@@ -2234,7 +2250,8 @@
           <a:p>
             <a:fld id="{78C97017-6FC3-485B-9764-EAC9E56C1D49}" type="datetimeFigureOut">
               <a:rPr lang="en-US" smtClean="0"/>
-              <a:t>12/15/2018</a:t>
+              <a:pPr/>
+              <a:t>4/14/2019</a:t>
             </a:fld>
             <a:endParaRPr lang="en-US"/>
           </a:p>
@@ -2276,6 +2293,7 @@
           <a:p>
             <a:fld id="{FB34683C-161B-4520-BF45-B179E228CF2A}" type="slidenum">
               <a:rPr lang="en-US" smtClean="0"/>
+              <a:pPr/>
               <a:t>‹#›</a:t>
             </a:fld>
             <a:endParaRPr lang="en-US"/>
@@ -2285,7 +2303,7 @@
     </p:spTree>
     <p:extLst>
       <p:ext uri="{BB962C8B-B14F-4D97-AF65-F5344CB8AC3E}">
-        <p14:creationId xmlns:p14="http://schemas.microsoft.com/office/powerpoint/2010/main" val="4159724230"/>
+        <p14:creationId xmlns:p14="http://schemas.microsoft.com/office/powerpoint/2010/main" xmlns="" val="4159724230"/>
       </p:ext>
     </p:extLst>
   </p:cSld>
@@ -2329,7 +2347,8 @@
           <a:p>
             <a:fld id="{78C97017-6FC3-485B-9764-EAC9E56C1D49}" type="datetimeFigureOut">
               <a:rPr lang="en-US" smtClean="0"/>
-              <a:t>12/15/2018</a:t>
+              <a:pPr/>
+              <a:t>4/14/2019</a:t>
             </a:fld>
             <a:endParaRPr lang="en-US"/>
           </a:p>
@@ -2371,6 +2390,7 @@
           <a:p>
             <a:fld id="{FB34683C-161B-4520-BF45-B179E228CF2A}" type="slidenum">
               <a:rPr lang="en-US" smtClean="0"/>
+              <a:pPr/>
               <a:t>‹#›</a:t>
             </a:fld>
             <a:endParaRPr lang="en-US"/>
@@ -2380,7 +2400,7 @@
     </p:spTree>
     <p:extLst>
       <p:ext uri="{BB962C8B-B14F-4D97-AF65-F5344CB8AC3E}">
-        <p14:creationId xmlns:p14="http://schemas.microsoft.com/office/powerpoint/2010/main" val="1793928710"/>
+        <p14:creationId xmlns:p14="http://schemas.microsoft.com/office/powerpoint/2010/main" xmlns="" val="1793928710"/>
       </p:ext>
     </p:extLst>
   </p:cSld>
@@ -2604,7 +2624,8 @@
           <a:p>
             <a:fld id="{78C97017-6FC3-485B-9764-EAC9E56C1D49}" type="datetimeFigureOut">
               <a:rPr lang="en-US" smtClean="0"/>
-              <a:t>12/15/2018</a:t>
+              <a:pPr/>
+              <a:t>4/14/2019</a:t>
             </a:fld>
             <a:endParaRPr lang="en-US"/>
           </a:p>
@@ -2646,6 +2667,7 @@
           <a:p>
             <a:fld id="{FB34683C-161B-4520-BF45-B179E228CF2A}" type="slidenum">
               <a:rPr lang="en-US" smtClean="0"/>
+              <a:pPr/>
               <a:t>‹#›</a:t>
             </a:fld>
             <a:endParaRPr lang="en-US"/>
@@ -2655,7 +2677,7 @@
     </p:spTree>
     <p:extLst>
       <p:ext uri="{BB962C8B-B14F-4D97-AF65-F5344CB8AC3E}">
-        <p14:creationId xmlns:p14="http://schemas.microsoft.com/office/powerpoint/2010/main" val="2076802089"/>
+        <p14:creationId xmlns:p14="http://schemas.microsoft.com/office/powerpoint/2010/main" xmlns="" val="2076802089"/>
       </p:ext>
     </p:extLst>
   </p:cSld>
@@ -2856,7 +2878,8 @@
           <a:p>
             <a:fld id="{78C97017-6FC3-485B-9764-EAC9E56C1D49}" type="datetimeFigureOut">
               <a:rPr lang="en-US" smtClean="0"/>
-              <a:t>12/15/2018</a:t>
+              <a:pPr/>
+              <a:t>4/14/2019</a:t>
             </a:fld>
             <a:endParaRPr lang="en-US"/>
           </a:p>
@@ -2898,6 +2921,7 @@
           <a:p>
             <a:fld id="{FB34683C-161B-4520-BF45-B179E228CF2A}" type="slidenum">
               <a:rPr lang="en-US" smtClean="0"/>
+              <a:pPr/>
               <a:t>‹#›</a:t>
             </a:fld>
             <a:endParaRPr lang="en-US"/>
@@ -2907,7 +2931,7 @@
     </p:spTree>
     <p:extLst>
       <p:ext uri="{BB962C8B-B14F-4D97-AF65-F5344CB8AC3E}">
-        <p14:creationId xmlns:p14="http://schemas.microsoft.com/office/powerpoint/2010/main" val="201835938"/>
+        <p14:creationId xmlns:p14="http://schemas.microsoft.com/office/powerpoint/2010/main" xmlns="" val="201835938"/>
       </p:ext>
     </p:extLst>
   </p:cSld>
@@ -3067,7 +3091,8 @@
           <a:p>
             <a:fld id="{78C97017-6FC3-485B-9764-EAC9E56C1D49}" type="datetimeFigureOut">
               <a:rPr lang="en-US" smtClean="0"/>
-              <a:t>12/15/2018</a:t>
+              <a:pPr/>
+              <a:t>4/14/2019</a:t>
             </a:fld>
             <a:endParaRPr lang="en-US"/>
           </a:p>
@@ -3145,6 +3170,7 @@
           <a:p>
             <a:fld id="{FB34683C-161B-4520-BF45-B179E228CF2A}" type="slidenum">
               <a:rPr lang="en-US" smtClean="0"/>
+              <a:pPr/>
               <a:t>‹#›</a:t>
             </a:fld>
             <a:endParaRPr lang="en-US"/>
@@ -3154,7 +3180,7 @@
     </p:spTree>
     <p:extLst>
       <p:ext uri="{BB962C8B-B14F-4D97-AF65-F5344CB8AC3E}">
-        <p14:creationId xmlns:p14="http://schemas.microsoft.com/office/powerpoint/2010/main" val="2341400630"/>
+        <p14:creationId xmlns:p14="http://schemas.microsoft.com/office/powerpoint/2010/main" xmlns="" val="2341400630"/>
       </p:ext>
     </p:extLst>
   </p:cSld>
@@ -4005,8 +4031,8 @@
         </p:nvSpPr>
         <p:spPr>
           <a:xfrm>
-            <a:off x="2592526" y="3991960"/>
-            <a:ext cx="1093635" cy="236841"/>
+            <a:off x="2592526" y="3962400"/>
+            <a:ext cx="1093635" cy="266401"/>
           </a:xfrm>
           <a:prstGeom prst="rect">
             <a:avLst/>
@@ -4038,14 +4064,34 @@
           <a:p>
             <a:pPr algn="ctr"/>
             <a:r>
-              <a:rPr lang="en-US" sz="1050" b="1" dirty="0" err="1">
+              <a:rPr lang="en-US" sz="1050" b="1" dirty="0" err="1" smtClean="0">
                 <a:solidFill>
                   <a:schemeClr val="accent3">
                     <a:lumMod val="75000"/>
                   </a:schemeClr>
                 </a:solidFill>
               </a:rPr>
-              <a:t>PersonListPanel</a:t>
+              <a:t>ModuleTaken</a:t>
+            </a:r>
+            <a:endParaRPr lang="en-US" sz="1050" b="1" dirty="0" smtClean="0">
+              <a:solidFill>
+                <a:schemeClr val="accent3">
+                  <a:lumMod val="75000"/>
+                </a:schemeClr>
+              </a:solidFill>
+            </a:endParaRPr>
+          </a:p>
+          <a:p>
+            <a:pPr algn="ctr"/>
+            <a:r>
+              <a:rPr lang="en-US" sz="1050" b="1" dirty="0" err="1" smtClean="0">
+                <a:solidFill>
+                  <a:schemeClr val="accent3">
+                    <a:lumMod val="75000"/>
+                  </a:schemeClr>
+                </a:solidFill>
+              </a:rPr>
+              <a:t>ListPanel</a:t>
             </a:r>
             <a:endParaRPr lang="en-SG" sz="1050" b="1" dirty="0">
               <a:solidFill>
@@ -4065,8 +4111,8 @@
         </p:nvSpPr>
         <p:spPr>
           <a:xfrm>
-            <a:off x="3839323" y="4228801"/>
-            <a:ext cx="1040906" cy="236841"/>
+            <a:off x="3839322" y="4228801"/>
+            <a:ext cx="1266077" cy="236841"/>
           </a:xfrm>
           <a:prstGeom prst="rect">
             <a:avLst/>
@@ -4098,14 +4144,14 @@
           <a:p>
             <a:pPr algn="ctr"/>
             <a:r>
-              <a:rPr lang="en-US" sz="1050" b="1" dirty="0" err="1">
+              <a:rPr lang="en-US" sz="1050" b="1" dirty="0" err="1" smtClean="0">
                 <a:solidFill>
                   <a:schemeClr val="accent3">
                     <a:lumMod val="75000"/>
                   </a:schemeClr>
                 </a:solidFill>
               </a:rPr>
-              <a:t>PersonCard</a:t>
+              <a:t>ModuleTakenCard</a:t>
             </a:r>
             <a:endParaRPr lang="en-SG" sz="1050" b="1" dirty="0">
               <a:solidFill>
@@ -4378,8 +4424,8 @@
         </p:nvCxnSpPr>
         <p:spPr>
           <a:xfrm rot="16200000" flipH="1">
-            <a:off x="1883148" y="3401003"/>
-            <a:ext cx="1242356" cy="176400"/>
+            <a:off x="1890538" y="3393613"/>
+            <a:ext cx="1227576" cy="176400"/>
           </a:xfrm>
           <a:prstGeom prst="bentConnector2">
             <a:avLst/>
@@ -4620,8 +4666,8 @@
         </p:nvCxnSpPr>
         <p:spPr>
           <a:xfrm rot="5400000">
-            <a:off x="4174488" y="2991741"/>
-            <a:ext cx="2061222" cy="649740"/>
+            <a:off x="4287073" y="3104326"/>
+            <a:ext cx="2061222" cy="424570"/>
           </a:xfrm>
           <a:prstGeom prst="bentConnector2">
             <a:avLst/>
@@ -5168,8 +5214,8 @@
         </p:nvCxnSpPr>
         <p:spPr>
           <a:xfrm rot="16200000" flipH="1">
-            <a:off x="3430123" y="3938021"/>
-            <a:ext cx="118421" cy="699979"/>
+            <a:off x="3430123" y="3938022"/>
+            <a:ext cx="118421" cy="699978"/>
           </a:xfrm>
           <a:prstGeom prst="bentConnector2">
             <a:avLst/>
@@ -5209,8 +5255,8 @@
         </p:nvCxnSpPr>
         <p:spPr>
           <a:xfrm rot="5400000">
-            <a:off x="3695875" y="2276286"/>
-            <a:ext cx="1824381" cy="1843808"/>
+            <a:off x="3703265" y="2268896"/>
+            <a:ext cx="1809601" cy="1843808"/>
           </a:xfrm>
           <a:prstGeom prst="bentConnector2">
             <a:avLst/>
@@ -5512,7 +5558,7 @@
     </p:spTree>
     <p:extLst>
       <p:ext uri="{BB962C8B-B14F-4D97-AF65-F5344CB8AC3E}">
-        <p14:creationId xmlns:p14="http://schemas.microsoft.com/office/powerpoint/2010/main" val="2776882492"/>
+        <p14:creationId xmlns:p14="http://schemas.microsoft.com/office/powerpoint/2010/main" xmlns="" val="2776882492"/>
       </p:ext>
     </p:extLst>
   </p:cSld>

</xml_diff>

<commit_message>
Updated all docs - PPP, User Guide and Developer Guide.
</commit_message>
<xml_diff>
--- a/docs/diagrams/UiComponentClassDiagram.pptx
+++ b/docs/diagrams/UiComponentClassDiagram.pptx
@@ -208,7 +208,7 @@
           <a:p>
             <a:fld id="{F5CC4B3F-88C1-4FFA-B1B6-F41C21DC6924}" type="datetimeFigureOut">
               <a:rPr lang="en-US" smtClean="0"/>
-              <a:t>4/13/19</a:t>
+              <a:t>4/14/19</a:t>
             </a:fld>
             <a:endParaRPr lang="en-US" dirty="0"/>
           </a:p>
@@ -738,7 +738,7 @@
           <a:p>
             <a:fld id="{78C97017-6FC3-485B-9764-EAC9E56C1D49}" type="datetimeFigureOut">
               <a:rPr lang="en-US" smtClean="0"/>
-              <a:t>4/13/19</a:t>
+              <a:t>4/14/19</a:t>
             </a:fld>
             <a:endParaRPr lang="en-US" dirty="0"/>
           </a:p>
@@ -906,7 +906,7 @@
           <a:p>
             <a:fld id="{78C97017-6FC3-485B-9764-EAC9E56C1D49}" type="datetimeFigureOut">
               <a:rPr lang="en-US" smtClean="0"/>
-              <a:t>4/13/19</a:t>
+              <a:t>4/14/19</a:t>
             </a:fld>
             <a:endParaRPr lang="en-US" dirty="0"/>
           </a:p>
@@ -1084,7 +1084,7 @@
           <a:p>
             <a:fld id="{78C97017-6FC3-485B-9764-EAC9E56C1D49}" type="datetimeFigureOut">
               <a:rPr lang="en-US" smtClean="0"/>
-              <a:t>4/13/19</a:t>
+              <a:t>4/14/19</a:t>
             </a:fld>
             <a:endParaRPr lang="en-US" dirty="0"/>
           </a:p>
@@ -1252,7 +1252,7 @@
           <a:p>
             <a:fld id="{78C97017-6FC3-485B-9764-EAC9E56C1D49}" type="datetimeFigureOut">
               <a:rPr lang="en-US" smtClean="0"/>
-              <a:t>4/13/19</a:t>
+              <a:t>4/14/19</a:t>
             </a:fld>
             <a:endParaRPr lang="en-US" dirty="0"/>
           </a:p>
@@ -1497,7 +1497,7 @@
           <a:p>
             <a:fld id="{78C97017-6FC3-485B-9764-EAC9E56C1D49}" type="datetimeFigureOut">
               <a:rPr lang="en-US" smtClean="0"/>
-              <a:t>4/13/19</a:t>
+              <a:t>4/14/19</a:t>
             </a:fld>
             <a:endParaRPr lang="en-US" dirty="0"/>
           </a:p>
@@ -1782,7 +1782,7 @@
           <a:p>
             <a:fld id="{78C97017-6FC3-485B-9764-EAC9E56C1D49}" type="datetimeFigureOut">
               <a:rPr lang="en-US" smtClean="0"/>
-              <a:t>4/13/19</a:t>
+              <a:t>4/14/19</a:t>
             </a:fld>
             <a:endParaRPr lang="en-US" dirty="0"/>
           </a:p>
@@ -2201,7 +2201,7 @@
           <a:p>
             <a:fld id="{78C97017-6FC3-485B-9764-EAC9E56C1D49}" type="datetimeFigureOut">
               <a:rPr lang="en-US" smtClean="0"/>
-              <a:t>4/13/19</a:t>
+              <a:t>4/14/19</a:t>
             </a:fld>
             <a:endParaRPr lang="en-US" dirty="0"/>
           </a:p>
@@ -2318,7 +2318,7 @@
           <a:p>
             <a:fld id="{78C97017-6FC3-485B-9764-EAC9E56C1D49}" type="datetimeFigureOut">
               <a:rPr lang="en-US" smtClean="0"/>
-              <a:t>4/13/19</a:t>
+              <a:t>4/14/19</a:t>
             </a:fld>
             <a:endParaRPr lang="en-US" dirty="0"/>
           </a:p>
@@ -2413,7 +2413,7 @@
           <a:p>
             <a:fld id="{78C97017-6FC3-485B-9764-EAC9E56C1D49}" type="datetimeFigureOut">
               <a:rPr lang="en-US" smtClean="0"/>
-              <a:t>4/13/19</a:t>
+              <a:t>4/14/19</a:t>
             </a:fld>
             <a:endParaRPr lang="en-US" dirty="0"/>
           </a:p>
@@ -2688,7 +2688,7 @@
           <a:p>
             <a:fld id="{78C97017-6FC3-485B-9764-EAC9E56C1D49}" type="datetimeFigureOut">
               <a:rPr lang="en-US" smtClean="0"/>
-              <a:t>4/13/19</a:t>
+              <a:t>4/14/19</a:t>
             </a:fld>
             <a:endParaRPr lang="en-US" dirty="0"/>
           </a:p>
@@ -2940,7 +2940,7 @@
           <a:p>
             <a:fld id="{78C97017-6FC3-485B-9764-EAC9E56C1D49}" type="datetimeFigureOut">
               <a:rPr lang="en-US" smtClean="0"/>
-              <a:t>4/13/19</a:t>
+              <a:t>4/14/19</a:t>
             </a:fld>
             <a:endParaRPr lang="en-US" dirty="0"/>
           </a:p>
@@ -3151,7 +3151,7 @@
           <a:p>
             <a:fld id="{78C97017-6FC3-485B-9764-EAC9E56C1D49}" type="datetimeFigureOut">
               <a:rPr lang="en-US" smtClean="0"/>
-              <a:t>4/13/19</a:t>
+              <a:t>4/14/19</a:t>
             </a:fld>
             <a:endParaRPr lang="en-US" dirty="0"/>
           </a:p>
@@ -3540,7 +3540,7 @@
         </p:nvSpPr>
         <p:spPr>
           <a:xfrm>
-            <a:off x="114748" y="76155"/>
+            <a:off x="289640" y="32734"/>
             <a:ext cx="7581451" cy="6781845"/>
           </a:xfrm>
           <a:prstGeom prst="roundRect">

</xml_diff>